<commit_message>
Neu: Schleifen und Verzweigungen
</commit_message>
<xml_diff>
--- a/presentations/Dart.pptx
+++ b/presentations/Dart.pptx
@@ -6,10 +6,10 @@
     <p:sldMasterId id="2147483656" r:id="rId2"/>
   </p:sldMasterIdLst>
   <p:notesMasterIdLst>
-    <p:notesMasterId r:id="rId21"/>
+    <p:notesMasterId r:id="rId28"/>
   </p:notesMasterIdLst>
   <p:handoutMasterIdLst>
-    <p:handoutMasterId r:id="rId22"/>
+    <p:handoutMasterId r:id="rId29"/>
   </p:handoutMasterIdLst>
   <p:sldIdLst>
     <p:sldId id="256" r:id="rId3"/>
@@ -30,6 +30,13 @@
     <p:sldId id="281" r:id="rId18"/>
     <p:sldId id="309" r:id="rId19"/>
     <p:sldId id="282" r:id="rId20"/>
+    <p:sldId id="288" r:id="rId21"/>
+    <p:sldId id="289" r:id="rId22"/>
+    <p:sldId id="290" r:id="rId23"/>
+    <p:sldId id="291" r:id="rId24"/>
+    <p:sldId id="292" r:id="rId25"/>
+    <p:sldId id="293" r:id="rId26"/>
+    <p:sldId id="294" r:id="rId27"/>
   </p:sldIdLst>
   <p:sldSz cx="12192000" cy="6858000"/>
   <p:notesSz cx="6858000" cy="9144000"/>
@@ -173,13 +180,23 @@
           <p14:sldIdLst/>
         </p14:section>
         <p14:section name="Wiederholungen" id="{73AB8712-4E2F-4040-9017-514AEF21DC08}">
-          <p14:sldIdLst/>
+          <p14:sldIdLst>
+            <p14:sldId id="288"/>
+            <p14:sldId id="289"/>
+          </p14:sldIdLst>
         </p14:section>
         <p14:section name="Wahrheitswerte" id="{4B6C73D6-2AD1-474F-AF6B-C90110223A5C}">
-          <p14:sldIdLst/>
+          <p14:sldIdLst>
+            <p14:sldId id="290"/>
+            <p14:sldId id="291"/>
+            <p14:sldId id="292"/>
+          </p14:sldIdLst>
         </p14:section>
         <p14:section name="Verzweigungen" id="{D12F182A-0B35-4F29-BE79-871A7FEF371C}">
-          <p14:sldIdLst/>
+          <p14:sldIdLst>
+            <p14:sldId id="293"/>
+            <p14:sldId id="294"/>
+          </p14:sldIdLst>
         </p14:section>
         <p14:section name="Listen" id="{7B341E35-302E-4EF2-A04B-B7E558EEEB6F}">
           <p14:sldIdLst/>
@@ -336,7 +353,7 @@
                   <a:schemeClr val="tx2"/>
                 </a:solidFill>
               </a:rPr>
-              <a:t>16.01.2023</a:t>
+              <a:t>23.01.2023</a:t>
             </a:fld>
             <a:endParaRPr lang="de-DE">
               <a:solidFill>
@@ -686,7 +703,7 @@
             <a:fld id="{B4113CCE-1A1A-46DB-884A-AE560F65C3AF}" type="datetimeFigureOut">
               <a:rPr lang="de-DE" smtClean="0"/>
               <a:pPr/>
-              <a:t>16.01.2023</a:t>
+              <a:t>23.01.2023</a:t>
             </a:fld>
             <a:endParaRPr lang="de-DE"/>
           </a:p>
@@ -1803,6 +1820,517 @@
 </p:notes>
 </file>
 
+<file path=ppt/notesSlides/notesSlide15.xml><?xml version="1.0" encoding="utf-8"?>
+<p:notes xmlns:a="http://schemas.openxmlformats.org/drawingml/2006/main" xmlns:r="http://schemas.openxmlformats.org/officeDocument/2006/relationships" xmlns:p="http://schemas.openxmlformats.org/presentationml/2006/main">
+  <p:cSld>
+    <p:spTree>
+      <p:nvGrpSpPr>
+        <p:cNvPr id="1" name=""/>
+        <p:cNvGrpSpPr/>
+        <p:nvPr/>
+      </p:nvGrpSpPr>
+      <p:grpSpPr>
+        <a:xfrm>
+          <a:off x="0" y="0"/>
+          <a:ext cx="0" cy="0"/>
+          <a:chOff x="0" y="0"/>
+          <a:chExt cx="0" cy="0"/>
+        </a:xfrm>
+      </p:grpSpPr>
+      <p:sp>
+        <p:nvSpPr>
+          <p:cNvPr id="2" name="Folienbildplatzhalter 1"/>
+          <p:cNvSpPr>
+            <a:spLocks noGrp="1" noRot="1" noChangeAspect="1"/>
+          </p:cNvSpPr>
+          <p:nvPr>
+            <p:ph type="sldImg"/>
+          </p:nvPr>
+        </p:nvSpPr>
+        <p:spPr>
+          <a:xfrm>
+            <a:off x="685800" y="1143000"/>
+            <a:ext cx="4270375" cy="2401888"/>
+          </a:xfrm>
+        </p:spPr>
+      </p:sp>
+      <p:sp>
+        <p:nvSpPr>
+          <p:cNvPr id="3" name="Notizenplatzhalter 2"/>
+          <p:cNvSpPr>
+            <a:spLocks noGrp="1"/>
+          </p:cNvSpPr>
+          <p:nvPr>
+            <p:ph type="body" idx="1"/>
+          </p:nvPr>
+        </p:nvSpPr>
+        <p:spPr/>
+        <p:txBody>
+          <a:bodyPr/>
+          <a:lstStyle/>
+          <a:p>
+            <a:r>
+              <a:rPr lang="de-DE" dirty="0"/>
+              <a:t>Das Ende ist bei &lt; exklusive, bei &lt;= inklusiv. </a:t>
+            </a:r>
+          </a:p>
+          <a:p>
+            <a:r>
+              <a:rPr lang="de-DE" dirty="0"/>
+              <a:t>&lt; kommt deutlich öfter vor als &lt;=. Überlege, ob Du &lt;= ende oder &lt; ende+1 schreiben willst.</a:t>
+            </a:r>
+          </a:p>
+          <a:p>
+            <a:r>
+              <a:rPr lang="de-DE" dirty="0"/>
+              <a:t>Die Zahl muss nicht um 1 erhöht werden. Das ist aber wiederum der häufigste Fall.</a:t>
+            </a:r>
+          </a:p>
+        </p:txBody>
+      </p:sp>
+      <p:sp>
+        <p:nvSpPr>
+          <p:cNvPr id="4" name="Foliennummernplatzhalter 3"/>
+          <p:cNvSpPr>
+            <a:spLocks noGrp="1"/>
+          </p:cNvSpPr>
+          <p:nvPr>
+            <p:ph type="sldNum" sz="quarter" idx="5"/>
+          </p:nvPr>
+        </p:nvSpPr>
+        <p:spPr/>
+        <p:txBody>
+          <a:bodyPr/>
+          <a:lstStyle/>
+          <a:p>
+            <a:fld id="{927DBD90-B360-417B-B4B3-F05A4AFC1996}" type="slidenum">
+              <a:rPr lang="de-DE" smtClean="0"/>
+              <a:pPr/>
+              <a:t>19</a:t>
+            </a:fld>
+            <a:endParaRPr lang="de-DE"/>
+          </a:p>
+        </p:txBody>
+      </p:sp>
+    </p:spTree>
+    <p:extLst>
+      <p:ext uri="{BB962C8B-B14F-4D97-AF65-F5344CB8AC3E}">
+        <p14:creationId xmlns:p14="http://schemas.microsoft.com/office/powerpoint/2010/main" val="1074791135"/>
+      </p:ext>
+    </p:extLst>
+  </p:cSld>
+  <p:clrMapOvr>
+    <a:masterClrMapping/>
+  </p:clrMapOvr>
+</p:notes>
+</file>
+
+<file path=ppt/notesSlides/notesSlide16.xml><?xml version="1.0" encoding="utf-8"?>
+<p:notes xmlns:a="http://schemas.openxmlformats.org/drawingml/2006/main" xmlns:r="http://schemas.openxmlformats.org/officeDocument/2006/relationships" xmlns:p="http://schemas.openxmlformats.org/presentationml/2006/main">
+  <p:cSld>
+    <p:spTree>
+      <p:nvGrpSpPr>
+        <p:cNvPr id="1" name=""/>
+        <p:cNvGrpSpPr/>
+        <p:nvPr/>
+      </p:nvGrpSpPr>
+      <p:grpSpPr>
+        <a:xfrm>
+          <a:off x="0" y="0"/>
+          <a:ext cx="0" cy="0"/>
+          <a:chOff x="0" y="0"/>
+          <a:chExt cx="0" cy="0"/>
+        </a:xfrm>
+      </p:grpSpPr>
+      <p:sp>
+        <p:nvSpPr>
+          <p:cNvPr id="2" name="Folienbildplatzhalter 1"/>
+          <p:cNvSpPr>
+            <a:spLocks noGrp="1" noRot="1" noChangeAspect="1"/>
+          </p:cNvSpPr>
+          <p:nvPr>
+            <p:ph type="sldImg"/>
+          </p:nvPr>
+        </p:nvSpPr>
+        <p:spPr>
+          <a:xfrm>
+            <a:off x="685800" y="1143000"/>
+            <a:ext cx="4270375" cy="2401888"/>
+          </a:xfrm>
+        </p:spPr>
+      </p:sp>
+      <p:sp>
+        <p:nvSpPr>
+          <p:cNvPr id="3" name="Notizenplatzhalter 2"/>
+          <p:cNvSpPr>
+            <a:spLocks noGrp="1"/>
+          </p:cNvSpPr>
+          <p:nvPr>
+            <p:ph type="body" idx="1"/>
+          </p:nvPr>
+        </p:nvSpPr>
+        <p:spPr/>
+        <p:txBody>
+          <a:bodyPr/>
+          <a:lstStyle/>
+          <a:p>
+            <a:r>
+              <a:rPr lang="de-DE" dirty="0"/>
+              <a:t>Wie oft muss die Zahl 1.0007 mit sich selbst multipliziert werden, bis sie 1000 überschreitet?</a:t>
+            </a:r>
+          </a:p>
+          <a:p>
+            <a:r>
+              <a:rPr lang="de-DE" dirty="0"/>
+              <a:t>Wir kennen die Anzahl nicht im Voraus, daher lassen wir den Computer anhand einer Bedingung entscheiden, wie lange er rechnet.</a:t>
+            </a:r>
+          </a:p>
+        </p:txBody>
+      </p:sp>
+      <p:sp>
+        <p:nvSpPr>
+          <p:cNvPr id="4" name="Foliennummernplatzhalter 3"/>
+          <p:cNvSpPr>
+            <a:spLocks noGrp="1"/>
+          </p:cNvSpPr>
+          <p:nvPr>
+            <p:ph type="sldNum" sz="quarter" idx="5"/>
+          </p:nvPr>
+        </p:nvSpPr>
+        <p:spPr/>
+        <p:txBody>
+          <a:bodyPr/>
+          <a:lstStyle/>
+          <a:p>
+            <a:fld id="{927DBD90-B360-417B-B4B3-F05A4AFC1996}" type="slidenum">
+              <a:rPr lang="de-DE" smtClean="0"/>
+              <a:pPr/>
+              <a:t>20</a:t>
+            </a:fld>
+            <a:endParaRPr lang="de-DE"/>
+          </a:p>
+        </p:txBody>
+      </p:sp>
+    </p:spTree>
+    <p:extLst>
+      <p:ext uri="{BB962C8B-B14F-4D97-AF65-F5344CB8AC3E}">
+        <p14:creationId xmlns:p14="http://schemas.microsoft.com/office/powerpoint/2010/main" val="171656243"/>
+      </p:ext>
+    </p:extLst>
+  </p:cSld>
+  <p:clrMapOvr>
+    <a:masterClrMapping/>
+  </p:clrMapOvr>
+</p:notes>
+</file>
+
+<file path=ppt/notesSlides/notesSlide17.xml><?xml version="1.0" encoding="utf-8"?>
+<p:notes xmlns:a="http://schemas.openxmlformats.org/drawingml/2006/main" xmlns:r="http://schemas.openxmlformats.org/officeDocument/2006/relationships" xmlns:p="http://schemas.openxmlformats.org/presentationml/2006/main">
+  <p:cSld>
+    <p:spTree>
+      <p:nvGrpSpPr>
+        <p:cNvPr id="1" name=""/>
+        <p:cNvGrpSpPr/>
+        <p:nvPr/>
+      </p:nvGrpSpPr>
+      <p:grpSpPr>
+        <a:xfrm>
+          <a:off x="0" y="0"/>
+          <a:ext cx="0" cy="0"/>
+          <a:chOff x="0" y="0"/>
+          <a:chExt cx="0" cy="0"/>
+        </a:xfrm>
+      </p:grpSpPr>
+      <p:sp>
+        <p:nvSpPr>
+          <p:cNvPr id="2" name="Folienbildplatzhalter 1"/>
+          <p:cNvSpPr>
+            <a:spLocks noGrp="1" noRot="1" noChangeAspect="1"/>
+          </p:cNvSpPr>
+          <p:nvPr>
+            <p:ph type="sldImg"/>
+          </p:nvPr>
+        </p:nvSpPr>
+        <p:spPr>
+          <a:xfrm>
+            <a:off x="685800" y="1143000"/>
+            <a:ext cx="4270375" cy="2401888"/>
+          </a:xfrm>
+        </p:spPr>
+      </p:sp>
+      <p:sp>
+        <p:nvSpPr>
+          <p:cNvPr id="3" name="Notizenplatzhalter 2"/>
+          <p:cNvSpPr>
+            <a:spLocks noGrp="1"/>
+          </p:cNvSpPr>
+          <p:nvPr>
+            <p:ph type="body" idx="1"/>
+          </p:nvPr>
+        </p:nvSpPr>
+        <p:spPr/>
+        <p:txBody>
+          <a:bodyPr/>
+          <a:lstStyle/>
+          <a:p>
+            <a:r>
+              <a:rPr lang="de-DE" dirty="0"/>
+              <a:t>Bug </a:t>
+            </a:r>
+            <a:r>
+              <a:rPr lang="de-DE" dirty="0" err="1"/>
+              <a:t>reports</a:t>
+            </a:r>
+            <a:r>
+              <a:rPr lang="de-DE" dirty="0"/>
+              <a:t>:</a:t>
+            </a:r>
+          </a:p>
+          <a:p>
+            <a:pPr marL="0" marR="0" lvl="0" indent="0" algn="l" defTabSz="914400" rtl="0" eaLnBrk="1" fontAlgn="auto" latinLnBrk="0" hangingPunct="1">
+              <a:lnSpc>
+                <a:spcPct val="100000"/>
+              </a:lnSpc>
+              <a:spcBef>
+                <a:spcPts val="0"/>
+              </a:spcBef>
+              <a:spcAft>
+                <a:spcPts val="0"/>
+              </a:spcAft>
+              <a:buClrTx/>
+              <a:buSzTx/>
+              <a:buFontTx/>
+              <a:buNone/>
+              <a:tabLst/>
+              <a:defRPr/>
+            </a:pPr>
+            <a:r>
+              <a:rPr lang="en-US" dirty="0"/>
+              <a:t>Tooltip suggestion for bitwise &amp; in a logical </a:t>
+            </a:r>
+            <a:r>
+              <a:rPr lang="en-US" dirty="0" err="1"/>
+              <a:t>boolean</a:t>
+            </a:r>
+            <a:r>
+              <a:rPr lang="en-US" dirty="0"/>
+              <a:t> expression </a:t>
+            </a:r>
+          </a:p>
+          <a:p>
+            <a:r>
+              <a:rPr lang="de-DE" dirty="0"/>
+              <a:t>https://youtrack.jetbrains.com/issue/IDEA-278654</a:t>
+            </a:r>
+          </a:p>
+          <a:p>
+            <a:pPr marL="0" marR="0" lvl="0" indent="0" algn="l" defTabSz="914400" rtl="0" eaLnBrk="1" fontAlgn="auto" latinLnBrk="0" hangingPunct="1">
+              <a:lnSpc>
+                <a:spcPct val="100000"/>
+              </a:lnSpc>
+              <a:spcBef>
+                <a:spcPts val="0"/>
+              </a:spcBef>
+              <a:spcAft>
+                <a:spcPts val="0"/>
+              </a:spcAft>
+              <a:buClrTx/>
+              <a:buSzTx/>
+              <a:buFontTx/>
+              <a:buNone/>
+              <a:tabLst/>
+              <a:defRPr/>
+            </a:pPr>
+            <a:r>
+              <a:rPr lang="en-US" dirty="0" err="1"/>
+              <a:t>Quickfix</a:t>
+            </a:r>
+            <a:r>
+              <a:rPr lang="en-US" dirty="0"/>
+              <a:t> does not fix logical operator according to suggestion </a:t>
+            </a:r>
+          </a:p>
+          <a:p>
+            <a:r>
+              <a:rPr lang="de-DE" dirty="0"/>
+              <a:t>https://youtrack.jetbrains.com/issue/IDEA-278655</a:t>
+            </a:r>
+          </a:p>
+          <a:p>
+            <a:pPr marL="0" marR="0" lvl="0" indent="0" algn="l" defTabSz="914400" rtl="0" eaLnBrk="1" fontAlgn="auto" latinLnBrk="0" hangingPunct="1">
+              <a:lnSpc>
+                <a:spcPct val="100000"/>
+              </a:lnSpc>
+              <a:spcBef>
+                <a:spcPts val="0"/>
+              </a:spcBef>
+              <a:spcAft>
+                <a:spcPts val="0"/>
+              </a:spcAft>
+              <a:buClrTx/>
+              <a:buSzTx/>
+              <a:buFontTx/>
+              <a:buNone/>
+              <a:tabLst/>
+              <a:defRPr/>
+            </a:pPr>
+            <a:r>
+              <a:rPr lang="en-US" dirty="0"/>
+              <a:t>Simplification of </a:t>
+            </a:r>
+            <a:r>
+              <a:rPr lang="en-US" dirty="0" err="1"/>
+              <a:t>boolean</a:t>
+            </a:r>
+            <a:r>
+              <a:rPr lang="en-US" dirty="0"/>
+              <a:t> expression with &amp;&amp; not offered </a:t>
+            </a:r>
+          </a:p>
+          <a:p>
+            <a:r>
+              <a:rPr lang="de-DE" dirty="0"/>
+              <a:t>https://youtrack.jetbrains.com/issue/IDEA-278656</a:t>
+            </a:r>
+          </a:p>
+        </p:txBody>
+      </p:sp>
+      <p:sp>
+        <p:nvSpPr>
+          <p:cNvPr id="4" name="Foliennummernplatzhalter 3"/>
+          <p:cNvSpPr>
+            <a:spLocks noGrp="1"/>
+          </p:cNvSpPr>
+          <p:nvPr>
+            <p:ph type="sldNum" sz="quarter" idx="5"/>
+          </p:nvPr>
+        </p:nvSpPr>
+        <p:spPr/>
+        <p:txBody>
+          <a:bodyPr/>
+          <a:lstStyle/>
+          <a:p>
+            <a:fld id="{927DBD90-B360-417B-B4B3-F05A4AFC1996}" type="slidenum">
+              <a:rPr lang="de-DE" smtClean="0"/>
+              <a:pPr/>
+              <a:t>22</a:t>
+            </a:fld>
+            <a:endParaRPr lang="de-DE"/>
+          </a:p>
+        </p:txBody>
+      </p:sp>
+    </p:spTree>
+    <p:extLst>
+      <p:ext uri="{BB962C8B-B14F-4D97-AF65-F5344CB8AC3E}">
+        <p14:creationId xmlns:p14="http://schemas.microsoft.com/office/powerpoint/2010/main" val="600016038"/>
+      </p:ext>
+    </p:extLst>
+  </p:cSld>
+  <p:clrMapOvr>
+    <a:masterClrMapping/>
+  </p:clrMapOvr>
+</p:notes>
+</file>
+
+<file path=ppt/notesSlides/notesSlide18.xml><?xml version="1.0" encoding="utf-8"?>
+<p:notes xmlns:a="http://schemas.openxmlformats.org/drawingml/2006/main" xmlns:r="http://schemas.openxmlformats.org/officeDocument/2006/relationships" xmlns:p="http://schemas.openxmlformats.org/presentationml/2006/main">
+  <p:cSld>
+    <p:spTree>
+      <p:nvGrpSpPr>
+        <p:cNvPr id="1" name=""/>
+        <p:cNvGrpSpPr/>
+        <p:nvPr/>
+      </p:nvGrpSpPr>
+      <p:grpSpPr>
+        <a:xfrm>
+          <a:off x="0" y="0"/>
+          <a:ext cx="0" cy="0"/>
+          <a:chOff x="0" y="0"/>
+          <a:chExt cx="0" cy="0"/>
+        </a:xfrm>
+      </p:grpSpPr>
+      <p:sp>
+        <p:nvSpPr>
+          <p:cNvPr id="2" name="Folienbildplatzhalter 1"/>
+          <p:cNvSpPr>
+            <a:spLocks noGrp="1" noRot="1" noChangeAspect="1"/>
+          </p:cNvSpPr>
+          <p:nvPr>
+            <p:ph type="sldImg"/>
+          </p:nvPr>
+        </p:nvSpPr>
+        <p:spPr>
+          <a:xfrm>
+            <a:off x="685800" y="1143000"/>
+            <a:ext cx="4270375" cy="2401888"/>
+          </a:xfrm>
+        </p:spPr>
+      </p:sp>
+      <p:sp>
+        <p:nvSpPr>
+          <p:cNvPr id="3" name="Notizenplatzhalter 2"/>
+          <p:cNvSpPr>
+            <a:spLocks noGrp="1"/>
+          </p:cNvSpPr>
+          <p:nvPr>
+            <p:ph type="body" idx="1"/>
+          </p:nvPr>
+        </p:nvSpPr>
+        <p:spPr/>
+        <p:txBody>
+          <a:bodyPr/>
+          <a:lstStyle/>
+          <a:p>
+            <a:r>
+              <a:rPr lang="de-DE" dirty="0"/>
+              <a:t>Die mathematische Operatoren ≤ und ≥ können wir so nicht einfach hinschreiben. Wir trennen sie auf in zwei Zeichen &lt;= und &gt;=.</a:t>
+            </a:r>
+          </a:p>
+          <a:p>
+            <a:r>
+              <a:rPr lang="de-DE" dirty="0"/>
+              <a:t>Im Gegensatz zu Python müssen die beiden Einzelbedingungen getrennt werden und dann mit &amp;&amp; verknüpft werden.</a:t>
+            </a:r>
+          </a:p>
+        </p:txBody>
+      </p:sp>
+      <p:sp>
+        <p:nvSpPr>
+          <p:cNvPr id="4" name="Foliennummernplatzhalter 3"/>
+          <p:cNvSpPr>
+            <a:spLocks noGrp="1"/>
+          </p:cNvSpPr>
+          <p:nvPr>
+            <p:ph type="sldNum" sz="quarter" idx="5"/>
+          </p:nvPr>
+        </p:nvSpPr>
+        <p:spPr/>
+        <p:txBody>
+          <a:bodyPr/>
+          <a:lstStyle/>
+          <a:p>
+            <a:fld id="{927DBD90-B360-417B-B4B3-F05A4AFC1996}" type="slidenum">
+              <a:rPr lang="de-DE" smtClean="0"/>
+              <a:pPr/>
+              <a:t>23</a:t>
+            </a:fld>
+            <a:endParaRPr lang="de-DE"/>
+          </a:p>
+        </p:txBody>
+      </p:sp>
+    </p:spTree>
+    <p:extLst>
+      <p:ext uri="{BB962C8B-B14F-4D97-AF65-F5344CB8AC3E}">
+        <p14:creationId xmlns:p14="http://schemas.microsoft.com/office/powerpoint/2010/main" val="2891175819"/>
+      </p:ext>
+    </p:extLst>
+  </p:cSld>
+  <p:clrMapOvr>
+    <a:masterClrMapping/>
+  </p:clrMapOvr>
+</p:notes>
+</file>
+
 <file path=ppt/notesSlides/notesSlide2.xml><?xml version="1.0" encoding="utf-8"?>
 <p:notes xmlns:a="http://schemas.openxmlformats.org/drawingml/2006/main" xmlns:r="http://schemas.openxmlformats.org/officeDocument/2006/relationships" xmlns:p="http://schemas.openxmlformats.org/presentationml/2006/main">
   <p:cSld>
@@ -2807,7 +3335,7 @@
           <a:p>
             <a:fld id="{4E6DF7AA-8899-480A-AE8B-97B651237939}" type="datetime1">
               <a:rPr lang="de-DE" smtClean="0"/>
-              <a:t>16.01.2023</a:t>
+              <a:t>23.01.2023</a:t>
             </a:fld>
             <a:endParaRPr lang="de-DE"/>
           </a:p>
@@ -3012,7 +3540,7 @@
           <a:p>
             <a:fld id="{A1082C62-1968-4D03-BE49-CB116A4D6814}" type="datetime1">
               <a:rPr lang="de-DE" smtClean="0"/>
-              <a:t>16.01.2023</a:t>
+              <a:t>23.01.2023</a:t>
             </a:fld>
             <a:endParaRPr lang="de-DE"/>
           </a:p>
@@ -3166,7 +3694,7 @@
           <a:p>
             <a:fld id="{C0E04462-FF80-4281-98D0-2AB88E65DA84}" type="datetime1">
               <a:rPr lang="de-DE" smtClean="0"/>
-              <a:t>16.01.2023</a:t>
+              <a:t>23.01.2023</a:t>
             </a:fld>
             <a:endParaRPr lang="de-DE"/>
           </a:p>
@@ -3403,7 +3931,7 @@
           <a:p>
             <a:fld id="{1FAA5A7F-2A4E-40D6-9FFE-960B13817A2C}" type="datetime1">
               <a:rPr lang="de-DE" smtClean="0"/>
-              <a:t>16.01.2023</a:t>
+              <a:t>23.01.2023</a:t>
             </a:fld>
             <a:endParaRPr lang="de-DE"/>
           </a:p>
@@ -3579,7 +4107,7 @@
           <a:p>
             <a:fld id="{382DDC3E-10C9-4B92-B2FB-A8167FB6AB1D}" type="datetime1">
               <a:rPr lang="de-DE" smtClean="0"/>
-              <a:t>16.01.2023</a:t>
+              <a:t>23.01.2023</a:t>
             </a:fld>
             <a:endParaRPr lang="de-DE"/>
           </a:p>
@@ -3755,7 +4283,7 @@
           <a:p>
             <a:fld id="{8159FE7A-07D2-4D3F-9855-29B7F3DF1D43}" type="datetime1">
               <a:rPr lang="de-DE" smtClean="0"/>
-              <a:t>16.01.2023</a:t>
+              <a:t>23.01.2023</a:t>
             </a:fld>
             <a:endParaRPr lang="de-DE"/>
           </a:p>
@@ -3905,7 +4433,7 @@
           <a:p>
             <a:fld id="{7CF1A54B-9CB9-49D3-BA48-5A7ECDBA0943}" type="datetime1">
               <a:rPr lang="de-DE" smtClean="0"/>
-              <a:t>16.01.2023</a:t>
+              <a:t>23.01.2023</a:t>
             </a:fld>
             <a:endParaRPr lang="de-DE"/>
           </a:p>
@@ -4003,7 +4531,7 @@
           <a:p>
             <a:fld id="{5621DBFA-780B-465A-97B9-CC4792E01430}" type="datetime1">
               <a:rPr lang="de-DE" smtClean="0"/>
-              <a:t>16.01.2023</a:t>
+              <a:t>23.01.2023</a:t>
             </a:fld>
             <a:endParaRPr lang="de-DE"/>
           </a:p>
@@ -4127,7 +4655,7 @@
           <a:p>
             <a:fld id="{13ADA68E-BD65-4999-8C0B-CC0F110C2BD3}" type="datetime1">
               <a:rPr lang="de-DE" smtClean="0"/>
-              <a:t>16.01.2023</a:t>
+              <a:t>23.01.2023</a:t>
             </a:fld>
             <a:endParaRPr lang="de-DE"/>
           </a:p>
@@ -4311,7 +4839,7 @@
           <a:p>
             <a:fld id="{93B55C80-8AAA-4242-8442-4A53184707C3}" type="datetime1">
               <a:rPr lang="de-DE" smtClean="0"/>
-              <a:t>16.01.2023</a:t>
+              <a:t>23.01.2023</a:t>
             </a:fld>
             <a:endParaRPr lang="de-DE"/>
           </a:p>
@@ -4516,7 +5044,7 @@
           <a:p>
             <a:fld id="{4485BB24-7FA9-422A-BF70-F9FA49C1D9F8}" type="datetime1">
               <a:rPr lang="de-DE" smtClean="0"/>
-              <a:t>16.01.2023</a:t>
+              <a:t>23.01.2023</a:t>
             </a:fld>
             <a:endParaRPr lang="de-DE"/>
           </a:p>
@@ -4874,7 +5402,7 @@
           <a:p>
             <a:fld id="{3CD93E9C-CF59-4162-A977-F7642EDBB23A}" type="datetime1">
               <a:rPr lang="de-DE" smtClean="0"/>
-              <a:t>16.01.2023</a:t>
+              <a:t>23.01.2023</a:t>
             </a:fld>
             <a:endParaRPr lang="de-DE" dirty="0"/>
           </a:p>
@@ -5515,7 +6043,7 @@
           <a:p>
             <a:fld id="{6FE8A2CE-6D32-4716-A090-EDD7EE0B4140}" type="datetime1">
               <a:rPr lang="de-DE" smtClean="0"/>
-              <a:t>16.01.2023</a:t>
+              <a:t>23.01.2023</a:t>
             </a:fld>
             <a:endParaRPr lang="de-DE" dirty="0"/>
           </a:p>
@@ -6187,7 +6715,7 @@
           <a:p>
             <a:fld id="{603113A9-B1ED-4EC0-A094-9858FCF2D0C8}" type="datetime1">
               <a:rPr lang="de-DE" smtClean="0"/>
-              <a:t>16.01.2023</a:t>
+              <a:t>23.01.2023</a:t>
             </a:fld>
             <a:endParaRPr lang="de-DE"/>
           </a:p>
@@ -6342,15 +6870,10 @@
             <p:ph idx="1"/>
           </p:nvPr>
         </p:nvSpPr>
-        <p:spPr>
-          <a:xfrm>
-            <a:off x="838200" y="1520825"/>
-            <a:ext cx="9271475" cy="1996728"/>
-          </a:xfrm>
-        </p:spPr>
+        <p:spPr/>
         <p:txBody>
           <a:bodyPr>
-            <a:normAutofit lnSpcReduction="10000"/>
+            <a:normAutofit/>
           </a:bodyPr>
           <a:lstStyle/>
           <a:p>
@@ -6402,7 +6925,7 @@
           <a:p>
             <a:fld id="{B70EBCA3-FB0B-48D9-A2E5-56DBD5624AFE}" type="datetime1">
               <a:rPr lang="de-DE" smtClean="0"/>
-              <a:t>16.01.2023</a:t>
+              <a:t>23.01.2023</a:t>
             </a:fld>
             <a:endParaRPr lang="de-DE"/>
           </a:p>
@@ -6569,12 +7092,7 @@
             <p:ph idx="1"/>
           </p:nvPr>
         </p:nvSpPr>
-        <p:spPr>
-          <a:xfrm>
-            <a:off x="838200" y="1520826"/>
-            <a:ext cx="10514013" cy="1658310"/>
-          </a:xfrm>
-        </p:spPr>
+        <p:spPr/>
         <p:txBody>
           <a:bodyPr>
             <a:normAutofit/>
@@ -6716,7 +7234,7 @@
           <a:p>
             <a:fld id="{AAEBEB04-CBF0-4835-872C-2565D4E2EBF1}" type="datetime1">
               <a:rPr lang="de-DE" smtClean="0"/>
-              <a:t>16.01.2023</a:t>
+              <a:t>23.01.2023</a:t>
             </a:fld>
             <a:endParaRPr lang="de-DE"/>
           </a:p>
@@ -6984,7 +7502,7 @@
           <a:p>
             <a:fld id="{8F663D0B-A90A-4472-ADF1-2D4D5E0E002A}" type="datetime1">
               <a:rPr lang="de-DE" smtClean="0"/>
-              <a:t>16.01.2023</a:t>
+              <a:t>23.01.2023</a:t>
             </a:fld>
             <a:endParaRPr lang="de-DE"/>
           </a:p>
@@ -7121,15 +7639,10 @@
             <p:ph idx="1"/>
           </p:nvPr>
         </p:nvSpPr>
-        <p:spPr>
-          <a:xfrm>
-            <a:off x="838200" y="1520825"/>
-            <a:ext cx="9271475" cy="2553997"/>
-          </a:xfrm>
-        </p:spPr>
+        <p:spPr/>
         <p:txBody>
           <a:bodyPr>
-            <a:normAutofit lnSpcReduction="10000"/>
+            <a:normAutofit/>
           </a:bodyPr>
           <a:lstStyle/>
           <a:p>
@@ -7288,7 +7801,7 @@
           <a:p>
             <a:fld id="{C81998FD-B568-4E47-AA9F-CE36B3FEB5BA}" type="datetime1">
               <a:rPr lang="de-DE" smtClean="0"/>
-              <a:t>16.01.2023</a:t>
+              <a:t>23.01.2023</a:t>
             </a:fld>
             <a:endParaRPr lang="de-DE"/>
           </a:p>
@@ -7485,15 +7998,10 @@
             <p:ph idx="1"/>
           </p:nvPr>
         </p:nvSpPr>
-        <p:spPr>
-          <a:xfrm>
-            <a:off x="838200" y="1520825"/>
-            <a:ext cx="9544665" cy="2424369"/>
-          </a:xfrm>
-        </p:spPr>
+        <p:spPr/>
         <p:txBody>
           <a:bodyPr>
-            <a:normAutofit fontScale="92500" lnSpcReduction="10000"/>
+            <a:normAutofit/>
           </a:bodyPr>
           <a:lstStyle/>
           <a:p>
@@ -7644,7 +8152,7 @@
           <a:p>
             <a:fld id="{0A4F56F1-7827-4042-A276-DAF40AC0B000}" type="datetime1">
               <a:rPr lang="de-DE" smtClean="0"/>
-              <a:t>16.01.2023</a:t>
+              <a:t>23.01.2023</a:t>
             </a:fld>
             <a:endParaRPr lang="de-DE"/>
           </a:p>
@@ -7942,7 +8450,7 @@
           <a:p>
             <a:fld id="{DAB02174-66FA-41E9-A997-DF7D3619438B}" type="datetime1">
               <a:rPr lang="de-DE" smtClean="0"/>
-              <a:t>16.01.2023</a:t>
+              <a:t>23.01.2023</a:t>
             </a:fld>
             <a:endParaRPr lang="de-DE"/>
           </a:p>
@@ -8323,7 +8831,7 @@
           <a:p>
             <a:fld id="{BDFFDF87-2C7B-4FBB-B7F3-0EB8FC88FA6F}" type="datetime1">
               <a:rPr lang="de-DE" smtClean="0"/>
-              <a:t>16.01.2023</a:t>
+              <a:t>23.01.2023</a:t>
             </a:fld>
             <a:endParaRPr lang="de-DE"/>
           </a:p>
@@ -8656,7 +9164,7 @@
           <a:p>
             <a:fld id="{4AEAFF43-79D1-488F-88E5-AECF0C52E4F6}" type="datetime1">
               <a:rPr lang="de-DE" smtClean="0"/>
-              <a:t>16.01.2023</a:t>
+              <a:t>23.01.2023</a:t>
             </a:fld>
             <a:endParaRPr lang="de-DE"/>
           </a:p>
@@ -8934,7 +9442,7 @@
           <a:p>
             <a:fld id="{F3624D99-4580-4939-A184-6854C4D65CB3}" type="datetime1">
               <a:rPr lang="de-DE" smtClean="0"/>
-              <a:t>16.01.2023</a:t>
+              <a:t>23.01.2023</a:t>
             </a:fld>
             <a:endParaRPr lang="de-DE"/>
           </a:p>
@@ -9001,6 +9509,376 @@
     <p:extLst>
       <p:ext uri="{BB962C8B-B14F-4D97-AF65-F5344CB8AC3E}">
         <p14:creationId xmlns:p14="http://schemas.microsoft.com/office/powerpoint/2010/main" val="2103130078"/>
+      </p:ext>
+    </p:extLst>
+  </p:cSld>
+  <p:clrMapOvr>
+    <a:masterClrMapping/>
+  </p:clrMapOvr>
+</p:sld>
+</file>
+
+<file path=ppt/slides/slide19.xml><?xml version="1.0" encoding="utf-8"?>
+<p:sld xmlns:a="http://schemas.openxmlformats.org/drawingml/2006/main" xmlns:r="http://schemas.openxmlformats.org/officeDocument/2006/relationships" xmlns:p="http://schemas.openxmlformats.org/presentationml/2006/main">
+  <p:cSld>
+    <p:spTree>
+      <p:nvGrpSpPr>
+        <p:cNvPr id="1" name=""/>
+        <p:cNvGrpSpPr/>
+        <p:nvPr/>
+      </p:nvGrpSpPr>
+      <p:grpSpPr>
+        <a:xfrm>
+          <a:off x="0" y="0"/>
+          <a:ext cx="0" cy="0"/>
+          <a:chOff x="0" y="0"/>
+          <a:chExt cx="0" cy="0"/>
+        </a:xfrm>
+      </p:grpSpPr>
+      <p:sp>
+        <p:nvSpPr>
+          <p:cNvPr id="2" name="Titel 1">
+            <a:extLst>
+              <a:ext uri="{FF2B5EF4-FFF2-40B4-BE49-F238E27FC236}">
+                <a16:creationId xmlns:a16="http://schemas.microsoft.com/office/drawing/2014/main" id="{495E46B9-86D6-4D35-827B-6CEB363EC834}"/>
+              </a:ext>
+            </a:extLst>
+          </p:cNvPr>
+          <p:cNvSpPr>
+            <a:spLocks noGrp="1"/>
+          </p:cNvSpPr>
+          <p:nvPr>
+            <p:ph type="title"/>
+          </p:nvPr>
+        </p:nvSpPr>
+        <p:spPr/>
+        <p:txBody>
+          <a:bodyPr/>
+          <a:lstStyle/>
+          <a:p>
+            <a:r>
+              <a:rPr lang="de-DE" dirty="0"/>
+              <a:t>Dart  -Wiederholungen</a:t>
+            </a:r>
+          </a:p>
+        </p:txBody>
+      </p:sp>
+      <p:sp>
+        <p:nvSpPr>
+          <p:cNvPr id="3" name="Inhaltsplatzhalter 2">
+            <a:extLst>
+              <a:ext uri="{FF2B5EF4-FFF2-40B4-BE49-F238E27FC236}">
+                <a16:creationId xmlns:a16="http://schemas.microsoft.com/office/drawing/2014/main" id="{2DF6E810-777F-4963-845F-682A3C84E64C}"/>
+              </a:ext>
+            </a:extLst>
+          </p:cNvPr>
+          <p:cNvSpPr>
+            <a:spLocks noGrp="1"/>
+          </p:cNvSpPr>
+          <p:nvPr>
+            <p:ph idx="1"/>
+          </p:nvPr>
+        </p:nvSpPr>
+        <p:spPr/>
+        <p:txBody>
+          <a:bodyPr/>
+          <a:lstStyle/>
+          <a:p>
+            <a:r>
+              <a:rPr lang="de-DE" dirty="0"/>
+              <a:t>Für eine bekannte Anzahl Durchläufe: </a:t>
+            </a:r>
+            <a:br>
+              <a:rPr lang="de-DE" dirty="0"/>
+            </a:br>
+            <a:r>
+              <a:rPr lang="de-DE" sz="3200" b="1" dirty="0" err="1">
+                <a:solidFill>
+                  <a:schemeClr val="accent1">
+                    <a:lumMod val="75000"/>
+                  </a:schemeClr>
+                </a:solidFill>
+                <a:ea typeface="+mj-ea"/>
+              </a:rPr>
+              <a:t>for</a:t>
+            </a:r>
+            <a:r>
+              <a:rPr lang="de-DE" sz="3200" b="1" dirty="0">
+                <a:solidFill>
+                  <a:schemeClr val="accent1">
+                    <a:lumMod val="75000"/>
+                  </a:schemeClr>
+                </a:solidFill>
+                <a:ea typeface="+mj-ea"/>
+              </a:rPr>
+              <a:t> (</a:t>
+            </a:r>
+            <a:r>
+              <a:rPr lang="de-DE" sz="3200" b="1" dirty="0" err="1">
+                <a:solidFill>
+                  <a:schemeClr val="accent1">
+                    <a:lumMod val="75000"/>
+                  </a:schemeClr>
+                </a:solidFill>
+                <a:ea typeface="+mj-ea"/>
+              </a:rPr>
+              <a:t>var</a:t>
+            </a:r>
+            <a:r>
+              <a:rPr lang="de-DE" sz="3200" b="1" dirty="0">
+                <a:solidFill>
+                  <a:schemeClr val="accent1">
+                    <a:lumMod val="75000"/>
+                  </a:schemeClr>
+                </a:solidFill>
+                <a:ea typeface="+mj-ea"/>
+              </a:rPr>
+              <a:t> </a:t>
+            </a:r>
+            <a:r>
+              <a:rPr lang="de-DE" sz="3200" b="1" i="1" dirty="0" err="1">
+                <a:solidFill>
+                  <a:schemeClr val="tx2"/>
+                </a:solidFill>
+                <a:ea typeface="+mj-ea"/>
+              </a:rPr>
+              <a:t>zähler</a:t>
+            </a:r>
+            <a:r>
+              <a:rPr lang="de-DE" sz="3200" b="1" dirty="0">
+                <a:solidFill>
+                  <a:schemeClr val="accent1">
+                    <a:lumMod val="75000"/>
+                  </a:schemeClr>
+                </a:solidFill>
+                <a:ea typeface="+mj-ea"/>
+              </a:rPr>
+              <a:t> = </a:t>
+            </a:r>
+            <a:r>
+              <a:rPr lang="de-DE" sz="3200" b="1" i="1" dirty="0" err="1">
+                <a:solidFill>
+                  <a:schemeClr val="tx2"/>
+                </a:solidFill>
+                <a:ea typeface="+mj-ea"/>
+              </a:rPr>
+              <a:t>anfang</a:t>
+            </a:r>
+            <a:r>
+              <a:rPr lang="de-DE" sz="3200" b="1" dirty="0">
+                <a:solidFill>
+                  <a:schemeClr val="accent1">
+                    <a:lumMod val="75000"/>
+                  </a:schemeClr>
+                </a:solidFill>
+                <a:ea typeface="+mj-ea"/>
+              </a:rPr>
+              <a:t>; </a:t>
+            </a:r>
+            <a:r>
+              <a:rPr lang="de-DE" sz="3200" b="1" i="1" dirty="0" err="1">
+                <a:solidFill>
+                  <a:schemeClr val="tx2"/>
+                </a:solidFill>
+                <a:ea typeface="+mj-ea"/>
+              </a:rPr>
+              <a:t>zähler</a:t>
+            </a:r>
+            <a:r>
+              <a:rPr lang="de-DE" sz="3200" b="1" dirty="0">
+                <a:solidFill>
+                  <a:schemeClr val="accent1">
+                    <a:lumMod val="75000"/>
+                  </a:schemeClr>
+                </a:solidFill>
+                <a:ea typeface="+mj-ea"/>
+              </a:rPr>
+              <a:t>&lt;</a:t>
+            </a:r>
+            <a:r>
+              <a:rPr lang="de-DE" sz="3200" b="1" i="1" dirty="0">
+                <a:solidFill>
+                  <a:schemeClr val="tx2"/>
+                </a:solidFill>
+                <a:ea typeface="+mj-ea"/>
+              </a:rPr>
+              <a:t>ende</a:t>
+            </a:r>
+            <a:r>
+              <a:rPr lang="de-DE" sz="3200" b="1" dirty="0">
+                <a:solidFill>
+                  <a:schemeClr val="accent1">
+                    <a:lumMod val="75000"/>
+                  </a:schemeClr>
+                </a:solidFill>
+                <a:ea typeface="+mj-ea"/>
+              </a:rPr>
+              <a:t>; </a:t>
+            </a:r>
+            <a:r>
+              <a:rPr lang="de-DE" sz="3200" b="1" i="1" dirty="0" err="1">
+                <a:solidFill>
+                  <a:schemeClr val="tx2"/>
+                </a:solidFill>
+                <a:ea typeface="+mj-ea"/>
+              </a:rPr>
+              <a:t>zähler</a:t>
+            </a:r>
+            <a:r>
+              <a:rPr lang="de-DE" sz="3200" b="1" dirty="0">
+                <a:solidFill>
+                  <a:schemeClr val="accent1">
+                    <a:lumMod val="75000"/>
+                  </a:schemeClr>
+                </a:solidFill>
+                <a:ea typeface="+mj-ea"/>
+              </a:rPr>
+              <a:t>++) { </a:t>
+            </a:r>
+            <a:r>
+              <a:rPr lang="de-DE" dirty="0"/>
+              <a:t>…</a:t>
+            </a:r>
+            <a:r>
+              <a:rPr lang="de-DE" sz="3200" b="1" dirty="0">
+                <a:solidFill>
+                  <a:schemeClr val="accent1">
+                    <a:lumMod val="75000"/>
+                  </a:schemeClr>
+                </a:solidFill>
+                <a:ea typeface="+mj-ea"/>
+              </a:rPr>
+              <a:t> }</a:t>
+            </a:r>
+          </a:p>
+          <a:p>
+            <a:r>
+              <a:rPr lang="de-DE" dirty="0"/>
+              <a:t>Zähler: oft i, j, k</a:t>
+            </a:r>
+          </a:p>
+        </p:txBody>
+      </p:sp>
+      <p:sp>
+        <p:nvSpPr>
+          <p:cNvPr id="4" name="Datumsplatzhalter 3">
+            <a:extLst>
+              <a:ext uri="{FF2B5EF4-FFF2-40B4-BE49-F238E27FC236}">
+                <a16:creationId xmlns:a16="http://schemas.microsoft.com/office/drawing/2014/main" id="{A0005513-0696-4B24-94B3-E0037265BB5A}"/>
+              </a:ext>
+            </a:extLst>
+          </p:cNvPr>
+          <p:cNvSpPr>
+            <a:spLocks noGrp="1"/>
+          </p:cNvSpPr>
+          <p:nvPr>
+            <p:ph type="dt" sz="half" idx="10"/>
+          </p:nvPr>
+        </p:nvSpPr>
+        <p:spPr/>
+        <p:txBody>
+          <a:bodyPr/>
+          <a:lstStyle/>
+          <a:p>
+            <a:fld id="{F2FEDD9D-5594-473A-899D-C0AD9514F726}" type="datetime1">
+              <a:rPr lang="de-DE" smtClean="0"/>
+              <a:t>23.01.2023</a:t>
+            </a:fld>
+            <a:endParaRPr lang="de-DE"/>
+          </a:p>
+        </p:txBody>
+      </p:sp>
+      <p:sp>
+        <p:nvSpPr>
+          <p:cNvPr id="5" name="Fußzeilenplatzhalter 4">
+            <a:extLst>
+              <a:ext uri="{FF2B5EF4-FFF2-40B4-BE49-F238E27FC236}">
+                <a16:creationId xmlns:a16="http://schemas.microsoft.com/office/drawing/2014/main" id="{330CD558-0E55-47E3-AECD-AF36602EB590}"/>
+              </a:ext>
+            </a:extLst>
+          </p:cNvPr>
+          <p:cNvSpPr>
+            <a:spLocks noGrp="1"/>
+          </p:cNvSpPr>
+          <p:nvPr>
+            <p:ph type="ftr" sz="quarter" idx="11"/>
+          </p:nvPr>
+        </p:nvSpPr>
+        <p:spPr/>
+        <p:txBody>
+          <a:bodyPr/>
+          <a:lstStyle/>
+          <a:p>
+            <a:r>
+              <a:rPr lang="de-DE"/>
+              <a:t>Dart - Programmiersprache für Smartphones</a:t>
+            </a:r>
+          </a:p>
+        </p:txBody>
+      </p:sp>
+      <p:sp>
+        <p:nvSpPr>
+          <p:cNvPr id="6" name="Foliennummernplatzhalter 5">
+            <a:extLst>
+              <a:ext uri="{FF2B5EF4-FFF2-40B4-BE49-F238E27FC236}">
+                <a16:creationId xmlns:a16="http://schemas.microsoft.com/office/drawing/2014/main" id="{4ACC37DE-821B-4C73-83C3-3533E90CD293}"/>
+              </a:ext>
+            </a:extLst>
+          </p:cNvPr>
+          <p:cNvSpPr>
+            <a:spLocks noGrp="1"/>
+          </p:cNvSpPr>
+          <p:nvPr>
+            <p:ph type="sldNum" sz="quarter" idx="12"/>
+          </p:nvPr>
+        </p:nvSpPr>
+        <p:spPr/>
+        <p:txBody>
+          <a:bodyPr/>
+          <a:lstStyle/>
+          <a:p>
+            <a:fld id="{3A1F27E2-D58A-4028-9FF2-B12D897F257E}" type="slidenum">
+              <a:rPr lang="de-DE" smtClean="0"/>
+              <a:t>19</a:t>
+            </a:fld>
+            <a:endParaRPr lang="de-DE"/>
+          </a:p>
+        </p:txBody>
+      </p:sp>
+      <p:pic>
+        <p:nvPicPr>
+          <p:cNvPr id="8" name="Grafik 7">
+            <a:extLst>
+              <a:ext uri="{FF2B5EF4-FFF2-40B4-BE49-F238E27FC236}">
+                <a16:creationId xmlns:a16="http://schemas.microsoft.com/office/drawing/2014/main" id="{4C467C52-98CB-4A6A-92AB-7456BCE7D9B4}"/>
+              </a:ext>
+            </a:extLst>
+          </p:cNvPr>
+          <p:cNvPicPr>
+            <a:picLocks noChangeAspect="1"/>
+          </p:cNvPicPr>
+          <p:nvPr/>
+        </p:nvPicPr>
+        <p:blipFill>
+          <a:blip r:embed="rId3"/>
+          <a:stretch>
+            <a:fillRect/>
+          </a:stretch>
+        </p:blipFill>
+        <p:spPr>
+          <a:xfrm>
+            <a:off x="838199" y="3226572"/>
+            <a:ext cx="4812943" cy="1523847"/>
+          </a:xfrm>
+          <a:prstGeom prst="rect">
+            <a:avLst/>
+          </a:prstGeom>
+        </p:spPr>
+      </p:pic>
+    </p:spTree>
+    <p:extLst>
+      <p:ext uri="{BB962C8B-B14F-4D97-AF65-F5344CB8AC3E}">
+        <p14:creationId xmlns:p14="http://schemas.microsoft.com/office/powerpoint/2010/main" val="3754420874"/>
       </p:ext>
     </p:extLst>
   </p:cSld>
@@ -9166,7 +10044,7 @@
           <a:p>
             <a:fld id="{92A047F3-1820-4570-AC17-C8DA167C5F14}" type="datetime1">
               <a:rPr lang="de-DE" smtClean="0"/>
-              <a:t>16.01.2023</a:t>
+              <a:t>23.01.2023</a:t>
             </a:fld>
             <a:endParaRPr lang="de-DE"/>
           </a:p>
@@ -9499,6 +10377,1770 @@
     <p:extLst>
       <p:ext uri="{BB962C8B-B14F-4D97-AF65-F5344CB8AC3E}">
         <p14:creationId xmlns:p14="http://schemas.microsoft.com/office/powerpoint/2010/main" val="86787828"/>
+      </p:ext>
+    </p:extLst>
+  </p:cSld>
+  <p:clrMapOvr>
+    <a:masterClrMapping/>
+  </p:clrMapOvr>
+</p:sld>
+</file>
+
+<file path=ppt/slides/slide20.xml><?xml version="1.0" encoding="utf-8"?>
+<p:sld xmlns:a="http://schemas.openxmlformats.org/drawingml/2006/main" xmlns:r="http://schemas.openxmlformats.org/officeDocument/2006/relationships" xmlns:p="http://schemas.openxmlformats.org/presentationml/2006/main">
+  <p:cSld>
+    <p:spTree>
+      <p:nvGrpSpPr>
+        <p:cNvPr id="1" name=""/>
+        <p:cNvGrpSpPr/>
+        <p:nvPr/>
+      </p:nvGrpSpPr>
+      <p:grpSpPr>
+        <a:xfrm>
+          <a:off x="0" y="0"/>
+          <a:ext cx="0" cy="0"/>
+          <a:chOff x="0" y="0"/>
+          <a:chExt cx="0" cy="0"/>
+        </a:xfrm>
+      </p:grpSpPr>
+      <p:sp>
+        <p:nvSpPr>
+          <p:cNvPr id="2" name="Titel 1">
+            <a:extLst>
+              <a:ext uri="{FF2B5EF4-FFF2-40B4-BE49-F238E27FC236}">
+                <a16:creationId xmlns:a16="http://schemas.microsoft.com/office/drawing/2014/main" id="{495E46B9-86D6-4D35-827B-6CEB363EC834}"/>
+              </a:ext>
+            </a:extLst>
+          </p:cNvPr>
+          <p:cNvSpPr>
+            <a:spLocks noGrp="1"/>
+          </p:cNvSpPr>
+          <p:nvPr>
+            <p:ph type="title"/>
+          </p:nvPr>
+        </p:nvSpPr>
+        <p:spPr/>
+        <p:txBody>
+          <a:bodyPr/>
+          <a:lstStyle/>
+          <a:p>
+            <a:r>
+              <a:rPr lang="de-DE" dirty="0"/>
+              <a:t>Dart  -Wiederholungen</a:t>
+            </a:r>
+          </a:p>
+        </p:txBody>
+      </p:sp>
+      <p:sp>
+        <p:nvSpPr>
+          <p:cNvPr id="3" name="Inhaltsplatzhalter 2">
+            <a:extLst>
+              <a:ext uri="{FF2B5EF4-FFF2-40B4-BE49-F238E27FC236}">
+                <a16:creationId xmlns:a16="http://schemas.microsoft.com/office/drawing/2014/main" id="{2DF6E810-777F-4963-845F-682A3C84E64C}"/>
+              </a:ext>
+            </a:extLst>
+          </p:cNvPr>
+          <p:cNvSpPr>
+            <a:spLocks noGrp="1"/>
+          </p:cNvSpPr>
+          <p:nvPr>
+            <p:ph idx="1"/>
+          </p:nvPr>
+        </p:nvSpPr>
+        <p:spPr/>
+        <p:txBody>
+          <a:bodyPr/>
+          <a:lstStyle/>
+          <a:p>
+            <a:r>
+              <a:rPr lang="de-DE" dirty="0"/>
+              <a:t>Für eine unbekannte Anzahl Durchläufe: </a:t>
+            </a:r>
+            <a:br>
+              <a:rPr lang="de-DE" dirty="0"/>
+            </a:br>
+            <a:r>
+              <a:rPr lang="de-DE" sz="3200" b="1" dirty="0" err="1">
+                <a:solidFill>
+                  <a:schemeClr val="accent1">
+                    <a:lumMod val="75000"/>
+                  </a:schemeClr>
+                </a:solidFill>
+                <a:ea typeface="+mj-ea"/>
+              </a:rPr>
+              <a:t>while</a:t>
+            </a:r>
+            <a:r>
+              <a:rPr lang="de-DE" sz="3200" b="1" dirty="0">
+                <a:solidFill>
+                  <a:schemeClr val="accent1">
+                    <a:lumMod val="75000"/>
+                  </a:schemeClr>
+                </a:solidFill>
+                <a:ea typeface="+mj-ea"/>
+              </a:rPr>
+              <a:t> (</a:t>
+            </a:r>
+            <a:r>
+              <a:rPr lang="de-DE" sz="3200" b="1" i="1" dirty="0" err="1">
+                <a:solidFill>
+                  <a:schemeClr val="tx2"/>
+                </a:solidFill>
+                <a:ea typeface="+mj-ea"/>
+              </a:rPr>
+              <a:t>bedingung</a:t>
+            </a:r>
+            <a:r>
+              <a:rPr lang="de-DE" sz="3200" b="1" dirty="0">
+                <a:solidFill>
+                  <a:schemeClr val="accent1">
+                    <a:lumMod val="75000"/>
+                  </a:schemeClr>
+                </a:solidFill>
+                <a:ea typeface="+mj-ea"/>
+              </a:rPr>
+              <a:t>) { </a:t>
+            </a:r>
+            <a:r>
+              <a:rPr lang="de-DE" dirty="0"/>
+              <a:t>…</a:t>
+            </a:r>
+            <a:r>
+              <a:rPr lang="de-DE" sz="3200" b="1" dirty="0">
+                <a:solidFill>
+                  <a:schemeClr val="accent1">
+                    <a:lumMod val="75000"/>
+                  </a:schemeClr>
+                </a:solidFill>
+                <a:ea typeface="+mj-ea"/>
+              </a:rPr>
+              <a:t> }</a:t>
+            </a:r>
+          </a:p>
+        </p:txBody>
+      </p:sp>
+      <p:sp>
+        <p:nvSpPr>
+          <p:cNvPr id="4" name="Datumsplatzhalter 3">
+            <a:extLst>
+              <a:ext uri="{FF2B5EF4-FFF2-40B4-BE49-F238E27FC236}">
+                <a16:creationId xmlns:a16="http://schemas.microsoft.com/office/drawing/2014/main" id="{A0005513-0696-4B24-94B3-E0037265BB5A}"/>
+              </a:ext>
+            </a:extLst>
+          </p:cNvPr>
+          <p:cNvSpPr>
+            <a:spLocks noGrp="1"/>
+          </p:cNvSpPr>
+          <p:nvPr>
+            <p:ph type="dt" sz="half" idx="10"/>
+          </p:nvPr>
+        </p:nvSpPr>
+        <p:spPr/>
+        <p:txBody>
+          <a:bodyPr/>
+          <a:lstStyle/>
+          <a:p>
+            <a:fld id="{95C3B550-B314-4EBE-B643-25AC9427FA8B}" type="datetime1">
+              <a:rPr lang="de-DE" smtClean="0"/>
+              <a:t>23.01.2023</a:t>
+            </a:fld>
+            <a:endParaRPr lang="de-DE"/>
+          </a:p>
+        </p:txBody>
+      </p:sp>
+      <p:sp>
+        <p:nvSpPr>
+          <p:cNvPr id="5" name="Fußzeilenplatzhalter 4">
+            <a:extLst>
+              <a:ext uri="{FF2B5EF4-FFF2-40B4-BE49-F238E27FC236}">
+                <a16:creationId xmlns:a16="http://schemas.microsoft.com/office/drawing/2014/main" id="{330CD558-0E55-47E3-AECD-AF36602EB590}"/>
+              </a:ext>
+            </a:extLst>
+          </p:cNvPr>
+          <p:cNvSpPr>
+            <a:spLocks noGrp="1"/>
+          </p:cNvSpPr>
+          <p:nvPr>
+            <p:ph type="ftr" sz="quarter" idx="11"/>
+          </p:nvPr>
+        </p:nvSpPr>
+        <p:spPr/>
+        <p:txBody>
+          <a:bodyPr/>
+          <a:lstStyle/>
+          <a:p>
+            <a:r>
+              <a:rPr lang="de-DE"/>
+              <a:t>Dart - Programmiersprache für Smartphones</a:t>
+            </a:r>
+          </a:p>
+        </p:txBody>
+      </p:sp>
+      <p:sp>
+        <p:nvSpPr>
+          <p:cNvPr id="6" name="Foliennummernplatzhalter 5">
+            <a:extLst>
+              <a:ext uri="{FF2B5EF4-FFF2-40B4-BE49-F238E27FC236}">
+                <a16:creationId xmlns:a16="http://schemas.microsoft.com/office/drawing/2014/main" id="{4ACC37DE-821B-4C73-83C3-3533E90CD293}"/>
+              </a:ext>
+            </a:extLst>
+          </p:cNvPr>
+          <p:cNvSpPr>
+            <a:spLocks noGrp="1"/>
+          </p:cNvSpPr>
+          <p:nvPr>
+            <p:ph type="sldNum" sz="quarter" idx="12"/>
+          </p:nvPr>
+        </p:nvSpPr>
+        <p:spPr/>
+        <p:txBody>
+          <a:bodyPr/>
+          <a:lstStyle/>
+          <a:p>
+            <a:fld id="{3A1F27E2-D58A-4028-9FF2-B12D897F257E}" type="slidenum">
+              <a:rPr lang="de-DE" smtClean="0"/>
+              <a:t>20</a:t>
+            </a:fld>
+            <a:endParaRPr lang="de-DE"/>
+          </a:p>
+        </p:txBody>
+      </p:sp>
+      <p:pic>
+        <p:nvPicPr>
+          <p:cNvPr id="9" name="Grafik 8">
+            <a:extLst>
+              <a:ext uri="{FF2B5EF4-FFF2-40B4-BE49-F238E27FC236}">
+                <a16:creationId xmlns:a16="http://schemas.microsoft.com/office/drawing/2014/main" id="{464718C5-BEDE-4AEE-880B-CDF330DADC77}"/>
+              </a:ext>
+            </a:extLst>
+          </p:cNvPr>
+          <p:cNvPicPr>
+            <a:picLocks noChangeAspect="1"/>
+          </p:cNvPicPr>
+          <p:nvPr/>
+        </p:nvPicPr>
+        <p:blipFill>
+          <a:blip r:embed="rId3"/>
+          <a:stretch>
+            <a:fillRect/>
+          </a:stretch>
+        </p:blipFill>
+        <p:spPr>
+          <a:xfrm>
+            <a:off x="838200" y="2738158"/>
+            <a:ext cx="3700346" cy="2112402"/>
+          </a:xfrm>
+          <a:prstGeom prst="rect">
+            <a:avLst/>
+          </a:prstGeom>
+        </p:spPr>
+      </p:pic>
+    </p:spTree>
+    <p:extLst>
+      <p:ext uri="{BB962C8B-B14F-4D97-AF65-F5344CB8AC3E}">
+        <p14:creationId xmlns:p14="http://schemas.microsoft.com/office/powerpoint/2010/main" val="1053329344"/>
+      </p:ext>
+    </p:extLst>
+  </p:cSld>
+  <p:clrMapOvr>
+    <a:masterClrMapping/>
+  </p:clrMapOvr>
+</p:sld>
+</file>
+
+<file path=ppt/slides/slide21.xml><?xml version="1.0" encoding="utf-8"?>
+<p:sld xmlns:a="http://schemas.openxmlformats.org/drawingml/2006/main" xmlns:r="http://schemas.openxmlformats.org/officeDocument/2006/relationships" xmlns:p="http://schemas.openxmlformats.org/presentationml/2006/main">
+  <p:cSld>
+    <p:spTree>
+      <p:nvGrpSpPr>
+        <p:cNvPr id="1" name=""/>
+        <p:cNvGrpSpPr/>
+        <p:nvPr/>
+      </p:nvGrpSpPr>
+      <p:grpSpPr>
+        <a:xfrm>
+          <a:off x="0" y="0"/>
+          <a:ext cx="0" cy="0"/>
+          <a:chOff x="0" y="0"/>
+          <a:chExt cx="0" cy="0"/>
+        </a:xfrm>
+      </p:grpSpPr>
+      <p:sp>
+        <p:nvSpPr>
+          <p:cNvPr id="2" name="Titel 1">
+            <a:extLst>
+              <a:ext uri="{FF2B5EF4-FFF2-40B4-BE49-F238E27FC236}">
+                <a16:creationId xmlns:a16="http://schemas.microsoft.com/office/drawing/2014/main" id="{F17C112E-FFFB-40C8-B4EA-6A0D6AF8C78E}"/>
+              </a:ext>
+            </a:extLst>
+          </p:cNvPr>
+          <p:cNvSpPr>
+            <a:spLocks noGrp="1"/>
+          </p:cNvSpPr>
+          <p:nvPr>
+            <p:ph type="title"/>
+          </p:nvPr>
+        </p:nvSpPr>
+        <p:spPr/>
+        <p:txBody>
+          <a:bodyPr/>
+          <a:lstStyle/>
+          <a:p>
+            <a:r>
+              <a:rPr lang="de-DE" dirty="0"/>
+              <a:t>Dart  - Wahrheitswerte</a:t>
+            </a:r>
+          </a:p>
+        </p:txBody>
+      </p:sp>
+      <p:sp>
+        <p:nvSpPr>
+          <p:cNvPr id="3" name="Inhaltsplatzhalter 2">
+            <a:extLst>
+              <a:ext uri="{FF2B5EF4-FFF2-40B4-BE49-F238E27FC236}">
+                <a16:creationId xmlns:a16="http://schemas.microsoft.com/office/drawing/2014/main" id="{4FFC9685-1750-4AB0-8573-96BB52A01427}"/>
+              </a:ext>
+            </a:extLst>
+          </p:cNvPr>
+          <p:cNvSpPr>
+            <a:spLocks noGrp="1"/>
+          </p:cNvSpPr>
+          <p:nvPr>
+            <p:ph idx="1"/>
+          </p:nvPr>
+        </p:nvSpPr>
+        <p:spPr/>
+        <p:txBody>
+          <a:bodyPr/>
+          <a:lstStyle/>
+          <a:p>
+            <a:r>
+              <a:rPr lang="de-DE" dirty="0"/>
+              <a:t>Aussagen können wahr (</a:t>
+            </a:r>
+            <a:r>
+              <a:rPr lang="de-DE" sz="3200" b="1" dirty="0" err="1">
+                <a:solidFill>
+                  <a:schemeClr val="accent1">
+                    <a:lumMod val="75000"/>
+                  </a:schemeClr>
+                </a:solidFill>
+                <a:ea typeface="+mj-ea"/>
+              </a:rPr>
+              <a:t>true</a:t>
+            </a:r>
+            <a:r>
+              <a:rPr lang="de-DE" dirty="0"/>
+              <a:t>) oder falsch (</a:t>
+            </a:r>
+            <a:r>
+              <a:rPr lang="de-DE" sz="3200" b="1" dirty="0" err="1">
+                <a:solidFill>
+                  <a:schemeClr val="accent1">
+                    <a:lumMod val="75000"/>
+                  </a:schemeClr>
+                </a:solidFill>
+                <a:ea typeface="+mj-ea"/>
+              </a:rPr>
+              <a:t>false</a:t>
+            </a:r>
+            <a:r>
+              <a:rPr lang="de-DE" dirty="0"/>
+              <a:t>) sein</a:t>
+            </a:r>
+          </a:p>
+          <a:p>
+            <a:endParaRPr lang="de-DE" dirty="0"/>
+          </a:p>
+          <a:p>
+            <a:r>
+              <a:rPr lang="de-DE" dirty="0"/>
+              <a:t>Operatoren</a:t>
+            </a:r>
+          </a:p>
+          <a:p>
+            <a:pPr lvl="1"/>
+            <a:r>
+              <a:rPr lang="de-DE" dirty="0"/>
+              <a:t>kleiner: </a:t>
+            </a:r>
+            <a:r>
+              <a:rPr lang="de-DE" b="1" dirty="0">
+                <a:solidFill>
+                  <a:schemeClr val="accent1">
+                    <a:lumMod val="75000"/>
+                  </a:schemeClr>
+                </a:solidFill>
+              </a:rPr>
+              <a:t>&lt;</a:t>
+            </a:r>
+          </a:p>
+          <a:p>
+            <a:pPr lvl="1"/>
+            <a:r>
+              <a:rPr lang="de-DE" dirty="0"/>
+              <a:t>kleiner oder gleich: </a:t>
+            </a:r>
+            <a:r>
+              <a:rPr lang="de-DE" b="1" dirty="0">
+                <a:solidFill>
+                  <a:schemeClr val="accent1">
+                    <a:lumMod val="75000"/>
+                  </a:schemeClr>
+                </a:solidFill>
+              </a:rPr>
+              <a:t>&lt;=</a:t>
+            </a:r>
+          </a:p>
+          <a:p>
+            <a:pPr lvl="1"/>
+            <a:r>
+              <a:rPr lang="de-DE" dirty="0"/>
+              <a:t>größer:</a:t>
+            </a:r>
+            <a:r>
+              <a:rPr lang="de-DE" b="1" dirty="0">
+                <a:solidFill>
+                  <a:schemeClr val="accent1">
+                    <a:lumMod val="75000"/>
+                  </a:schemeClr>
+                </a:solidFill>
+              </a:rPr>
+              <a:t> &gt;</a:t>
+            </a:r>
+          </a:p>
+          <a:p>
+            <a:pPr lvl="1"/>
+            <a:r>
+              <a:rPr lang="de-DE" dirty="0"/>
+              <a:t>größer oder gleich: </a:t>
+            </a:r>
+            <a:r>
+              <a:rPr lang="de-DE" b="1" dirty="0">
+                <a:solidFill>
+                  <a:schemeClr val="accent1">
+                    <a:lumMod val="75000"/>
+                  </a:schemeClr>
+                </a:solidFill>
+              </a:rPr>
+              <a:t>&gt;=</a:t>
+            </a:r>
+          </a:p>
+          <a:p>
+            <a:pPr lvl="1"/>
+            <a:r>
+              <a:rPr lang="de-DE" dirty="0"/>
+              <a:t>gleich: </a:t>
+            </a:r>
+            <a:r>
+              <a:rPr lang="de-DE" b="1" dirty="0">
+                <a:solidFill>
+                  <a:schemeClr val="accent1">
+                    <a:lumMod val="75000"/>
+                  </a:schemeClr>
+                </a:solidFill>
+              </a:rPr>
+              <a:t>==</a:t>
+            </a:r>
+          </a:p>
+          <a:p>
+            <a:pPr lvl="1"/>
+            <a:r>
+              <a:rPr lang="de-DE" dirty="0"/>
+              <a:t>ungleich: </a:t>
+            </a:r>
+            <a:r>
+              <a:rPr lang="de-DE" b="1" dirty="0">
+                <a:solidFill>
+                  <a:schemeClr val="accent1">
+                    <a:lumMod val="75000"/>
+                  </a:schemeClr>
+                </a:solidFill>
+              </a:rPr>
+              <a:t>!=</a:t>
+            </a:r>
+          </a:p>
+          <a:p>
+            <a:endParaRPr lang="de-DE" dirty="0"/>
+          </a:p>
+        </p:txBody>
+      </p:sp>
+      <p:sp>
+        <p:nvSpPr>
+          <p:cNvPr id="4" name="Datumsplatzhalter 3">
+            <a:extLst>
+              <a:ext uri="{FF2B5EF4-FFF2-40B4-BE49-F238E27FC236}">
+                <a16:creationId xmlns:a16="http://schemas.microsoft.com/office/drawing/2014/main" id="{84A77E82-EB32-462F-8EF5-F0B43AB7069A}"/>
+              </a:ext>
+            </a:extLst>
+          </p:cNvPr>
+          <p:cNvSpPr>
+            <a:spLocks noGrp="1"/>
+          </p:cNvSpPr>
+          <p:nvPr>
+            <p:ph type="dt" sz="half" idx="10"/>
+          </p:nvPr>
+        </p:nvSpPr>
+        <p:spPr/>
+        <p:txBody>
+          <a:bodyPr/>
+          <a:lstStyle/>
+          <a:p>
+            <a:fld id="{767B626B-00B4-4CEC-8206-7F4851B03FEF}" type="datetime1">
+              <a:rPr lang="de-DE" smtClean="0"/>
+              <a:t>23.01.2023</a:t>
+            </a:fld>
+            <a:endParaRPr lang="de-DE"/>
+          </a:p>
+        </p:txBody>
+      </p:sp>
+      <p:sp>
+        <p:nvSpPr>
+          <p:cNvPr id="5" name="Fußzeilenplatzhalter 4">
+            <a:extLst>
+              <a:ext uri="{FF2B5EF4-FFF2-40B4-BE49-F238E27FC236}">
+                <a16:creationId xmlns:a16="http://schemas.microsoft.com/office/drawing/2014/main" id="{78CAC62B-7DB2-4388-8AF2-9D157943E4D7}"/>
+              </a:ext>
+            </a:extLst>
+          </p:cNvPr>
+          <p:cNvSpPr>
+            <a:spLocks noGrp="1"/>
+          </p:cNvSpPr>
+          <p:nvPr>
+            <p:ph type="ftr" sz="quarter" idx="11"/>
+          </p:nvPr>
+        </p:nvSpPr>
+        <p:spPr/>
+        <p:txBody>
+          <a:bodyPr/>
+          <a:lstStyle/>
+          <a:p>
+            <a:r>
+              <a:rPr lang="de-DE"/>
+              <a:t>Dart - Programmiersprache für Smartphones</a:t>
+            </a:r>
+          </a:p>
+        </p:txBody>
+      </p:sp>
+      <p:sp>
+        <p:nvSpPr>
+          <p:cNvPr id="6" name="Foliennummernplatzhalter 5">
+            <a:extLst>
+              <a:ext uri="{FF2B5EF4-FFF2-40B4-BE49-F238E27FC236}">
+                <a16:creationId xmlns:a16="http://schemas.microsoft.com/office/drawing/2014/main" id="{5038DEC3-48E2-4923-ABF9-BF7C76D95687}"/>
+              </a:ext>
+            </a:extLst>
+          </p:cNvPr>
+          <p:cNvSpPr>
+            <a:spLocks noGrp="1"/>
+          </p:cNvSpPr>
+          <p:nvPr>
+            <p:ph type="sldNum" sz="quarter" idx="12"/>
+          </p:nvPr>
+        </p:nvSpPr>
+        <p:spPr/>
+        <p:txBody>
+          <a:bodyPr/>
+          <a:lstStyle/>
+          <a:p>
+            <a:fld id="{3A1F27E2-D58A-4028-9FF2-B12D897F257E}" type="slidenum">
+              <a:rPr lang="de-DE" smtClean="0"/>
+              <a:t>21</a:t>
+            </a:fld>
+            <a:endParaRPr lang="de-DE"/>
+          </a:p>
+        </p:txBody>
+      </p:sp>
+      <p:pic>
+        <p:nvPicPr>
+          <p:cNvPr id="8" name="Grafik 7">
+            <a:extLst>
+              <a:ext uri="{FF2B5EF4-FFF2-40B4-BE49-F238E27FC236}">
+                <a16:creationId xmlns:a16="http://schemas.microsoft.com/office/drawing/2014/main" id="{209539B3-C9D0-497B-8DB2-65E1DBD44D96}"/>
+              </a:ext>
+            </a:extLst>
+          </p:cNvPr>
+          <p:cNvPicPr>
+            <a:picLocks noChangeAspect="1"/>
+          </p:cNvPicPr>
+          <p:nvPr/>
+        </p:nvPicPr>
+        <p:blipFill>
+          <a:blip r:embed="rId2"/>
+          <a:stretch>
+            <a:fillRect/>
+          </a:stretch>
+        </p:blipFill>
+        <p:spPr>
+          <a:xfrm>
+            <a:off x="5622073" y="3080670"/>
+            <a:ext cx="3735318" cy="1926227"/>
+          </a:xfrm>
+          <a:prstGeom prst="rect">
+            <a:avLst/>
+          </a:prstGeom>
+        </p:spPr>
+      </p:pic>
+    </p:spTree>
+    <p:extLst>
+      <p:ext uri="{BB962C8B-B14F-4D97-AF65-F5344CB8AC3E}">
+        <p14:creationId xmlns:p14="http://schemas.microsoft.com/office/powerpoint/2010/main" val="1100889318"/>
+      </p:ext>
+    </p:extLst>
+  </p:cSld>
+  <p:clrMapOvr>
+    <a:masterClrMapping/>
+  </p:clrMapOvr>
+</p:sld>
+</file>
+
+<file path=ppt/slides/slide22.xml><?xml version="1.0" encoding="utf-8"?>
+<p:sld xmlns:a="http://schemas.openxmlformats.org/drawingml/2006/main" xmlns:r="http://schemas.openxmlformats.org/officeDocument/2006/relationships" xmlns:p="http://schemas.openxmlformats.org/presentationml/2006/main">
+  <p:cSld>
+    <p:spTree>
+      <p:nvGrpSpPr>
+        <p:cNvPr id="1" name=""/>
+        <p:cNvGrpSpPr/>
+        <p:nvPr/>
+      </p:nvGrpSpPr>
+      <p:grpSpPr>
+        <a:xfrm>
+          <a:off x="0" y="0"/>
+          <a:ext cx="0" cy="0"/>
+          <a:chOff x="0" y="0"/>
+          <a:chExt cx="0" cy="0"/>
+        </a:xfrm>
+      </p:grpSpPr>
+      <p:sp>
+        <p:nvSpPr>
+          <p:cNvPr id="2" name="Titel 1">
+            <a:extLst>
+              <a:ext uri="{FF2B5EF4-FFF2-40B4-BE49-F238E27FC236}">
+                <a16:creationId xmlns:a16="http://schemas.microsoft.com/office/drawing/2014/main" id="{106C09AE-0E69-49BE-955A-8840D8904084}"/>
+              </a:ext>
+            </a:extLst>
+          </p:cNvPr>
+          <p:cNvSpPr>
+            <a:spLocks noGrp="1"/>
+          </p:cNvSpPr>
+          <p:nvPr>
+            <p:ph type="title"/>
+          </p:nvPr>
+        </p:nvSpPr>
+        <p:spPr/>
+        <p:txBody>
+          <a:bodyPr/>
+          <a:lstStyle/>
+          <a:p>
+            <a:r>
+              <a:rPr lang="de-DE" dirty="0"/>
+              <a:t>Dart  - Wahrheitswerte</a:t>
+            </a:r>
+          </a:p>
+        </p:txBody>
+      </p:sp>
+      <p:sp>
+        <p:nvSpPr>
+          <p:cNvPr id="3" name="Inhaltsplatzhalter 2">
+            <a:extLst>
+              <a:ext uri="{FF2B5EF4-FFF2-40B4-BE49-F238E27FC236}">
+                <a16:creationId xmlns:a16="http://schemas.microsoft.com/office/drawing/2014/main" id="{516E3A3D-6390-4ABA-A6BC-922D2F3E11EF}"/>
+              </a:ext>
+            </a:extLst>
+          </p:cNvPr>
+          <p:cNvSpPr>
+            <a:spLocks noGrp="1"/>
+          </p:cNvSpPr>
+          <p:nvPr>
+            <p:ph idx="1"/>
+          </p:nvPr>
+        </p:nvSpPr>
+        <p:spPr/>
+        <p:txBody>
+          <a:bodyPr/>
+          <a:lstStyle/>
+          <a:p>
+            <a:r>
+              <a:rPr lang="de-DE" dirty="0"/>
+              <a:t>Aussagen können verknüpft werden</a:t>
+            </a:r>
+          </a:p>
+          <a:p>
+            <a:endParaRPr lang="de-DE" dirty="0"/>
+          </a:p>
+          <a:p>
+            <a:r>
+              <a:rPr lang="de-DE" dirty="0"/>
+              <a:t>Operatoren</a:t>
+            </a:r>
+          </a:p>
+          <a:p>
+            <a:pPr lvl="1"/>
+            <a:r>
+              <a:rPr lang="de-DE" dirty="0"/>
+              <a:t>und: </a:t>
+            </a:r>
+            <a:r>
+              <a:rPr lang="de-DE" b="1" dirty="0">
+                <a:solidFill>
+                  <a:schemeClr val="accent1">
+                    <a:lumMod val="75000"/>
+                  </a:schemeClr>
+                </a:solidFill>
+              </a:rPr>
+              <a:t>&amp;&amp; </a:t>
+            </a:r>
+            <a:r>
+              <a:rPr lang="de-DE" dirty="0"/>
+              <a:t>(beide müssen wahr sein)</a:t>
+            </a:r>
+            <a:endParaRPr lang="de-DE" b="1" dirty="0">
+              <a:solidFill>
+                <a:schemeClr val="accent1">
+                  <a:lumMod val="75000"/>
+                </a:schemeClr>
+              </a:solidFill>
+            </a:endParaRPr>
+          </a:p>
+          <a:p>
+            <a:pPr lvl="1"/>
+            <a:r>
+              <a:rPr lang="de-DE" dirty="0"/>
+              <a:t>oder: </a:t>
+            </a:r>
+            <a:r>
+              <a:rPr lang="de-DE" b="1" dirty="0">
+                <a:solidFill>
+                  <a:schemeClr val="accent1">
+                    <a:lumMod val="75000"/>
+                  </a:schemeClr>
+                </a:solidFill>
+              </a:rPr>
+              <a:t>|| </a:t>
+            </a:r>
+            <a:r>
+              <a:rPr lang="de-DE" dirty="0"/>
+              <a:t>(mindestens eins muss wahr sein)</a:t>
+            </a:r>
+            <a:endParaRPr lang="de-DE" b="1" dirty="0">
+              <a:solidFill>
+                <a:schemeClr val="accent1">
+                  <a:lumMod val="75000"/>
+                </a:schemeClr>
+              </a:solidFill>
+            </a:endParaRPr>
+          </a:p>
+          <a:p>
+            <a:pPr lvl="1">
+              <a:buClr>
+                <a:schemeClr val="tx1"/>
+              </a:buClr>
+            </a:pPr>
+            <a:r>
+              <a:rPr lang="de-DE" b="1" dirty="0">
+                <a:solidFill>
+                  <a:schemeClr val="accent1">
+                    <a:lumMod val="75000"/>
+                  </a:schemeClr>
+                </a:solidFill>
+              </a:rPr>
+              <a:t>&amp;&amp;</a:t>
+            </a:r>
+            <a:r>
+              <a:rPr lang="de-DE" dirty="0"/>
+              <a:t> hat Vorrang vor </a:t>
+            </a:r>
+            <a:r>
+              <a:rPr lang="de-DE" b="1" dirty="0">
+                <a:solidFill>
+                  <a:schemeClr val="accent1">
+                    <a:lumMod val="75000"/>
+                  </a:schemeClr>
+                </a:solidFill>
+              </a:rPr>
+              <a:t>||</a:t>
+            </a:r>
+          </a:p>
+          <a:p>
+            <a:pPr lvl="1">
+              <a:buClr>
+                <a:schemeClr val="tx1"/>
+              </a:buClr>
+            </a:pPr>
+            <a:r>
+              <a:rPr lang="de-DE" dirty="0"/>
+              <a:t>Klammern möglich</a:t>
+            </a:r>
+          </a:p>
+          <a:p>
+            <a:endParaRPr lang="de-DE" dirty="0"/>
+          </a:p>
+        </p:txBody>
+      </p:sp>
+      <p:sp>
+        <p:nvSpPr>
+          <p:cNvPr id="4" name="Datumsplatzhalter 3">
+            <a:extLst>
+              <a:ext uri="{FF2B5EF4-FFF2-40B4-BE49-F238E27FC236}">
+                <a16:creationId xmlns:a16="http://schemas.microsoft.com/office/drawing/2014/main" id="{74CDA85A-C793-4DC9-AFC0-767BF81263C1}"/>
+              </a:ext>
+            </a:extLst>
+          </p:cNvPr>
+          <p:cNvSpPr>
+            <a:spLocks noGrp="1"/>
+          </p:cNvSpPr>
+          <p:nvPr>
+            <p:ph type="dt" sz="half" idx="10"/>
+          </p:nvPr>
+        </p:nvSpPr>
+        <p:spPr/>
+        <p:txBody>
+          <a:bodyPr/>
+          <a:lstStyle/>
+          <a:p>
+            <a:fld id="{102EEC64-5E38-4CDE-986C-4F454B58738A}" type="datetime1">
+              <a:rPr lang="de-DE" smtClean="0"/>
+              <a:t>23.01.2023</a:t>
+            </a:fld>
+            <a:endParaRPr lang="de-DE"/>
+          </a:p>
+        </p:txBody>
+      </p:sp>
+      <p:sp>
+        <p:nvSpPr>
+          <p:cNvPr id="5" name="Fußzeilenplatzhalter 4">
+            <a:extLst>
+              <a:ext uri="{FF2B5EF4-FFF2-40B4-BE49-F238E27FC236}">
+                <a16:creationId xmlns:a16="http://schemas.microsoft.com/office/drawing/2014/main" id="{C9DC446C-992C-4C82-960B-4C44EA90AFDE}"/>
+              </a:ext>
+            </a:extLst>
+          </p:cNvPr>
+          <p:cNvSpPr>
+            <a:spLocks noGrp="1"/>
+          </p:cNvSpPr>
+          <p:nvPr>
+            <p:ph type="ftr" sz="quarter" idx="11"/>
+          </p:nvPr>
+        </p:nvSpPr>
+        <p:spPr/>
+        <p:txBody>
+          <a:bodyPr/>
+          <a:lstStyle/>
+          <a:p>
+            <a:r>
+              <a:rPr lang="de-DE"/>
+              <a:t>Dart - Programmiersprache für Smartphones</a:t>
+            </a:r>
+          </a:p>
+        </p:txBody>
+      </p:sp>
+      <p:sp>
+        <p:nvSpPr>
+          <p:cNvPr id="6" name="Foliennummernplatzhalter 5">
+            <a:extLst>
+              <a:ext uri="{FF2B5EF4-FFF2-40B4-BE49-F238E27FC236}">
+                <a16:creationId xmlns:a16="http://schemas.microsoft.com/office/drawing/2014/main" id="{493BEEB2-B8DD-4932-B890-90DB00B1F2E8}"/>
+              </a:ext>
+            </a:extLst>
+          </p:cNvPr>
+          <p:cNvSpPr>
+            <a:spLocks noGrp="1"/>
+          </p:cNvSpPr>
+          <p:nvPr>
+            <p:ph type="sldNum" sz="quarter" idx="12"/>
+          </p:nvPr>
+        </p:nvSpPr>
+        <p:spPr/>
+        <p:txBody>
+          <a:bodyPr/>
+          <a:lstStyle/>
+          <a:p>
+            <a:fld id="{3A1F27E2-D58A-4028-9FF2-B12D897F257E}" type="slidenum">
+              <a:rPr lang="de-DE" smtClean="0"/>
+              <a:t>22</a:t>
+            </a:fld>
+            <a:endParaRPr lang="de-DE"/>
+          </a:p>
+        </p:txBody>
+      </p:sp>
+      <p:pic>
+        <p:nvPicPr>
+          <p:cNvPr id="8" name="Grafik 7">
+            <a:extLst>
+              <a:ext uri="{FF2B5EF4-FFF2-40B4-BE49-F238E27FC236}">
+                <a16:creationId xmlns:a16="http://schemas.microsoft.com/office/drawing/2014/main" id="{FAF063B2-C35B-43F1-9808-82257DE7784D}"/>
+              </a:ext>
+            </a:extLst>
+          </p:cNvPr>
+          <p:cNvPicPr>
+            <a:picLocks noChangeAspect="1"/>
+          </p:cNvPicPr>
+          <p:nvPr/>
+        </p:nvPicPr>
+        <p:blipFill>
+          <a:blip r:embed="rId3"/>
+          <a:stretch>
+            <a:fillRect/>
+          </a:stretch>
+        </p:blipFill>
+        <p:spPr>
+          <a:xfrm>
+            <a:off x="5366056" y="3986360"/>
+            <a:ext cx="4447017" cy="1834577"/>
+          </a:xfrm>
+          <a:prstGeom prst="rect">
+            <a:avLst/>
+          </a:prstGeom>
+        </p:spPr>
+      </p:pic>
+    </p:spTree>
+    <p:extLst>
+      <p:ext uri="{BB962C8B-B14F-4D97-AF65-F5344CB8AC3E}">
+        <p14:creationId xmlns:p14="http://schemas.microsoft.com/office/powerpoint/2010/main" val="452968522"/>
+      </p:ext>
+    </p:extLst>
+  </p:cSld>
+  <p:clrMapOvr>
+    <a:masterClrMapping/>
+  </p:clrMapOvr>
+</p:sld>
+</file>
+
+<file path=ppt/slides/slide23.xml><?xml version="1.0" encoding="utf-8"?>
+<p:sld xmlns:a="http://schemas.openxmlformats.org/drawingml/2006/main" xmlns:r="http://schemas.openxmlformats.org/officeDocument/2006/relationships" xmlns:p="http://schemas.openxmlformats.org/presentationml/2006/main">
+  <p:cSld>
+    <p:spTree>
+      <p:nvGrpSpPr>
+        <p:cNvPr id="1" name=""/>
+        <p:cNvGrpSpPr/>
+        <p:nvPr/>
+      </p:nvGrpSpPr>
+      <p:grpSpPr>
+        <a:xfrm>
+          <a:off x="0" y="0"/>
+          <a:ext cx="0" cy="0"/>
+          <a:chOff x="0" y="0"/>
+          <a:chExt cx="0" cy="0"/>
+        </a:xfrm>
+      </p:grpSpPr>
+      <p:sp>
+        <p:nvSpPr>
+          <p:cNvPr id="2" name="Titel 1">
+            <a:extLst>
+              <a:ext uri="{FF2B5EF4-FFF2-40B4-BE49-F238E27FC236}">
+                <a16:creationId xmlns:a16="http://schemas.microsoft.com/office/drawing/2014/main" id="{87BA3A23-AE8D-493E-A851-D9DC3F948DCB}"/>
+              </a:ext>
+            </a:extLst>
+          </p:cNvPr>
+          <p:cNvSpPr>
+            <a:spLocks noGrp="1"/>
+          </p:cNvSpPr>
+          <p:nvPr>
+            <p:ph type="title"/>
+          </p:nvPr>
+        </p:nvSpPr>
+        <p:spPr/>
+        <p:txBody>
+          <a:bodyPr/>
+          <a:lstStyle/>
+          <a:p>
+            <a:r>
+              <a:rPr lang="de-DE" dirty="0"/>
+              <a:t>Dart  - Wahrheitswerte</a:t>
+            </a:r>
+          </a:p>
+        </p:txBody>
+      </p:sp>
+      <p:sp>
+        <p:nvSpPr>
+          <p:cNvPr id="3" name="Inhaltsplatzhalter 2">
+            <a:extLst>
+              <a:ext uri="{FF2B5EF4-FFF2-40B4-BE49-F238E27FC236}">
+                <a16:creationId xmlns:a16="http://schemas.microsoft.com/office/drawing/2014/main" id="{41D56D4B-3CA4-4AF9-B958-3220E810AEB1}"/>
+              </a:ext>
+            </a:extLst>
+          </p:cNvPr>
+          <p:cNvSpPr>
+            <a:spLocks noGrp="1"/>
+          </p:cNvSpPr>
+          <p:nvPr>
+            <p:ph idx="1"/>
+          </p:nvPr>
+        </p:nvSpPr>
+        <p:spPr/>
+        <p:txBody>
+          <a:bodyPr anchor="ctr"/>
+          <a:lstStyle/>
+          <a:p>
+            <a:pPr marL="0" indent="0">
+              <a:buNone/>
+            </a:pPr>
+            <a:r>
+              <a:rPr lang="de-DE" dirty="0"/>
+              <a:t>Finde heraus, ob die Aussage a ≤ b ≥ c</a:t>
+            </a:r>
+            <a:br>
+              <a:rPr lang="de-DE" dirty="0"/>
+            </a:br>
+            <a:r>
+              <a:rPr lang="de-DE" dirty="0"/>
+              <a:t>wahr oder falsch ist für</a:t>
+            </a:r>
+          </a:p>
+          <a:p>
+            <a:pPr lvl="1"/>
+            <a:r>
+              <a:rPr lang="de-DE" dirty="0"/>
+              <a:t>a=3, b=9, c=17</a:t>
+            </a:r>
+          </a:p>
+          <a:p>
+            <a:pPr lvl="1"/>
+            <a:r>
+              <a:rPr lang="de-DE" dirty="0"/>
+              <a:t>a=1, b=2, c=2</a:t>
+            </a:r>
+            <a:endParaRPr lang="de-DE" b="1" dirty="0">
+              <a:solidFill>
+                <a:schemeClr val="accent1">
+                  <a:lumMod val="75000"/>
+                </a:schemeClr>
+              </a:solidFill>
+            </a:endParaRPr>
+          </a:p>
+        </p:txBody>
+      </p:sp>
+      <p:sp>
+        <p:nvSpPr>
+          <p:cNvPr id="4" name="Datumsplatzhalter 3">
+            <a:extLst>
+              <a:ext uri="{FF2B5EF4-FFF2-40B4-BE49-F238E27FC236}">
+                <a16:creationId xmlns:a16="http://schemas.microsoft.com/office/drawing/2014/main" id="{4B6D3DA3-BA5A-4C0E-A4A5-C133A5C5447F}"/>
+              </a:ext>
+            </a:extLst>
+          </p:cNvPr>
+          <p:cNvSpPr>
+            <a:spLocks noGrp="1"/>
+          </p:cNvSpPr>
+          <p:nvPr>
+            <p:ph type="dt" sz="half" idx="10"/>
+          </p:nvPr>
+        </p:nvSpPr>
+        <p:spPr/>
+        <p:txBody>
+          <a:bodyPr/>
+          <a:lstStyle/>
+          <a:p>
+            <a:fld id="{8B9E1184-3E8E-4927-B70E-FCD133F545CF}" type="datetime1">
+              <a:rPr lang="de-DE" smtClean="0"/>
+              <a:t>23.01.2023</a:t>
+            </a:fld>
+            <a:endParaRPr lang="de-DE"/>
+          </a:p>
+        </p:txBody>
+      </p:sp>
+      <p:sp>
+        <p:nvSpPr>
+          <p:cNvPr id="5" name="Fußzeilenplatzhalter 4">
+            <a:extLst>
+              <a:ext uri="{FF2B5EF4-FFF2-40B4-BE49-F238E27FC236}">
+                <a16:creationId xmlns:a16="http://schemas.microsoft.com/office/drawing/2014/main" id="{A69E3BE8-6E26-4585-AF09-54FD33821EBE}"/>
+              </a:ext>
+            </a:extLst>
+          </p:cNvPr>
+          <p:cNvSpPr>
+            <a:spLocks noGrp="1"/>
+          </p:cNvSpPr>
+          <p:nvPr>
+            <p:ph type="ftr" sz="quarter" idx="11"/>
+          </p:nvPr>
+        </p:nvSpPr>
+        <p:spPr/>
+        <p:txBody>
+          <a:bodyPr/>
+          <a:lstStyle/>
+          <a:p>
+            <a:r>
+              <a:rPr lang="de-DE"/>
+              <a:t>Dart - Programmiersprache für Smartphones</a:t>
+            </a:r>
+          </a:p>
+        </p:txBody>
+      </p:sp>
+      <p:sp>
+        <p:nvSpPr>
+          <p:cNvPr id="6" name="Foliennummernplatzhalter 5">
+            <a:extLst>
+              <a:ext uri="{FF2B5EF4-FFF2-40B4-BE49-F238E27FC236}">
+                <a16:creationId xmlns:a16="http://schemas.microsoft.com/office/drawing/2014/main" id="{7955519E-7E51-4F4B-A447-2C4E1E982E4F}"/>
+              </a:ext>
+            </a:extLst>
+          </p:cNvPr>
+          <p:cNvSpPr>
+            <a:spLocks noGrp="1"/>
+          </p:cNvSpPr>
+          <p:nvPr>
+            <p:ph type="sldNum" sz="quarter" idx="12"/>
+          </p:nvPr>
+        </p:nvSpPr>
+        <p:spPr/>
+        <p:txBody>
+          <a:bodyPr/>
+          <a:lstStyle/>
+          <a:p>
+            <a:fld id="{3A1F27E2-D58A-4028-9FF2-B12D897F257E}" type="slidenum">
+              <a:rPr lang="de-DE" smtClean="0"/>
+              <a:t>23</a:t>
+            </a:fld>
+            <a:endParaRPr lang="de-DE"/>
+          </a:p>
+        </p:txBody>
+      </p:sp>
+    </p:spTree>
+    <p:extLst>
+      <p:ext uri="{BB962C8B-B14F-4D97-AF65-F5344CB8AC3E}">
+        <p14:creationId xmlns:p14="http://schemas.microsoft.com/office/powerpoint/2010/main" val="348541739"/>
+      </p:ext>
+    </p:extLst>
+  </p:cSld>
+  <p:clrMapOvr>
+    <a:masterClrMapping/>
+  </p:clrMapOvr>
+</p:sld>
+</file>
+
+<file path=ppt/slides/slide24.xml><?xml version="1.0" encoding="utf-8"?>
+<p:sld xmlns:a="http://schemas.openxmlformats.org/drawingml/2006/main" xmlns:r="http://schemas.openxmlformats.org/officeDocument/2006/relationships" xmlns:p="http://schemas.openxmlformats.org/presentationml/2006/main">
+  <p:cSld>
+    <p:spTree>
+      <p:nvGrpSpPr>
+        <p:cNvPr id="1" name=""/>
+        <p:cNvGrpSpPr/>
+        <p:nvPr/>
+      </p:nvGrpSpPr>
+      <p:grpSpPr>
+        <a:xfrm>
+          <a:off x="0" y="0"/>
+          <a:ext cx="0" cy="0"/>
+          <a:chOff x="0" y="0"/>
+          <a:chExt cx="0" cy="0"/>
+        </a:xfrm>
+      </p:grpSpPr>
+      <p:sp>
+        <p:nvSpPr>
+          <p:cNvPr id="2" name="Titel 1">
+            <a:extLst>
+              <a:ext uri="{FF2B5EF4-FFF2-40B4-BE49-F238E27FC236}">
+                <a16:creationId xmlns:a16="http://schemas.microsoft.com/office/drawing/2014/main" id="{05BF9027-1DE7-43A9-9EA5-02F0FAE22EC2}"/>
+              </a:ext>
+            </a:extLst>
+          </p:cNvPr>
+          <p:cNvSpPr>
+            <a:spLocks noGrp="1"/>
+          </p:cNvSpPr>
+          <p:nvPr>
+            <p:ph type="title"/>
+          </p:nvPr>
+        </p:nvSpPr>
+        <p:spPr/>
+        <p:txBody>
+          <a:bodyPr/>
+          <a:lstStyle/>
+          <a:p>
+            <a:r>
+              <a:rPr lang="de-DE" dirty="0"/>
+              <a:t>Dart  - Verzweigungen</a:t>
+            </a:r>
+          </a:p>
+        </p:txBody>
+      </p:sp>
+      <p:sp>
+        <p:nvSpPr>
+          <p:cNvPr id="3" name="Inhaltsplatzhalter 2">
+            <a:extLst>
+              <a:ext uri="{FF2B5EF4-FFF2-40B4-BE49-F238E27FC236}">
+                <a16:creationId xmlns:a16="http://schemas.microsoft.com/office/drawing/2014/main" id="{57269D83-674E-49D9-B66B-B52322D36F7D}"/>
+              </a:ext>
+            </a:extLst>
+          </p:cNvPr>
+          <p:cNvSpPr>
+            <a:spLocks noGrp="1"/>
+          </p:cNvSpPr>
+          <p:nvPr>
+            <p:ph idx="1"/>
+          </p:nvPr>
+        </p:nvSpPr>
+        <p:spPr/>
+        <p:txBody>
+          <a:bodyPr/>
+          <a:lstStyle/>
+          <a:p>
+            <a:r>
+              <a:rPr lang="de-DE" dirty="0" err="1"/>
+              <a:t>if</a:t>
+            </a:r>
+            <a:r>
+              <a:rPr lang="de-DE" dirty="0"/>
+              <a:t>-Befehl</a:t>
+            </a:r>
+          </a:p>
+          <a:p>
+            <a:pPr lvl="1">
+              <a:buClr>
+                <a:schemeClr val="tx1"/>
+              </a:buClr>
+            </a:pPr>
+            <a:r>
+              <a:rPr lang="de-DE" b="1" dirty="0" err="1">
+                <a:solidFill>
+                  <a:schemeClr val="accent1">
+                    <a:lumMod val="75000"/>
+                  </a:schemeClr>
+                </a:solidFill>
+              </a:rPr>
+              <a:t>if</a:t>
+            </a:r>
+            <a:r>
+              <a:rPr lang="de-DE" b="1" dirty="0">
+                <a:solidFill>
+                  <a:schemeClr val="accent1">
+                    <a:lumMod val="75000"/>
+                  </a:schemeClr>
+                </a:solidFill>
+              </a:rPr>
+              <a:t> (</a:t>
+            </a:r>
+            <a:r>
+              <a:rPr lang="de-DE" i="1" dirty="0">
+                <a:solidFill>
+                  <a:schemeClr val="accent2">
+                    <a:lumMod val="75000"/>
+                  </a:schemeClr>
+                </a:solidFill>
+              </a:rPr>
+              <a:t>Bedingung</a:t>
+            </a:r>
+            <a:r>
+              <a:rPr lang="de-DE" b="1" dirty="0">
+                <a:solidFill>
+                  <a:schemeClr val="accent1">
+                    <a:lumMod val="75000"/>
+                  </a:schemeClr>
+                </a:solidFill>
+              </a:rPr>
+              <a:t>) {</a:t>
+            </a:r>
+            <a:br>
+              <a:rPr lang="de-DE" i="1" dirty="0"/>
+            </a:br>
+            <a:r>
+              <a:rPr lang="de-DE" dirty="0"/>
+              <a:t>	// wenn </a:t>
+            </a:r>
+            <a:r>
+              <a:rPr lang="de-DE" i="1" dirty="0">
+                <a:solidFill>
+                  <a:schemeClr val="accent2">
+                    <a:lumMod val="75000"/>
+                  </a:schemeClr>
+                </a:solidFill>
+              </a:rPr>
+              <a:t>Bedingung</a:t>
+            </a:r>
+            <a:r>
+              <a:rPr lang="de-DE" dirty="0"/>
+              <a:t> wahr ist</a:t>
+            </a:r>
+            <a:br>
+              <a:rPr lang="de-DE" dirty="0"/>
+            </a:br>
+            <a:r>
+              <a:rPr lang="de-DE" b="1" dirty="0">
+                <a:solidFill>
+                  <a:schemeClr val="accent1">
+                    <a:lumMod val="75000"/>
+                  </a:schemeClr>
+                </a:solidFill>
+              </a:rPr>
+              <a:t>} </a:t>
+            </a:r>
+            <a:r>
+              <a:rPr lang="de-DE" b="1" dirty="0" err="1">
+                <a:solidFill>
+                  <a:schemeClr val="accent1">
+                    <a:lumMod val="75000"/>
+                  </a:schemeClr>
+                </a:solidFill>
+              </a:rPr>
+              <a:t>else</a:t>
+            </a:r>
+            <a:r>
+              <a:rPr lang="de-DE" b="1" dirty="0">
+                <a:solidFill>
+                  <a:schemeClr val="accent1">
+                    <a:lumMod val="75000"/>
+                  </a:schemeClr>
+                </a:solidFill>
+              </a:rPr>
+              <a:t> </a:t>
+            </a:r>
+            <a:r>
+              <a:rPr lang="de-DE" b="1" dirty="0" err="1">
+                <a:solidFill>
+                  <a:schemeClr val="accent1">
+                    <a:lumMod val="75000"/>
+                  </a:schemeClr>
+                </a:solidFill>
+              </a:rPr>
+              <a:t>if</a:t>
+            </a:r>
+            <a:r>
+              <a:rPr lang="de-DE" b="1" dirty="0">
+                <a:solidFill>
+                  <a:schemeClr val="accent1">
+                    <a:lumMod val="75000"/>
+                  </a:schemeClr>
+                </a:solidFill>
+              </a:rPr>
+              <a:t> (</a:t>
+            </a:r>
+            <a:r>
+              <a:rPr lang="de-DE" dirty="0"/>
+              <a:t> </a:t>
+            </a:r>
+            <a:r>
+              <a:rPr lang="de-DE" i="1" dirty="0">
+                <a:solidFill>
+                  <a:schemeClr val="accent2">
+                    <a:lumMod val="75000"/>
+                  </a:schemeClr>
+                </a:solidFill>
+              </a:rPr>
+              <a:t>Bedingung2 </a:t>
+            </a:r>
+            <a:r>
+              <a:rPr lang="de-DE" b="1" dirty="0">
+                <a:solidFill>
+                  <a:schemeClr val="accent1">
+                    <a:lumMod val="75000"/>
+                  </a:schemeClr>
+                </a:solidFill>
+              </a:rPr>
+              <a:t>) {</a:t>
+            </a:r>
+            <a:br>
+              <a:rPr lang="de-DE" i="1" dirty="0"/>
+            </a:br>
+            <a:r>
+              <a:rPr lang="de-DE" dirty="0"/>
+              <a:t>	// wenn </a:t>
+            </a:r>
+            <a:r>
+              <a:rPr lang="de-DE" i="1" dirty="0">
+                <a:solidFill>
+                  <a:schemeClr val="accent2">
+                    <a:lumMod val="75000"/>
+                  </a:schemeClr>
+                </a:solidFill>
+              </a:rPr>
+              <a:t>Bedingung</a:t>
+            </a:r>
+            <a:r>
+              <a:rPr lang="de-DE" dirty="0"/>
+              <a:t> nicht wahr aber </a:t>
+            </a:r>
+            <a:r>
+              <a:rPr lang="de-DE" i="1" dirty="0">
+                <a:solidFill>
+                  <a:schemeClr val="accent2">
+                    <a:lumMod val="75000"/>
+                  </a:schemeClr>
+                </a:solidFill>
+              </a:rPr>
+              <a:t>Bedingung2</a:t>
+            </a:r>
+            <a:r>
+              <a:rPr lang="de-DE" dirty="0"/>
+              <a:t> wahr ist</a:t>
+            </a:r>
+            <a:br>
+              <a:rPr lang="de-DE" dirty="0"/>
+            </a:br>
+            <a:r>
+              <a:rPr lang="de-DE" b="1" dirty="0" err="1">
+                <a:solidFill>
+                  <a:schemeClr val="accent1">
+                    <a:lumMod val="75000"/>
+                  </a:schemeClr>
+                </a:solidFill>
+              </a:rPr>
+              <a:t>else</a:t>
+            </a:r>
+            <a:r>
+              <a:rPr lang="de-DE" b="1" dirty="0">
+                <a:solidFill>
+                  <a:schemeClr val="accent1">
+                    <a:lumMod val="75000"/>
+                  </a:schemeClr>
+                </a:solidFill>
+              </a:rPr>
+              <a:t> {</a:t>
+            </a:r>
+            <a:br>
+              <a:rPr lang="de-DE" dirty="0"/>
+            </a:br>
+            <a:r>
+              <a:rPr lang="de-DE" dirty="0"/>
+              <a:t>	// wenn weder </a:t>
+            </a:r>
+            <a:r>
+              <a:rPr lang="de-DE" i="1" dirty="0">
+                <a:solidFill>
+                  <a:schemeClr val="accent2">
+                    <a:lumMod val="75000"/>
+                  </a:schemeClr>
+                </a:solidFill>
+              </a:rPr>
+              <a:t>Bedingung</a:t>
+            </a:r>
+            <a:r>
+              <a:rPr lang="de-DE" dirty="0"/>
+              <a:t> noch </a:t>
+            </a:r>
+            <a:r>
+              <a:rPr lang="de-DE" i="1" dirty="0">
+                <a:solidFill>
+                  <a:schemeClr val="accent2">
+                    <a:lumMod val="75000"/>
+                  </a:schemeClr>
+                </a:solidFill>
+              </a:rPr>
+              <a:t>Bedingung2</a:t>
+            </a:r>
+            <a:r>
+              <a:rPr lang="de-DE" dirty="0"/>
+              <a:t> wahr sind</a:t>
+            </a:r>
+            <a:br>
+              <a:rPr lang="de-DE" dirty="0"/>
+            </a:br>
+            <a:r>
+              <a:rPr lang="de-DE" b="1" dirty="0">
+                <a:solidFill>
+                  <a:schemeClr val="accent1">
+                    <a:lumMod val="75000"/>
+                  </a:schemeClr>
+                </a:solidFill>
+              </a:rPr>
+              <a:t>}</a:t>
+            </a:r>
+            <a:endParaRPr lang="de-DE" dirty="0"/>
+          </a:p>
+        </p:txBody>
+      </p:sp>
+      <p:sp>
+        <p:nvSpPr>
+          <p:cNvPr id="4" name="Datumsplatzhalter 3">
+            <a:extLst>
+              <a:ext uri="{FF2B5EF4-FFF2-40B4-BE49-F238E27FC236}">
+                <a16:creationId xmlns:a16="http://schemas.microsoft.com/office/drawing/2014/main" id="{9B26293B-7F5D-4853-A6BF-36FA37526F5C}"/>
+              </a:ext>
+            </a:extLst>
+          </p:cNvPr>
+          <p:cNvSpPr>
+            <a:spLocks noGrp="1"/>
+          </p:cNvSpPr>
+          <p:nvPr>
+            <p:ph type="dt" sz="half" idx="10"/>
+          </p:nvPr>
+        </p:nvSpPr>
+        <p:spPr/>
+        <p:txBody>
+          <a:bodyPr/>
+          <a:lstStyle/>
+          <a:p>
+            <a:fld id="{372285A9-CAD1-4F8C-A320-59D4C92876C5}" type="datetime1">
+              <a:rPr lang="de-DE" smtClean="0"/>
+              <a:t>23.01.2023</a:t>
+            </a:fld>
+            <a:endParaRPr lang="de-DE"/>
+          </a:p>
+        </p:txBody>
+      </p:sp>
+      <p:sp>
+        <p:nvSpPr>
+          <p:cNvPr id="5" name="Fußzeilenplatzhalter 4">
+            <a:extLst>
+              <a:ext uri="{FF2B5EF4-FFF2-40B4-BE49-F238E27FC236}">
+                <a16:creationId xmlns:a16="http://schemas.microsoft.com/office/drawing/2014/main" id="{2C778F10-8AB2-40E6-BC1F-E81FB19FDE79}"/>
+              </a:ext>
+            </a:extLst>
+          </p:cNvPr>
+          <p:cNvSpPr>
+            <a:spLocks noGrp="1"/>
+          </p:cNvSpPr>
+          <p:nvPr>
+            <p:ph type="ftr" sz="quarter" idx="11"/>
+          </p:nvPr>
+        </p:nvSpPr>
+        <p:spPr/>
+        <p:txBody>
+          <a:bodyPr/>
+          <a:lstStyle/>
+          <a:p>
+            <a:r>
+              <a:rPr lang="de-DE"/>
+              <a:t>Dart - Programmiersprache für Smartphones</a:t>
+            </a:r>
+          </a:p>
+        </p:txBody>
+      </p:sp>
+      <p:sp>
+        <p:nvSpPr>
+          <p:cNvPr id="6" name="Foliennummernplatzhalter 5">
+            <a:extLst>
+              <a:ext uri="{FF2B5EF4-FFF2-40B4-BE49-F238E27FC236}">
+                <a16:creationId xmlns:a16="http://schemas.microsoft.com/office/drawing/2014/main" id="{50BDCC66-ED19-4B87-9100-4EE7F556CCE7}"/>
+              </a:ext>
+            </a:extLst>
+          </p:cNvPr>
+          <p:cNvSpPr>
+            <a:spLocks noGrp="1"/>
+          </p:cNvSpPr>
+          <p:nvPr>
+            <p:ph type="sldNum" sz="quarter" idx="12"/>
+          </p:nvPr>
+        </p:nvSpPr>
+        <p:spPr/>
+        <p:txBody>
+          <a:bodyPr/>
+          <a:lstStyle/>
+          <a:p>
+            <a:fld id="{3A1F27E2-D58A-4028-9FF2-B12D897F257E}" type="slidenum">
+              <a:rPr lang="de-DE" smtClean="0"/>
+              <a:t>24</a:t>
+            </a:fld>
+            <a:endParaRPr lang="de-DE"/>
+          </a:p>
+        </p:txBody>
+      </p:sp>
+      <p:pic>
+        <p:nvPicPr>
+          <p:cNvPr id="8" name="Grafik 7">
+            <a:extLst>
+              <a:ext uri="{FF2B5EF4-FFF2-40B4-BE49-F238E27FC236}">
+                <a16:creationId xmlns:a16="http://schemas.microsoft.com/office/drawing/2014/main" id="{C741E023-2A89-4C3C-9AE6-35BFFCC7EFB4}"/>
+              </a:ext>
+            </a:extLst>
+          </p:cNvPr>
+          <p:cNvPicPr>
+            <a:picLocks noChangeAspect="1"/>
+          </p:cNvPicPr>
+          <p:nvPr/>
+        </p:nvPicPr>
+        <p:blipFill>
+          <a:blip r:embed="rId2"/>
+          <a:stretch>
+            <a:fillRect/>
+          </a:stretch>
+        </p:blipFill>
+        <p:spPr>
+          <a:xfrm>
+            <a:off x="838200" y="4428379"/>
+            <a:ext cx="4985661" cy="1905514"/>
+          </a:xfrm>
+          <a:prstGeom prst="rect">
+            <a:avLst/>
+          </a:prstGeom>
+        </p:spPr>
+      </p:pic>
+    </p:spTree>
+    <p:extLst>
+      <p:ext uri="{BB962C8B-B14F-4D97-AF65-F5344CB8AC3E}">
+        <p14:creationId xmlns:p14="http://schemas.microsoft.com/office/powerpoint/2010/main" val="2205451820"/>
+      </p:ext>
+    </p:extLst>
+  </p:cSld>
+  <p:clrMapOvr>
+    <a:masterClrMapping/>
+  </p:clrMapOvr>
+</p:sld>
+</file>
+
+<file path=ppt/slides/slide25.xml><?xml version="1.0" encoding="utf-8"?>
+<p:sld xmlns:a="http://schemas.openxmlformats.org/drawingml/2006/main" xmlns:r="http://schemas.openxmlformats.org/officeDocument/2006/relationships" xmlns:p="http://schemas.openxmlformats.org/presentationml/2006/main">
+  <p:cSld>
+    <p:spTree>
+      <p:nvGrpSpPr>
+        <p:cNvPr id="1" name=""/>
+        <p:cNvGrpSpPr/>
+        <p:nvPr/>
+      </p:nvGrpSpPr>
+      <p:grpSpPr>
+        <a:xfrm>
+          <a:off x="0" y="0"/>
+          <a:ext cx="0" cy="0"/>
+          <a:chOff x="0" y="0"/>
+          <a:chExt cx="0" cy="0"/>
+        </a:xfrm>
+      </p:grpSpPr>
+      <p:sp>
+        <p:nvSpPr>
+          <p:cNvPr id="2" name="Titel 1">
+            <a:extLst>
+              <a:ext uri="{FF2B5EF4-FFF2-40B4-BE49-F238E27FC236}">
+                <a16:creationId xmlns:a16="http://schemas.microsoft.com/office/drawing/2014/main" id="{11919140-9CAB-49B3-90EE-163B13FF144D}"/>
+              </a:ext>
+            </a:extLst>
+          </p:cNvPr>
+          <p:cNvSpPr>
+            <a:spLocks noGrp="1"/>
+          </p:cNvSpPr>
+          <p:nvPr>
+            <p:ph type="title"/>
+          </p:nvPr>
+        </p:nvSpPr>
+        <p:spPr/>
+        <p:txBody>
+          <a:bodyPr/>
+          <a:lstStyle/>
+          <a:p>
+            <a:r>
+              <a:rPr lang="de-DE" dirty="0"/>
+              <a:t>Dart  - Verzweigungen - Aufgabe</a:t>
+            </a:r>
+          </a:p>
+        </p:txBody>
+      </p:sp>
+      <p:sp>
+        <p:nvSpPr>
+          <p:cNvPr id="3" name="Inhaltsplatzhalter 2">
+            <a:extLst>
+              <a:ext uri="{FF2B5EF4-FFF2-40B4-BE49-F238E27FC236}">
+                <a16:creationId xmlns:a16="http://schemas.microsoft.com/office/drawing/2014/main" id="{FDEC950F-0A78-438D-8A33-B226705DA15F}"/>
+              </a:ext>
+            </a:extLst>
+          </p:cNvPr>
+          <p:cNvSpPr>
+            <a:spLocks noGrp="1"/>
+          </p:cNvSpPr>
+          <p:nvPr>
+            <p:ph idx="1"/>
+          </p:nvPr>
+        </p:nvSpPr>
+        <p:spPr>
+          <a:xfrm>
+            <a:off x="838200" y="1520825"/>
+            <a:ext cx="9554737" cy="4645025"/>
+          </a:xfrm>
+        </p:spPr>
+        <p:txBody>
+          <a:bodyPr anchor="ctr"/>
+          <a:lstStyle/>
+          <a:p>
+            <a:pPr marL="0" indent="0">
+              <a:buNone/>
+            </a:pPr>
+            <a:r>
+              <a:rPr lang="de-DE" dirty="0"/>
+              <a:t>Wie viele Zahlen von 100 bis 999 enthalten die Ziffer 3?</a:t>
+            </a:r>
+          </a:p>
+          <a:p>
+            <a:endParaRPr lang="de-DE" dirty="0"/>
+          </a:p>
+        </p:txBody>
+      </p:sp>
+      <p:sp>
+        <p:nvSpPr>
+          <p:cNvPr id="4" name="Datumsplatzhalter 3">
+            <a:extLst>
+              <a:ext uri="{FF2B5EF4-FFF2-40B4-BE49-F238E27FC236}">
+                <a16:creationId xmlns:a16="http://schemas.microsoft.com/office/drawing/2014/main" id="{4D2AE852-945F-4D43-9B0F-90759264559B}"/>
+              </a:ext>
+            </a:extLst>
+          </p:cNvPr>
+          <p:cNvSpPr>
+            <a:spLocks noGrp="1"/>
+          </p:cNvSpPr>
+          <p:nvPr>
+            <p:ph type="dt" sz="half" idx="10"/>
+          </p:nvPr>
+        </p:nvSpPr>
+        <p:spPr/>
+        <p:txBody>
+          <a:bodyPr/>
+          <a:lstStyle/>
+          <a:p>
+            <a:fld id="{2F8DC1E6-2D30-4DE7-9C9D-5217FE18022E}" type="datetime1">
+              <a:rPr lang="de-DE" smtClean="0"/>
+              <a:t>23.01.2023</a:t>
+            </a:fld>
+            <a:endParaRPr lang="de-DE"/>
+          </a:p>
+        </p:txBody>
+      </p:sp>
+      <p:sp>
+        <p:nvSpPr>
+          <p:cNvPr id="5" name="Fußzeilenplatzhalter 4">
+            <a:extLst>
+              <a:ext uri="{FF2B5EF4-FFF2-40B4-BE49-F238E27FC236}">
+                <a16:creationId xmlns:a16="http://schemas.microsoft.com/office/drawing/2014/main" id="{55EBAF22-C26B-4B67-B17A-E272F262EE6D}"/>
+              </a:ext>
+            </a:extLst>
+          </p:cNvPr>
+          <p:cNvSpPr>
+            <a:spLocks noGrp="1"/>
+          </p:cNvSpPr>
+          <p:nvPr>
+            <p:ph type="ftr" sz="quarter" idx="11"/>
+          </p:nvPr>
+        </p:nvSpPr>
+        <p:spPr/>
+        <p:txBody>
+          <a:bodyPr/>
+          <a:lstStyle/>
+          <a:p>
+            <a:r>
+              <a:rPr lang="de-DE"/>
+              <a:t>Dart - Programmiersprache für Smartphones</a:t>
+            </a:r>
+          </a:p>
+        </p:txBody>
+      </p:sp>
+      <p:sp>
+        <p:nvSpPr>
+          <p:cNvPr id="6" name="Foliennummernplatzhalter 5">
+            <a:extLst>
+              <a:ext uri="{FF2B5EF4-FFF2-40B4-BE49-F238E27FC236}">
+                <a16:creationId xmlns:a16="http://schemas.microsoft.com/office/drawing/2014/main" id="{10202B96-6461-48B8-BC88-6389BC07BB4D}"/>
+              </a:ext>
+            </a:extLst>
+          </p:cNvPr>
+          <p:cNvSpPr>
+            <a:spLocks noGrp="1"/>
+          </p:cNvSpPr>
+          <p:nvPr>
+            <p:ph type="sldNum" sz="quarter" idx="12"/>
+          </p:nvPr>
+        </p:nvSpPr>
+        <p:spPr/>
+        <p:txBody>
+          <a:bodyPr/>
+          <a:lstStyle/>
+          <a:p>
+            <a:fld id="{3A1F27E2-D58A-4028-9FF2-B12D897F257E}" type="slidenum">
+              <a:rPr lang="de-DE" smtClean="0"/>
+              <a:t>25</a:t>
+            </a:fld>
+            <a:endParaRPr lang="de-DE"/>
+          </a:p>
+        </p:txBody>
+      </p:sp>
+    </p:spTree>
+    <p:extLst>
+      <p:ext uri="{BB962C8B-B14F-4D97-AF65-F5344CB8AC3E}">
+        <p14:creationId xmlns:p14="http://schemas.microsoft.com/office/powerpoint/2010/main" val="1327933660"/>
       </p:ext>
     </p:extLst>
   </p:cSld>
@@ -9703,7 +12345,7 @@
           <a:p>
             <a:fld id="{5C03BAA7-20D5-4E1B-8CB5-A2ED8F9EFD7F}" type="datetime1">
               <a:rPr lang="de-DE" smtClean="0"/>
-              <a:t>16.01.2023</a:t>
+              <a:t>23.01.2023</a:t>
             </a:fld>
             <a:endParaRPr lang="de-DE"/>
           </a:p>
@@ -9816,6 +12458,34 @@
       </p:pic>
       <p:sp>
         <p:nvSpPr>
+          <p:cNvPr id="2" name="Titel 1">
+            <a:extLst>
+              <a:ext uri="{FF2B5EF4-FFF2-40B4-BE49-F238E27FC236}">
+                <a16:creationId xmlns:a16="http://schemas.microsoft.com/office/drawing/2014/main" id="{D326F20E-9C8C-4589-B938-1CE6D7B41B0C}"/>
+              </a:ext>
+            </a:extLst>
+          </p:cNvPr>
+          <p:cNvSpPr>
+            <a:spLocks noGrp="1"/>
+          </p:cNvSpPr>
+          <p:nvPr>
+            <p:ph type="title"/>
+          </p:nvPr>
+        </p:nvSpPr>
+        <p:spPr/>
+        <p:txBody>
+          <a:bodyPr/>
+          <a:lstStyle/>
+          <a:p>
+            <a:r>
+              <a:rPr lang="de-DE" dirty="0"/>
+              <a:t>Dart - Ausgabe auf dem Bildschirm</a:t>
+            </a:r>
+          </a:p>
+        </p:txBody>
+      </p:sp>
+      <p:sp>
+        <p:nvSpPr>
           <p:cNvPr id="7" name="Inhaltsplatzhalter 6">
             <a:extLst>
               <a:ext uri="{FF2B5EF4-FFF2-40B4-BE49-F238E27FC236}">
@@ -9936,6 +12606,92 @@
           </a:p>
           <a:p>
             <a:endParaRPr lang="de-DE" dirty="0"/>
+          </a:p>
+        </p:txBody>
+      </p:sp>
+      <p:sp>
+        <p:nvSpPr>
+          <p:cNvPr id="4" name="Datumsplatzhalter 3">
+            <a:extLst>
+              <a:ext uri="{FF2B5EF4-FFF2-40B4-BE49-F238E27FC236}">
+                <a16:creationId xmlns:a16="http://schemas.microsoft.com/office/drawing/2014/main" id="{E607A61A-BF2F-4712-B4AC-98AD90F671D6}"/>
+              </a:ext>
+            </a:extLst>
+          </p:cNvPr>
+          <p:cNvSpPr>
+            <a:spLocks noGrp="1"/>
+          </p:cNvSpPr>
+          <p:nvPr>
+            <p:ph type="dt" sz="half" idx="10"/>
+          </p:nvPr>
+        </p:nvSpPr>
+        <p:spPr/>
+        <p:txBody>
+          <a:bodyPr/>
+          <a:lstStyle/>
+          <a:p>
+            <a:fld id="{DDF7F67B-F411-40A4-BFC4-67CF6BB150A8}" type="datetime1">
+              <a:rPr lang="de-DE" smtClean="0"/>
+              <a:t>23.01.2023</a:t>
+            </a:fld>
+            <a:endParaRPr lang="de-DE"/>
+          </a:p>
+        </p:txBody>
+      </p:sp>
+      <p:sp>
+        <p:nvSpPr>
+          <p:cNvPr id="5" name="Fußzeilenplatzhalter 4">
+            <a:extLst>
+              <a:ext uri="{FF2B5EF4-FFF2-40B4-BE49-F238E27FC236}">
+                <a16:creationId xmlns:a16="http://schemas.microsoft.com/office/drawing/2014/main" id="{850A3253-E84D-4CFB-A301-495D8D122D52}"/>
+              </a:ext>
+            </a:extLst>
+          </p:cNvPr>
+          <p:cNvSpPr>
+            <a:spLocks noGrp="1"/>
+          </p:cNvSpPr>
+          <p:nvPr>
+            <p:ph type="ftr" sz="quarter" idx="11"/>
+          </p:nvPr>
+        </p:nvSpPr>
+        <p:spPr/>
+        <p:txBody>
+          <a:bodyPr/>
+          <a:lstStyle/>
+          <a:p>
+            <a:r>
+              <a:rPr lang="de-DE"/>
+              <a:t>Dart - Programmiersprache für Smartphones</a:t>
+            </a:r>
+          </a:p>
+        </p:txBody>
+      </p:sp>
+      <p:sp>
+        <p:nvSpPr>
+          <p:cNvPr id="6" name="Foliennummernplatzhalter 5">
+            <a:extLst>
+              <a:ext uri="{FF2B5EF4-FFF2-40B4-BE49-F238E27FC236}">
+                <a16:creationId xmlns:a16="http://schemas.microsoft.com/office/drawing/2014/main" id="{539FF752-35A7-447F-BC29-B42721F88796}"/>
+              </a:ext>
+            </a:extLst>
+          </p:cNvPr>
+          <p:cNvSpPr>
+            <a:spLocks noGrp="1"/>
+          </p:cNvSpPr>
+          <p:nvPr>
+            <p:ph type="sldNum" sz="quarter" idx="12"/>
+          </p:nvPr>
+        </p:nvSpPr>
+        <p:spPr/>
+        <p:txBody>
+          <a:bodyPr/>
+          <a:lstStyle/>
+          <a:p>
+            <a:fld id="{3A1F27E2-D58A-4028-9FF2-B12D897F257E}" type="slidenum">
+              <a:rPr lang="de-DE" smtClean="0"/>
+              <a:t>4</a:t>
+            </a:fld>
+            <a:endParaRPr lang="de-DE"/>
           </a:p>
         </p:txBody>
       </p:sp>
@@ -9969,120 +12725,6 @@
           </a:prstGeom>
         </p:spPr>
       </p:pic>
-      <p:sp>
-        <p:nvSpPr>
-          <p:cNvPr id="2" name="Titel 1">
-            <a:extLst>
-              <a:ext uri="{FF2B5EF4-FFF2-40B4-BE49-F238E27FC236}">
-                <a16:creationId xmlns:a16="http://schemas.microsoft.com/office/drawing/2014/main" id="{D326F20E-9C8C-4589-B938-1CE6D7B41B0C}"/>
-              </a:ext>
-            </a:extLst>
-          </p:cNvPr>
-          <p:cNvSpPr>
-            <a:spLocks noGrp="1"/>
-          </p:cNvSpPr>
-          <p:nvPr>
-            <p:ph type="title"/>
-          </p:nvPr>
-        </p:nvSpPr>
-        <p:spPr/>
-        <p:txBody>
-          <a:bodyPr/>
-          <a:lstStyle/>
-          <a:p>
-            <a:r>
-              <a:rPr lang="de-DE" dirty="0"/>
-              <a:t>Dart - Ausgabe auf dem Bildschirm</a:t>
-            </a:r>
-          </a:p>
-        </p:txBody>
-      </p:sp>
-      <p:sp>
-        <p:nvSpPr>
-          <p:cNvPr id="4" name="Datumsplatzhalter 3">
-            <a:extLst>
-              <a:ext uri="{FF2B5EF4-FFF2-40B4-BE49-F238E27FC236}">
-                <a16:creationId xmlns:a16="http://schemas.microsoft.com/office/drawing/2014/main" id="{E607A61A-BF2F-4712-B4AC-98AD90F671D6}"/>
-              </a:ext>
-            </a:extLst>
-          </p:cNvPr>
-          <p:cNvSpPr>
-            <a:spLocks noGrp="1"/>
-          </p:cNvSpPr>
-          <p:nvPr>
-            <p:ph type="dt" sz="half" idx="10"/>
-          </p:nvPr>
-        </p:nvSpPr>
-        <p:spPr/>
-        <p:txBody>
-          <a:bodyPr/>
-          <a:lstStyle/>
-          <a:p>
-            <a:fld id="{DDF7F67B-F411-40A4-BFC4-67CF6BB150A8}" type="datetime1">
-              <a:rPr lang="de-DE" smtClean="0"/>
-              <a:t>16.01.2023</a:t>
-            </a:fld>
-            <a:endParaRPr lang="de-DE"/>
-          </a:p>
-        </p:txBody>
-      </p:sp>
-      <p:sp>
-        <p:nvSpPr>
-          <p:cNvPr id="5" name="Fußzeilenplatzhalter 4">
-            <a:extLst>
-              <a:ext uri="{FF2B5EF4-FFF2-40B4-BE49-F238E27FC236}">
-                <a16:creationId xmlns:a16="http://schemas.microsoft.com/office/drawing/2014/main" id="{850A3253-E84D-4CFB-A301-495D8D122D52}"/>
-              </a:ext>
-            </a:extLst>
-          </p:cNvPr>
-          <p:cNvSpPr>
-            <a:spLocks noGrp="1"/>
-          </p:cNvSpPr>
-          <p:nvPr>
-            <p:ph type="ftr" sz="quarter" idx="11"/>
-          </p:nvPr>
-        </p:nvSpPr>
-        <p:spPr/>
-        <p:txBody>
-          <a:bodyPr/>
-          <a:lstStyle/>
-          <a:p>
-            <a:r>
-              <a:rPr lang="de-DE"/>
-              <a:t>Dart - Programmiersprache für Smartphones</a:t>
-            </a:r>
-          </a:p>
-        </p:txBody>
-      </p:sp>
-      <p:sp>
-        <p:nvSpPr>
-          <p:cNvPr id="6" name="Foliennummernplatzhalter 5">
-            <a:extLst>
-              <a:ext uri="{FF2B5EF4-FFF2-40B4-BE49-F238E27FC236}">
-                <a16:creationId xmlns:a16="http://schemas.microsoft.com/office/drawing/2014/main" id="{539FF752-35A7-447F-BC29-B42721F88796}"/>
-              </a:ext>
-            </a:extLst>
-          </p:cNvPr>
-          <p:cNvSpPr>
-            <a:spLocks noGrp="1"/>
-          </p:cNvSpPr>
-          <p:nvPr>
-            <p:ph type="sldNum" sz="quarter" idx="12"/>
-          </p:nvPr>
-        </p:nvSpPr>
-        <p:spPr/>
-        <p:txBody>
-          <a:bodyPr/>
-          <a:lstStyle/>
-          <a:p>
-            <a:fld id="{3A1F27E2-D58A-4028-9FF2-B12D897F257E}" type="slidenum">
-              <a:rPr lang="de-DE" smtClean="0"/>
-              <a:t>4</a:t>
-            </a:fld>
-            <a:endParaRPr lang="de-DE"/>
-          </a:p>
-        </p:txBody>
-      </p:sp>
       <p:sp>
         <p:nvSpPr>
           <p:cNvPr id="10" name="Rechteck 9">
@@ -10392,7 +13034,7 @@
           <a:p>
             <a:fld id="{96C0D114-F0DB-443F-9337-40D84E177FDC}" type="datetime1">
               <a:rPr lang="de-DE" smtClean="0"/>
-              <a:t>16.01.2023</a:t>
+              <a:t>23.01.2023</a:t>
             </a:fld>
             <a:endParaRPr lang="de-DE"/>
           </a:p>
@@ -10761,7 +13403,7 @@
           <a:p>
             <a:fld id="{A952138C-0142-4C6B-A620-863AA96BBBE1}" type="datetime1">
               <a:rPr lang="de-DE" smtClean="0"/>
-              <a:t>16.01.2023</a:t>
+              <a:t>23.01.2023</a:t>
             </a:fld>
             <a:endParaRPr lang="de-DE"/>
           </a:p>
@@ -10997,7 +13639,7 @@
           <a:p>
             <a:fld id="{7127E464-1A99-4532-A297-E1D7378D9E61}" type="datetime1">
               <a:rPr lang="de-DE" smtClean="0"/>
-              <a:t>16.01.2023</a:t>
+              <a:t>23.01.2023</a:t>
             </a:fld>
             <a:endParaRPr lang="de-DE"/>
           </a:p>
@@ -11378,7 +14020,7 @@
           <a:p>
             <a:fld id="{77B5C711-A7A8-40A0-AEA6-3F77D4628817}" type="datetime1">
               <a:rPr lang="de-DE" smtClean="0"/>
-              <a:t>16.01.2023</a:t>
+              <a:t>23.01.2023</a:t>
             </a:fld>
             <a:endParaRPr lang="de-DE"/>
           </a:p>
@@ -11757,7 +14399,7 @@
           <a:p>
             <a:fld id="{27A2010A-1149-4F23-80A2-1B4570F18F3A}" type="datetime1">
               <a:rPr lang="de-DE" smtClean="0"/>
-              <a:t>16.01.2023</a:t>
+              <a:t>23.01.2023</a:t>
             </a:fld>
             <a:endParaRPr lang="de-DE"/>
           </a:p>

</xml_diff>

<commit_message>
Add slides 26-32 about lists
</commit_message>
<xml_diff>
--- a/presentations/Dart.pptx
+++ b/presentations/Dart.pptx
@@ -6,10 +6,10 @@
     <p:sldMasterId id="2147483656" r:id="rId2"/>
   </p:sldMasterIdLst>
   <p:notesMasterIdLst>
-    <p:notesMasterId r:id="rId28"/>
+    <p:notesMasterId r:id="rId35"/>
   </p:notesMasterIdLst>
   <p:handoutMasterIdLst>
-    <p:handoutMasterId r:id="rId29"/>
+    <p:handoutMasterId r:id="rId36"/>
   </p:handoutMasterIdLst>
   <p:sldIdLst>
     <p:sldId id="256" r:id="rId3"/>
@@ -37,6 +37,13 @@
     <p:sldId id="292" r:id="rId25"/>
     <p:sldId id="293" r:id="rId26"/>
     <p:sldId id="294" r:id="rId27"/>
+    <p:sldId id="297" r:id="rId28"/>
+    <p:sldId id="296" r:id="rId29"/>
+    <p:sldId id="298" r:id="rId30"/>
+    <p:sldId id="299" r:id="rId31"/>
+    <p:sldId id="300" r:id="rId32"/>
+    <p:sldId id="310" r:id="rId33"/>
+    <p:sldId id="301" r:id="rId34"/>
   </p:sldIdLst>
   <p:sldSz cx="12192000" cy="6858000"/>
   <p:notesSz cx="6858000" cy="9144000"/>
@@ -199,7 +206,15 @@
           </p14:sldIdLst>
         </p14:section>
         <p14:section name="Listen" id="{7B341E35-302E-4EF2-A04B-B7E558EEEB6F}">
-          <p14:sldIdLst/>
+          <p14:sldIdLst>
+            <p14:sldId id="297"/>
+            <p14:sldId id="296"/>
+            <p14:sldId id="298"/>
+            <p14:sldId id="299"/>
+            <p14:sldId id="300"/>
+            <p14:sldId id="310"/>
+            <p14:sldId id="301"/>
+          </p14:sldIdLst>
         </p14:section>
         <p14:section name="Map / Dictionary" id="{D4A4C5FB-0BB1-4A3B-B0E1-186A6D1D750D}">
           <p14:sldIdLst/>
@@ -353,7 +368,7 @@
                   <a:schemeClr val="tx2"/>
                 </a:solidFill>
               </a:rPr>
-              <a:t>23.01.2023</a:t>
+              <a:t>31.01.2023</a:t>
             </a:fld>
             <a:endParaRPr lang="de-DE">
               <a:solidFill>
@@ -703,7 +718,7 @@
             <a:fld id="{B4113CCE-1A1A-46DB-884A-AE560F65C3AF}" type="datetimeFigureOut">
               <a:rPr lang="de-DE" smtClean="0"/>
               <a:pPr/>
-              <a:t>23.01.2023</a:t>
+              <a:t>31.01.2023</a:t>
             </a:fld>
             <a:endParaRPr lang="de-DE"/>
           </a:p>
@@ -2331,6 +2346,145 @@
 </p:notes>
 </file>
 
+<file path=ppt/notesSlides/notesSlide19.xml><?xml version="1.0" encoding="utf-8"?>
+<p:notes xmlns:a="http://schemas.openxmlformats.org/drawingml/2006/main" xmlns:r="http://schemas.openxmlformats.org/officeDocument/2006/relationships" xmlns:p="http://schemas.openxmlformats.org/presentationml/2006/main">
+  <p:cSld>
+    <p:spTree>
+      <p:nvGrpSpPr>
+        <p:cNvPr id="1" name=""/>
+        <p:cNvGrpSpPr/>
+        <p:nvPr/>
+      </p:nvGrpSpPr>
+      <p:grpSpPr>
+        <a:xfrm>
+          <a:off x="0" y="0"/>
+          <a:ext cx="0" cy="0"/>
+          <a:chOff x="0" y="0"/>
+          <a:chExt cx="0" cy="0"/>
+        </a:xfrm>
+      </p:grpSpPr>
+      <p:sp>
+        <p:nvSpPr>
+          <p:cNvPr id="2" name="Folienbildplatzhalter 1"/>
+          <p:cNvSpPr>
+            <a:spLocks noGrp="1" noRot="1" noChangeAspect="1"/>
+          </p:cNvSpPr>
+          <p:nvPr>
+            <p:ph type="sldImg"/>
+          </p:nvPr>
+        </p:nvSpPr>
+        <p:spPr>
+          <a:xfrm>
+            <a:off x="685800" y="1143000"/>
+            <a:ext cx="4270375" cy="2401888"/>
+          </a:xfrm>
+        </p:spPr>
+      </p:sp>
+      <p:sp>
+        <p:nvSpPr>
+          <p:cNvPr id="3" name="Notizenplatzhalter 2"/>
+          <p:cNvSpPr>
+            <a:spLocks noGrp="1"/>
+          </p:cNvSpPr>
+          <p:nvPr>
+            <p:ph type="body" idx="1"/>
+          </p:nvPr>
+        </p:nvSpPr>
+        <p:spPr/>
+        <p:txBody>
+          <a:bodyPr/>
+          <a:lstStyle/>
+          <a:p>
+            <a:r>
+              <a:rPr lang="de-DE" dirty="0"/>
+              <a:t>Datum ist die Einzahl von Daten.</a:t>
+            </a:r>
+          </a:p>
+          <a:p>
+            <a:pPr marL="0" marR="0" lvl="0" indent="0" algn="l" defTabSz="914400" rtl="0" eaLnBrk="1" fontAlgn="auto" latinLnBrk="0" hangingPunct="1">
+              <a:lnSpc>
+                <a:spcPct val="100000"/>
+              </a:lnSpc>
+              <a:spcBef>
+                <a:spcPts val="0"/>
+              </a:spcBef>
+              <a:spcAft>
+                <a:spcPts val="0"/>
+              </a:spcAft>
+              <a:buClrTx/>
+              <a:buSzTx/>
+              <a:buFontTx/>
+              <a:buNone/>
+              <a:tabLst/>
+              <a:defRPr/>
+            </a:pPr>
+            <a:r>
+              <a:rPr lang="de-DE" dirty="0"/>
+              <a:t>Quizfrage: Um was für Zahlen handelt es sich hier?</a:t>
+            </a:r>
+          </a:p>
+          <a:p>
+            <a:pPr marL="0" marR="0" lvl="0" indent="0" algn="l" defTabSz="914400" rtl="0" eaLnBrk="1" fontAlgn="auto" latinLnBrk="0" hangingPunct="1">
+              <a:lnSpc>
+                <a:spcPct val="100000"/>
+              </a:lnSpc>
+              <a:spcBef>
+                <a:spcPts val="0"/>
+              </a:spcBef>
+              <a:spcAft>
+                <a:spcPts val="0"/>
+              </a:spcAft>
+              <a:buClrTx/>
+              <a:buSzTx/>
+              <a:buFontTx/>
+              <a:buNone/>
+              <a:tabLst/>
+              <a:defRPr/>
+            </a:pPr>
+            <a:r>
+              <a:rPr lang="de-DE" dirty="0"/>
+              <a:t>Das sind die ersten Primzahlen.</a:t>
+            </a:r>
+          </a:p>
+        </p:txBody>
+      </p:sp>
+      <p:sp>
+        <p:nvSpPr>
+          <p:cNvPr id="4" name="Foliennummernplatzhalter 3"/>
+          <p:cNvSpPr>
+            <a:spLocks noGrp="1"/>
+          </p:cNvSpPr>
+          <p:nvPr>
+            <p:ph type="sldNum" sz="quarter" idx="5"/>
+          </p:nvPr>
+        </p:nvSpPr>
+        <p:spPr/>
+        <p:txBody>
+          <a:bodyPr/>
+          <a:lstStyle/>
+          <a:p>
+            <a:fld id="{927DBD90-B360-417B-B4B3-F05A4AFC1996}" type="slidenum">
+              <a:rPr lang="de-DE" smtClean="0"/>
+              <a:pPr/>
+              <a:t>26</a:t>
+            </a:fld>
+            <a:endParaRPr lang="de-DE"/>
+          </a:p>
+        </p:txBody>
+      </p:sp>
+    </p:spTree>
+    <p:extLst>
+      <p:ext uri="{BB962C8B-B14F-4D97-AF65-F5344CB8AC3E}">
+        <p14:creationId xmlns:p14="http://schemas.microsoft.com/office/powerpoint/2010/main" val="1156331582"/>
+      </p:ext>
+    </p:extLst>
+  </p:cSld>
+  <p:clrMapOvr>
+    <a:masterClrMapping/>
+  </p:clrMapOvr>
+</p:notes>
+</file>
+
 <file path=ppt/notesSlides/notesSlide2.xml><?xml version="1.0" encoding="utf-8"?>
 <p:notes xmlns:a="http://schemas.openxmlformats.org/drawingml/2006/main" xmlns:r="http://schemas.openxmlformats.org/officeDocument/2006/relationships" xmlns:p="http://schemas.openxmlformats.org/presentationml/2006/main">
   <p:cSld>
@@ -2445,6 +2599,369 @@
     <p:extLst>
       <p:ext uri="{BB962C8B-B14F-4D97-AF65-F5344CB8AC3E}">
         <p14:creationId xmlns:p14="http://schemas.microsoft.com/office/powerpoint/2010/main" val="538888843"/>
+      </p:ext>
+    </p:extLst>
+  </p:cSld>
+  <p:clrMapOvr>
+    <a:masterClrMapping/>
+  </p:clrMapOvr>
+</p:notes>
+</file>
+
+<file path=ppt/notesSlides/notesSlide20.xml><?xml version="1.0" encoding="utf-8"?>
+<p:notes xmlns:a="http://schemas.openxmlformats.org/drawingml/2006/main" xmlns:r="http://schemas.openxmlformats.org/officeDocument/2006/relationships" xmlns:p="http://schemas.openxmlformats.org/presentationml/2006/main">
+  <p:cSld>
+    <p:spTree>
+      <p:nvGrpSpPr>
+        <p:cNvPr id="1" name=""/>
+        <p:cNvGrpSpPr/>
+        <p:nvPr/>
+      </p:nvGrpSpPr>
+      <p:grpSpPr>
+        <a:xfrm>
+          <a:off x="0" y="0"/>
+          <a:ext cx="0" cy="0"/>
+          <a:chOff x="0" y="0"/>
+          <a:chExt cx="0" cy="0"/>
+        </a:xfrm>
+      </p:grpSpPr>
+      <p:sp>
+        <p:nvSpPr>
+          <p:cNvPr id="2" name="Folienbildplatzhalter 1"/>
+          <p:cNvSpPr>
+            <a:spLocks noGrp="1" noRot="1" noChangeAspect="1"/>
+          </p:cNvSpPr>
+          <p:nvPr>
+            <p:ph type="sldImg"/>
+          </p:nvPr>
+        </p:nvSpPr>
+        <p:spPr>
+          <a:xfrm>
+            <a:off x="685800" y="1143000"/>
+            <a:ext cx="4270375" cy="2401888"/>
+          </a:xfrm>
+        </p:spPr>
+      </p:sp>
+      <p:sp>
+        <p:nvSpPr>
+          <p:cNvPr id="3" name="Notizenplatzhalter 2"/>
+          <p:cNvSpPr>
+            <a:spLocks noGrp="1"/>
+          </p:cNvSpPr>
+          <p:nvPr>
+            <p:ph type="body" idx="1"/>
+          </p:nvPr>
+        </p:nvSpPr>
+        <p:spPr/>
+        <p:txBody>
+          <a:bodyPr/>
+          <a:lstStyle/>
+          <a:p>
+            <a:endParaRPr lang="de-DE" dirty="0"/>
+          </a:p>
+        </p:txBody>
+      </p:sp>
+      <p:sp>
+        <p:nvSpPr>
+          <p:cNvPr id="4" name="Foliennummernplatzhalter 3"/>
+          <p:cNvSpPr>
+            <a:spLocks noGrp="1"/>
+          </p:cNvSpPr>
+          <p:nvPr>
+            <p:ph type="sldNum" sz="quarter" idx="5"/>
+          </p:nvPr>
+        </p:nvSpPr>
+        <p:spPr/>
+        <p:txBody>
+          <a:bodyPr/>
+          <a:lstStyle/>
+          <a:p>
+            <a:fld id="{927DBD90-B360-417B-B4B3-F05A4AFC1996}" type="slidenum">
+              <a:rPr lang="de-DE" smtClean="0"/>
+              <a:pPr/>
+              <a:t>27</a:t>
+            </a:fld>
+            <a:endParaRPr lang="de-DE"/>
+          </a:p>
+        </p:txBody>
+      </p:sp>
+    </p:spTree>
+    <p:extLst>
+      <p:ext uri="{BB962C8B-B14F-4D97-AF65-F5344CB8AC3E}">
+        <p14:creationId xmlns:p14="http://schemas.microsoft.com/office/powerpoint/2010/main" val="2272935812"/>
+      </p:ext>
+    </p:extLst>
+  </p:cSld>
+  <p:clrMapOvr>
+    <a:masterClrMapping/>
+  </p:clrMapOvr>
+</p:notes>
+</file>
+
+<file path=ppt/notesSlides/notesSlide21.xml><?xml version="1.0" encoding="utf-8"?>
+<p:notes xmlns:a="http://schemas.openxmlformats.org/drawingml/2006/main" xmlns:r="http://schemas.openxmlformats.org/officeDocument/2006/relationships" xmlns:p="http://schemas.openxmlformats.org/presentationml/2006/main">
+  <p:cSld>
+    <p:spTree>
+      <p:nvGrpSpPr>
+        <p:cNvPr id="1" name=""/>
+        <p:cNvGrpSpPr/>
+        <p:nvPr/>
+      </p:nvGrpSpPr>
+      <p:grpSpPr>
+        <a:xfrm>
+          <a:off x="0" y="0"/>
+          <a:ext cx="0" cy="0"/>
+          <a:chOff x="0" y="0"/>
+          <a:chExt cx="0" cy="0"/>
+        </a:xfrm>
+      </p:grpSpPr>
+      <p:sp>
+        <p:nvSpPr>
+          <p:cNvPr id="2" name="Folienbildplatzhalter 1"/>
+          <p:cNvSpPr>
+            <a:spLocks noGrp="1" noRot="1" noChangeAspect="1"/>
+          </p:cNvSpPr>
+          <p:nvPr>
+            <p:ph type="sldImg"/>
+          </p:nvPr>
+        </p:nvSpPr>
+        <p:spPr>
+          <a:xfrm>
+            <a:off x="685800" y="1143000"/>
+            <a:ext cx="4270375" cy="2401888"/>
+          </a:xfrm>
+        </p:spPr>
+      </p:sp>
+      <p:sp>
+        <p:nvSpPr>
+          <p:cNvPr id="3" name="Notizenplatzhalter 2"/>
+          <p:cNvSpPr>
+            <a:spLocks noGrp="1"/>
+          </p:cNvSpPr>
+          <p:nvPr>
+            <p:ph type="body" idx="1"/>
+          </p:nvPr>
+        </p:nvSpPr>
+        <p:spPr/>
+        <p:txBody>
+          <a:bodyPr/>
+          <a:lstStyle/>
+          <a:p>
+            <a:r>
+              <a:rPr lang="de-DE" dirty="0"/>
+              <a:t>Die Liste enthält ein paar Zahlen der Zweierpotenzen.</a:t>
+            </a:r>
+          </a:p>
+        </p:txBody>
+      </p:sp>
+      <p:sp>
+        <p:nvSpPr>
+          <p:cNvPr id="4" name="Foliennummernplatzhalter 3"/>
+          <p:cNvSpPr>
+            <a:spLocks noGrp="1"/>
+          </p:cNvSpPr>
+          <p:nvPr>
+            <p:ph type="sldNum" sz="quarter" idx="5"/>
+          </p:nvPr>
+        </p:nvSpPr>
+        <p:spPr/>
+        <p:txBody>
+          <a:bodyPr/>
+          <a:lstStyle/>
+          <a:p>
+            <a:fld id="{927DBD90-B360-417B-B4B3-F05A4AFC1996}" type="slidenum">
+              <a:rPr lang="de-DE" smtClean="0"/>
+              <a:pPr/>
+              <a:t>30</a:t>
+            </a:fld>
+            <a:endParaRPr lang="de-DE"/>
+          </a:p>
+        </p:txBody>
+      </p:sp>
+    </p:spTree>
+    <p:extLst>
+      <p:ext uri="{BB962C8B-B14F-4D97-AF65-F5344CB8AC3E}">
+        <p14:creationId xmlns:p14="http://schemas.microsoft.com/office/powerpoint/2010/main" val="4147465160"/>
+      </p:ext>
+    </p:extLst>
+  </p:cSld>
+  <p:clrMapOvr>
+    <a:masterClrMapping/>
+  </p:clrMapOvr>
+</p:notes>
+</file>
+
+<file path=ppt/notesSlides/notesSlide22.xml><?xml version="1.0" encoding="utf-8"?>
+<p:notes xmlns:a="http://schemas.openxmlformats.org/drawingml/2006/main" xmlns:r="http://schemas.openxmlformats.org/officeDocument/2006/relationships" xmlns:p="http://schemas.openxmlformats.org/presentationml/2006/main">
+  <p:cSld>
+    <p:spTree>
+      <p:nvGrpSpPr>
+        <p:cNvPr id="1" name=""/>
+        <p:cNvGrpSpPr/>
+        <p:nvPr/>
+      </p:nvGrpSpPr>
+      <p:grpSpPr>
+        <a:xfrm>
+          <a:off x="0" y="0"/>
+          <a:ext cx="0" cy="0"/>
+          <a:chOff x="0" y="0"/>
+          <a:chExt cx="0" cy="0"/>
+        </a:xfrm>
+      </p:grpSpPr>
+      <p:sp>
+        <p:nvSpPr>
+          <p:cNvPr id="2" name="Folienbildplatzhalter 1"/>
+          <p:cNvSpPr>
+            <a:spLocks noGrp="1" noRot="1" noChangeAspect="1"/>
+          </p:cNvSpPr>
+          <p:nvPr>
+            <p:ph type="sldImg"/>
+          </p:nvPr>
+        </p:nvSpPr>
+        <p:spPr>
+          <a:xfrm>
+            <a:off x="685800" y="1143000"/>
+            <a:ext cx="4270375" cy="2401888"/>
+          </a:xfrm>
+        </p:spPr>
+      </p:sp>
+      <p:sp>
+        <p:nvSpPr>
+          <p:cNvPr id="3" name="Notizenplatzhalter 2"/>
+          <p:cNvSpPr>
+            <a:spLocks noGrp="1"/>
+          </p:cNvSpPr>
+          <p:nvPr>
+            <p:ph type="body" idx="1"/>
+          </p:nvPr>
+        </p:nvSpPr>
+        <p:spPr/>
+        <p:txBody>
+          <a:bodyPr/>
+          <a:lstStyle/>
+          <a:p>
+            <a:endParaRPr lang="de-DE" dirty="0"/>
+          </a:p>
+        </p:txBody>
+      </p:sp>
+      <p:sp>
+        <p:nvSpPr>
+          <p:cNvPr id="4" name="Foliennummernplatzhalter 3"/>
+          <p:cNvSpPr>
+            <a:spLocks noGrp="1"/>
+          </p:cNvSpPr>
+          <p:nvPr>
+            <p:ph type="sldNum" sz="quarter" idx="5"/>
+          </p:nvPr>
+        </p:nvSpPr>
+        <p:spPr/>
+        <p:txBody>
+          <a:bodyPr/>
+          <a:lstStyle/>
+          <a:p>
+            <a:fld id="{927DBD90-B360-417B-B4B3-F05A4AFC1996}" type="slidenum">
+              <a:rPr lang="de-DE" smtClean="0"/>
+              <a:pPr/>
+              <a:t>31</a:t>
+            </a:fld>
+            <a:endParaRPr lang="de-DE"/>
+          </a:p>
+        </p:txBody>
+      </p:sp>
+    </p:spTree>
+    <p:extLst>
+      <p:ext uri="{BB962C8B-B14F-4D97-AF65-F5344CB8AC3E}">
+        <p14:creationId xmlns:p14="http://schemas.microsoft.com/office/powerpoint/2010/main" val="3331197511"/>
+      </p:ext>
+    </p:extLst>
+  </p:cSld>
+  <p:clrMapOvr>
+    <a:masterClrMapping/>
+  </p:clrMapOvr>
+</p:notes>
+</file>
+
+<file path=ppt/notesSlides/notesSlide23.xml><?xml version="1.0" encoding="utf-8"?>
+<p:notes xmlns:a="http://schemas.openxmlformats.org/drawingml/2006/main" xmlns:r="http://schemas.openxmlformats.org/officeDocument/2006/relationships" xmlns:p="http://schemas.openxmlformats.org/presentationml/2006/main">
+  <p:cSld>
+    <p:spTree>
+      <p:nvGrpSpPr>
+        <p:cNvPr id="1" name=""/>
+        <p:cNvGrpSpPr/>
+        <p:nvPr/>
+      </p:nvGrpSpPr>
+      <p:grpSpPr>
+        <a:xfrm>
+          <a:off x="0" y="0"/>
+          <a:ext cx="0" cy="0"/>
+          <a:chOff x="0" y="0"/>
+          <a:chExt cx="0" cy="0"/>
+        </a:xfrm>
+      </p:grpSpPr>
+      <p:sp>
+        <p:nvSpPr>
+          <p:cNvPr id="2" name="Folienbildplatzhalter 1"/>
+          <p:cNvSpPr>
+            <a:spLocks noGrp="1" noRot="1" noChangeAspect="1"/>
+          </p:cNvSpPr>
+          <p:nvPr>
+            <p:ph type="sldImg"/>
+          </p:nvPr>
+        </p:nvSpPr>
+        <p:spPr>
+          <a:xfrm>
+            <a:off x="685800" y="1143000"/>
+            <a:ext cx="4270375" cy="2401888"/>
+          </a:xfrm>
+        </p:spPr>
+      </p:sp>
+      <p:sp>
+        <p:nvSpPr>
+          <p:cNvPr id="3" name="Notizenplatzhalter 2"/>
+          <p:cNvSpPr>
+            <a:spLocks noGrp="1"/>
+          </p:cNvSpPr>
+          <p:nvPr>
+            <p:ph type="body" idx="1"/>
+          </p:nvPr>
+        </p:nvSpPr>
+        <p:spPr/>
+        <p:txBody>
+          <a:bodyPr/>
+          <a:lstStyle/>
+          <a:p>
+            <a:endParaRPr lang="de-DE" dirty="0"/>
+          </a:p>
+        </p:txBody>
+      </p:sp>
+      <p:sp>
+        <p:nvSpPr>
+          <p:cNvPr id="4" name="Foliennummernplatzhalter 3"/>
+          <p:cNvSpPr>
+            <a:spLocks noGrp="1"/>
+          </p:cNvSpPr>
+          <p:nvPr>
+            <p:ph type="sldNum" sz="quarter" idx="5"/>
+          </p:nvPr>
+        </p:nvSpPr>
+        <p:spPr/>
+        <p:txBody>
+          <a:bodyPr/>
+          <a:lstStyle/>
+          <a:p>
+            <a:fld id="{927DBD90-B360-417B-B4B3-F05A4AFC1996}" type="slidenum">
+              <a:rPr lang="de-DE" smtClean="0"/>
+              <a:pPr/>
+              <a:t>32</a:t>
+            </a:fld>
+            <a:endParaRPr lang="de-DE"/>
+          </a:p>
+        </p:txBody>
+      </p:sp>
+    </p:spTree>
+    <p:extLst>
+      <p:ext uri="{BB962C8B-B14F-4D97-AF65-F5344CB8AC3E}">
+        <p14:creationId xmlns:p14="http://schemas.microsoft.com/office/powerpoint/2010/main" val="326313081"/>
       </p:ext>
     </p:extLst>
   </p:cSld>
@@ -3335,7 +3852,7 @@
           <a:p>
             <a:fld id="{4E6DF7AA-8899-480A-AE8B-97B651237939}" type="datetime1">
               <a:rPr lang="de-DE" smtClean="0"/>
-              <a:t>23.01.2023</a:t>
+              <a:t>31.01.2023</a:t>
             </a:fld>
             <a:endParaRPr lang="de-DE"/>
           </a:p>
@@ -3540,7 +4057,7 @@
           <a:p>
             <a:fld id="{A1082C62-1968-4D03-BE49-CB116A4D6814}" type="datetime1">
               <a:rPr lang="de-DE" smtClean="0"/>
-              <a:t>23.01.2023</a:t>
+              <a:t>31.01.2023</a:t>
             </a:fld>
             <a:endParaRPr lang="de-DE"/>
           </a:p>
@@ -3694,7 +4211,7 @@
           <a:p>
             <a:fld id="{C0E04462-FF80-4281-98D0-2AB88E65DA84}" type="datetime1">
               <a:rPr lang="de-DE" smtClean="0"/>
-              <a:t>23.01.2023</a:t>
+              <a:t>31.01.2023</a:t>
             </a:fld>
             <a:endParaRPr lang="de-DE"/>
           </a:p>
@@ -3931,7 +4448,7 @@
           <a:p>
             <a:fld id="{1FAA5A7F-2A4E-40D6-9FFE-960B13817A2C}" type="datetime1">
               <a:rPr lang="de-DE" smtClean="0"/>
-              <a:t>23.01.2023</a:t>
+              <a:t>31.01.2023</a:t>
             </a:fld>
             <a:endParaRPr lang="de-DE"/>
           </a:p>
@@ -4107,7 +4624,7 @@
           <a:p>
             <a:fld id="{382DDC3E-10C9-4B92-B2FB-A8167FB6AB1D}" type="datetime1">
               <a:rPr lang="de-DE" smtClean="0"/>
-              <a:t>23.01.2023</a:t>
+              <a:t>31.01.2023</a:t>
             </a:fld>
             <a:endParaRPr lang="de-DE"/>
           </a:p>
@@ -4283,7 +4800,7 @@
           <a:p>
             <a:fld id="{8159FE7A-07D2-4D3F-9855-29B7F3DF1D43}" type="datetime1">
               <a:rPr lang="de-DE" smtClean="0"/>
-              <a:t>23.01.2023</a:t>
+              <a:t>31.01.2023</a:t>
             </a:fld>
             <a:endParaRPr lang="de-DE"/>
           </a:p>
@@ -4433,7 +4950,7 @@
           <a:p>
             <a:fld id="{7CF1A54B-9CB9-49D3-BA48-5A7ECDBA0943}" type="datetime1">
               <a:rPr lang="de-DE" smtClean="0"/>
-              <a:t>23.01.2023</a:t>
+              <a:t>31.01.2023</a:t>
             </a:fld>
             <a:endParaRPr lang="de-DE"/>
           </a:p>
@@ -4531,7 +5048,7 @@
           <a:p>
             <a:fld id="{5621DBFA-780B-465A-97B9-CC4792E01430}" type="datetime1">
               <a:rPr lang="de-DE" smtClean="0"/>
-              <a:t>23.01.2023</a:t>
+              <a:t>31.01.2023</a:t>
             </a:fld>
             <a:endParaRPr lang="de-DE"/>
           </a:p>
@@ -4655,7 +5172,7 @@
           <a:p>
             <a:fld id="{13ADA68E-BD65-4999-8C0B-CC0F110C2BD3}" type="datetime1">
               <a:rPr lang="de-DE" smtClean="0"/>
-              <a:t>23.01.2023</a:t>
+              <a:t>31.01.2023</a:t>
             </a:fld>
             <a:endParaRPr lang="de-DE"/>
           </a:p>
@@ -4839,7 +5356,7 @@
           <a:p>
             <a:fld id="{93B55C80-8AAA-4242-8442-4A53184707C3}" type="datetime1">
               <a:rPr lang="de-DE" smtClean="0"/>
-              <a:t>23.01.2023</a:t>
+              <a:t>31.01.2023</a:t>
             </a:fld>
             <a:endParaRPr lang="de-DE"/>
           </a:p>
@@ -5044,7 +5561,7 @@
           <a:p>
             <a:fld id="{4485BB24-7FA9-422A-BF70-F9FA49C1D9F8}" type="datetime1">
               <a:rPr lang="de-DE" smtClean="0"/>
-              <a:t>23.01.2023</a:t>
+              <a:t>31.01.2023</a:t>
             </a:fld>
             <a:endParaRPr lang="de-DE"/>
           </a:p>
@@ -5402,7 +5919,7 @@
           <a:p>
             <a:fld id="{3CD93E9C-CF59-4162-A977-F7642EDBB23A}" type="datetime1">
               <a:rPr lang="de-DE" smtClean="0"/>
-              <a:t>23.01.2023</a:t>
+              <a:t>31.01.2023</a:t>
             </a:fld>
             <a:endParaRPr lang="de-DE" dirty="0"/>
           </a:p>
@@ -6043,7 +6560,7 @@
           <a:p>
             <a:fld id="{6FE8A2CE-6D32-4716-A090-EDD7EE0B4140}" type="datetime1">
               <a:rPr lang="de-DE" smtClean="0"/>
-              <a:t>23.01.2023</a:t>
+              <a:t>31.01.2023</a:t>
             </a:fld>
             <a:endParaRPr lang="de-DE" dirty="0"/>
           </a:p>
@@ -6715,7 +7232,7 @@
           <a:p>
             <a:fld id="{603113A9-B1ED-4EC0-A094-9858FCF2D0C8}" type="datetime1">
               <a:rPr lang="de-DE" smtClean="0"/>
-              <a:t>23.01.2023</a:t>
+              <a:t>31.01.2023</a:t>
             </a:fld>
             <a:endParaRPr lang="de-DE"/>
           </a:p>
@@ -6925,7 +7442,7 @@
           <a:p>
             <a:fld id="{B70EBCA3-FB0B-48D9-A2E5-56DBD5624AFE}" type="datetime1">
               <a:rPr lang="de-DE" smtClean="0"/>
-              <a:t>23.01.2023</a:t>
+              <a:t>31.01.2023</a:t>
             </a:fld>
             <a:endParaRPr lang="de-DE"/>
           </a:p>
@@ -7234,7 +7751,7 @@
           <a:p>
             <a:fld id="{AAEBEB04-CBF0-4835-872C-2565D4E2EBF1}" type="datetime1">
               <a:rPr lang="de-DE" smtClean="0"/>
-              <a:t>23.01.2023</a:t>
+              <a:t>31.01.2023</a:t>
             </a:fld>
             <a:endParaRPr lang="de-DE"/>
           </a:p>
@@ -7502,7 +8019,7 @@
           <a:p>
             <a:fld id="{8F663D0B-A90A-4472-ADF1-2D4D5E0E002A}" type="datetime1">
               <a:rPr lang="de-DE" smtClean="0"/>
-              <a:t>23.01.2023</a:t>
+              <a:t>31.01.2023</a:t>
             </a:fld>
             <a:endParaRPr lang="de-DE"/>
           </a:p>
@@ -7801,7 +8318,7 @@
           <a:p>
             <a:fld id="{C81998FD-B568-4E47-AA9F-CE36B3FEB5BA}" type="datetime1">
               <a:rPr lang="de-DE" smtClean="0"/>
-              <a:t>23.01.2023</a:t>
+              <a:t>31.01.2023</a:t>
             </a:fld>
             <a:endParaRPr lang="de-DE"/>
           </a:p>
@@ -8152,7 +8669,7 @@
           <a:p>
             <a:fld id="{0A4F56F1-7827-4042-A276-DAF40AC0B000}" type="datetime1">
               <a:rPr lang="de-DE" smtClean="0"/>
-              <a:t>23.01.2023</a:t>
+              <a:t>31.01.2023</a:t>
             </a:fld>
             <a:endParaRPr lang="de-DE"/>
           </a:p>
@@ -8450,7 +8967,7 @@
           <a:p>
             <a:fld id="{DAB02174-66FA-41E9-A997-DF7D3619438B}" type="datetime1">
               <a:rPr lang="de-DE" smtClean="0"/>
-              <a:t>23.01.2023</a:t>
+              <a:t>31.01.2023</a:t>
             </a:fld>
             <a:endParaRPr lang="de-DE"/>
           </a:p>
@@ -8831,7 +9348,7 @@
           <a:p>
             <a:fld id="{BDFFDF87-2C7B-4FBB-B7F3-0EB8FC88FA6F}" type="datetime1">
               <a:rPr lang="de-DE" smtClean="0"/>
-              <a:t>23.01.2023</a:t>
+              <a:t>31.01.2023</a:t>
             </a:fld>
             <a:endParaRPr lang="de-DE"/>
           </a:p>
@@ -9164,7 +9681,7 @@
           <a:p>
             <a:fld id="{4AEAFF43-79D1-488F-88E5-AECF0C52E4F6}" type="datetime1">
               <a:rPr lang="de-DE" smtClean="0"/>
-              <a:t>23.01.2023</a:t>
+              <a:t>31.01.2023</a:t>
             </a:fld>
             <a:endParaRPr lang="de-DE"/>
           </a:p>
@@ -9442,7 +9959,7 @@
           <a:p>
             <a:fld id="{F3624D99-4580-4939-A184-6854C4D65CB3}" type="datetime1">
               <a:rPr lang="de-DE" smtClean="0"/>
-              <a:t>23.01.2023</a:t>
+              <a:t>31.01.2023</a:t>
             </a:fld>
             <a:endParaRPr lang="de-DE"/>
           </a:p>
@@ -9782,7 +10299,7 @@
           <a:p>
             <a:fld id="{F2FEDD9D-5594-473A-899D-C0AD9514F726}" type="datetime1">
               <a:rPr lang="de-DE" smtClean="0"/>
-              <a:t>23.01.2023</a:t>
+              <a:t>31.01.2023</a:t>
             </a:fld>
             <a:endParaRPr lang="de-DE"/>
           </a:p>
@@ -10044,7 +10561,7 @@
           <a:p>
             <a:fld id="{92A047F3-1820-4570-AC17-C8DA167C5F14}" type="datetime1">
               <a:rPr lang="de-DE" smtClean="0"/>
-              <a:t>23.01.2023</a:t>
+              <a:t>31.01.2023</a:t>
             </a:fld>
             <a:endParaRPr lang="de-DE"/>
           </a:p>
@@ -10542,7 +11059,7 @@
           <a:p>
             <a:fld id="{95C3B550-B314-4EBE-B643-25AC9427FA8B}" type="datetime1">
               <a:rPr lang="de-DE" smtClean="0"/>
-              <a:t>23.01.2023</a:t>
+              <a:t>31.01.2023</a:t>
             </a:fld>
             <a:endParaRPr lang="de-DE"/>
           </a:p>
@@ -10888,7 +11405,7 @@
           <a:p>
             <a:fld id="{767B626B-00B4-4CEC-8206-7F4851B03FEF}" type="datetime1">
               <a:rPr lang="de-DE" smtClean="0"/>
-              <a:t>23.01.2023</a:t>
+              <a:t>31.01.2023</a:t>
             </a:fld>
             <a:endParaRPr lang="de-DE"/>
           </a:p>
@@ -11200,7 +11717,7 @@
           <a:p>
             <a:fld id="{102EEC64-5E38-4CDE-986C-4F454B58738A}" type="datetime1">
               <a:rPr lang="de-DE" smtClean="0"/>
-              <a:t>23.01.2023</a:t>
+              <a:t>31.01.2023</a:t>
             </a:fld>
             <a:endParaRPr lang="de-DE"/>
           </a:p>
@@ -11433,7 +11950,7 @@
           <a:p>
             <a:fld id="{8B9E1184-3E8E-4927-B70E-FCD133F545CF}" type="datetime1">
               <a:rPr lang="de-DE" smtClean="0"/>
-              <a:t>23.01.2023</a:t>
+              <a:t>31.01.2023</a:t>
             </a:fld>
             <a:endParaRPr lang="de-DE"/>
           </a:p>
@@ -11861,7 +12378,7 @@
           <a:p>
             <a:fld id="{372285A9-CAD1-4F8C-A320-59D4C92876C5}" type="datetime1">
               <a:rPr lang="de-DE" smtClean="0"/>
-              <a:t>23.01.2023</a:t>
+              <a:t>31.01.2023</a:t>
             </a:fld>
             <a:endParaRPr lang="de-DE"/>
           </a:p>
@@ -12074,7 +12591,7 @@
           <a:p>
             <a:fld id="{2F8DC1E6-2D30-4DE7-9C9D-5217FE18022E}" type="datetime1">
               <a:rPr lang="de-DE" smtClean="0"/>
-              <a:t>23.01.2023</a:t>
+              <a:t>31.01.2023</a:t>
             </a:fld>
             <a:endParaRPr lang="de-DE"/>
           </a:p>
@@ -12141,6 +12658,1239 @@
     <p:extLst>
       <p:ext uri="{BB962C8B-B14F-4D97-AF65-F5344CB8AC3E}">
         <p14:creationId xmlns:p14="http://schemas.microsoft.com/office/powerpoint/2010/main" val="1327933660"/>
+      </p:ext>
+    </p:extLst>
+  </p:cSld>
+  <p:clrMapOvr>
+    <a:masterClrMapping/>
+  </p:clrMapOvr>
+</p:sld>
+</file>
+
+<file path=ppt/slides/slide26.xml><?xml version="1.0" encoding="utf-8"?>
+<p:sld xmlns:a="http://schemas.openxmlformats.org/drawingml/2006/main" xmlns:r="http://schemas.openxmlformats.org/officeDocument/2006/relationships" xmlns:p="http://schemas.openxmlformats.org/presentationml/2006/main">
+  <p:cSld>
+    <p:spTree>
+      <p:nvGrpSpPr>
+        <p:cNvPr id="1" name=""/>
+        <p:cNvGrpSpPr/>
+        <p:nvPr/>
+      </p:nvGrpSpPr>
+      <p:grpSpPr>
+        <a:xfrm>
+          <a:off x="0" y="0"/>
+          <a:ext cx="0" cy="0"/>
+          <a:chOff x="0" y="0"/>
+          <a:chExt cx="0" cy="0"/>
+        </a:xfrm>
+      </p:grpSpPr>
+      <p:sp>
+        <p:nvSpPr>
+          <p:cNvPr id="2" name="Titel 1">
+            <a:extLst>
+              <a:ext uri="{FF2B5EF4-FFF2-40B4-BE49-F238E27FC236}">
+                <a16:creationId xmlns:a16="http://schemas.microsoft.com/office/drawing/2014/main" id="{8DCCF400-951A-4A86-BE90-A48A26498FE2}"/>
+              </a:ext>
+            </a:extLst>
+          </p:cNvPr>
+          <p:cNvSpPr>
+            <a:spLocks noGrp="1"/>
+          </p:cNvSpPr>
+          <p:nvPr>
+            <p:ph type="title"/>
+          </p:nvPr>
+        </p:nvSpPr>
+        <p:spPr/>
+        <p:txBody>
+          <a:bodyPr/>
+          <a:lstStyle/>
+          <a:p>
+            <a:r>
+              <a:rPr lang="de-DE" dirty="0"/>
+              <a:t>Dart  - Listen</a:t>
+            </a:r>
+          </a:p>
+        </p:txBody>
+      </p:sp>
+      <p:sp>
+        <p:nvSpPr>
+          <p:cNvPr id="3" name="Inhaltsplatzhalter 2">
+            <a:extLst>
+              <a:ext uri="{FF2B5EF4-FFF2-40B4-BE49-F238E27FC236}">
+                <a16:creationId xmlns:a16="http://schemas.microsoft.com/office/drawing/2014/main" id="{3E556397-DB53-4175-9091-C6671B74AC70}"/>
+              </a:ext>
+            </a:extLst>
+          </p:cNvPr>
+          <p:cNvSpPr>
+            <a:spLocks noGrp="1"/>
+          </p:cNvSpPr>
+          <p:nvPr>
+            <p:ph idx="1"/>
+          </p:nvPr>
+        </p:nvSpPr>
+        <p:spPr>
+          <a:xfrm>
+            <a:off x="838201" y="1520825"/>
+            <a:ext cx="6817242" cy="4645025"/>
+          </a:xfrm>
+        </p:spPr>
+        <p:txBody>
+          <a:bodyPr/>
+          <a:lstStyle/>
+          <a:p>
+            <a:r>
+              <a:rPr lang="de-DE" dirty="0"/>
+              <a:t>Listen beinhalten viele Daten ohne dass jedes Datum einen eigenen Namen bekommen muss.</a:t>
+            </a:r>
+          </a:p>
+        </p:txBody>
+      </p:sp>
+      <p:sp>
+        <p:nvSpPr>
+          <p:cNvPr id="4" name="Datumsplatzhalter 3">
+            <a:extLst>
+              <a:ext uri="{FF2B5EF4-FFF2-40B4-BE49-F238E27FC236}">
+                <a16:creationId xmlns:a16="http://schemas.microsoft.com/office/drawing/2014/main" id="{6D29CD4C-ED28-4DAD-8B6D-F2C68EE741B3}"/>
+              </a:ext>
+            </a:extLst>
+          </p:cNvPr>
+          <p:cNvSpPr>
+            <a:spLocks noGrp="1"/>
+          </p:cNvSpPr>
+          <p:nvPr>
+            <p:ph type="dt" sz="half" idx="10"/>
+          </p:nvPr>
+        </p:nvSpPr>
+        <p:spPr/>
+        <p:txBody>
+          <a:bodyPr/>
+          <a:lstStyle/>
+          <a:p>
+            <a:fld id="{637BE197-E414-48F3-B656-784E07538695}" type="datetime1">
+              <a:rPr lang="de-DE" smtClean="0"/>
+              <a:t>31.01.2023</a:t>
+            </a:fld>
+            <a:endParaRPr lang="de-DE"/>
+          </a:p>
+        </p:txBody>
+      </p:sp>
+      <p:sp>
+        <p:nvSpPr>
+          <p:cNvPr id="5" name="Fußzeilenplatzhalter 4">
+            <a:extLst>
+              <a:ext uri="{FF2B5EF4-FFF2-40B4-BE49-F238E27FC236}">
+                <a16:creationId xmlns:a16="http://schemas.microsoft.com/office/drawing/2014/main" id="{C1A7106B-A7A5-4373-A48B-F764A628E98A}"/>
+              </a:ext>
+            </a:extLst>
+          </p:cNvPr>
+          <p:cNvSpPr>
+            <a:spLocks noGrp="1"/>
+          </p:cNvSpPr>
+          <p:nvPr>
+            <p:ph type="ftr" sz="quarter" idx="11"/>
+          </p:nvPr>
+        </p:nvSpPr>
+        <p:spPr/>
+        <p:txBody>
+          <a:bodyPr/>
+          <a:lstStyle/>
+          <a:p>
+            <a:r>
+              <a:rPr lang="de-DE"/>
+              <a:t>Dart - Programmiersprache für Smartphones</a:t>
+            </a:r>
+          </a:p>
+        </p:txBody>
+      </p:sp>
+      <p:sp>
+        <p:nvSpPr>
+          <p:cNvPr id="6" name="Foliennummernplatzhalter 5">
+            <a:extLst>
+              <a:ext uri="{FF2B5EF4-FFF2-40B4-BE49-F238E27FC236}">
+                <a16:creationId xmlns:a16="http://schemas.microsoft.com/office/drawing/2014/main" id="{F47200A0-B347-4725-8D32-31563F752BDF}"/>
+              </a:ext>
+            </a:extLst>
+          </p:cNvPr>
+          <p:cNvSpPr>
+            <a:spLocks noGrp="1"/>
+          </p:cNvSpPr>
+          <p:nvPr>
+            <p:ph type="sldNum" sz="quarter" idx="12"/>
+          </p:nvPr>
+        </p:nvSpPr>
+        <p:spPr/>
+        <p:txBody>
+          <a:bodyPr/>
+          <a:lstStyle/>
+          <a:p>
+            <a:fld id="{3A1F27E2-D58A-4028-9FF2-B12D897F257E}" type="slidenum">
+              <a:rPr lang="de-DE" smtClean="0"/>
+              <a:t>26</a:t>
+            </a:fld>
+            <a:endParaRPr lang="de-DE"/>
+          </a:p>
+        </p:txBody>
+      </p:sp>
+      <p:pic>
+        <p:nvPicPr>
+          <p:cNvPr id="8" name="Grafik 7">
+            <a:extLst>
+              <a:ext uri="{FF2B5EF4-FFF2-40B4-BE49-F238E27FC236}">
+                <a16:creationId xmlns:a16="http://schemas.microsoft.com/office/drawing/2014/main" id="{C285383B-5846-4C6D-AC2D-FCAE797B9343}"/>
+              </a:ext>
+            </a:extLst>
+          </p:cNvPr>
+          <p:cNvPicPr>
+            <a:picLocks noChangeAspect="1"/>
+          </p:cNvPicPr>
+          <p:nvPr/>
+        </p:nvPicPr>
+        <p:blipFill>
+          <a:blip r:embed="rId3"/>
+          <a:stretch>
+            <a:fillRect/>
+          </a:stretch>
+        </p:blipFill>
+        <p:spPr>
+          <a:xfrm>
+            <a:off x="7740807" y="1538120"/>
+            <a:ext cx="2355108" cy="3781759"/>
+          </a:xfrm>
+          <a:prstGeom prst="rect">
+            <a:avLst/>
+          </a:prstGeom>
+        </p:spPr>
+      </p:pic>
+      <p:sp>
+        <p:nvSpPr>
+          <p:cNvPr id="11" name="Textfeld 10">
+            <a:extLst>
+              <a:ext uri="{FF2B5EF4-FFF2-40B4-BE49-F238E27FC236}">
+                <a16:creationId xmlns:a16="http://schemas.microsoft.com/office/drawing/2014/main" id="{8E06B972-AAAC-458C-BF6A-6478FC4E5D02}"/>
+              </a:ext>
+            </a:extLst>
+          </p:cNvPr>
+          <p:cNvSpPr txBox="1"/>
+          <p:nvPr/>
+        </p:nvSpPr>
+        <p:spPr>
+          <a:xfrm>
+            <a:off x="6961511" y="5422550"/>
+            <a:ext cx="3913700" cy="369332"/>
+          </a:xfrm>
+          <a:prstGeom prst="rect">
+            <a:avLst/>
+          </a:prstGeom>
+          <a:noFill/>
+        </p:spPr>
+        <p:txBody>
+          <a:bodyPr wrap="none" rtlCol="0">
+            <a:spAutoFit/>
+          </a:bodyPr>
+          <a:lstStyle/>
+          <a:p>
+            <a:r>
+              <a:rPr lang="de-DE" dirty="0"/>
+              <a:t>Wird irgendwann langweilig zum tippen</a:t>
+            </a:r>
+          </a:p>
+        </p:txBody>
+      </p:sp>
+    </p:spTree>
+    <p:extLst>
+      <p:ext uri="{BB962C8B-B14F-4D97-AF65-F5344CB8AC3E}">
+        <p14:creationId xmlns:p14="http://schemas.microsoft.com/office/powerpoint/2010/main" val="2032780050"/>
+      </p:ext>
+    </p:extLst>
+  </p:cSld>
+  <p:clrMapOvr>
+    <a:masterClrMapping/>
+  </p:clrMapOvr>
+</p:sld>
+</file>
+
+<file path=ppt/slides/slide27.xml><?xml version="1.0" encoding="utf-8"?>
+<p:sld xmlns:a="http://schemas.openxmlformats.org/drawingml/2006/main" xmlns:r="http://schemas.openxmlformats.org/officeDocument/2006/relationships" xmlns:p="http://schemas.openxmlformats.org/presentationml/2006/main">
+  <p:cSld>
+    <p:spTree>
+      <p:nvGrpSpPr>
+        <p:cNvPr id="1" name=""/>
+        <p:cNvGrpSpPr/>
+        <p:nvPr/>
+      </p:nvGrpSpPr>
+      <p:grpSpPr>
+        <a:xfrm>
+          <a:off x="0" y="0"/>
+          <a:ext cx="0" cy="0"/>
+          <a:chOff x="0" y="0"/>
+          <a:chExt cx="0" cy="0"/>
+        </a:xfrm>
+      </p:grpSpPr>
+      <p:sp>
+        <p:nvSpPr>
+          <p:cNvPr id="2" name="Titel 1">
+            <a:extLst>
+              <a:ext uri="{FF2B5EF4-FFF2-40B4-BE49-F238E27FC236}">
+                <a16:creationId xmlns:a16="http://schemas.microsoft.com/office/drawing/2014/main" id="{8DCCF400-951A-4A86-BE90-A48A26498FE2}"/>
+              </a:ext>
+            </a:extLst>
+          </p:cNvPr>
+          <p:cNvSpPr>
+            <a:spLocks noGrp="1"/>
+          </p:cNvSpPr>
+          <p:nvPr>
+            <p:ph type="title"/>
+          </p:nvPr>
+        </p:nvSpPr>
+        <p:spPr/>
+        <p:txBody>
+          <a:bodyPr/>
+          <a:lstStyle/>
+          <a:p>
+            <a:r>
+              <a:rPr lang="de-DE" dirty="0"/>
+              <a:t>Dart  - Listen</a:t>
+            </a:r>
+          </a:p>
+        </p:txBody>
+      </p:sp>
+      <p:sp>
+        <p:nvSpPr>
+          <p:cNvPr id="3" name="Inhaltsplatzhalter 2">
+            <a:extLst>
+              <a:ext uri="{FF2B5EF4-FFF2-40B4-BE49-F238E27FC236}">
+                <a16:creationId xmlns:a16="http://schemas.microsoft.com/office/drawing/2014/main" id="{3E556397-DB53-4175-9091-C6671B74AC70}"/>
+              </a:ext>
+            </a:extLst>
+          </p:cNvPr>
+          <p:cNvSpPr>
+            <a:spLocks noGrp="1"/>
+          </p:cNvSpPr>
+          <p:nvPr>
+            <p:ph idx="1"/>
+          </p:nvPr>
+        </p:nvSpPr>
+        <p:spPr/>
+        <p:txBody>
+          <a:bodyPr/>
+          <a:lstStyle/>
+          <a:p>
+            <a:r>
+              <a:rPr lang="de-DE" dirty="0"/>
+              <a:t>Liste: </a:t>
+            </a:r>
+            <a:r>
+              <a:rPr lang="de-DE" sz="2400" b="1" dirty="0" err="1">
+                <a:solidFill>
+                  <a:schemeClr val="accent1">
+                    <a:lumMod val="75000"/>
+                  </a:schemeClr>
+                </a:solidFill>
+              </a:rPr>
+              <a:t>var</a:t>
+            </a:r>
+            <a:r>
+              <a:rPr lang="de-DE" sz="2400" b="1" dirty="0">
+                <a:solidFill>
+                  <a:schemeClr val="accent1">
+                    <a:lumMod val="75000"/>
+                  </a:schemeClr>
+                </a:solidFill>
+              </a:rPr>
+              <a:t> </a:t>
+            </a:r>
+            <a:r>
+              <a:rPr lang="de-DE" sz="2400" b="1" i="1" dirty="0">
+                <a:solidFill>
+                  <a:schemeClr val="tx2"/>
+                </a:solidFill>
+              </a:rPr>
+              <a:t>liste</a:t>
+            </a:r>
+            <a:r>
+              <a:rPr lang="de-DE" sz="2400" b="1" dirty="0">
+                <a:solidFill>
+                  <a:schemeClr val="accent1">
+                    <a:lumMod val="75000"/>
+                  </a:schemeClr>
+                </a:solidFill>
+              </a:rPr>
+              <a:t> = [ </a:t>
+            </a:r>
+            <a:r>
+              <a:rPr lang="de-DE" sz="2400" b="1" i="1" dirty="0">
+                <a:solidFill>
+                  <a:schemeClr val="tx2"/>
+                </a:solidFill>
+              </a:rPr>
+              <a:t>wert</a:t>
+            </a:r>
+            <a:r>
+              <a:rPr lang="de-DE" sz="2400" b="1" dirty="0">
+                <a:solidFill>
+                  <a:schemeClr val="accent1">
+                    <a:lumMod val="75000"/>
+                  </a:schemeClr>
+                </a:solidFill>
+              </a:rPr>
+              <a:t>, </a:t>
+            </a:r>
+            <a:r>
+              <a:rPr lang="de-DE" sz="2400" b="1" i="1" dirty="0">
+                <a:solidFill>
+                  <a:schemeClr val="tx2"/>
+                </a:solidFill>
+              </a:rPr>
+              <a:t>wert</a:t>
+            </a:r>
+            <a:r>
+              <a:rPr lang="de-DE" sz="2400" b="1" dirty="0">
+                <a:solidFill>
+                  <a:schemeClr val="accent1">
+                    <a:lumMod val="75000"/>
+                  </a:schemeClr>
+                </a:solidFill>
+              </a:rPr>
+              <a:t>, </a:t>
+            </a:r>
+            <a:r>
+              <a:rPr lang="de-DE" dirty="0"/>
+              <a:t>…</a:t>
+            </a:r>
+            <a:r>
+              <a:rPr lang="de-DE" sz="2400" b="1" dirty="0">
+                <a:solidFill>
+                  <a:schemeClr val="accent1">
+                    <a:lumMod val="75000"/>
+                  </a:schemeClr>
+                </a:solidFill>
+              </a:rPr>
+              <a:t>];</a:t>
+            </a:r>
+          </a:p>
+          <a:p>
+            <a:r>
+              <a:rPr lang="de-DE" dirty="0"/>
+              <a:t>Zur Liste gibt es eine Variante der </a:t>
+            </a:r>
+            <a:r>
+              <a:rPr lang="de-DE" dirty="0" err="1"/>
+              <a:t>For</a:t>
+            </a:r>
+            <a:r>
+              <a:rPr lang="de-DE" dirty="0"/>
+              <a:t>-Schleife:</a:t>
+            </a:r>
+            <a:br>
+              <a:rPr lang="de-DE" dirty="0"/>
+            </a:br>
+            <a:r>
+              <a:rPr lang="de-DE" sz="2400" b="1" dirty="0" err="1">
+                <a:solidFill>
+                  <a:schemeClr val="accent1">
+                    <a:lumMod val="75000"/>
+                  </a:schemeClr>
+                </a:solidFill>
+              </a:rPr>
+              <a:t>for</a:t>
+            </a:r>
+            <a:r>
+              <a:rPr lang="de-DE" sz="2400" b="1" dirty="0">
+                <a:solidFill>
+                  <a:schemeClr val="accent1">
+                    <a:lumMod val="75000"/>
+                  </a:schemeClr>
+                </a:solidFill>
+              </a:rPr>
+              <a:t> (</a:t>
+            </a:r>
+            <a:r>
+              <a:rPr lang="de-DE" sz="2400" b="1" dirty="0" err="1">
+                <a:solidFill>
+                  <a:schemeClr val="accent1">
+                    <a:lumMod val="75000"/>
+                  </a:schemeClr>
+                </a:solidFill>
+              </a:rPr>
+              <a:t>var</a:t>
+            </a:r>
+            <a:r>
+              <a:rPr lang="de-DE" sz="2400" b="1" dirty="0">
+                <a:solidFill>
+                  <a:schemeClr val="accent1">
+                    <a:lumMod val="75000"/>
+                  </a:schemeClr>
+                </a:solidFill>
+              </a:rPr>
+              <a:t> </a:t>
+            </a:r>
+            <a:r>
+              <a:rPr lang="de-DE" sz="2400" b="1" i="1" dirty="0" err="1">
+                <a:solidFill>
+                  <a:schemeClr val="tx2"/>
+                </a:solidFill>
+              </a:rPr>
+              <a:t>name</a:t>
+            </a:r>
+            <a:r>
+              <a:rPr lang="de-DE" sz="2400" b="1" dirty="0">
+                <a:solidFill>
+                  <a:schemeClr val="accent1">
+                    <a:lumMod val="75000"/>
+                  </a:schemeClr>
+                </a:solidFill>
+              </a:rPr>
+              <a:t> in </a:t>
+            </a:r>
+            <a:r>
+              <a:rPr lang="de-DE" sz="2400" b="1" i="1" dirty="0">
+                <a:solidFill>
+                  <a:schemeClr val="tx2"/>
+                </a:solidFill>
+              </a:rPr>
+              <a:t>liste</a:t>
+            </a:r>
+            <a:r>
+              <a:rPr lang="de-DE" sz="2400" b="1" dirty="0">
+                <a:solidFill>
+                  <a:schemeClr val="accent1">
+                    <a:lumMod val="75000"/>
+                  </a:schemeClr>
+                </a:solidFill>
+              </a:rPr>
+              <a:t>) { </a:t>
+            </a:r>
+            <a:r>
+              <a:rPr lang="de-DE" dirty="0"/>
+              <a:t>…</a:t>
+            </a:r>
+            <a:r>
+              <a:rPr lang="de-DE" sz="2400" b="1" dirty="0">
+                <a:solidFill>
+                  <a:schemeClr val="accent1">
+                    <a:lumMod val="75000"/>
+                  </a:schemeClr>
+                </a:solidFill>
+              </a:rPr>
+              <a:t> }</a:t>
+            </a:r>
+          </a:p>
+        </p:txBody>
+      </p:sp>
+      <p:sp>
+        <p:nvSpPr>
+          <p:cNvPr id="4" name="Datumsplatzhalter 3">
+            <a:extLst>
+              <a:ext uri="{FF2B5EF4-FFF2-40B4-BE49-F238E27FC236}">
+                <a16:creationId xmlns:a16="http://schemas.microsoft.com/office/drawing/2014/main" id="{6D29CD4C-ED28-4DAD-8B6D-F2C68EE741B3}"/>
+              </a:ext>
+            </a:extLst>
+          </p:cNvPr>
+          <p:cNvSpPr>
+            <a:spLocks noGrp="1"/>
+          </p:cNvSpPr>
+          <p:nvPr>
+            <p:ph type="dt" sz="half" idx="10"/>
+          </p:nvPr>
+        </p:nvSpPr>
+        <p:spPr/>
+        <p:txBody>
+          <a:bodyPr/>
+          <a:lstStyle/>
+          <a:p>
+            <a:fld id="{BC048919-3C08-48F6-A0CD-915EC777362A}" type="datetime1">
+              <a:rPr lang="de-DE" smtClean="0"/>
+              <a:t>31.01.2023</a:t>
+            </a:fld>
+            <a:endParaRPr lang="de-DE"/>
+          </a:p>
+        </p:txBody>
+      </p:sp>
+      <p:sp>
+        <p:nvSpPr>
+          <p:cNvPr id="5" name="Fußzeilenplatzhalter 4">
+            <a:extLst>
+              <a:ext uri="{FF2B5EF4-FFF2-40B4-BE49-F238E27FC236}">
+                <a16:creationId xmlns:a16="http://schemas.microsoft.com/office/drawing/2014/main" id="{C1A7106B-A7A5-4373-A48B-F764A628E98A}"/>
+              </a:ext>
+            </a:extLst>
+          </p:cNvPr>
+          <p:cNvSpPr>
+            <a:spLocks noGrp="1"/>
+          </p:cNvSpPr>
+          <p:nvPr>
+            <p:ph type="ftr" sz="quarter" idx="11"/>
+          </p:nvPr>
+        </p:nvSpPr>
+        <p:spPr/>
+        <p:txBody>
+          <a:bodyPr/>
+          <a:lstStyle/>
+          <a:p>
+            <a:r>
+              <a:rPr lang="de-DE"/>
+              <a:t>Dart - Programmiersprache für Smartphones</a:t>
+            </a:r>
+          </a:p>
+        </p:txBody>
+      </p:sp>
+      <p:sp>
+        <p:nvSpPr>
+          <p:cNvPr id="6" name="Foliennummernplatzhalter 5">
+            <a:extLst>
+              <a:ext uri="{FF2B5EF4-FFF2-40B4-BE49-F238E27FC236}">
+                <a16:creationId xmlns:a16="http://schemas.microsoft.com/office/drawing/2014/main" id="{F47200A0-B347-4725-8D32-31563F752BDF}"/>
+              </a:ext>
+            </a:extLst>
+          </p:cNvPr>
+          <p:cNvSpPr>
+            <a:spLocks noGrp="1"/>
+          </p:cNvSpPr>
+          <p:nvPr>
+            <p:ph type="sldNum" sz="quarter" idx="12"/>
+          </p:nvPr>
+        </p:nvSpPr>
+        <p:spPr/>
+        <p:txBody>
+          <a:bodyPr/>
+          <a:lstStyle/>
+          <a:p>
+            <a:fld id="{3A1F27E2-D58A-4028-9FF2-B12D897F257E}" type="slidenum">
+              <a:rPr lang="de-DE" smtClean="0"/>
+              <a:t>27</a:t>
+            </a:fld>
+            <a:endParaRPr lang="de-DE"/>
+          </a:p>
+        </p:txBody>
+      </p:sp>
+      <p:pic>
+        <p:nvPicPr>
+          <p:cNvPr id="10" name="Grafik 9">
+            <a:extLst>
+              <a:ext uri="{FF2B5EF4-FFF2-40B4-BE49-F238E27FC236}">
+                <a16:creationId xmlns:a16="http://schemas.microsoft.com/office/drawing/2014/main" id="{68DB29DE-9B68-4A2B-BC86-F797D3C7DF43}"/>
+              </a:ext>
+            </a:extLst>
+          </p:cNvPr>
+          <p:cNvPicPr>
+            <a:picLocks noChangeAspect="1"/>
+          </p:cNvPicPr>
+          <p:nvPr/>
+        </p:nvPicPr>
+        <p:blipFill>
+          <a:blip r:embed="rId3"/>
+          <a:stretch>
+            <a:fillRect/>
+          </a:stretch>
+        </p:blipFill>
+        <p:spPr>
+          <a:xfrm>
+            <a:off x="838200" y="3489635"/>
+            <a:ext cx="4063660" cy="1396174"/>
+          </a:xfrm>
+          <a:prstGeom prst="rect">
+            <a:avLst/>
+          </a:prstGeom>
+        </p:spPr>
+      </p:pic>
+      <p:sp>
+        <p:nvSpPr>
+          <p:cNvPr id="12" name="Textfeld 11">
+            <a:extLst>
+              <a:ext uri="{FF2B5EF4-FFF2-40B4-BE49-F238E27FC236}">
+                <a16:creationId xmlns:a16="http://schemas.microsoft.com/office/drawing/2014/main" id="{634F73F7-FFED-43B1-824A-931C6B0DB0CB}"/>
+              </a:ext>
+            </a:extLst>
+          </p:cNvPr>
+          <p:cNvSpPr txBox="1"/>
+          <p:nvPr/>
+        </p:nvSpPr>
+        <p:spPr>
+          <a:xfrm>
+            <a:off x="1977927" y="4967843"/>
+            <a:ext cx="1784206" cy="369332"/>
+          </a:xfrm>
+          <a:prstGeom prst="rect">
+            <a:avLst/>
+          </a:prstGeom>
+          <a:noFill/>
+        </p:spPr>
+        <p:txBody>
+          <a:bodyPr wrap="none" rtlCol="0">
+            <a:spAutoFit/>
+          </a:bodyPr>
+          <a:lstStyle/>
+          <a:p>
+            <a:r>
+              <a:rPr lang="de-DE" dirty="0"/>
+              <a:t>Irgendwie besser</a:t>
+            </a:r>
+          </a:p>
+        </p:txBody>
+      </p:sp>
+    </p:spTree>
+    <p:extLst>
+      <p:ext uri="{BB962C8B-B14F-4D97-AF65-F5344CB8AC3E}">
+        <p14:creationId xmlns:p14="http://schemas.microsoft.com/office/powerpoint/2010/main" val="3404073024"/>
+      </p:ext>
+    </p:extLst>
+  </p:cSld>
+  <p:clrMapOvr>
+    <a:masterClrMapping/>
+  </p:clrMapOvr>
+</p:sld>
+</file>
+
+<file path=ppt/slides/slide28.xml><?xml version="1.0" encoding="utf-8"?>
+<p:sld xmlns:a="http://schemas.openxmlformats.org/drawingml/2006/main" xmlns:r="http://schemas.openxmlformats.org/officeDocument/2006/relationships" xmlns:p="http://schemas.openxmlformats.org/presentationml/2006/main">
+  <p:cSld>
+    <p:spTree>
+      <p:nvGrpSpPr>
+        <p:cNvPr id="1" name=""/>
+        <p:cNvGrpSpPr/>
+        <p:nvPr/>
+      </p:nvGrpSpPr>
+      <p:grpSpPr>
+        <a:xfrm>
+          <a:off x="0" y="0"/>
+          <a:ext cx="0" cy="0"/>
+          <a:chOff x="0" y="0"/>
+          <a:chExt cx="0" cy="0"/>
+        </a:xfrm>
+      </p:grpSpPr>
+      <p:sp>
+        <p:nvSpPr>
+          <p:cNvPr id="2" name="Titel 1">
+            <a:extLst>
+              <a:ext uri="{FF2B5EF4-FFF2-40B4-BE49-F238E27FC236}">
+                <a16:creationId xmlns:a16="http://schemas.microsoft.com/office/drawing/2014/main" id="{C70ABF5F-5206-4E2A-93A8-0CF40BE0E51D}"/>
+              </a:ext>
+            </a:extLst>
+          </p:cNvPr>
+          <p:cNvSpPr>
+            <a:spLocks noGrp="1"/>
+          </p:cNvSpPr>
+          <p:nvPr>
+            <p:ph type="title"/>
+          </p:nvPr>
+        </p:nvSpPr>
+        <p:spPr/>
+        <p:txBody>
+          <a:bodyPr/>
+          <a:lstStyle/>
+          <a:p>
+            <a:r>
+              <a:rPr lang="de-DE" dirty="0"/>
+              <a:t>Dart  - Listen</a:t>
+            </a:r>
+          </a:p>
+        </p:txBody>
+      </p:sp>
+      <p:sp>
+        <p:nvSpPr>
+          <p:cNvPr id="3" name="Inhaltsplatzhalter 2">
+            <a:extLst>
+              <a:ext uri="{FF2B5EF4-FFF2-40B4-BE49-F238E27FC236}">
+                <a16:creationId xmlns:a16="http://schemas.microsoft.com/office/drawing/2014/main" id="{6593768A-5D81-4569-B2BC-C2C1DA3675E5}"/>
+              </a:ext>
+            </a:extLst>
+          </p:cNvPr>
+          <p:cNvSpPr>
+            <a:spLocks noGrp="1"/>
+          </p:cNvSpPr>
+          <p:nvPr>
+            <p:ph idx="1"/>
+          </p:nvPr>
+        </p:nvSpPr>
+        <p:spPr/>
+        <p:txBody>
+          <a:bodyPr/>
+          <a:lstStyle/>
+          <a:p>
+            <a:r>
+              <a:rPr lang="de-DE" dirty="0"/>
+              <a:t>"Rechnen" mit Listen</a:t>
+            </a:r>
+          </a:p>
+          <a:p>
+            <a:r>
+              <a:rPr lang="de-DE" dirty="0"/>
+              <a:t>Aneinanderhängen: </a:t>
+            </a:r>
+            <a:r>
+              <a:rPr lang="de-DE" sz="2400" b="1" dirty="0">
+                <a:solidFill>
+                  <a:schemeClr val="accent1">
+                    <a:lumMod val="75000"/>
+                  </a:schemeClr>
+                </a:solidFill>
+              </a:rPr>
+              <a:t>+</a:t>
+            </a:r>
+          </a:p>
+        </p:txBody>
+      </p:sp>
+      <p:sp>
+        <p:nvSpPr>
+          <p:cNvPr id="4" name="Datumsplatzhalter 3">
+            <a:extLst>
+              <a:ext uri="{FF2B5EF4-FFF2-40B4-BE49-F238E27FC236}">
+                <a16:creationId xmlns:a16="http://schemas.microsoft.com/office/drawing/2014/main" id="{C5CA9116-1595-41C3-BE98-6BAB26F31984}"/>
+              </a:ext>
+            </a:extLst>
+          </p:cNvPr>
+          <p:cNvSpPr>
+            <a:spLocks noGrp="1"/>
+          </p:cNvSpPr>
+          <p:nvPr>
+            <p:ph type="dt" sz="half" idx="10"/>
+          </p:nvPr>
+        </p:nvSpPr>
+        <p:spPr/>
+        <p:txBody>
+          <a:bodyPr/>
+          <a:lstStyle/>
+          <a:p>
+            <a:fld id="{94C91350-6869-4C72-8675-ECEAAAF05F8D}" type="datetime1">
+              <a:rPr lang="de-DE" smtClean="0"/>
+              <a:t>31.01.2023</a:t>
+            </a:fld>
+            <a:endParaRPr lang="de-DE"/>
+          </a:p>
+        </p:txBody>
+      </p:sp>
+      <p:sp>
+        <p:nvSpPr>
+          <p:cNvPr id="5" name="Fußzeilenplatzhalter 4">
+            <a:extLst>
+              <a:ext uri="{FF2B5EF4-FFF2-40B4-BE49-F238E27FC236}">
+                <a16:creationId xmlns:a16="http://schemas.microsoft.com/office/drawing/2014/main" id="{9C1BD6BE-83F8-4669-96A2-4F3A84D56A32}"/>
+              </a:ext>
+            </a:extLst>
+          </p:cNvPr>
+          <p:cNvSpPr>
+            <a:spLocks noGrp="1"/>
+          </p:cNvSpPr>
+          <p:nvPr>
+            <p:ph type="ftr" sz="quarter" idx="11"/>
+          </p:nvPr>
+        </p:nvSpPr>
+        <p:spPr/>
+        <p:txBody>
+          <a:bodyPr/>
+          <a:lstStyle/>
+          <a:p>
+            <a:r>
+              <a:rPr lang="de-DE"/>
+              <a:t>Dart - Programmiersprache für Smartphones</a:t>
+            </a:r>
+          </a:p>
+        </p:txBody>
+      </p:sp>
+      <p:sp>
+        <p:nvSpPr>
+          <p:cNvPr id="6" name="Foliennummernplatzhalter 5">
+            <a:extLst>
+              <a:ext uri="{FF2B5EF4-FFF2-40B4-BE49-F238E27FC236}">
+                <a16:creationId xmlns:a16="http://schemas.microsoft.com/office/drawing/2014/main" id="{CC50ACE0-23AA-4F6E-B6A5-A06E4A9CFD6E}"/>
+              </a:ext>
+            </a:extLst>
+          </p:cNvPr>
+          <p:cNvSpPr>
+            <a:spLocks noGrp="1"/>
+          </p:cNvSpPr>
+          <p:nvPr>
+            <p:ph type="sldNum" sz="quarter" idx="12"/>
+          </p:nvPr>
+        </p:nvSpPr>
+        <p:spPr/>
+        <p:txBody>
+          <a:bodyPr/>
+          <a:lstStyle/>
+          <a:p>
+            <a:fld id="{3A1F27E2-D58A-4028-9FF2-B12D897F257E}" type="slidenum">
+              <a:rPr lang="de-DE" smtClean="0"/>
+              <a:t>28</a:t>
+            </a:fld>
+            <a:endParaRPr lang="de-DE"/>
+          </a:p>
+        </p:txBody>
+      </p:sp>
+      <p:pic>
+        <p:nvPicPr>
+          <p:cNvPr id="8" name="Grafik 7">
+            <a:extLst>
+              <a:ext uri="{FF2B5EF4-FFF2-40B4-BE49-F238E27FC236}">
+                <a16:creationId xmlns:a16="http://schemas.microsoft.com/office/drawing/2014/main" id="{7D94A421-C5CF-4494-A4AD-4C4887B47C0A}"/>
+              </a:ext>
+            </a:extLst>
+          </p:cNvPr>
+          <p:cNvPicPr>
+            <a:picLocks noChangeAspect="1"/>
+          </p:cNvPicPr>
+          <p:nvPr/>
+        </p:nvPicPr>
+        <p:blipFill>
+          <a:blip r:embed="rId2"/>
+          <a:stretch>
+            <a:fillRect/>
+          </a:stretch>
+        </p:blipFill>
+        <p:spPr>
+          <a:xfrm>
+            <a:off x="838200" y="2743928"/>
+            <a:ext cx="3699857" cy="1404326"/>
+          </a:xfrm>
+          <a:prstGeom prst="rect">
+            <a:avLst/>
+          </a:prstGeom>
+        </p:spPr>
+      </p:pic>
+    </p:spTree>
+    <p:extLst>
+      <p:ext uri="{BB962C8B-B14F-4D97-AF65-F5344CB8AC3E}">
+        <p14:creationId xmlns:p14="http://schemas.microsoft.com/office/powerpoint/2010/main" val="1364947190"/>
+      </p:ext>
+    </p:extLst>
+  </p:cSld>
+  <p:clrMapOvr>
+    <a:masterClrMapping/>
+  </p:clrMapOvr>
+</p:sld>
+</file>
+
+<file path=ppt/slides/slide29.xml><?xml version="1.0" encoding="utf-8"?>
+<p:sld xmlns:a="http://schemas.openxmlformats.org/drawingml/2006/main" xmlns:r="http://schemas.openxmlformats.org/officeDocument/2006/relationships" xmlns:p="http://schemas.openxmlformats.org/presentationml/2006/main">
+  <p:cSld>
+    <p:spTree>
+      <p:nvGrpSpPr>
+        <p:cNvPr id="1" name=""/>
+        <p:cNvGrpSpPr/>
+        <p:nvPr/>
+      </p:nvGrpSpPr>
+      <p:grpSpPr>
+        <a:xfrm>
+          <a:off x="0" y="0"/>
+          <a:ext cx="0" cy="0"/>
+          <a:chOff x="0" y="0"/>
+          <a:chExt cx="0" cy="0"/>
+        </a:xfrm>
+      </p:grpSpPr>
+      <p:sp>
+        <p:nvSpPr>
+          <p:cNvPr id="2" name="Titel 1">
+            <a:extLst>
+              <a:ext uri="{FF2B5EF4-FFF2-40B4-BE49-F238E27FC236}">
+                <a16:creationId xmlns:a16="http://schemas.microsoft.com/office/drawing/2014/main" id="{28A3DEC2-04E4-4BCE-8D2E-408266F02FF8}"/>
+              </a:ext>
+            </a:extLst>
+          </p:cNvPr>
+          <p:cNvSpPr>
+            <a:spLocks noGrp="1"/>
+          </p:cNvSpPr>
+          <p:nvPr>
+            <p:ph type="title"/>
+          </p:nvPr>
+        </p:nvSpPr>
+        <p:spPr/>
+        <p:txBody>
+          <a:bodyPr/>
+          <a:lstStyle/>
+          <a:p>
+            <a:r>
+              <a:rPr lang="de-DE" dirty="0"/>
+              <a:t>Dart  - Listen</a:t>
+            </a:r>
+          </a:p>
+        </p:txBody>
+      </p:sp>
+      <p:sp>
+        <p:nvSpPr>
+          <p:cNvPr id="3" name="Inhaltsplatzhalter 2">
+            <a:extLst>
+              <a:ext uri="{FF2B5EF4-FFF2-40B4-BE49-F238E27FC236}">
+                <a16:creationId xmlns:a16="http://schemas.microsoft.com/office/drawing/2014/main" id="{F3F3F8D7-5979-497A-9C4F-E5CF72568041}"/>
+              </a:ext>
+            </a:extLst>
+          </p:cNvPr>
+          <p:cNvSpPr>
+            <a:spLocks noGrp="1"/>
+          </p:cNvSpPr>
+          <p:nvPr>
+            <p:ph idx="1"/>
+          </p:nvPr>
+        </p:nvSpPr>
+        <p:spPr/>
+        <p:txBody>
+          <a:bodyPr/>
+          <a:lstStyle/>
+          <a:p>
+            <a:r>
+              <a:rPr lang="de-DE" dirty="0"/>
+              <a:t>Element aus der Liste holen: </a:t>
+            </a:r>
+            <a:r>
+              <a:rPr lang="de-DE" sz="2400" b="1" dirty="0" err="1">
+                <a:solidFill>
+                  <a:schemeClr val="accent1">
+                    <a:lumMod val="75000"/>
+                  </a:schemeClr>
+                </a:solidFill>
+              </a:rPr>
+              <a:t>var</a:t>
+            </a:r>
+            <a:r>
+              <a:rPr lang="de-DE" sz="2400" b="1" dirty="0">
+                <a:solidFill>
+                  <a:schemeClr val="accent1">
+                    <a:lumMod val="75000"/>
+                  </a:schemeClr>
+                </a:solidFill>
+              </a:rPr>
+              <a:t> </a:t>
+            </a:r>
+            <a:r>
+              <a:rPr lang="de-DE" sz="2400" b="1" i="1" dirty="0" err="1">
+                <a:solidFill>
+                  <a:schemeClr val="tx2"/>
+                </a:solidFill>
+              </a:rPr>
+              <a:t>name</a:t>
+            </a:r>
+            <a:r>
+              <a:rPr lang="de-DE" sz="2400" b="1" dirty="0">
+                <a:solidFill>
+                  <a:schemeClr val="accent1">
+                    <a:lumMod val="75000"/>
+                  </a:schemeClr>
+                </a:solidFill>
+              </a:rPr>
+              <a:t> = </a:t>
+            </a:r>
+            <a:r>
+              <a:rPr lang="de-DE" sz="2400" b="1" i="1" dirty="0">
+                <a:solidFill>
+                  <a:schemeClr val="tx2"/>
+                </a:solidFill>
+              </a:rPr>
+              <a:t>liste</a:t>
+            </a:r>
+            <a:r>
+              <a:rPr lang="de-DE" sz="2400" b="1" dirty="0">
+                <a:solidFill>
+                  <a:schemeClr val="accent1">
+                    <a:lumMod val="75000"/>
+                  </a:schemeClr>
+                </a:solidFill>
+              </a:rPr>
+              <a:t>[</a:t>
+            </a:r>
+            <a:r>
+              <a:rPr lang="de-DE" sz="2400" b="1" i="1" dirty="0" err="1">
+                <a:solidFill>
+                  <a:schemeClr val="tx2"/>
+                </a:solidFill>
+              </a:rPr>
+              <a:t>index</a:t>
+            </a:r>
+            <a:r>
+              <a:rPr lang="de-DE" sz="2400" b="1" dirty="0">
+                <a:solidFill>
+                  <a:schemeClr val="accent1">
+                    <a:lumMod val="75000"/>
+                  </a:schemeClr>
+                </a:solidFill>
+              </a:rPr>
+              <a:t>];</a:t>
+            </a:r>
+          </a:p>
+          <a:p>
+            <a:r>
+              <a:rPr lang="de-DE" dirty="0"/>
+              <a:t>Element in der Liste austauschen: </a:t>
+            </a:r>
+            <a:r>
+              <a:rPr lang="de-DE" sz="2400" b="1" i="1" dirty="0">
+                <a:solidFill>
+                  <a:schemeClr val="tx2"/>
+                </a:solidFill>
+              </a:rPr>
+              <a:t>liste</a:t>
+            </a:r>
+            <a:r>
+              <a:rPr lang="de-DE" sz="2400" b="1" dirty="0">
+                <a:solidFill>
+                  <a:schemeClr val="accent1">
+                    <a:lumMod val="75000"/>
+                  </a:schemeClr>
+                </a:solidFill>
+              </a:rPr>
+              <a:t>[</a:t>
+            </a:r>
+            <a:r>
+              <a:rPr lang="de-DE" sz="2400" b="1" i="1" dirty="0" err="1">
+                <a:solidFill>
+                  <a:schemeClr val="tx2"/>
+                </a:solidFill>
+              </a:rPr>
+              <a:t>index</a:t>
+            </a:r>
+            <a:r>
+              <a:rPr lang="de-DE" sz="2400" b="1" dirty="0">
+                <a:solidFill>
+                  <a:schemeClr val="accent1">
+                    <a:lumMod val="75000"/>
+                  </a:schemeClr>
+                </a:solidFill>
+              </a:rPr>
+              <a:t>] = </a:t>
+            </a:r>
+            <a:r>
+              <a:rPr lang="de-DE" sz="2400" b="1" i="1" dirty="0">
+                <a:solidFill>
+                  <a:schemeClr val="tx2"/>
+                </a:solidFill>
+              </a:rPr>
+              <a:t>wert</a:t>
+            </a:r>
+            <a:r>
+              <a:rPr lang="de-DE" sz="2400" b="1" dirty="0">
+                <a:solidFill>
+                  <a:schemeClr val="accent1">
+                    <a:lumMod val="75000"/>
+                  </a:schemeClr>
+                </a:solidFill>
+              </a:rPr>
+              <a:t>;</a:t>
+            </a:r>
+          </a:p>
+          <a:p>
+            <a:r>
+              <a:rPr lang="de-DE" dirty="0"/>
+              <a:t>Die Zählung beginnt bei 0</a:t>
+            </a:r>
+          </a:p>
+        </p:txBody>
+      </p:sp>
+      <p:sp>
+        <p:nvSpPr>
+          <p:cNvPr id="4" name="Datumsplatzhalter 3">
+            <a:extLst>
+              <a:ext uri="{FF2B5EF4-FFF2-40B4-BE49-F238E27FC236}">
+                <a16:creationId xmlns:a16="http://schemas.microsoft.com/office/drawing/2014/main" id="{64F6FD43-0751-4CF2-AA83-CD93913BF749}"/>
+              </a:ext>
+            </a:extLst>
+          </p:cNvPr>
+          <p:cNvSpPr>
+            <a:spLocks noGrp="1"/>
+          </p:cNvSpPr>
+          <p:nvPr>
+            <p:ph type="dt" sz="half" idx="10"/>
+          </p:nvPr>
+        </p:nvSpPr>
+        <p:spPr/>
+        <p:txBody>
+          <a:bodyPr/>
+          <a:lstStyle/>
+          <a:p>
+            <a:fld id="{ACA1733B-6687-4EEA-9A6B-2EF228C82457}" type="datetime1">
+              <a:rPr lang="de-DE" smtClean="0"/>
+              <a:t>31.01.2023</a:t>
+            </a:fld>
+            <a:endParaRPr lang="de-DE"/>
+          </a:p>
+        </p:txBody>
+      </p:sp>
+      <p:sp>
+        <p:nvSpPr>
+          <p:cNvPr id="5" name="Fußzeilenplatzhalter 4">
+            <a:extLst>
+              <a:ext uri="{FF2B5EF4-FFF2-40B4-BE49-F238E27FC236}">
+                <a16:creationId xmlns:a16="http://schemas.microsoft.com/office/drawing/2014/main" id="{96CFF753-F2D4-4D00-85A0-1BFD711EBCA4}"/>
+              </a:ext>
+            </a:extLst>
+          </p:cNvPr>
+          <p:cNvSpPr>
+            <a:spLocks noGrp="1"/>
+          </p:cNvSpPr>
+          <p:nvPr>
+            <p:ph type="ftr" sz="quarter" idx="11"/>
+          </p:nvPr>
+        </p:nvSpPr>
+        <p:spPr/>
+        <p:txBody>
+          <a:bodyPr/>
+          <a:lstStyle/>
+          <a:p>
+            <a:r>
+              <a:rPr lang="de-DE"/>
+              <a:t>Dart - Programmiersprache für Smartphones</a:t>
+            </a:r>
+          </a:p>
+        </p:txBody>
+      </p:sp>
+      <p:sp>
+        <p:nvSpPr>
+          <p:cNvPr id="6" name="Foliennummernplatzhalter 5">
+            <a:extLst>
+              <a:ext uri="{FF2B5EF4-FFF2-40B4-BE49-F238E27FC236}">
+                <a16:creationId xmlns:a16="http://schemas.microsoft.com/office/drawing/2014/main" id="{34F574A1-159D-47F6-8348-5DAA122848C6}"/>
+              </a:ext>
+            </a:extLst>
+          </p:cNvPr>
+          <p:cNvSpPr>
+            <a:spLocks noGrp="1"/>
+          </p:cNvSpPr>
+          <p:nvPr>
+            <p:ph type="sldNum" sz="quarter" idx="12"/>
+          </p:nvPr>
+        </p:nvSpPr>
+        <p:spPr/>
+        <p:txBody>
+          <a:bodyPr/>
+          <a:lstStyle/>
+          <a:p>
+            <a:fld id="{3A1F27E2-D58A-4028-9FF2-B12D897F257E}" type="slidenum">
+              <a:rPr lang="de-DE" smtClean="0"/>
+              <a:t>29</a:t>
+            </a:fld>
+            <a:endParaRPr lang="de-DE"/>
+          </a:p>
+        </p:txBody>
+      </p:sp>
+      <p:pic>
+        <p:nvPicPr>
+          <p:cNvPr id="8" name="Grafik 7">
+            <a:extLst>
+              <a:ext uri="{FF2B5EF4-FFF2-40B4-BE49-F238E27FC236}">
+                <a16:creationId xmlns:a16="http://schemas.microsoft.com/office/drawing/2014/main" id="{A4EBF874-0D26-4081-83D6-6F559EEA4326}"/>
+              </a:ext>
+            </a:extLst>
+          </p:cNvPr>
+          <p:cNvPicPr>
+            <a:picLocks noChangeAspect="1"/>
+          </p:cNvPicPr>
+          <p:nvPr/>
+        </p:nvPicPr>
+        <p:blipFill rotWithShape="1">
+          <a:blip r:embed="rId2"/>
+          <a:srcRect t="2384"/>
+          <a:stretch/>
+        </p:blipFill>
+        <p:spPr>
+          <a:xfrm>
+            <a:off x="838200" y="3256156"/>
+            <a:ext cx="4765170" cy="1717288"/>
+          </a:xfrm>
+          <a:prstGeom prst="rect">
+            <a:avLst/>
+          </a:prstGeom>
+        </p:spPr>
+      </p:pic>
+    </p:spTree>
+    <p:extLst>
+      <p:ext uri="{BB962C8B-B14F-4D97-AF65-F5344CB8AC3E}">
+        <p14:creationId xmlns:p14="http://schemas.microsoft.com/office/powerpoint/2010/main" val="2292454382"/>
       </p:ext>
     </p:extLst>
   </p:cSld>
@@ -12345,7 +14095,7 @@
           <a:p>
             <a:fld id="{5C03BAA7-20D5-4E1B-8CB5-A2ED8F9EFD7F}" type="datetime1">
               <a:rPr lang="de-DE" smtClean="0"/>
-              <a:t>23.01.2023</a:t>
+              <a:t>31.01.2023</a:t>
             </a:fld>
             <a:endParaRPr lang="de-DE"/>
           </a:p>
@@ -12400,6 +14150,772 @@
     <p:extLst>
       <p:ext uri="{BB962C8B-B14F-4D97-AF65-F5344CB8AC3E}">
         <p14:creationId xmlns:p14="http://schemas.microsoft.com/office/powerpoint/2010/main" val="2041278893"/>
+      </p:ext>
+    </p:extLst>
+  </p:cSld>
+  <p:clrMapOvr>
+    <a:masterClrMapping/>
+  </p:clrMapOvr>
+</p:sld>
+</file>
+
+<file path=ppt/slides/slide30.xml><?xml version="1.0" encoding="utf-8"?>
+<p:sld xmlns:a="http://schemas.openxmlformats.org/drawingml/2006/main" xmlns:r="http://schemas.openxmlformats.org/officeDocument/2006/relationships" xmlns:p="http://schemas.openxmlformats.org/presentationml/2006/main">
+  <p:cSld>
+    <p:spTree>
+      <p:nvGrpSpPr>
+        <p:cNvPr id="1" name=""/>
+        <p:cNvGrpSpPr/>
+        <p:nvPr/>
+      </p:nvGrpSpPr>
+      <p:grpSpPr>
+        <a:xfrm>
+          <a:off x="0" y="0"/>
+          <a:ext cx="0" cy="0"/>
+          <a:chOff x="0" y="0"/>
+          <a:chExt cx="0" cy="0"/>
+        </a:xfrm>
+      </p:grpSpPr>
+      <p:pic>
+        <p:nvPicPr>
+          <p:cNvPr id="10" name="Grafik 9">
+            <a:extLst>
+              <a:ext uri="{FF2B5EF4-FFF2-40B4-BE49-F238E27FC236}">
+                <a16:creationId xmlns:a16="http://schemas.microsoft.com/office/drawing/2014/main" id="{AB9F94E3-C971-4171-B930-6F092124C5DE}"/>
+              </a:ext>
+            </a:extLst>
+          </p:cNvPr>
+          <p:cNvPicPr>
+            <a:picLocks noChangeAspect="1"/>
+          </p:cNvPicPr>
+          <p:nvPr/>
+        </p:nvPicPr>
+        <p:blipFill>
+          <a:blip r:embed="rId3"/>
+          <a:stretch>
+            <a:fillRect/>
+          </a:stretch>
+        </p:blipFill>
+        <p:spPr>
+          <a:xfrm>
+            <a:off x="838199" y="2954795"/>
+            <a:ext cx="4781747" cy="2007498"/>
+          </a:xfrm>
+          <a:prstGeom prst="rect">
+            <a:avLst/>
+          </a:prstGeom>
+        </p:spPr>
+      </p:pic>
+      <p:sp>
+        <p:nvSpPr>
+          <p:cNvPr id="2" name="Titel 1">
+            <a:extLst>
+              <a:ext uri="{FF2B5EF4-FFF2-40B4-BE49-F238E27FC236}">
+                <a16:creationId xmlns:a16="http://schemas.microsoft.com/office/drawing/2014/main" id="{126FC69A-6D68-4CD8-98CC-64C886D06442}"/>
+              </a:ext>
+            </a:extLst>
+          </p:cNvPr>
+          <p:cNvSpPr>
+            <a:spLocks noGrp="1"/>
+          </p:cNvSpPr>
+          <p:nvPr>
+            <p:ph type="title"/>
+          </p:nvPr>
+        </p:nvSpPr>
+        <p:spPr/>
+        <p:txBody>
+          <a:bodyPr/>
+          <a:lstStyle/>
+          <a:p>
+            <a:r>
+              <a:rPr lang="de-DE" dirty="0"/>
+              <a:t>Dart  - Listen</a:t>
+            </a:r>
+          </a:p>
+        </p:txBody>
+      </p:sp>
+      <p:sp>
+        <p:nvSpPr>
+          <p:cNvPr id="3" name="Inhaltsplatzhalter 2">
+            <a:extLst>
+              <a:ext uri="{FF2B5EF4-FFF2-40B4-BE49-F238E27FC236}">
+                <a16:creationId xmlns:a16="http://schemas.microsoft.com/office/drawing/2014/main" id="{A940B417-BDF6-4DDD-ABCC-CEFC5F74BEED}"/>
+              </a:ext>
+            </a:extLst>
+          </p:cNvPr>
+          <p:cNvSpPr>
+            <a:spLocks noGrp="1"/>
+          </p:cNvSpPr>
+          <p:nvPr>
+            <p:ph idx="1"/>
+          </p:nvPr>
+        </p:nvSpPr>
+        <p:spPr/>
+        <p:txBody>
+          <a:bodyPr/>
+          <a:lstStyle/>
+          <a:p>
+            <a:r>
+              <a:rPr lang="de-DE" dirty="0"/>
+              <a:t>Listen zerteilen: </a:t>
+            </a:r>
+            <a:r>
+              <a:rPr lang="de-DE" sz="2400" b="1" dirty="0" err="1">
+                <a:solidFill>
+                  <a:schemeClr val="accent1">
+                    <a:lumMod val="75000"/>
+                  </a:schemeClr>
+                </a:solidFill>
+              </a:rPr>
+              <a:t>var</a:t>
+            </a:r>
+            <a:r>
+              <a:rPr lang="de-DE" sz="2400" b="1" dirty="0">
+                <a:solidFill>
+                  <a:schemeClr val="accent1">
+                    <a:lumMod val="75000"/>
+                  </a:schemeClr>
+                </a:solidFill>
+              </a:rPr>
+              <a:t> </a:t>
+            </a:r>
+            <a:r>
+              <a:rPr lang="de-DE" sz="2400" b="1" i="1" dirty="0">
+                <a:solidFill>
+                  <a:schemeClr val="tx2"/>
+                </a:solidFill>
+              </a:rPr>
+              <a:t>teil</a:t>
+            </a:r>
+            <a:r>
+              <a:rPr lang="de-DE" sz="2400" b="1" dirty="0">
+                <a:solidFill>
+                  <a:schemeClr val="accent1">
+                    <a:lumMod val="75000"/>
+                  </a:schemeClr>
+                </a:solidFill>
+              </a:rPr>
+              <a:t> = </a:t>
+            </a:r>
+            <a:r>
+              <a:rPr lang="de-DE" sz="2400" b="1" i="1" dirty="0" err="1">
+                <a:solidFill>
+                  <a:schemeClr val="tx2"/>
+                </a:solidFill>
+              </a:rPr>
+              <a:t>liste</a:t>
+            </a:r>
+            <a:r>
+              <a:rPr lang="de-DE" sz="2400" b="1" dirty="0" err="1">
+                <a:solidFill>
+                  <a:schemeClr val="accent1">
+                    <a:lumMod val="75000"/>
+                  </a:schemeClr>
+                </a:solidFill>
+              </a:rPr>
+              <a:t>.sublist</a:t>
+            </a:r>
+            <a:r>
+              <a:rPr lang="de-DE" sz="2400" b="1" dirty="0">
+                <a:solidFill>
+                  <a:schemeClr val="accent1">
+                    <a:lumMod val="75000"/>
+                  </a:schemeClr>
+                </a:solidFill>
+              </a:rPr>
+              <a:t>(</a:t>
+            </a:r>
+            <a:r>
+              <a:rPr lang="de-DE" sz="2400" b="1" i="1" dirty="0" err="1">
+                <a:solidFill>
+                  <a:schemeClr val="tx2"/>
+                </a:solidFill>
+              </a:rPr>
+              <a:t>start</a:t>
+            </a:r>
+            <a:r>
+              <a:rPr lang="de-DE" sz="2400" b="1" dirty="0">
+                <a:solidFill>
+                  <a:schemeClr val="accent1">
+                    <a:lumMod val="75000"/>
+                  </a:schemeClr>
+                </a:solidFill>
+              </a:rPr>
+              <a:t>, </a:t>
+            </a:r>
+            <a:r>
+              <a:rPr lang="de-DE" sz="2400" b="1" i="1" dirty="0">
+                <a:solidFill>
+                  <a:schemeClr val="tx2"/>
+                </a:solidFill>
+              </a:rPr>
+              <a:t>ende</a:t>
+            </a:r>
+            <a:r>
+              <a:rPr lang="de-DE" sz="2400" b="1" dirty="0">
+                <a:solidFill>
+                  <a:schemeClr val="accent1">
+                    <a:lumMod val="75000"/>
+                  </a:schemeClr>
+                </a:solidFill>
+              </a:rPr>
+              <a:t>);</a:t>
+            </a:r>
+          </a:p>
+        </p:txBody>
+      </p:sp>
+      <p:sp>
+        <p:nvSpPr>
+          <p:cNvPr id="4" name="Datumsplatzhalter 3">
+            <a:extLst>
+              <a:ext uri="{FF2B5EF4-FFF2-40B4-BE49-F238E27FC236}">
+                <a16:creationId xmlns:a16="http://schemas.microsoft.com/office/drawing/2014/main" id="{DCB0860C-D410-4664-8871-9EE5CE04DF19}"/>
+              </a:ext>
+            </a:extLst>
+          </p:cNvPr>
+          <p:cNvSpPr>
+            <a:spLocks noGrp="1"/>
+          </p:cNvSpPr>
+          <p:nvPr>
+            <p:ph type="dt" sz="half" idx="10"/>
+          </p:nvPr>
+        </p:nvSpPr>
+        <p:spPr/>
+        <p:txBody>
+          <a:bodyPr/>
+          <a:lstStyle/>
+          <a:p>
+            <a:fld id="{2BBD85E3-27A5-4125-9DB2-C537C85BBE8A}" type="datetime1">
+              <a:rPr lang="de-DE" smtClean="0"/>
+              <a:t>31.01.2023</a:t>
+            </a:fld>
+            <a:endParaRPr lang="de-DE"/>
+          </a:p>
+        </p:txBody>
+      </p:sp>
+      <p:sp>
+        <p:nvSpPr>
+          <p:cNvPr id="5" name="Fußzeilenplatzhalter 4">
+            <a:extLst>
+              <a:ext uri="{FF2B5EF4-FFF2-40B4-BE49-F238E27FC236}">
+                <a16:creationId xmlns:a16="http://schemas.microsoft.com/office/drawing/2014/main" id="{67537BDA-162A-48AB-A112-A0077123C647}"/>
+              </a:ext>
+            </a:extLst>
+          </p:cNvPr>
+          <p:cNvSpPr>
+            <a:spLocks noGrp="1"/>
+          </p:cNvSpPr>
+          <p:nvPr>
+            <p:ph type="ftr" sz="quarter" idx="11"/>
+          </p:nvPr>
+        </p:nvSpPr>
+        <p:spPr/>
+        <p:txBody>
+          <a:bodyPr/>
+          <a:lstStyle/>
+          <a:p>
+            <a:r>
+              <a:rPr lang="de-DE"/>
+              <a:t>Dart - Programmiersprache für Smartphones</a:t>
+            </a:r>
+          </a:p>
+        </p:txBody>
+      </p:sp>
+      <p:sp>
+        <p:nvSpPr>
+          <p:cNvPr id="6" name="Foliennummernplatzhalter 5">
+            <a:extLst>
+              <a:ext uri="{FF2B5EF4-FFF2-40B4-BE49-F238E27FC236}">
+                <a16:creationId xmlns:a16="http://schemas.microsoft.com/office/drawing/2014/main" id="{8403445F-FB62-452C-A1EC-FB9A32BEB9C2}"/>
+              </a:ext>
+            </a:extLst>
+          </p:cNvPr>
+          <p:cNvSpPr>
+            <a:spLocks noGrp="1"/>
+          </p:cNvSpPr>
+          <p:nvPr>
+            <p:ph type="sldNum" sz="quarter" idx="12"/>
+          </p:nvPr>
+        </p:nvSpPr>
+        <p:spPr/>
+        <p:txBody>
+          <a:bodyPr/>
+          <a:lstStyle/>
+          <a:p>
+            <a:fld id="{3A1F27E2-D58A-4028-9FF2-B12D897F257E}" type="slidenum">
+              <a:rPr lang="de-DE" smtClean="0"/>
+              <a:t>30</a:t>
+            </a:fld>
+            <a:endParaRPr lang="de-DE"/>
+          </a:p>
+        </p:txBody>
+      </p:sp>
+    </p:spTree>
+    <p:extLst>
+      <p:ext uri="{BB962C8B-B14F-4D97-AF65-F5344CB8AC3E}">
+        <p14:creationId xmlns:p14="http://schemas.microsoft.com/office/powerpoint/2010/main" val="2359135768"/>
+      </p:ext>
+    </p:extLst>
+  </p:cSld>
+  <p:clrMapOvr>
+    <a:masterClrMapping/>
+  </p:clrMapOvr>
+</p:sld>
+</file>
+
+<file path=ppt/slides/slide31.xml><?xml version="1.0" encoding="utf-8"?>
+<p:sld xmlns:a="http://schemas.openxmlformats.org/drawingml/2006/main" xmlns:r="http://schemas.openxmlformats.org/officeDocument/2006/relationships" xmlns:p="http://schemas.openxmlformats.org/presentationml/2006/main">
+  <p:cSld>
+    <p:spTree>
+      <p:nvGrpSpPr>
+        <p:cNvPr id="1" name=""/>
+        <p:cNvGrpSpPr/>
+        <p:nvPr/>
+      </p:nvGrpSpPr>
+      <p:grpSpPr>
+        <a:xfrm>
+          <a:off x="0" y="0"/>
+          <a:ext cx="0" cy="0"/>
+          <a:chOff x="0" y="0"/>
+          <a:chExt cx="0" cy="0"/>
+        </a:xfrm>
+      </p:grpSpPr>
+      <p:sp>
+        <p:nvSpPr>
+          <p:cNvPr id="2" name="Titel 1">
+            <a:extLst>
+              <a:ext uri="{FF2B5EF4-FFF2-40B4-BE49-F238E27FC236}">
+                <a16:creationId xmlns:a16="http://schemas.microsoft.com/office/drawing/2014/main" id="{126FC69A-6D68-4CD8-98CC-64C886D06442}"/>
+              </a:ext>
+            </a:extLst>
+          </p:cNvPr>
+          <p:cNvSpPr>
+            <a:spLocks noGrp="1"/>
+          </p:cNvSpPr>
+          <p:nvPr>
+            <p:ph type="title"/>
+          </p:nvPr>
+        </p:nvSpPr>
+        <p:spPr/>
+        <p:txBody>
+          <a:bodyPr/>
+          <a:lstStyle/>
+          <a:p>
+            <a:r>
+              <a:rPr lang="de-DE" dirty="0"/>
+              <a:t>Dart  - Listen</a:t>
+            </a:r>
+          </a:p>
+        </p:txBody>
+      </p:sp>
+      <p:sp>
+        <p:nvSpPr>
+          <p:cNvPr id="3" name="Inhaltsplatzhalter 2">
+            <a:extLst>
+              <a:ext uri="{FF2B5EF4-FFF2-40B4-BE49-F238E27FC236}">
+                <a16:creationId xmlns:a16="http://schemas.microsoft.com/office/drawing/2014/main" id="{A940B417-BDF6-4DDD-ABCC-CEFC5F74BEED}"/>
+              </a:ext>
+            </a:extLst>
+          </p:cNvPr>
+          <p:cNvSpPr>
+            <a:spLocks noGrp="1"/>
+          </p:cNvSpPr>
+          <p:nvPr>
+            <p:ph idx="1"/>
+          </p:nvPr>
+        </p:nvSpPr>
+        <p:spPr/>
+        <p:txBody>
+          <a:bodyPr/>
+          <a:lstStyle/>
+          <a:p>
+            <a:r>
+              <a:rPr lang="de-DE" dirty="0"/>
+              <a:t>Listen dynamisch erstellen (Einträge per Programm hinzufügen)</a:t>
+            </a:r>
+          </a:p>
+          <a:p>
+            <a:r>
+              <a:rPr lang="de-DE" sz="2800" b="1" i="1" dirty="0" err="1">
+                <a:solidFill>
+                  <a:schemeClr val="tx2"/>
+                </a:solidFill>
+              </a:rPr>
+              <a:t>liste</a:t>
+            </a:r>
+            <a:r>
+              <a:rPr lang="de-DE" sz="2800" b="1" dirty="0" err="1">
+                <a:solidFill>
+                  <a:schemeClr val="accent1">
+                    <a:lumMod val="75000"/>
+                  </a:schemeClr>
+                </a:solidFill>
+              </a:rPr>
+              <a:t>.add</a:t>
+            </a:r>
+            <a:r>
+              <a:rPr lang="de-DE" sz="2800" b="1" dirty="0">
+                <a:solidFill>
+                  <a:schemeClr val="accent1">
+                    <a:lumMod val="75000"/>
+                  </a:schemeClr>
+                </a:solidFill>
+              </a:rPr>
+              <a:t>(</a:t>
+            </a:r>
+            <a:r>
+              <a:rPr lang="de-DE" sz="2800" b="1" i="1" dirty="0" err="1">
+                <a:solidFill>
+                  <a:schemeClr val="tx2"/>
+                </a:solidFill>
+              </a:rPr>
+              <a:t>eintrag</a:t>
+            </a:r>
+            <a:r>
+              <a:rPr lang="de-DE" sz="2800" b="1" dirty="0">
+                <a:solidFill>
+                  <a:schemeClr val="accent1">
+                    <a:lumMod val="75000"/>
+                  </a:schemeClr>
+                </a:solidFill>
+              </a:rPr>
+              <a:t>);</a:t>
+            </a:r>
+            <a:endParaRPr lang="de-DE" dirty="0"/>
+          </a:p>
+          <a:p>
+            <a:pPr lvl="1"/>
+            <a:endParaRPr lang="de-DE" sz="2000" b="1" dirty="0">
+              <a:solidFill>
+                <a:schemeClr val="accent1">
+                  <a:lumMod val="75000"/>
+                </a:schemeClr>
+              </a:solidFill>
+            </a:endParaRPr>
+          </a:p>
+        </p:txBody>
+      </p:sp>
+      <p:sp>
+        <p:nvSpPr>
+          <p:cNvPr id="4" name="Datumsplatzhalter 3">
+            <a:extLst>
+              <a:ext uri="{FF2B5EF4-FFF2-40B4-BE49-F238E27FC236}">
+                <a16:creationId xmlns:a16="http://schemas.microsoft.com/office/drawing/2014/main" id="{DCB0860C-D410-4664-8871-9EE5CE04DF19}"/>
+              </a:ext>
+            </a:extLst>
+          </p:cNvPr>
+          <p:cNvSpPr>
+            <a:spLocks noGrp="1"/>
+          </p:cNvSpPr>
+          <p:nvPr>
+            <p:ph type="dt" sz="half" idx="10"/>
+          </p:nvPr>
+        </p:nvSpPr>
+        <p:spPr/>
+        <p:txBody>
+          <a:bodyPr/>
+          <a:lstStyle/>
+          <a:p>
+            <a:fld id="{2BBD85E3-27A5-4125-9DB2-C537C85BBE8A}" type="datetime1">
+              <a:rPr lang="de-DE" smtClean="0"/>
+              <a:t>31.01.2023</a:t>
+            </a:fld>
+            <a:endParaRPr lang="de-DE"/>
+          </a:p>
+        </p:txBody>
+      </p:sp>
+      <p:sp>
+        <p:nvSpPr>
+          <p:cNvPr id="5" name="Fußzeilenplatzhalter 4">
+            <a:extLst>
+              <a:ext uri="{FF2B5EF4-FFF2-40B4-BE49-F238E27FC236}">
+                <a16:creationId xmlns:a16="http://schemas.microsoft.com/office/drawing/2014/main" id="{67537BDA-162A-48AB-A112-A0077123C647}"/>
+              </a:ext>
+            </a:extLst>
+          </p:cNvPr>
+          <p:cNvSpPr>
+            <a:spLocks noGrp="1"/>
+          </p:cNvSpPr>
+          <p:nvPr>
+            <p:ph type="ftr" sz="quarter" idx="11"/>
+          </p:nvPr>
+        </p:nvSpPr>
+        <p:spPr/>
+        <p:txBody>
+          <a:bodyPr/>
+          <a:lstStyle/>
+          <a:p>
+            <a:r>
+              <a:rPr lang="de-DE"/>
+              <a:t>Dart - Programmiersprache für Smartphones</a:t>
+            </a:r>
+          </a:p>
+        </p:txBody>
+      </p:sp>
+      <p:sp>
+        <p:nvSpPr>
+          <p:cNvPr id="6" name="Foliennummernplatzhalter 5">
+            <a:extLst>
+              <a:ext uri="{FF2B5EF4-FFF2-40B4-BE49-F238E27FC236}">
+                <a16:creationId xmlns:a16="http://schemas.microsoft.com/office/drawing/2014/main" id="{8403445F-FB62-452C-A1EC-FB9A32BEB9C2}"/>
+              </a:ext>
+            </a:extLst>
+          </p:cNvPr>
+          <p:cNvSpPr>
+            <a:spLocks noGrp="1"/>
+          </p:cNvSpPr>
+          <p:nvPr>
+            <p:ph type="sldNum" sz="quarter" idx="12"/>
+          </p:nvPr>
+        </p:nvSpPr>
+        <p:spPr/>
+        <p:txBody>
+          <a:bodyPr/>
+          <a:lstStyle/>
+          <a:p>
+            <a:fld id="{3A1F27E2-D58A-4028-9FF2-B12D897F257E}" type="slidenum">
+              <a:rPr lang="de-DE" smtClean="0"/>
+              <a:t>31</a:t>
+            </a:fld>
+            <a:endParaRPr lang="de-DE"/>
+          </a:p>
+        </p:txBody>
+      </p:sp>
+      <p:pic>
+        <p:nvPicPr>
+          <p:cNvPr id="11" name="Picture 10">
+            <a:extLst>
+              <a:ext uri="{FF2B5EF4-FFF2-40B4-BE49-F238E27FC236}">
+                <a16:creationId xmlns:a16="http://schemas.microsoft.com/office/drawing/2014/main" id="{D1DFD1AC-45E9-0F5B-65A0-42AC1FC86537}"/>
+              </a:ext>
+            </a:extLst>
+          </p:cNvPr>
+          <p:cNvPicPr>
+            <a:picLocks noChangeAspect="1"/>
+          </p:cNvPicPr>
+          <p:nvPr/>
+        </p:nvPicPr>
+        <p:blipFill>
+          <a:blip r:embed="rId3"/>
+          <a:stretch>
+            <a:fillRect/>
+          </a:stretch>
+        </p:blipFill>
+        <p:spPr>
+          <a:xfrm>
+            <a:off x="838199" y="2821469"/>
+            <a:ext cx="5844507" cy="2377851"/>
+          </a:xfrm>
+          <a:prstGeom prst="rect">
+            <a:avLst/>
+          </a:prstGeom>
+        </p:spPr>
+      </p:pic>
+    </p:spTree>
+    <p:extLst>
+      <p:ext uri="{BB962C8B-B14F-4D97-AF65-F5344CB8AC3E}">
+        <p14:creationId xmlns:p14="http://schemas.microsoft.com/office/powerpoint/2010/main" val="1809038235"/>
+      </p:ext>
+    </p:extLst>
+  </p:cSld>
+  <p:clrMapOvr>
+    <a:masterClrMapping/>
+  </p:clrMapOvr>
+</p:sld>
+</file>
+
+<file path=ppt/slides/slide32.xml><?xml version="1.0" encoding="utf-8"?>
+<p:sld xmlns:a="http://schemas.openxmlformats.org/drawingml/2006/main" xmlns:r="http://schemas.openxmlformats.org/officeDocument/2006/relationships" xmlns:p="http://schemas.openxmlformats.org/presentationml/2006/main">
+  <p:cSld>
+    <p:spTree>
+      <p:nvGrpSpPr>
+        <p:cNvPr id="1" name=""/>
+        <p:cNvGrpSpPr/>
+        <p:nvPr/>
+      </p:nvGrpSpPr>
+      <p:grpSpPr>
+        <a:xfrm>
+          <a:off x="0" y="0"/>
+          <a:ext cx="0" cy="0"/>
+          <a:chOff x="0" y="0"/>
+          <a:chExt cx="0" cy="0"/>
+        </a:xfrm>
+      </p:grpSpPr>
+      <p:sp>
+        <p:nvSpPr>
+          <p:cNvPr id="2" name="Titel 1">
+            <a:extLst>
+              <a:ext uri="{FF2B5EF4-FFF2-40B4-BE49-F238E27FC236}">
+                <a16:creationId xmlns:a16="http://schemas.microsoft.com/office/drawing/2014/main" id="{B8E6947D-2630-4244-9622-61CFE645C57B}"/>
+              </a:ext>
+            </a:extLst>
+          </p:cNvPr>
+          <p:cNvSpPr>
+            <a:spLocks noGrp="1"/>
+          </p:cNvSpPr>
+          <p:nvPr>
+            <p:ph type="title"/>
+          </p:nvPr>
+        </p:nvSpPr>
+        <p:spPr/>
+        <p:txBody>
+          <a:bodyPr/>
+          <a:lstStyle/>
+          <a:p>
+            <a:r>
+              <a:rPr lang="de-DE" dirty="0"/>
+              <a:t>Dart  - Listen Aufgabe</a:t>
+            </a:r>
+          </a:p>
+        </p:txBody>
+      </p:sp>
+      <p:sp>
+        <p:nvSpPr>
+          <p:cNvPr id="3" name="Inhaltsplatzhalter 2">
+            <a:extLst>
+              <a:ext uri="{FF2B5EF4-FFF2-40B4-BE49-F238E27FC236}">
+                <a16:creationId xmlns:a16="http://schemas.microsoft.com/office/drawing/2014/main" id="{1C7C9EE9-9FFC-4F21-B0C7-4919940AF9CE}"/>
+              </a:ext>
+            </a:extLst>
+          </p:cNvPr>
+          <p:cNvSpPr>
+            <a:spLocks noGrp="1"/>
+          </p:cNvSpPr>
+          <p:nvPr>
+            <p:ph idx="1"/>
+          </p:nvPr>
+        </p:nvSpPr>
+        <p:spPr/>
+        <p:txBody>
+          <a:bodyPr anchor="ctr"/>
+          <a:lstStyle/>
+          <a:p>
+            <a:pPr marL="0" indent="0">
+              <a:buNone/>
+            </a:pPr>
+            <a:r>
+              <a:rPr lang="de-DE" dirty="0"/>
+              <a:t>Erstelle eine Liste der ersten 20 </a:t>
+            </a:r>
+            <a:r>
+              <a:rPr lang="de-DE" dirty="0" err="1"/>
+              <a:t>Fibunacci</a:t>
+            </a:r>
+            <a:r>
+              <a:rPr lang="de-DE" dirty="0"/>
+              <a:t>-Zahlen.</a:t>
+            </a:r>
+          </a:p>
+          <a:p>
+            <a:pPr marL="0" indent="0">
+              <a:buNone/>
+            </a:pPr>
+            <a:r>
+              <a:rPr lang="de-DE"/>
+              <a:t>Gib </a:t>
+            </a:r>
+            <a:r>
+              <a:rPr lang="de-DE" dirty="0"/>
+              <a:t>die letzten </a:t>
+            </a:r>
+            <a:r>
+              <a:rPr lang="de-DE"/>
+              <a:t>3 Elemente dieser Liste aus.</a:t>
+            </a:r>
+            <a:endParaRPr lang="de-DE" dirty="0"/>
+          </a:p>
+        </p:txBody>
+      </p:sp>
+      <p:sp>
+        <p:nvSpPr>
+          <p:cNvPr id="4" name="Datumsplatzhalter 3">
+            <a:extLst>
+              <a:ext uri="{FF2B5EF4-FFF2-40B4-BE49-F238E27FC236}">
+                <a16:creationId xmlns:a16="http://schemas.microsoft.com/office/drawing/2014/main" id="{61ECAA51-4FF1-47B3-B6F7-E0C5B470883F}"/>
+              </a:ext>
+            </a:extLst>
+          </p:cNvPr>
+          <p:cNvSpPr>
+            <a:spLocks noGrp="1"/>
+          </p:cNvSpPr>
+          <p:nvPr>
+            <p:ph type="dt" sz="half" idx="10"/>
+          </p:nvPr>
+        </p:nvSpPr>
+        <p:spPr/>
+        <p:txBody>
+          <a:bodyPr/>
+          <a:lstStyle/>
+          <a:p>
+            <a:fld id="{115AC75E-72B2-486D-BEF5-A13F9B218F2F}" type="datetime1">
+              <a:rPr lang="de-DE" smtClean="0"/>
+              <a:t>31.01.2023</a:t>
+            </a:fld>
+            <a:endParaRPr lang="de-DE"/>
+          </a:p>
+        </p:txBody>
+      </p:sp>
+      <p:sp>
+        <p:nvSpPr>
+          <p:cNvPr id="5" name="Fußzeilenplatzhalter 4">
+            <a:extLst>
+              <a:ext uri="{FF2B5EF4-FFF2-40B4-BE49-F238E27FC236}">
+                <a16:creationId xmlns:a16="http://schemas.microsoft.com/office/drawing/2014/main" id="{30A95F8B-39B8-4BC8-B512-A91B80D4DA0F}"/>
+              </a:ext>
+            </a:extLst>
+          </p:cNvPr>
+          <p:cNvSpPr>
+            <a:spLocks noGrp="1"/>
+          </p:cNvSpPr>
+          <p:nvPr>
+            <p:ph type="ftr" sz="quarter" idx="11"/>
+          </p:nvPr>
+        </p:nvSpPr>
+        <p:spPr/>
+        <p:txBody>
+          <a:bodyPr/>
+          <a:lstStyle/>
+          <a:p>
+            <a:r>
+              <a:rPr lang="de-DE"/>
+              <a:t>Dart - Programmiersprache für Smartphones</a:t>
+            </a:r>
+          </a:p>
+        </p:txBody>
+      </p:sp>
+      <p:sp>
+        <p:nvSpPr>
+          <p:cNvPr id="6" name="Foliennummernplatzhalter 5">
+            <a:extLst>
+              <a:ext uri="{FF2B5EF4-FFF2-40B4-BE49-F238E27FC236}">
+                <a16:creationId xmlns:a16="http://schemas.microsoft.com/office/drawing/2014/main" id="{9E8CFE69-3E47-424A-89C0-19DABB2B8A14}"/>
+              </a:ext>
+            </a:extLst>
+          </p:cNvPr>
+          <p:cNvSpPr>
+            <a:spLocks noGrp="1"/>
+          </p:cNvSpPr>
+          <p:nvPr>
+            <p:ph type="sldNum" sz="quarter" idx="12"/>
+          </p:nvPr>
+        </p:nvSpPr>
+        <p:spPr/>
+        <p:txBody>
+          <a:bodyPr/>
+          <a:lstStyle/>
+          <a:p>
+            <a:fld id="{3A1F27E2-D58A-4028-9FF2-B12D897F257E}" type="slidenum">
+              <a:rPr lang="de-DE" smtClean="0"/>
+              <a:t>32</a:t>
+            </a:fld>
+            <a:endParaRPr lang="de-DE"/>
+          </a:p>
+        </p:txBody>
+      </p:sp>
+    </p:spTree>
+    <p:extLst>
+      <p:ext uri="{BB962C8B-B14F-4D97-AF65-F5344CB8AC3E}">
+        <p14:creationId xmlns:p14="http://schemas.microsoft.com/office/powerpoint/2010/main" val="754825474"/>
       </p:ext>
     </p:extLst>
   </p:cSld>
@@ -12632,7 +15148,7 @@
           <a:p>
             <a:fld id="{DDF7F67B-F411-40A4-BFC4-67CF6BB150A8}" type="datetime1">
               <a:rPr lang="de-DE" smtClean="0"/>
-              <a:t>23.01.2023</a:t>
+              <a:t>31.01.2023</a:t>
             </a:fld>
             <a:endParaRPr lang="de-DE"/>
           </a:p>
@@ -13034,7 +15550,7 @@
           <a:p>
             <a:fld id="{96C0D114-F0DB-443F-9337-40D84E177FDC}" type="datetime1">
               <a:rPr lang="de-DE" smtClean="0"/>
-              <a:t>23.01.2023</a:t>
+              <a:t>31.01.2023</a:t>
             </a:fld>
             <a:endParaRPr lang="de-DE"/>
           </a:p>
@@ -13403,7 +15919,7 @@
           <a:p>
             <a:fld id="{A952138C-0142-4C6B-A620-863AA96BBBE1}" type="datetime1">
               <a:rPr lang="de-DE" smtClean="0"/>
-              <a:t>23.01.2023</a:t>
+              <a:t>31.01.2023</a:t>
             </a:fld>
             <a:endParaRPr lang="de-DE"/>
           </a:p>
@@ -13639,7 +16155,7 @@
           <a:p>
             <a:fld id="{7127E464-1A99-4532-A297-E1D7378D9E61}" type="datetime1">
               <a:rPr lang="de-DE" smtClean="0"/>
-              <a:t>23.01.2023</a:t>
+              <a:t>31.01.2023</a:t>
             </a:fld>
             <a:endParaRPr lang="de-DE"/>
           </a:p>
@@ -14020,7 +16536,7 @@
           <a:p>
             <a:fld id="{77B5C711-A7A8-40A0-AEA6-3F77D4628817}" type="datetime1">
               <a:rPr lang="de-DE" smtClean="0"/>
-              <a:t>23.01.2023</a:t>
+              <a:t>31.01.2023</a:t>
             </a:fld>
             <a:endParaRPr lang="de-DE"/>
           </a:p>
@@ -14399,7 +16915,7 @@
           <a:p>
             <a:fld id="{27A2010A-1149-4F23-80A2-1B4570F18F3A}" type="datetime1">
               <a:rPr lang="de-DE" smtClean="0"/>
-              <a:t>23.01.2023</a:t>
+              <a:t>31.01.2023</a:t>
             </a:fld>
             <a:endParaRPr lang="de-DE"/>
           </a:p>

</xml_diff>

<commit_message>
add slides for Maps, Methods and Functions
</commit_message>
<xml_diff>
--- a/presentations/Dart.pptx
+++ b/presentations/Dart.pptx
@@ -6,10 +6,10 @@
     <p:sldMasterId id="2147483656" r:id="rId2"/>
   </p:sldMasterIdLst>
   <p:notesMasterIdLst>
-    <p:notesMasterId r:id="rId35"/>
+    <p:notesMasterId r:id="rId43"/>
   </p:notesMasterIdLst>
   <p:handoutMasterIdLst>
-    <p:handoutMasterId r:id="rId36"/>
+    <p:handoutMasterId r:id="rId44"/>
   </p:handoutMasterIdLst>
   <p:sldIdLst>
     <p:sldId id="256" r:id="rId3"/>
@@ -44,6 +44,14 @@
     <p:sldId id="300" r:id="rId32"/>
     <p:sldId id="310" r:id="rId33"/>
     <p:sldId id="301" r:id="rId34"/>
+    <p:sldId id="308" r:id="rId35"/>
+    <p:sldId id="311" r:id="rId36"/>
+    <p:sldId id="302" r:id="rId37"/>
+    <p:sldId id="303" r:id="rId38"/>
+    <p:sldId id="304" r:id="rId39"/>
+    <p:sldId id="305" r:id="rId40"/>
+    <p:sldId id="306" r:id="rId41"/>
+    <p:sldId id="307" r:id="rId42"/>
   </p:sldIdLst>
   <p:sldSz cx="12192000" cy="6858000"/>
   <p:notesSz cx="6858000" cy="9144000"/>
@@ -217,13 +225,24 @@
           </p14:sldIdLst>
         </p14:section>
         <p14:section name="Map / Dictionary" id="{D4A4C5FB-0BB1-4A3B-B0E1-186A6D1D750D}">
-          <p14:sldIdLst/>
+          <p14:sldIdLst>
+            <p14:sldId id="308"/>
+            <p14:sldId id="311"/>
+          </p14:sldIdLst>
         </p14:section>
         <p14:section name="Methoden" id="{A1A8E00F-B74D-4454-8AF5-7F9D36699E8D}">
-          <p14:sldIdLst/>
+          <p14:sldIdLst>
+            <p14:sldId id="302"/>
+            <p14:sldId id="303"/>
+            <p14:sldId id="304"/>
+          </p14:sldIdLst>
         </p14:section>
         <p14:section name="Funktionen" id="{E0B51D4E-0574-46DB-8EAA-8D0AC9FB54FC}">
-          <p14:sldIdLst/>
+          <p14:sldIdLst>
+            <p14:sldId id="305"/>
+            <p14:sldId id="306"/>
+            <p14:sldId id="307"/>
+          </p14:sldIdLst>
         </p14:section>
         <p14:section name="Named Arguments" id="{6F6084BE-49CE-424A-9BA1-3FE4FD559CA2}">
           <p14:sldIdLst/>
@@ -2971,6 +2990,682 @@
 </p:notes>
 </file>
 
+<file path=ppt/notesSlides/notesSlide24.xml><?xml version="1.0" encoding="utf-8"?>
+<p:notes xmlns:a="http://schemas.openxmlformats.org/drawingml/2006/main" xmlns:r="http://schemas.openxmlformats.org/officeDocument/2006/relationships" xmlns:p="http://schemas.openxmlformats.org/presentationml/2006/main">
+  <p:cSld>
+    <p:spTree>
+      <p:nvGrpSpPr>
+        <p:cNvPr id="1" name=""/>
+        <p:cNvGrpSpPr/>
+        <p:nvPr/>
+      </p:nvGrpSpPr>
+      <p:grpSpPr>
+        <a:xfrm>
+          <a:off x="0" y="0"/>
+          <a:ext cx="0" cy="0"/>
+          <a:chOff x="0" y="0"/>
+          <a:chExt cx="0" cy="0"/>
+        </a:xfrm>
+      </p:grpSpPr>
+      <p:sp>
+        <p:nvSpPr>
+          <p:cNvPr id="2" name="Folienbildplatzhalter 1"/>
+          <p:cNvSpPr>
+            <a:spLocks noGrp="1" noRot="1" noChangeAspect="1"/>
+          </p:cNvSpPr>
+          <p:nvPr>
+            <p:ph type="sldImg"/>
+          </p:nvPr>
+        </p:nvSpPr>
+        <p:spPr>
+          <a:xfrm>
+            <a:off x="685800" y="1143000"/>
+            <a:ext cx="4270375" cy="2401888"/>
+          </a:xfrm>
+        </p:spPr>
+      </p:sp>
+      <p:sp>
+        <p:nvSpPr>
+          <p:cNvPr id="3" name="Notizenplatzhalter 2"/>
+          <p:cNvSpPr>
+            <a:spLocks noGrp="1"/>
+          </p:cNvSpPr>
+          <p:nvPr>
+            <p:ph type="body" idx="1"/>
+          </p:nvPr>
+        </p:nvSpPr>
+        <p:spPr/>
+        <p:txBody>
+          <a:bodyPr/>
+          <a:lstStyle/>
+          <a:p>
+            <a:r>
+              <a:rPr lang="de-DE" dirty="0" err="1"/>
+              <a:t>Map</a:t>
+            </a:r>
+            <a:r>
+              <a:rPr lang="de-DE" dirty="0"/>
+              <a:t> ≠ Karte, sondern </a:t>
+            </a:r>
+            <a:r>
+              <a:rPr lang="de-DE" dirty="0" err="1"/>
+              <a:t>Map</a:t>
+            </a:r>
+            <a:r>
+              <a:rPr lang="de-DE" dirty="0"/>
+              <a:t> = Abbild</a:t>
+            </a:r>
+          </a:p>
+          <a:p>
+            <a:endParaRPr lang="de-DE" dirty="0"/>
+          </a:p>
+        </p:txBody>
+      </p:sp>
+      <p:sp>
+        <p:nvSpPr>
+          <p:cNvPr id="4" name="Foliennummernplatzhalter 3"/>
+          <p:cNvSpPr>
+            <a:spLocks noGrp="1"/>
+          </p:cNvSpPr>
+          <p:nvPr>
+            <p:ph type="sldNum" sz="quarter" idx="5"/>
+          </p:nvPr>
+        </p:nvSpPr>
+        <p:spPr/>
+        <p:txBody>
+          <a:bodyPr/>
+          <a:lstStyle/>
+          <a:p>
+            <a:fld id="{927DBD90-B360-417B-B4B3-F05A4AFC1996}" type="slidenum">
+              <a:rPr lang="de-DE" smtClean="0"/>
+              <a:pPr/>
+              <a:t>33</a:t>
+            </a:fld>
+            <a:endParaRPr lang="de-DE"/>
+          </a:p>
+        </p:txBody>
+      </p:sp>
+    </p:spTree>
+    <p:extLst>
+      <p:ext uri="{BB962C8B-B14F-4D97-AF65-F5344CB8AC3E}">
+        <p14:creationId xmlns:p14="http://schemas.microsoft.com/office/powerpoint/2010/main" val="2557453124"/>
+      </p:ext>
+    </p:extLst>
+  </p:cSld>
+  <p:clrMapOvr>
+    <a:masterClrMapping/>
+  </p:clrMapOvr>
+</p:notes>
+</file>
+
+<file path=ppt/notesSlides/notesSlide25.xml><?xml version="1.0" encoding="utf-8"?>
+<p:notes xmlns:a="http://schemas.openxmlformats.org/drawingml/2006/main" xmlns:r="http://schemas.openxmlformats.org/officeDocument/2006/relationships" xmlns:p="http://schemas.openxmlformats.org/presentationml/2006/main">
+  <p:cSld>
+    <p:spTree>
+      <p:nvGrpSpPr>
+        <p:cNvPr id="1" name=""/>
+        <p:cNvGrpSpPr/>
+        <p:nvPr/>
+      </p:nvGrpSpPr>
+      <p:grpSpPr>
+        <a:xfrm>
+          <a:off x="0" y="0"/>
+          <a:ext cx="0" cy="0"/>
+          <a:chOff x="0" y="0"/>
+          <a:chExt cx="0" cy="0"/>
+        </a:xfrm>
+      </p:grpSpPr>
+      <p:sp>
+        <p:nvSpPr>
+          <p:cNvPr id="2" name="Folienbildplatzhalter 1"/>
+          <p:cNvSpPr>
+            <a:spLocks noGrp="1" noRot="1" noChangeAspect="1"/>
+          </p:cNvSpPr>
+          <p:nvPr>
+            <p:ph type="sldImg"/>
+          </p:nvPr>
+        </p:nvSpPr>
+        <p:spPr>
+          <a:xfrm>
+            <a:off x="685800" y="1143000"/>
+            <a:ext cx="4270375" cy="2401888"/>
+          </a:xfrm>
+        </p:spPr>
+      </p:sp>
+      <p:sp>
+        <p:nvSpPr>
+          <p:cNvPr id="3" name="Notizenplatzhalter 2"/>
+          <p:cNvSpPr>
+            <a:spLocks noGrp="1"/>
+          </p:cNvSpPr>
+          <p:nvPr>
+            <p:ph type="body" idx="1"/>
+          </p:nvPr>
+        </p:nvSpPr>
+        <p:spPr/>
+        <p:txBody>
+          <a:bodyPr/>
+          <a:lstStyle/>
+          <a:p>
+            <a:r>
+              <a:rPr lang="de-DE" dirty="0"/>
+              <a:t>Was wir bisher schon immer hatten, </a:t>
+            </a:r>
+            <a:r>
+              <a:rPr lang="de-DE" dirty="0" err="1"/>
+              <a:t>void</a:t>
+            </a:r>
+            <a:r>
+              <a:rPr lang="de-DE" dirty="0"/>
+              <a:t> </a:t>
+            </a:r>
+            <a:r>
+              <a:rPr lang="de-DE" dirty="0" err="1"/>
+              <a:t>main</a:t>
+            </a:r>
+            <a:r>
+              <a:rPr lang="de-DE" dirty="0"/>
+              <a:t>() {…} ist auch eine Methode.</a:t>
+            </a:r>
+          </a:p>
+          <a:p>
+            <a:r>
+              <a:rPr lang="de-DE" dirty="0"/>
+              <a:t>Diese Methode ist speziell, weil sie beim Start der Datei ausgeführt wird.</a:t>
+            </a:r>
+          </a:p>
+          <a:p>
+            <a:endParaRPr lang="de-DE" dirty="0"/>
+          </a:p>
+          <a:p>
+            <a:r>
+              <a:rPr lang="de-DE" dirty="0"/>
+              <a:t>Hinweis für erfahrene Entwickler:</a:t>
+            </a:r>
+          </a:p>
+          <a:p>
+            <a:r>
+              <a:rPr lang="de-DE" dirty="0"/>
+              <a:t>Es ist empfohlen "</a:t>
+            </a:r>
+            <a:r>
+              <a:rPr lang="de-DE" dirty="0" err="1"/>
+              <a:t>void</a:t>
+            </a:r>
+            <a:r>
+              <a:rPr lang="de-DE" dirty="0"/>
+              <a:t>" zu verwenden, auch wenn der Code ohne "</a:t>
+            </a:r>
+            <a:r>
+              <a:rPr lang="de-DE" dirty="0" err="1"/>
+              <a:t>void</a:t>
+            </a:r>
+            <a:r>
+              <a:rPr lang="de-DE" dirty="0"/>
+              <a:t>" funktionieren würde.</a:t>
+            </a:r>
+          </a:p>
+          <a:p>
+            <a:r>
+              <a:rPr lang="de-DE" dirty="0"/>
+              <a:t>Mit dem Schlüsselwort "</a:t>
+            </a:r>
+            <a:r>
+              <a:rPr lang="de-DE" dirty="0" err="1"/>
+              <a:t>void</a:t>
+            </a:r>
+            <a:r>
+              <a:rPr lang="de-DE" dirty="0"/>
+              <a:t>" erhält man aber zusätzliche Prüfungen, z.B. ob versucht wird, den nicht vorhandenen Rückgabewert zuzuweisen.</a:t>
+            </a:r>
+          </a:p>
+        </p:txBody>
+      </p:sp>
+      <p:sp>
+        <p:nvSpPr>
+          <p:cNvPr id="4" name="Foliennummernplatzhalter 3"/>
+          <p:cNvSpPr>
+            <a:spLocks noGrp="1"/>
+          </p:cNvSpPr>
+          <p:nvPr>
+            <p:ph type="sldNum" sz="quarter" idx="5"/>
+          </p:nvPr>
+        </p:nvSpPr>
+        <p:spPr/>
+        <p:txBody>
+          <a:bodyPr/>
+          <a:lstStyle/>
+          <a:p>
+            <a:fld id="{927DBD90-B360-417B-B4B3-F05A4AFC1996}" type="slidenum">
+              <a:rPr lang="de-DE" smtClean="0"/>
+              <a:pPr/>
+              <a:t>35</a:t>
+            </a:fld>
+            <a:endParaRPr lang="de-DE"/>
+          </a:p>
+        </p:txBody>
+      </p:sp>
+    </p:spTree>
+    <p:extLst>
+      <p:ext uri="{BB962C8B-B14F-4D97-AF65-F5344CB8AC3E}">
+        <p14:creationId xmlns:p14="http://schemas.microsoft.com/office/powerpoint/2010/main" val="188613444"/>
+      </p:ext>
+    </p:extLst>
+  </p:cSld>
+  <p:clrMapOvr>
+    <a:masterClrMapping/>
+  </p:clrMapOvr>
+</p:notes>
+</file>
+
+<file path=ppt/notesSlides/notesSlide26.xml><?xml version="1.0" encoding="utf-8"?>
+<p:notes xmlns:a="http://schemas.openxmlformats.org/drawingml/2006/main" xmlns:r="http://schemas.openxmlformats.org/officeDocument/2006/relationships" xmlns:p="http://schemas.openxmlformats.org/presentationml/2006/main">
+  <p:cSld>
+    <p:spTree>
+      <p:nvGrpSpPr>
+        <p:cNvPr id="1" name=""/>
+        <p:cNvGrpSpPr/>
+        <p:nvPr/>
+      </p:nvGrpSpPr>
+      <p:grpSpPr>
+        <a:xfrm>
+          <a:off x="0" y="0"/>
+          <a:ext cx="0" cy="0"/>
+          <a:chOff x="0" y="0"/>
+          <a:chExt cx="0" cy="0"/>
+        </a:xfrm>
+      </p:grpSpPr>
+      <p:sp>
+        <p:nvSpPr>
+          <p:cNvPr id="2" name="Folienbildplatzhalter 1"/>
+          <p:cNvSpPr>
+            <a:spLocks noGrp="1" noRot="1" noChangeAspect="1"/>
+          </p:cNvSpPr>
+          <p:nvPr>
+            <p:ph type="sldImg"/>
+          </p:nvPr>
+        </p:nvSpPr>
+        <p:spPr>
+          <a:xfrm>
+            <a:off x="685800" y="1143000"/>
+            <a:ext cx="4270375" cy="2401888"/>
+          </a:xfrm>
+        </p:spPr>
+      </p:sp>
+      <p:sp>
+        <p:nvSpPr>
+          <p:cNvPr id="3" name="Notizenplatzhalter 2"/>
+          <p:cNvSpPr>
+            <a:spLocks noGrp="1"/>
+          </p:cNvSpPr>
+          <p:nvPr>
+            <p:ph type="body" idx="1"/>
+          </p:nvPr>
+        </p:nvSpPr>
+        <p:spPr/>
+        <p:txBody>
+          <a:bodyPr/>
+          <a:lstStyle/>
+          <a:p>
+            <a:r>
+              <a:rPr lang="de-DE" dirty="0"/>
+              <a:t>In der Programmierumgebung wird kein Fehler angezeigt.</a:t>
+            </a:r>
+          </a:p>
+          <a:p>
+            <a:r>
+              <a:rPr lang="de-DE" dirty="0"/>
+              <a:t>Beim Ausführen tritt aber ein Fehler auf.</a:t>
+            </a:r>
+          </a:p>
+          <a:p>
+            <a:endParaRPr lang="de-DE" dirty="0"/>
+          </a:p>
+        </p:txBody>
+      </p:sp>
+      <p:sp>
+        <p:nvSpPr>
+          <p:cNvPr id="4" name="Foliennummernplatzhalter 3"/>
+          <p:cNvSpPr>
+            <a:spLocks noGrp="1"/>
+          </p:cNvSpPr>
+          <p:nvPr>
+            <p:ph type="sldNum" sz="quarter" idx="5"/>
+          </p:nvPr>
+        </p:nvSpPr>
+        <p:spPr/>
+        <p:txBody>
+          <a:bodyPr/>
+          <a:lstStyle/>
+          <a:p>
+            <a:fld id="{927DBD90-B360-417B-B4B3-F05A4AFC1996}" type="slidenum">
+              <a:rPr lang="de-DE" smtClean="0"/>
+              <a:pPr/>
+              <a:t>36</a:t>
+            </a:fld>
+            <a:endParaRPr lang="de-DE"/>
+          </a:p>
+        </p:txBody>
+      </p:sp>
+    </p:spTree>
+    <p:extLst>
+      <p:ext uri="{BB962C8B-B14F-4D97-AF65-F5344CB8AC3E}">
+        <p14:creationId xmlns:p14="http://schemas.microsoft.com/office/powerpoint/2010/main" val="1117887279"/>
+      </p:ext>
+    </p:extLst>
+  </p:cSld>
+  <p:clrMapOvr>
+    <a:masterClrMapping/>
+  </p:clrMapOvr>
+</p:notes>
+</file>
+
+<file path=ppt/notesSlides/notesSlide27.xml><?xml version="1.0" encoding="utf-8"?>
+<p:notes xmlns:a="http://schemas.openxmlformats.org/drawingml/2006/main" xmlns:r="http://schemas.openxmlformats.org/officeDocument/2006/relationships" xmlns:p="http://schemas.openxmlformats.org/presentationml/2006/main">
+  <p:cSld>
+    <p:spTree>
+      <p:nvGrpSpPr>
+        <p:cNvPr id="1" name=""/>
+        <p:cNvGrpSpPr/>
+        <p:nvPr/>
+      </p:nvGrpSpPr>
+      <p:grpSpPr>
+        <a:xfrm>
+          <a:off x="0" y="0"/>
+          <a:ext cx="0" cy="0"/>
+          <a:chOff x="0" y="0"/>
+          <a:chExt cx="0" cy="0"/>
+        </a:xfrm>
+      </p:grpSpPr>
+      <p:sp>
+        <p:nvSpPr>
+          <p:cNvPr id="2" name="Folienbildplatzhalter 1"/>
+          <p:cNvSpPr>
+            <a:spLocks noGrp="1" noRot="1" noChangeAspect="1"/>
+          </p:cNvSpPr>
+          <p:nvPr>
+            <p:ph type="sldImg"/>
+          </p:nvPr>
+        </p:nvSpPr>
+        <p:spPr>
+          <a:xfrm>
+            <a:off x="685800" y="1143000"/>
+            <a:ext cx="4270375" cy="2401888"/>
+          </a:xfrm>
+        </p:spPr>
+      </p:sp>
+      <p:sp>
+        <p:nvSpPr>
+          <p:cNvPr id="3" name="Notizenplatzhalter 2"/>
+          <p:cNvSpPr>
+            <a:spLocks noGrp="1"/>
+          </p:cNvSpPr>
+          <p:nvPr>
+            <p:ph type="body" idx="1"/>
+          </p:nvPr>
+        </p:nvSpPr>
+        <p:spPr/>
+        <p:txBody>
+          <a:bodyPr/>
+          <a:lstStyle/>
+          <a:p>
+            <a:r>
+              <a:rPr lang="de-DE" dirty="0"/>
+              <a:t>Was gibt es für Datentypen?</a:t>
+            </a:r>
+          </a:p>
+          <a:p>
+            <a:r>
+              <a:rPr lang="de-DE" dirty="0" err="1"/>
+              <a:t>int</a:t>
+            </a:r>
+            <a:r>
+              <a:rPr lang="de-DE" dirty="0"/>
+              <a:t> für Ganzzahlen</a:t>
+            </a:r>
+          </a:p>
+          <a:p>
+            <a:r>
+              <a:rPr lang="de-DE" dirty="0"/>
+              <a:t>double für Kommazahlen</a:t>
+            </a:r>
+          </a:p>
+          <a:p>
+            <a:r>
+              <a:rPr lang="de-DE" dirty="0"/>
+              <a:t>String für Texte</a:t>
+            </a:r>
+          </a:p>
+        </p:txBody>
+      </p:sp>
+      <p:sp>
+        <p:nvSpPr>
+          <p:cNvPr id="4" name="Foliennummernplatzhalter 3"/>
+          <p:cNvSpPr>
+            <a:spLocks noGrp="1"/>
+          </p:cNvSpPr>
+          <p:nvPr>
+            <p:ph type="sldNum" sz="quarter" idx="5"/>
+          </p:nvPr>
+        </p:nvSpPr>
+        <p:spPr/>
+        <p:txBody>
+          <a:bodyPr/>
+          <a:lstStyle/>
+          <a:p>
+            <a:fld id="{927DBD90-B360-417B-B4B3-F05A4AFC1996}" type="slidenum">
+              <a:rPr lang="de-DE" smtClean="0"/>
+              <a:pPr/>
+              <a:t>37</a:t>
+            </a:fld>
+            <a:endParaRPr lang="de-DE"/>
+          </a:p>
+        </p:txBody>
+      </p:sp>
+    </p:spTree>
+    <p:extLst>
+      <p:ext uri="{BB962C8B-B14F-4D97-AF65-F5344CB8AC3E}">
+        <p14:creationId xmlns:p14="http://schemas.microsoft.com/office/powerpoint/2010/main" val="1610905615"/>
+      </p:ext>
+    </p:extLst>
+  </p:cSld>
+  <p:clrMapOvr>
+    <a:masterClrMapping/>
+  </p:clrMapOvr>
+</p:notes>
+</file>
+
+<file path=ppt/notesSlides/notesSlide28.xml><?xml version="1.0" encoding="utf-8"?>
+<p:notes xmlns:a="http://schemas.openxmlformats.org/drawingml/2006/main" xmlns:r="http://schemas.openxmlformats.org/officeDocument/2006/relationships" xmlns:p="http://schemas.openxmlformats.org/presentationml/2006/main">
+  <p:cSld>
+    <p:spTree>
+      <p:nvGrpSpPr>
+        <p:cNvPr id="1" name=""/>
+        <p:cNvGrpSpPr/>
+        <p:nvPr/>
+      </p:nvGrpSpPr>
+      <p:grpSpPr>
+        <a:xfrm>
+          <a:off x="0" y="0"/>
+          <a:ext cx="0" cy="0"/>
+          <a:chOff x="0" y="0"/>
+          <a:chExt cx="0" cy="0"/>
+        </a:xfrm>
+      </p:grpSpPr>
+      <p:sp>
+        <p:nvSpPr>
+          <p:cNvPr id="2" name="Folienbildplatzhalter 1"/>
+          <p:cNvSpPr>
+            <a:spLocks noGrp="1" noRot="1" noChangeAspect="1"/>
+          </p:cNvSpPr>
+          <p:nvPr>
+            <p:ph type="sldImg"/>
+          </p:nvPr>
+        </p:nvSpPr>
+        <p:spPr>
+          <a:xfrm>
+            <a:off x="685800" y="1143000"/>
+            <a:ext cx="4270375" cy="2401888"/>
+          </a:xfrm>
+        </p:spPr>
+      </p:sp>
+      <p:sp>
+        <p:nvSpPr>
+          <p:cNvPr id="3" name="Notizenplatzhalter 2"/>
+          <p:cNvSpPr>
+            <a:spLocks noGrp="1"/>
+          </p:cNvSpPr>
+          <p:nvPr>
+            <p:ph type="body" idx="1"/>
+          </p:nvPr>
+        </p:nvSpPr>
+        <p:spPr/>
+        <p:txBody>
+          <a:bodyPr/>
+          <a:lstStyle/>
+          <a:p>
+            <a:r>
+              <a:rPr lang="de-DE" dirty="0"/>
+              <a:t>Auch Funktionen haben wir schon benutzt, zum Beispiel </a:t>
+            </a:r>
+            <a:r>
+              <a:rPr lang="de-DE" dirty="0" err="1"/>
+              <a:t>math.pow</a:t>
+            </a:r>
+            <a:r>
+              <a:rPr lang="de-DE" dirty="0"/>
+              <a:t>().</a:t>
+            </a:r>
+          </a:p>
+        </p:txBody>
+      </p:sp>
+      <p:sp>
+        <p:nvSpPr>
+          <p:cNvPr id="4" name="Foliennummernplatzhalter 3"/>
+          <p:cNvSpPr>
+            <a:spLocks noGrp="1"/>
+          </p:cNvSpPr>
+          <p:nvPr>
+            <p:ph type="sldNum" sz="quarter" idx="5"/>
+          </p:nvPr>
+        </p:nvSpPr>
+        <p:spPr/>
+        <p:txBody>
+          <a:bodyPr/>
+          <a:lstStyle/>
+          <a:p>
+            <a:fld id="{927DBD90-B360-417B-B4B3-F05A4AFC1996}" type="slidenum">
+              <a:rPr lang="de-DE" smtClean="0"/>
+              <a:pPr/>
+              <a:t>38</a:t>
+            </a:fld>
+            <a:endParaRPr lang="de-DE"/>
+          </a:p>
+        </p:txBody>
+      </p:sp>
+    </p:spTree>
+    <p:extLst>
+      <p:ext uri="{BB962C8B-B14F-4D97-AF65-F5344CB8AC3E}">
+        <p14:creationId xmlns:p14="http://schemas.microsoft.com/office/powerpoint/2010/main" val="3960663427"/>
+      </p:ext>
+    </p:extLst>
+  </p:cSld>
+  <p:clrMapOvr>
+    <a:masterClrMapping/>
+  </p:clrMapOvr>
+</p:notes>
+</file>
+
+<file path=ppt/notesSlides/notesSlide29.xml><?xml version="1.0" encoding="utf-8"?>
+<p:notes xmlns:a="http://schemas.openxmlformats.org/drawingml/2006/main" xmlns:r="http://schemas.openxmlformats.org/officeDocument/2006/relationships" xmlns:p="http://schemas.openxmlformats.org/presentationml/2006/main">
+  <p:cSld>
+    <p:spTree>
+      <p:nvGrpSpPr>
+        <p:cNvPr id="1" name=""/>
+        <p:cNvGrpSpPr/>
+        <p:nvPr/>
+      </p:nvGrpSpPr>
+      <p:grpSpPr>
+        <a:xfrm>
+          <a:off x="0" y="0"/>
+          <a:ext cx="0" cy="0"/>
+          <a:chOff x="0" y="0"/>
+          <a:chExt cx="0" cy="0"/>
+        </a:xfrm>
+      </p:grpSpPr>
+      <p:sp>
+        <p:nvSpPr>
+          <p:cNvPr id="2" name="Folienbildplatzhalter 1"/>
+          <p:cNvSpPr>
+            <a:spLocks noGrp="1" noRot="1" noChangeAspect="1"/>
+          </p:cNvSpPr>
+          <p:nvPr>
+            <p:ph type="sldImg"/>
+          </p:nvPr>
+        </p:nvSpPr>
+        <p:spPr>
+          <a:xfrm>
+            <a:off x="685800" y="1143000"/>
+            <a:ext cx="4270375" cy="2401888"/>
+          </a:xfrm>
+        </p:spPr>
+      </p:sp>
+      <p:sp>
+        <p:nvSpPr>
+          <p:cNvPr id="3" name="Notizenplatzhalter 2"/>
+          <p:cNvSpPr>
+            <a:spLocks noGrp="1"/>
+          </p:cNvSpPr>
+          <p:nvPr>
+            <p:ph type="body" idx="1"/>
+          </p:nvPr>
+        </p:nvSpPr>
+        <p:spPr/>
+        <p:txBody>
+          <a:bodyPr/>
+          <a:lstStyle/>
+          <a:p>
+            <a:endParaRPr lang="de-DE" dirty="0"/>
+          </a:p>
+        </p:txBody>
+      </p:sp>
+      <p:sp>
+        <p:nvSpPr>
+          <p:cNvPr id="4" name="Foliennummernplatzhalter 3"/>
+          <p:cNvSpPr>
+            <a:spLocks noGrp="1"/>
+          </p:cNvSpPr>
+          <p:nvPr>
+            <p:ph type="sldNum" sz="quarter" idx="5"/>
+          </p:nvPr>
+        </p:nvSpPr>
+        <p:spPr/>
+        <p:txBody>
+          <a:bodyPr/>
+          <a:lstStyle/>
+          <a:p>
+            <a:fld id="{927DBD90-B360-417B-B4B3-F05A4AFC1996}" type="slidenum">
+              <a:rPr lang="de-DE" smtClean="0"/>
+              <a:pPr/>
+              <a:t>39</a:t>
+            </a:fld>
+            <a:endParaRPr lang="de-DE"/>
+          </a:p>
+        </p:txBody>
+      </p:sp>
+    </p:spTree>
+    <p:extLst>
+      <p:ext uri="{BB962C8B-B14F-4D97-AF65-F5344CB8AC3E}">
+        <p14:creationId xmlns:p14="http://schemas.microsoft.com/office/powerpoint/2010/main" val="540679312"/>
+      </p:ext>
+    </p:extLst>
+  </p:cSld>
+  <p:clrMapOvr>
+    <a:masterClrMapping/>
+  </p:clrMapOvr>
+</p:notes>
+</file>
+
 <file path=ppt/notesSlides/notesSlide3.xml><?xml version="1.0" encoding="utf-8"?>
 <p:notes xmlns:a="http://schemas.openxmlformats.org/drawingml/2006/main" xmlns:r="http://schemas.openxmlformats.org/officeDocument/2006/relationships" xmlns:p="http://schemas.openxmlformats.org/presentationml/2006/main">
   <p:cSld>
@@ -3082,6 +3777,163 @@
     <p:extLst>
       <p:ext uri="{BB962C8B-B14F-4D97-AF65-F5344CB8AC3E}">
         <p14:creationId xmlns:p14="http://schemas.microsoft.com/office/powerpoint/2010/main" val="1847169918"/>
+      </p:ext>
+    </p:extLst>
+  </p:cSld>
+  <p:clrMapOvr>
+    <a:masterClrMapping/>
+  </p:clrMapOvr>
+</p:notes>
+</file>
+
+<file path=ppt/notesSlides/notesSlide30.xml><?xml version="1.0" encoding="utf-8"?>
+<p:notes xmlns:a="http://schemas.openxmlformats.org/drawingml/2006/main" xmlns:r="http://schemas.openxmlformats.org/officeDocument/2006/relationships" xmlns:p="http://schemas.openxmlformats.org/presentationml/2006/main">
+  <p:cSld>
+    <p:spTree>
+      <p:nvGrpSpPr>
+        <p:cNvPr id="1" name=""/>
+        <p:cNvGrpSpPr/>
+        <p:nvPr/>
+      </p:nvGrpSpPr>
+      <p:grpSpPr>
+        <a:xfrm>
+          <a:off x="0" y="0"/>
+          <a:ext cx="0" cy="0"/>
+          <a:chOff x="0" y="0"/>
+          <a:chExt cx="0" cy="0"/>
+        </a:xfrm>
+      </p:grpSpPr>
+      <p:sp>
+        <p:nvSpPr>
+          <p:cNvPr id="2" name="Folienbildplatzhalter 1"/>
+          <p:cNvSpPr>
+            <a:spLocks noGrp="1" noRot="1" noChangeAspect="1"/>
+          </p:cNvSpPr>
+          <p:nvPr>
+            <p:ph type="sldImg"/>
+          </p:nvPr>
+        </p:nvSpPr>
+        <p:spPr>
+          <a:xfrm>
+            <a:off x="685800" y="1143000"/>
+            <a:ext cx="4270375" cy="2401888"/>
+          </a:xfrm>
+        </p:spPr>
+      </p:sp>
+      <p:sp>
+        <p:nvSpPr>
+          <p:cNvPr id="3" name="Notizenplatzhalter 2"/>
+          <p:cNvSpPr>
+            <a:spLocks noGrp="1"/>
+          </p:cNvSpPr>
+          <p:nvPr>
+            <p:ph type="body" idx="1"/>
+          </p:nvPr>
+        </p:nvSpPr>
+        <p:spPr/>
+        <p:txBody>
+          <a:bodyPr/>
+          <a:lstStyle/>
+          <a:p>
+            <a:r>
+              <a:rPr lang="de-DE" dirty="0"/>
+              <a:t>Das neutrale Element (https://de.wikipedia.org/wiki/Neutrales_Element) (</a:t>
+            </a:r>
+            <a:r>
+              <a:rPr lang="de-DE" dirty="0" err="1"/>
+              <a:t>engl</a:t>
+            </a:r>
+            <a:r>
+              <a:rPr lang="de-DE" dirty="0"/>
+              <a:t>: </a:t>
+            </a:r>
+            <a:r>
+              <a:rPr lang="de-DE" dirty="0" err="1"/>
+              <a:t>identity</a:t>
+            </a:r>
+            <a:r>
+              <a:rPr lang="de-DE" dirty="0"/>
+              <a:t> </a:t>
+            </a:r>
+            <a:r>
+              <a:rPr lang="de-DE" dirty="0" err="1"/>
+              <a:t>element</a:t>
+            </a:r>
+            <a:r>
+              <a:rPr lang="de-DE" dirty="0"/>
+              <a:t>) für die Minimum-Funktion ist +∞.</a:t>
+            </a:r>
+          </a:p>
+          <a:p>
+            <a:r>
+              <a:rPr lang="de-DE" dirty="0"/>
+              <a:t>+∞ gibt es beim Datentyp </a:t>
+            </a:r>
+            <a:r>
+              <a:rPr lang="de-DE" dirty="0" err="1"/>
+              <a:t>int</a:t>
+            </a:r>
+            <a:r>
+              <a:rPr lang="de-DE" dirty="0"/>
+              <a:t> nicht. Es gibt in Dart wohl auch keine Konstante, die den Maximalwert definiert.</a:t>
+            </a:r>
+          </a:p>
+          <a:p>
+            <a:r>
+              <a:rPr lang="de-DE" dirty="0" err="1"/>
+              <a:t>const</a:t>
+            </a:r>
+            <a:r>
+              <a:rPr lang="de-DE" dirty="0"/>
+              <a:t> </a:t>
+            </a:r>
+            <a:r>
+              <a:rPr lang="de-DE" dirty="0" err="1"/>
+              <a:t>int</a:t>
+            </a:r>
+            <a:r>
+              <a:rPr lang="de-DE" dirty="0"/>
+              <a:t> </a:t>
+            </a:r>
+            <a:r>
+              <a:rPr lang="de-DE" dirty="0" err="1"/>
+              <a:t>intMaxValue</a:t>
+            </a:r>
+            <a:r>
+              <a:rPr lang="de-DE" dirty="0"/>
+              <a:t> = 9007199254740991; https://stackoverflow.com/a/60358200/480982 </a:t>
+            </a:r>
+          </a:p>
+        </p:txBody>
+      </p:sp>
+      <p:sp>
+        <p:nvSpPr>
+          <p:cNvPr id="4" name="Foliennummernplatzhalter 3"/>
+          <p:cNvSpPr>
+            <a:spLocks noGrp="1"/>
+          </p:cNvSpPr>
+          <p:nvPr>
+            <p:ph type="sldNum" sz="quarter" idx="5"/>
+          </p:nvPr>
+        </p:nvSpPr>
+        <p:spPr/>
+        <p:txBody>
+          <a:bodyPr/>
+          <a:lstStyle/>
+          <a:p>
+            <a:fld id="{927DBD90-B360-417B-B4B3-F05A4AFC1996}" type="slidenum">
+              <a:rPr lang="de-DE" smtClean="0"/>
+              <a:pPr/>
+              <a:t>40</a:t>
+            </a:fld>
+            <a:endParaRPr lang="de-DE"/>
+          </a:p>
+        </p:txBody>
+      </p:sp>
+    </p:spTree>
+    <p:extLst>
+      <p:ext uri="{BB962C8B-B14F-4D97-AF65-F5344CB8AC3E}">
+        <p14:creationId xmlns:p14="http://schemas.microsoft.com/office/powerpoint/2010/main" val="3080275828"/>
       </p:ext>
     </p:extLst>
   </p:cSld>
@@ -14925,6 +15777,2556 @@
 </p:sld>
 </file>
 
+<file path=ppt/slides/slide33.xml><?xml version="1.0" encoding="utf-8"?>
+<p:sld xmlns:a="http://schemas.openxmlformats.org/drawingml/2006/main" xmlns:r="http://schemas.openxmlformats.org/officeDocument/2006/relationships" xmlns:p="http://schemas.openxmlformats.org/presentationml/2006/main">
+  <p:cSld>
+    <p:spTree>
+      <p:nvGrpSpPr>
+        <p:cNvPr id="1" name=""/>
+        <p:cNvGrpSpPr/>
+        <p:nvPr/>
+      </p:nvGrpSpPr>
+      <p:grpSpPr>
+        <a:xfrm>
+          <a:off x="0" y="0"/>
+          <a:ext cx="0" cy="0"/>
+          <a:chOff x="0" y="0"/>
+          <a:chExt cx="0" cy="0"/>
+        </a:xfrm>
+      </p:grpSpPr>
+      <p:sp>
+        <p:nvSpPr>
+          <p:cNvPr id="2" name="Titel 1">
+            <a:extLst>
+              <a:ext uri="{FF2B5EF4-FFF2-40B4-BE49-F238E27FC236}">
+                <a16:creationId xmlns:a16="http://schemas.microsoft.com/office/drawing/2014/main" id="{6E17C20D-DCC9-4EBA-9E5B-8A9E0D8011CB}"/>
+              </a:ext>
+            </a:extLst>
+          </p:cNvPr>
+          <p:cNvSpPr>
+            <a:spLocks noGrp="1"/>
+          </p:cNvSpPr>
+          <p:nvPr>
+            <p:ph type="title"/>
+          </p:nvPr>
+        </p:nvSpPr>
+        <p:spPr/>
+        <p:txBody>
+          <a:bodyPr/>
+          <a:lstStyle/>
+          <a:p>
+            <a:r>
+              <a:rPr lang="de-DE" dirty="0"/>
+              <a:t>Dart  - </a:t>
+            </a:r>
+            <a:r>
+              <a:rPr lang="de-DE" dirty="0" err="1"/>
+              <a:t>Map</a:t>
+            </a:r>
+            <a:endParaRPr lang="de-DE" dirty="0"/>
+          </a:p>
+        </p:txBody>
+      </p:sp>
+      <p:sp>
+        <p:nvSpPr>
+          <p:cNvPr id="3" name="Inhaltsplatzhalter 2">
+            <a:extLst>
+              <a:ext uri="{FF2B5EF4-FFF2-40B4-BE49-F238E27FC236}">
+                <a16:creationId xmlns:a16="http://schemas.microsoft.com/office/drawing/2014/main" id="{3EFDDC73-27A8-47DF-AF26-77B387595E28}"/>
+              </a:ext>
+            </a:extLst>
+          </p:cNvPr>
+          <p:cNvSpPr>
+            <a:spLocks noGrp="1"/>
+          </p:cNvSpPr>
+          <p:nvPr>
+            <p:ph idx="1"/>
+          </p:nvPr>
+        </p:nvSpPr>
+        <p:spPr/>
+        <p:txBody>
+          <a:bodyPr/>
+          <a:lstStyle/>
+          <a:p>
+            <a:r>
+              <a:rPr lang="de-DE" dirty="0" err="1"/>
+              <a:t>Map</a:t>
+            </a:r>
+            <a:r>
+              <a:rPr lang="de-DE" dirty="0"/>
+              <a:t>: Abbildung</a:t>
+            </a:r>
+          </a:p>
+          <a:p>
+            <a:r>
+              <a:rPr lang="de-DE" dirty="0"/>
+              <a:t>Abbildung von einem Wert (Key) auf einen anderen (Value)</a:t>
+            </a:r>
+            <a:br>
+              <a:rPr lang="de-DE" dirty="0"/>
+            </a:br>
+            <a:r>
+              <a:rPr lang="de-DE" sz="2800" b="1" dirty="0" err="1">
+                <a:solidFill>
+                  <a:schemeClr val="accent1">
+                    <a:lumMod val="75000"/>
+                  </a:schemeClr>
+                </a:solidFill>
+              </a:rPr>
+              <a:t>var</a:t>
+            </a:r>
+            <a:r>
+              <a:rPr lang="de-DE" sz="2800" b="1" dirty="0">
+                <a:solidFill>
+                  <a:schemeClr val="accent1">
+                    <a:lumMod val="75000"/>
+                  </a:schemeClr>
+                </a:solidFill>
+              </a:rPr>
+              <a:t> </a:t>
+            </a:r>
+            <a:r>
+              <a:rPr lang="de-DE" sz="2800" b="1" i="1" dirty="0" err="1">
+                <a:solidFill>
+                  <a:schemeClr val="tx2"/>
+                </a:solidFill>
+              </a:rPr>
+              <a:t>name</a:t>
+            </a:r>
+            <a:r>
+              <a:rPr lang="de-DE" sz="2800" b="1" i="1" dirty="0">
+                <a:solidFill>
+                  <a:schemeClr val="tx2"/>
+                </a:solidFill>
+              </a:rPr>
+              <a:t> </a:t>
+            </a:r>
+            <a:r>
+              <a:rPr lang="de-DE" b="1" dirty="0">
+                <a:solidFill>
+                  <a:schemeClr val="accent1">
+                    <a:lumMod val="75000"/>
+                  </a:schemeClr>
+                </a:solidFill>
+              </a:rPr>
+              <a:t>= </a:t>
+            </a:r>
+            <a:r>
+              <a:rPr lang="de-DE" sz="2800" b="1" dirty="0">
+                <a:solidFill>
+                  <a:schemeClr val="accent1">
+                    <a:lumMod val="75000"/>
+                  </a:schemeClr>
+                </a:solidFill>
+              </a:rPr>
+              <a:t>{</a:t>
+            </a:r>
+            <a:r>
+              <a:rPr lang="de-DE" dirty="0"/>
+              <a:t> </a:t>
+            </a:r>
+            <a:r>
+              <a:rPr lang="de-DE" sz="2800" b="1" i="1" dirty="0" err="1">
+                <a:solidFill>
+                  <a:schemeClr val="tx2"/>
+                </a:solidFill>
+              </a:rPr>
+              <a:t>key</a:t>
+            </a:r>
+            <a:r>
+              <a:rPr lang="de-DE" sz="2800" b="1" dirty="0" err="1">
+                <a:solidFill>
+                  <a:schemeClr val="accent1">
+                    <a:lumMod val="75000"/>
+                  </a:schemeClr>
+                </a:solidFill>
+              </a:rPr>
+              <a:t>:</a:t>
+            </a:r>
+            <a:r>
+              <a:rPr lang="de-DE" sz="2800" b="1" i="1" dirty="0" err="1">
+                <a:solidFill>
+                  <a:schemeClr val="tx2"/>
+                </a:solidFill>
+              </a:rPr>
+              <a:t>value</a:t>
+            </a:r>
+            <a:r>
+              <a:rPr lang="de-DE" sz="2800" b="1" dirty="0">
+                <a:solidFill>
+                  <a:schemeClr val="accent1">
+                    <a:lumMod val="75000"/>
+                  </a:schemeClr>
+                </a:solidFill>
+              </a:rPr>
+              <a:t>, </a:t>
+            </a:r>
+            <a:r>
+              <a:rPr lang="de-DE" dirty="0"/>
+              <a:t>…</a:t>
+            </a:r>
+            <a:r>
+              <a:rPr lang="de-DE" sz="2800" b="1" i="1" dirty="0">
+                <a:solidFill>
+                  <a:schemeClr val="tx2"/>
+                </a:solidFill>
+              </a:rPr>
+              <a:t> </a:t>
+            </a:r>
+            <a:r>
+              <a:rPr lang="de-DE" sz="2800" b="1" dirty="0">
+                <a:solidFill>
+                  <a:schemeClr val="accent1">
+                    <a:lumMod val="75000"/>
+                  </a:schemeClr>
+                </a:solidFill>
+              </a:rPr>
+              <a:t>};</a:t>
+            </a:r>
+          </a:p>
+          <a:p>
+            <a:r>
+              <a:rPr lang="de-DE" dirty="0"/>
+              <a:t>Zugriff über den Key in Klammern:</a:t>
+            </a:r>
+            <a:br>
+              <a:rPr lang="de-DE" b="1" dirty="0">
+                <a:solidFill>
+                  <a:schemeClr val="accent1">
+                    <a:lumMod val="75000"/>
+                  </a:schemeClr>
+                </a:solidFill>
+              </a:rPr>
+            </a:br>
+            <a:r>
+              <a:rPr lang="de-DE" b="1" dirty="0" err="1">
+                <a:solidFill>
+                  <a:schemeClr val="accent1">
+                    <a:lumMod val="75000"/>
+                  </a:schemeClr>
+                </a:solidFill>
+              </a:rPr>
+              <a:t>var</a:t>
+            </a:r>
+            <a:r>
+              <a:rPr lang="de-DE" b="1" dirty="0">
+                <a:solidFill>
+                  <a:schemeClr val="accent1">
+                    <a:lumMod val="75000"/>
+                  </a:schemeClr>
+                </a:solidFill>
+              </a:rPr>
+              <a:t> </a:t>
+            </a:r>
+            <a:r>
+              <a:rPr lang="de-DE" b="1" i="1" dirty="0" err="1">
+                <a:solidFill>
+                  <a:schemeClr val="tx2"/>
+                </a:solidFill>
+              </a:rPr>
+              <a:t>value</a:t>
+            </a:r>
+            <a:r>
+              <a:rPr lang="de-DE" b="1" dirty="0">
+                <a:solidFill>
+                  <a:schemeClr val="accent1">
+                    <a:lumMod val="75000"/>
+                  </a:schemeClr>
+                </a:solidFill>
+              </a:rPr>
+              <a:t> = </a:t>
+            </a:r>
+            <a:r>
+              <a:rPr lang="de-DE" b="1" i="1" dirty="0" err="1">
+                <a:solidFill>
+                  <a:schemeClr val="tx2"/>
+                </a:solidFill>
+              </a:rPr>
+              <a:t>name</a:t>
+            </a:r>
+            <a:r>
+              <a:rPr lang="de-DE" b="1" dirty="0">
+                <a:solidFill>
+                  <a:schemeClr val="accent1">
+                    <a:lumMod val="75000"/>
+                  </a:schemeClr>
+                </a:solidFill>
+              </a:rPr>
+              <a:t>[</a:t>
+            </a:r>
+            <a:r>
+              <a:rPr lang="de-DE" b="1" i="1" dirty="0" err="1">
+                <a:solidFill>
+                  <a:schemeClr val="tx2"/>
+                </a:solidFill>
+              </a:rPr>
+              <a:t>key</a:t>
+            </a:r>
+            <a:r>
+              <a:rPr lang="de-DE" b="1" dirty="0">
+                <a:solidFill>
+                  <a:schemeClr val="accent1">
+                    <a:lumMod val="75000"/>
+                  </a:schemeClr>
+                </a:solidFill>
+              </a:rPr>
+              <a:t>];</a:t>
+            </a:r>
+          </a:p>
+          <a:p>
+            <a:endParaRPr lang="de-DE" dirty="0"/>
+          </a:p>
+        </p:txBody>
+      </p:sp>
+      <p:sp>
+        <p:nvSpPr>
+          <p:cNvPr id="4" name="Datumsplatzhalter 3">
+            <a:extLst>
+              <a:ext uri="{FF2B5EF4-FFF2-40B4-BE49-F238E27FC236}">
+                <a16:creationId xmlns:a16="http://schemas.microsoft.com/office/drawing/2014/main" id="{77BC02E2-AF6E-45EA-A03A-22FA826A4F10}"/>
+              </a:ext>
+            </a:extLst>
+          </p:cNvPr>
+          <p:cNvSpPr>
+            <a:spLocks noGrp="1"/>
+          </p:cNvSpPr>
+          <p:nvPr>
+            <p:ph type="dt" sz="half" idx="10"/>
+          </p:nvPr>
+        </p:nvSpPr>
+        <p:spPr/>
+        <p:txBody>
+          <a:bodyPr/>
+          <a:lstStyle/>
+          <a:p>
+            <a:fld id="{B8ECF4B1-F230-4767-9D40-08A350DFB7D7}" type="datetime1">
+              <a:rPr lang="de-DE" smtClean="0"/>
+              <a:t>31.01.2023</a:t>
+            </a:fld>
+            <a:endParaRPr lang="de-DE"/>
+          </a:p>
+        </p:txBody>
+      </p:sp>
+      <p:sp>
+        <p:nvSpPr>
+          <p:cNvPr id="5" name="Fußzeilenplatzhalter 4">
+            <a:extLst>
+              <a:ext uri="{FF2B5EF4-FFF2-40B4-BE49-F238E27FC236}">
+                <a16:creationId xmlns:a16="http://schemas.microsoft.com/office/drawing/2014/main" id="{0149F47C-0698-483A-AC11-719D6FEC8771}"/>
+              </a:ext>
+            </a:extLst>
+          </p:cNvPr>
+          <p:cNvSpPr>
+            <a:spLocks noGrp="1"/>
+          </p:cNvSpPr>
+          <p:nvPr>
+            <p:ph type="ftr" sz="quarter" idx="11"/>
+          </p:nvPr>
+        </p:nvSpPr>
+        <p:spPr/>
+        <p:txBody>
+          <a:bodyPr/>
+          <a:lstStyle/>
+          <a:p>
+            <a:r>
+              <a:rPr lang="de-DE"/>
+              <a:t>Dart - Programmiersprache für Smartphones</a:t>
+            </a:r>
+          </a:p>
+        </p:txBody>
+      </p:sp>
+      <p:sp>
+        <p:nvSpPr>
+          <p:cNvPr id="6" name="Foliennummernplatzhalter 5">
+            <a:extLst>
+              <a:ext uri="{FF2B5EF4-FFF2-40B4-BE49-F238E27FC236}">
+                <a16:creationId xmlns:a16="http://schemas.microsoft.com/office/drawing/2014/main" id="{B4CB0FD5-65D6-4ACF-97CF-5F94F6860047}"/>
+              </a:ext>
+            </a:extLst>
+          </p:cNvPr>
+          <p:cNvSpPr>
+            <a:spLocks noGrp="1"/>
+          </p:cNvSpPr>
+          <p:nvPr>
+            <p:ph type="sldNum" sz="quarter" idx="12"/>
+          </p:nvPr>
+        </p:nvSpPr>
+        <p:spPr/>
+        <p:txBody>
+          <a:bodyPr/>
+          <a:lstStyle/>
+          <a:p>
+            <a:fld id="{3A1F27E2-D58A-4028-9FF2-B12D897F257E}" type="slidenum">
+              <a:rPr lang="de-DE" smtClean="0"/>
+              <a:t>33</a:t>
+            </a:fld>
+            <a:endParaRPr lang="de-DE"/>
+          </a:p>
+        </p:txBody>
+      </p:sp>
+      <p:pic>
+        <p:nvPicPr>
+          <p:cNvPr id="8" name="Grafik 7">
+            <a:extLst>
+              <a:ext uri="{FF2B5EF4-FFF2-40B4-BE49-F238E27FC236}">
+                <a16:creationId xmlns:a16="http://schemas.microsoft.com/office/drawing/2014/main" id="{A004331E-FDB3-4CA0-8FAF-B3CEB34C83C6}"/>
+              </a:ext>
+            </a:extLst>
+          </p:cNvPr>
+          <p:cNvPicPr>
+            <a:picLocks noChangeAspect="1"/>
+          </p:cNvPicPr>
+          <p:nvPr/>
+        </p:nvPicPr>
+        <p:blipFill>
+          <a:blip r:embed="rId3"/>
+          <a:stretch>
+            <a:fillRect/>
+          </a:stretch>
+        </p:blipFill>
+        <p:spPr>
+          <a:xfrm>
+            <a:off x="1111617" y="3927888"/>
+            <a:ext cx="8072100" cy="2237962"/>
+          </a:xfrm>
+          <a:prstGeom prst="rect">
+            <a:avLst/>
+          </a:prstGeom>
+        </p:spPr>
+      </p:pic>
+    </p:spTree>
+    <p:extLst>
+      <p:ext uri="{BB962C8B-B14F-4D97-AF65-F5344CB8AC3E}">
+        <p14:creationId xmlns:p14="http://schemas.microsoft.com/office/powerpoint/2010/main" val="3504939260"/>
+      </p:ext>
+    </p:extLst>
+  </p:cSld>
+  <p:clrMapOvr>
+    <a:masterClrMapping/>
+  </p:clrMapOvr>
+</p:sld>
+</file>
+
+<file path=ppt/slides/slide34.xml><?xml version="1.0" encoding="utf-8"?>
+<p:sld xmlns:a="http://schemas.openxmlformats.org/drawingml/2006/main" xmlns:r="http://schemas.openxmlformats.org/officeDocument/2006/relationships" xmlns:p="http://schemas.openxmlformats.org/presentationml/2006/main">
+  <p:cSld>
+    <p:spTree>
+      <p:nvGrpSpPr>
+        <p:cNvPr id="1" name=""/>
+        <p:cNvGrpSpPr/>
+        <p:nvPr/>
+      </p:nvGrpSpPr>
+      <p:grpSpPr>
+        <a:xfrm>
+          <a:off x="0" y="0"/>
+          <a:ext cx="0" cy="0"/>
+          <a:chOff x="0" y="0"/>
+          <a:chExt cx="0" cy="0"/>
+        </a:xfrm>
+      </p:grpSpPr>
+      <p:sp>
+        <p:nvSpPr>
+          <p:cNvPr id="2" name="Titel 1">
+            <a:extLst>
+              <a:ext uri="{FF2B5EF4-FFF2-40B4-BE49-F238E27FC236}">
+                <a16:creationId xmlns:a16="http://schemas.microsoft.com/office/drawing/2014/main" id="{45B166F4-74A7-4CA7-A83A-F12867F02086}"/>
+              </a:ext>
+            </a:extLst>
+          </p:cNvPr>
+          <p:cNvSpPr>
+            <a:spLocks noGrp="1"/>
+          </p:cNvSpPr>
+          <p:nvPr>
+            <p:ph type="title"/>
+          </p:nvPr>
+        </p:nvSpPr>
+        <p:spPr/>
+        <p:txBody>
+          <a:bodyPr/>
+          <a:lstStyle/>
+          <a:p>
+            <a:r>
+              <a:rPr lang="de-DE" dirty="0"/>
+              <a:t>Dart  - </a:t>
+            </a:r>
+            <a:r>
+              <a:rPr lang="de-DE" dirty="0" err="1"/>
+              <a:t>Map</a:t>
+            </a:r>
+            <a:endParaRPr lang="de-DE" dirty="0"/>
+          </a:p>
+        </p:txBody>
+      </p:sp>
+      <p:sp>
+        <p:nvSpPr>
+          <p:cNvPr id="3" name="Inhaltsplatzhalter 2">
+            <a:extLst>
+              <a:ext uri="{FF2B5EF4-FFF2-40B4-BE49-F238E27FC236}">
+                <a16:creationId xmlns:a16="http://schemas.microsoft.com/office/drawing/2014/main" id="{95512C55-3F6A-49B4-8E85-5BA03B371D49}"/>
+              </a:ext>
+            </a:extLst>
+          </p:cNvPr>
+          <p:cNvSpPr>
+            <a:spLocks noGrp="1"/>
+          </p:cNvSpPr>
+          <p:nvPr>
+            <p:ph idx="1"/>
+          </p:nvPr>
+        </p:nvSpPr>
+        <p:spPr/>
+        <p:txBody>
+          <a:bodyPr/>
+          <a:lstStyle/>
+          <a:p>
+            <a:r>
+              <a:rPr lang="de-DE" dirty="0"/>
+              <a:t>Schleife für eine </a:t>
+            </a:r>
+            <a:r>
+              <a:rPr lang="de-DE" dirty="0" err="1"/>
+              <a:t>Map</a:t>
+            </a:r>
+            <a:r>
+              <a:rPr lang="de-DE" dirty="0"/>
+              <a:t>:</a:t>
+            </a:r>
+            <a:br>
+              <a:rPr lang="de-DE" dirty="0"/>
+            </a:br>
+            <a:r>
+              <a:rPr lang="de-DE" b="1" dirty="0" err="1">
+                <a:solidFill>
+                  <a:schemeClr val="accent1">
+                    <a:lumMod val="75000"/>
+                  </a:schemeClr>
+                </a:solidFill>
+              </a:rPr>
+              <a:t>for</a:t>
+            </a:r>
+            <a:r>
+              <a:rPr lang="de-DE" b="1" dirty="0">
+                <a:solidFill>
+                  <a:schemeClr val="accent1">
+                    <a:lumMod val="75000"/>
+                  </a:schemeClr>
+                </a:solidFill>
+              </a:rPr>
+              <a:t> (</a:t>
+            </a:r>
+            <a:r>
+              <a:rPr lang="de-DE" b="1" dirty="0" err="1">
+                <a:solidFill>
+                  <a:schemeClr val="accent1">
+                    <a:lumMod val="75000"/>
+                  </a:schemeClr>
+                </a:solidFill>
+              </a:rPr>
+              <a:t>var</a:t>
+            </a:r>
+            <a:r>
+              <a:rPr lang="de-DE" b="1" dirty="0">
+                <a:solidFill>
+                  <a:schemeClr val="accent1">
+                    <a:lumMod val="75000"/>
+                  </a:schemeClr>
+                </a:solidFill>
+              </a:rPr>
+              <a:t> </a:t>
+            </a:r>
+            <a:r>
+              <a:rPr lang="de-DE" b="1" i="1" dirty="0">
+                <a:solidFill>
+                  <a:schemeClr val="tx2"/>
+                </a:solidFill>
+              </a:rPr>
+              <a:t>pair</a:t>
+            </a:r>
+            <a:r>
+              <a:rPr lang="de-DE" b="1" dirty="0">
+                <a:solidFill>
+                  <a:schemeClr val="accent1">
+                    <a:lumMod val="75000"/>
+                  </a:schemeClr>
+                </a:solidFill>
+              </a:rPr>
+              <a:t> in </a:t>
+            </a:r>
+            <a:r>
+              <a:rPr lang="de-DE" b="1" i="1" dirty="0" err="1">
+                <a:solidFill>
+                  <a:schemeClr val="tx2"/>
+                </a:solidFill>
+              </a:rPr>
+              <a:t>map</a:t>
+            </a:r>
+            <a:r>
+              <a:rPr lang="de-DE" b="1" dirty="0" err="1">
+                <a:solidFill>
+                  <a:schemeClr val="accent1">
+                    <a:lumMod val="75000"/>
+                  </a:schemeClr>
+                </a:solidFill>
+              </a:rPr>
+              <a:t>.entries</a:t>
+            </a:r>
+            <a:r>
+              <a:rPr lang="de-DE" b="1" dirty="0">
+                <a:solidFill>
+                  <a:schemeClr val="accent1">
+                    <a:lumMod val="75000"/>
+                  </a:schemeClr>
+                </a:solidFill>
+              </a:rPr>
+              <a:t>) {</a:t>
+            </a:r>
+            <a:br>
+              <a:rPr lang="de-DE" b="1" dirty="0">
+                <a:solidFill>
+                  <a:schemeClr val="accent1">
+                    <a:lumMod val="75000"/>
+                  </a:schemeClr>
+                </a:solidFill>
+              </a:rPr>
+            </a:br>
+            <a:r>
+              <a:rPr lang="de-DE" dirty="0"/>
+              <a:t>…</a:t>
+            </a:r>
+            <a:br>
+              <a:rPr lang="de-DE" b="1" dirty="0">
+                <a:solidFill>
+                  <a:schemeClr val="accent1">
+                    <a:lumMod val="75000"/>
+                  </a:schemeClr>
+                </a:solidFill>
+              </a:rPr>
+            </a:br>
+            <a:r>
+              <a:rPr lang="de-DE" b="1" dirty="0">
+                <a:solidFill>
+                  <a:schemeClr val="accent1">
+                    <a:lumMod val="75000"/>
+                  </a:schemeClr>
+                </a:solidFill>
+              </a:rPr>
+              <a:t>}</a:t>
+            </a:r>
+          </a:p>
+        </p:txBody>
+      </p:sp>
+      <p:sp>
+        <p:nvSpPr>
+          <p:cNvPr id="4" name="Datumsplatzhalter 3">
+            <a:extLst>
+              <a:ext uri="{FF2B5EF4-FFF2-40B4-BE49-F238E27FC236}">
+                <a16:creationId xmlns:a16="http://schemas.microsoft.com/office/drawing/2014/main" id="{90A40058-7BFC-4790-A80F-46D8CBA1132A}"/>
+              </a:ext>
+            </a:extLst>
+          </p:cNvPr>
+          <p:cNvSpPr>
+            <a:spLocks noGrp="1"/>
+          </p:cNvSpPr>
+          <p:nvPr>
+            <p:ph type="dt" sz="half" idx="10"/>
+          </p:nvPr>
+        </p:nvSpPr>
+        <p:spPr/>
+        <p:txBody>
+          <a:bodyPr/>
+          <a:lstStyle/>
+          <a:p>
+            <a:fld id="{DFEB386C-A89C-4E71-8C7A-EB57A1CCB74F}" type="datetime1">
+              <a:rPr lang="de-DE" smtClean="0"/>
+              <a:t>31.01.2023</a:t>
+            </a:fld>
+            <a:endParaRPr lang="de-DE"/>
+          </a:p>
+        </p:txBody>
+      </p:sp>
+      <p:sp>
+        <p:nvSpPr>
+          <p:cNvPr id="5" name="Fußzeilenplatzhalter 4">
+            <a:extLst>
+              <a:ext uri="{FF2B5EF4-FFF2-40B4-BE49-F238E27FC236}">
+                <a16:creationId xmlns:a16="http://schemas.microsoft.com/office/drawing/2014/main" id="{FDECD55C-BBB5-4615-A795-EF795C54CA07}"/>
+              </a:ext>
+            </a:extLst>
+          </p:cNvPr>
+          <p:cNvSpPr>
+            <a:spLocks noGrp="1"/>
+          </p:cNvSpPr>
+          <p:nvPr>
+            <p:ph type="ftr" sz="quarter" idx="11"/>
+          </p:nvPr>
+        </p:nvSpPr>
+        <p:spPr/>
+        <p:txBody>
+          <a:bodyPr/>
+          <a:lstStyle/>
+          <a:p>
+            <a:r>
+              <a:rPr lang="de-DE"/>
+              <a:t>Dart - Programmiersprache für Smartphones</a:t>
+            </a:r>
+          </a:p>
+        </p:txBody>
+      </p:sp>
+      <p:sp>
+        <p:nvSpPr>
+          <p:cNvPr id="6" name="Foliennummernplatzhalter 5">
+            <a:extLst>
+              <a:ext uri="{FF2B5EF4-FFF2-40B4-BE49-F238E27FC236}">
+                <a16:creationId xmlns:a16="http://schemas.microsoft.com/office/drawing/2014/main" id="{7FB25540-F989-450E-AA77-2835A5A581FD}"/>
+              </a:ext>
+            </a:extLst>
+          </p:cNvPr>
+          <p:cNvSpPr>
+            <a:spLocks noGrp="1"/>
+          </p:cNvSpPr>
+          <p:nvPr>
+            <p:ph type="sldNum" sz="quarter" idx="12"/>
+          </p:nvPr>
+        </p:nvSpPr>
+        <p:spPr/>
+        <p:txBody>
+          <a:bodyPr/>
+          <a:lstStyle/>
+          <a:p>
+            <a:fld id="{3A1F27E2-D58A-4028-9FF2-B12D897F257E}" type="slidenum">
+              <a:rPr lang="de-DE" smtClean="0"/>
+              <a:t>34</a:t>
+            </a:fld>
+            <a:endParaRPr lang="de-DE"/>
+          </a:p>
+        </p:txBody>
+      </p:sp>
+      <p:pic>
+        <p:nvPicPr>
+          <p:cNvPr id="8" name="Grafik 7">
+            <a:extLst>
+              <a:ext uri="{FF2B5EF4-FFF2-40B4-BE49-F238E27FC236}">
+                <a16:creationId xmlns:a16="http://schemas.microsoft.com/office/drawing/2014/main" id="{A1D99950-89BE-49EA-B411-D01FD6568731}"/>
+              </a:ext>
+            </a:extLst>
+          </p:cNvPr>
+          <p:cNvPicPr>
+            <a:picLocks noChangeAspect="1"/>
+          </p:cNvPicPr>
+          <p:nvPr/>
+        </p:nvPicPr>
+        <p:blipFill>
+          <a:blip r:embed="rId2"/>
+          <a:stretch>
+            <a:fillRect/>
+          </a:stretch>
+        </p:blipFill>
+        <p:spPr>
+          <a:xfrm>
+            <a:off x="1035385" y="3428999"/>
+            <a:ext cx="8171295" cy="1908175"/>
+          </a:xfrm>
+          <a:prstGeom prst="rect">
+            <a:avLst/>
+          </a:prstGeom>
+        </p:spPr>
+      </p:pic>
+    </p:spTree>
+    <p:extLst>
+      <p:ext uri="{BB962C8B-B14F-4D97-AF65-F5344CB8AC3E}">
+        <p14:creationId xmlns:p14="http://schemas.microsoft.com/office/powerpoint/2010/main" val="826067247"/>
+      </p:ext>
+    </p:extLst>
+  </p:cSld>
+  <p:clrMapOvr>
+    <a:masterClrMapping/>
+  </p:clrMapOvr>
+</p:sld>
+</file>
+
+<file path=ppt/slides/slide35.xml><?xml version="1.0" encoding="utf-8"?>
+<p:sld xmlns:a="http://schemas.openxmlformats.org/drawingml/2006/main" xmlns:r="http://schemas.openxmlformats.org/officeDocument/2006/relationships" xmlns:p="http://schemas.openxmlformats.org/presentationml/2006/main">
+  <p:cSld>
+    <p:spTree>
+      <p:nvGrpSpPr>
+        <p:cNvPr id="1" name=""/>
+        <p:cNvGrpSpPr/>
+        <p:nvPr/>
+      </p:nvGrpSpPr>
+      <p:grpSpPr>
+        <a:xfrm>
+          <a:off x="0" y="0"/>
+          <a:ext cx="0" cy="0"/>
+          <a:chOff x="0" y="0"/>
+          <a:chExt cx="0" cy="0"/>
+        </a:xfrm>
+      </p:grpSpPr>
+      <p:sp>
+        <p:nvSpPr>
+          <p:cNvPr id="2" name="Titel 1">
+            <a:extLst>
+              <a:ext uri="{FF2B5EF4-FFF2-40B4-BE49-F238E27FC236}">
+                <a16:creationId xmlns:a16="http://schemas.microsoft.com/office/drawing/2014/main" id="{D8AEE356-2190-4A68-B30A-AD40D96A4F3E}"/>
+              </a:ext>
+            </a:extLst>
+          </p:cNvPr>
+          <p:cNvSpPr>
+            <a:spLocks noGrp="1"/>
+          </p:cNvSpPr>
+          <p:nvPr>
+            <p:ph type="title"/>
+          </p:nvPr>
+        </p:nvSpPr>
+        <p:spPr/>
+        <p:txBody>
+          <a:bodyPr/>
+          <a:lstStyle/>
+          <a:p>
+            <a:r>
+              <a:rPr lang="de-DE" dirty="0"/>
+              <a:t>Dart - Methoden</a:t>
+            </a:r>
+          </a:p>
+        </p:txBody>
+      </p:sp>
+      <p:sp>
+        <p:nvSpPr>
+          <p:cNvPr id="3" name="Inhaltsplatzhalter 2">
+            <a:extLst>
+              <a:ext uri="{FF2B5EF4-FFF2-40B4-BE49-F238E27FC236}">
+                <a16:creationId xmlns:a16="http://schemas.microsoft.com/office/drawing/2014/main" id="{CAA2B96E-C69F-4F5B-8511-66F66DA7DC44}"/>
+              </a:ext>
+            </a:extLst>
+          </p:cNvPr>
+          <p:cNvSpPr>
+            <a:spLocks noGrp="1"/>
+          </p:cNvSpPr>
+          <p:nvPr>
+            <p:ph idx="1"/>
+          </p:nvPr>
+        </p:nvSpPr>
+        <p:spPr/>
+        <p:txBody>
+          <a:bodyPr/>
+          <a:lstStyle/>
+          <a:p>
+            <a:r>
+              <a:rPr lang="de-DE" dirty="0"/>
+              <a:t>Methoden dienen der Wiederverwendung von Code</a:t>
+            </a:r>
+            <a:br>
+              <a:rPr lang="de-DE" dirty="0"/>
+            </a:br>
+            <a:r>
+              <a:rPr lang="de-DE" sz="2400" b="1" dirty="0" err="1">
+                <a:solidFill>
+                  <a:schemeClr val="accent1">
+                    <a:lumMod val="75000"/>
+                  </a:schemeClr>
+                </a:solidFill>
+              </a:rPr>
+              <a:t>void</a:t>
+            </a:r>
+            <a:r>
+              <a:rPr lang="de-DE" sz="2400" b="1" dirty="0">
+                <a:solidFill>
+                  <a:schemeClr val="accent1">
+                    <a:lumMod val="75000"/>
+                  </a:schemeClr>
+                </a:solidFill>
+              </a:rPr>
+              <a:t> </a:t>
+            </a:r>
+            <a:r>
+              <a:rPr lang="de-DE" sz="2400" b="1" i="1" dirty="0" err="1">
+                <a:solidFill>
+                  <a:schemeClr val="tx2"/>
+                </a:solidFill>
+              </a:rPr>
+              <a:t>name</a:t>
+            </a:r>
+            <a:r>
+              <a:rPr lang="de-DE" sz="2400" b="1" dirty="0">
+                <a:solidFill>
+                  <a:schemeClr val="accent1">
+                    <a:lumMod val="75000"/>
+                  </a:schemeClr>
+                </a:solidFill>
+              </a:rPr>
+              <a:t>(</a:t>
+            </a:r>
+            <a:r>
+              <a:rPr lang="de-DE" sz="2400" b="1" dirty="0" err="1">
+                <a:solidFill>
+                  <a:schemeClr val="accent1">
+                    <a:lumMod val="75000"/>
+                  </a:schemeClr>
+                </a:solidFill>
+              </a:rPr>
+              <a:t>var</a:t>
+            </a:r>
+            <a:r>
+              <a:rPr lang="de-DE" sz="2400" b="1" dirty="0">
+                <a:solidFill>
+                  <a:schemeClr val="accent1">
+                    <a:lumMod val="75000"/>
+                  </a:schemeClr>
+                </a:solidFill>
+              </a:rPr>
+              <a:t> </a:t>
+            </a:r>
+            <a:r>
+              <a:rPr lang="de-DE" sz="2400" b="1" i="1" dirty="0" err="1">
+                <a:solidFill>
+                  <a:schemeClr val="tx2"/>
+                </a:solidFill>
+              </a:rPr>
+              <a:t>argument</a:t>
+            </a:r>
+            <a:r>
+              <a:rPr lang="de-DE" sz="2400" b="1" dirty="0">
+                <a:solidFill>
+                  <a:schemeClr val="accent1">
+                    <a:lumMod val="75000"/>
+                  </a:schemeClr>
+                </a:solidFill>
+              </a:rPr>
+              <a:t>, </a:t>
+            </a:r>
+            <a:r>
+              <a:rPr lang="de-DE" sz="2400" b="1" dirty="0" err="1">
+                <a:solidFill>
+                  <a:schemeClr val="accent1">
+                    <a:lumMod val="75000"/>
+                  </a:schemeClr>
+                </a:solidFill>
+              </a:rPr>
+              <a:t>var</a:t>
+            </a:r>
+            <a:r>
+              <a:rPr lang="de-DE" sz="2400" b="1" i="1" dirty="0">
+                <a:solidFill>
+                  <a:schemeClr val="tx2"/>
+                </a:solidFill>
+              </a:rPr>
+              <a:t> argument2</a:t>
+            </a:r>
+            <a:r>
+              <a:rPr lang="de-DE" sz="2400" b="1" dirty="0">
+                <a:solidFill>
+                  <a:schemeClr val="accent1">
+                    <a:lumMod val="75000"/>
+                  </a:schemeClr>
+                </a:solidFill>
+              </a:rPr>
+              <a:t>,</a:t>
+            </a:r>
+            <a:r>
+              <a:rPr lang="de-DE" sz="2400" b="1" i="1" dirty="0">
+                <a:solidFill>
+                  <a:schemeClr val="tx2"/>
+                </a:solidFill>
+              </a:rPr>
+              <a:t> </a:t>
+            </a:r>
+            <a:r>
+              <a:rPr lang="de-DE" dirty="0"/>
+              <a:t>…</a:t>
+            </a:r>
+            <a:r>
+              <a:rPr lang="de-DE" sz="2400" b="1" dirty="0">
+                <a:solidFill>
+                  <a:schemeClr val="accent1">
+                    <a:lumMod val="75000"/>
+                  </a:schemeClr>
+                </a:solidFill>
+              </a:rPr>
+              <a:t>) {</a:t>
+            </a:r>
+            <a:r>
+              <a:rPr lang="de-DE" dirty="0"/>
+              <a:t> … </a:t>
+            </a:r>
+            <a:r>
+              <a:rPr lang="de-DE" sz="2400" b="1" dirty="0">
+                <a:solidFill>
+                  <a:schemeClr val="accent1">
+                    <a:lumMod val="75000"/>
+                  </a:schemeClr>
+                </a:solidFill>
+              </a:rPr>
+              <a:t>}</a:t>
+            </a:r>
+          </a:p>
+        </p:txBody>
+      </p:sp>
+      <p:sp>
+        <p:nvSpPr>
+          <p:cNvPr id="4" name="Datumsplatzhalter 3">
+            <a:extLst>
+              <a:ext uri="{FF2B5EF4-FFF2-40B4-BE49-F238E27FC236}">
+                <a16:creationId xmlns:a16="http://schemas.microsoft.com/office/drawing/2014/main" id="{5DB3E6EA-5CA3-4700-8A7A-A7DF6CBD7260}"/>
+              </a:ext>
+            </a:extLst>
+          </p:cNvPr>
+          <p:cNvSpPr>
+            <a:spLocks noGrp="1"/>
+          </p:cNvSpPr>
+          <p:nvPr>
+            <p:ph type="dt" sz="half" idx="10"/>
+          </p:nvPr>
+        </p:nvSpPr>
+        <p:spPr/>
+        <p:txBody>
+          <a:bodyPr/>
+          <a:lstStyle/>
+          <a:p>
+            <a:fld id="{E3A6C6BD-3868-452A-A2BD-92328FD8B4E8}" type="datetime1">
+              <a:rPr lang="de-DE" smtClean="0"/>
+              <a:t>31.01.2023</a:t>
+            </a:fld>
+            <a:endParaRPr lang="de-DE"/>
+          </a:p>
+        </p:txBody>
+      </p:sp>
+      <p:sp>
+        <p:nvSpPr>
+          <p:cNvPr id="5" name="Fußzeilenplatzhalter 4">
+            <a:extLst>
+              <a:ext uri="{FF2B5EF4-FFF2-40B4-BE49-F238E27FC236}">
+                <a16:creationId xmlns:a16="http://schemas.microsoft.com/office/drawing/2014/main" id="{14E75CA1-7496-4A5F-A5B9-9377BBE8B1B1}"/>
+              </a:ext>
+            </a:extLst>
+          </p:cNvPr>
+          <p:cNvSpPr>
+            <a:spLocks noGrp="1"/>
+          </p:cNvSpPr>
+          <p:nvPr>
+            <p:ph type="ftr" sz="quarter" idx="11"/>
+          </p:nvPr>
+        </p:nvSpPr>
+        <p:spPr/>
+        <p:txBody>
+          <a:bodyPr/>
+          <a:lstStyle/>
+          <a:p>
+            <a:r>
+              <a:rPr lang="de-DE"/>
+              <a:t>Dart - Programmiersprache für Smartphones</a:t>
+            </a:r>
+          </a:p>
+        </p:txBody>
+      </p:sp>
+      <p:sp>
+        <p:nvSpPr>
+          <p:cNvPr id="6" name="Foliennummernplatzhalter 5">
+            <a:extLst>
+              <a:ext uri="{FF2B5EF4-FFF2-40B4-BE49-F238E27FC236}">
+                <a16:creationId xmlns:a16="http://schemas.microsoft.com/office/drawing/2014/main" id="{D692A012-F83C-46E1-89B2-E7D25E69A176}"/>
+              </a:ext>
+            </a:extLst>
+          </p:cNvPr>
+          <p:cNvSpPr>
+            <a:spLocks noGrp="1"/>
+          </p:cNvSpPr>
+          <p:nvPr>
+            <p:ph type="sldNum" sz="quarter" idx="12"/>
+          </p:nvPr>
+        </p:nvSpPr>
+        <p:spPr/>
+        <p:txBody>
+          <a:bodyPr/>
+          <a:lstStyle/>
+          <a:p>
+            <a:fld id="{3A1F27E2-D58A-4028-9FF2-B12D897F257E}" type="slidenum">
+              <a:rPr lang="de-DE" smtClean="0"/>
+              <a:t>35</a:t>
+            </a:fld>
+            <a:endParaRPr lang="de-DE"/>
+          </a:p>
+        </p:txBody>
+      </p:sp>
+      <p:pic>
+        <p:nvPicPr>
+          <p:cNvPr id="8" name="Grafik 7">
+            <a:extLst>
+              <a:ext uri="{FF2B5EF4-FFF2-40B4-BE49-F238E27FC236}">
+                <a16:creationId xmlns:a16="http://schemas.microsoft.com/office/drawing/2014/main" id="{CEB77E9B-1C50-449D-8599-52D27718F45E}"/>
+              </a:ext>
+            </a:extLst>
+          </p:cNvPr>
+          <p:cNvPicPr>
+            <a:picLocks noChangeAspect="1"/>
+          </p:cNvPicPr>
+          <p:nvPr/>
+        </p:nvPicPr>
+        <p:blipFill>
+          <a:blip r:embed="rId3"/>
+          <a:stretch>
+            <a:fillRect/>
+          </a:stretch>
+        </p:blipFill>
+        <p:spPr>
+          <a:xfrm>
+            <a:off x="838200" y="2541859"/>
+            <a:ext cx="7114255" cy="3623991"/>
+          </a:xfrm>
+          <a:prstGeom prst="rect">
+            <a:avLst/>
+          </a:prstGeom>
+        </p:spPr>
+      </p:pic>
+    </p:spTree>
+    <p:extLst>
+      <p:ext uri="{BB962C8B-B14F-4D97-AF65-F5344CB8AC3E}">
+        <p14:creationId xmlns:p14="http://schemas.microsoft.com/office/powerpoint/2010/main" val="1591608245"/>
+      </p:ext>
+    </p:extLst>
+  </p:cSld>
+  <p:clrMapOvr>
+    <a:masterClrMapping/>
+  </p:clrMapOvr>
+</p:sld>
+</file>
+
+<file path=ppt/slides/slide36.xml><?xml version="1.0" encoding="utf-8"?>
+<p:sld xmlns:a="http://schemas.openxmlformats.org/drawingml/2006/main" xmlns:r="http://schemas.openxmlformats.org/officeDocument/2006/relationships" xmlns:p="http://schemas.openxmlformats.org/presentationml/2006/main">
+  <p:cSld>
+    <p:spTree>
+      <p:nvGrpSpPr>
+        <p:cNvPr id="1" name=""/>
+        <p:cNvGrpSpPr/>
+        <p:nvPr/>
+      </p:nvGrpSpPr>
+      <p:grpSpPr>
+        <a:xfrm>
+          <a:off x="0" y="0"/>
+          <a:ext cx="0" cy="0"/>
+          <a:chOff x="0" y="0"/>
+          <a:chExt cx="0" cy="0"/>
+        </a:xfrm>
+      </p:grpSpPr>
+      <p:sp>
+        <p:nvSpPr>
+          <p:cNvPr id="2" name="Titel 1">
+            <a:extLst>
+              <a:ext uri="{FF2B5EF4-FFF2-40B4-BE49-F238E27FC236}">
+                <a16:creationId xmlns:a16="http://schemas.microsoft.com/office/drawing/2014/main" id="{D8AEE356-2190-4A68-B30A-AD40D96A4F3E}"/>
+              </a:ext>
+            </a:extLst>
+          </p:cNvPr>
+          <p:cNvSpPr>
+            <a:spLocks noGrp="1"/>
+          </p:cNvSpPr>
+          <p:nvPr>
+            <p:ph type="title"/>
+          </p:nvPr>
+        </p:nvSpPr>
+        <p:spPr/>
+        <p:txBody>
+          <a:bodyPr/>
+          <a:lstStyle/>
+          <a:p>
+            <a:r>
+              <a:rPr lang="de-DE" dirty="0"/>
+              <a:t>Dart - Methoden</a:t>
+            </a:r>
+          </a:p>
+        </p:txBody>
+      </p:sp>
+      <p:sp>
+        <p:nvSpPr>
+          <p:cNvPr id="3" name="Inhaltsplatzhalter 2">
+            <a:extLst>
+              <a:ext uri="{FF2B5EF4-FFF2-40B4-BE49-F238E27FC236}">
+                <a16:creationId xmlns:a16="http://schemas.microsoft.com/office/drawing/2014/main" id="{CAA2B96E-C69F-4F5B-8511-66F66DA7DC44}"/>
+              </a:ext>
+            </a:extLst>
+          </p:cNvPr>
+          <p:cNvSpPr>
+            <a:spLocks noGrp="1"/>
+          </p:cNvSpPr>
+          <p:nvPr>
+            <p:ph idx="1"/>
+          </p:nvPr>
+        </p:nvSpPr>
+        <p:spPr/>
+        <p:txBody>
+          <a:bodyPr/>
+          <a:lstStyle/>
+          <a:p>
+            <a:r>
+              <a:rPr lang="de-DE" dirty="0"/>
+              <a:t>Bei Methoden ist es sinnvoll den Typ der Argumente genauer anzugeben als nur </a:t>
+            </a:r>
+            <a:r>
+              <a:rPr lang="de-DE" sz="2400" b="1" dirty="0" err="1">
+                <a:solidFill>
+                  <a:schemeClr val="accent1">
+                    <a:lumMod val="75000"/>
+                  </a:schemeClr>
+                </a:solidFill>
+              </a:rPr>
+              <a:t>var</a:t>
+            </a:r>
+            <a:endParaRPr lang="de-DE" sz="2400" b="1" dirty="0">
+              <a:solidFill>
+                <a:schemeClr val="accent1">
+                  <a:lumMod val="75000"/>
+                </a:schemeClr>
+              </a:solidFill>
+            </a:endParaRPr>
+          </a:p>
+        </p:txBody>
+      </p:sp>
+      <p:sp>
+        <p:nvSpPr>
+          <p:cNvPr id="4" name="Datumsplatzhalter 3">
+            <a:extLst>
+              <a:ext uri="{FF2B5EF4-FFF2-40B4-BE49-F238E27FC236}">
+                <a16:creationId xmlns:a16="http://schemas.microsoft.com/office/drawing/2014/main" id="{5DB3E6EA-5CA3-4700-8A7A-A7DF6CBD7260}"/>
+              </a:ext>
+            </a:extLst>
+          </p:cNvPr>
+          <p:cNvSpPr>
+            <a:spLocks noGrp="1"/>
+          </p:cNvSpPr>
+          <p:nvPr>
+            <p:ph type="dt" sz="half" idx="10"/>
+          </p:nvPr>
+        </p:nvSpPr>
+        <p:spPr/>
+        <p:txBody>
+          <a:bodyPr/>
+          <a:lstStyle/>
+          <a:p>
+            <a:fld id="{B60FD287-29C3-4567-A3C8-1214880B52D5}" type="datetime1">
+              <a:rPr lang="de-DE" smtClean="0"/>
+              <a:t>31.01.2023</a:t>
+            </a:fld>
+            <a:endParaRPr lang="de-DE"/>
+          </a:p>
+        </p:txBody>
+      </p:sp>
+      <p:sp>
+        <p:nvSpPr>
+          <p:cNvPr id="5" name="Fußzeilenplatzhalter 4">
+            <a:extLst>
+              <a:ext uri="{FF2B5EF4-FFF2-40B4-BE49-F238E27FC236}">
+                <a16:creationId xmlns:a16="http://schemas.microsoft.com/office/drawing/2014/main" id="{14E75CA1-7496-4A5F-A5B9-9377BBE8B1B1}"/>
+              </a:ext>
+            </a:extLst>
+          </p:cNvPr>
+          <p:cNvSpPr>
+            <a:spLocks noGrp="1"/>
+          </p:cNvSpPr>
+          <p:nvPr>
+            <p:ph type="ftr" sz="quarter" idx="11"/>
+          </p:nvPr>
+        </p:nvSpPr>
+        <p:spPr/>
+        <p:txBody>
+          <a:bodyPr/>
+          <a:lstStyle/>
+          <a:p>
+            <a:r>
+              <a:rPr lang="de-DE"/>
+              <a:t>Dart - Programmiersprache für Smartphones</a:t>
+            </a:r>
+          </a:p>
+        </p:txBody>
+      </p:sp>
+      <p:sp>
+        <p:nvSpPr>
+          <p:cNvPr id="6" name="Foliennummernplatzhalter 5">
+            <a:extLst>
+              <a:ext uri="{FF2B5EF4-FFF2-40B4-BE49-F238E27FC236}">
+                <a16:creationId xmlns:a16="http://schemas.microsoft.com/office/drawing/2014/main" id="{D692A012-F83C-46E1-89B2-E7D25E69A176}"/>
+              </a:ext>
+            </a:extLst>
+          </p:cNvPr>
+          <p:cNvSpPr>
+            <a:spLocks noGrp="1"/>
+          </p:cNvSpPr>
+          <p:nvPr>
+            <p:ph type="sldNum" sz="quarter" idx="12"/>
+          </p:nvPr>
+        </p:nvSpPr>
+        <p:spPr/>
+        <p:txBody>
+          <a:bodyPr/>
+          <a:lstStyle/>
+          <a:p>
+            <a:fld id="{3A1F27E2-D58A-4028-9FF2-B12D897F257E}" type="slidenum">
+              <a:rPr lang="de-DE" smtClean="0"/>
+              <a:t>36</a:t>
+            </a:fld>
+            <a:endParaRPr lang="de-DE"/>
+          </a:p>
+        </p:txBody>
+      </p:sp>
+      <p:pic>
+        <p:nvPicPr>
+          <p:cNvPr id="10" name="Grafik 9">
+            <a:extLst>
+              <a:ext uri="{FF2B5EF4-FFF2-40B4-BE49-F238E27FC236}">
+                <a16:creationId xmlns:a16="http://schemas.microsoft.com/office/drawing/2014/main" id="{4DF2D440-0562-4B86-B3A9-F5569F1034DA}"/>
+              </a:ext>
+            </a:extLst>
+          </p:cNvPr>
+          <p:cNvPicPr>
+            <a:picLocks noChangeAspect="1"/>
+          </p:cNvPicPr>
+          <p:nvPr/>
+        </p:nvPicPr>
+        <p:blipFill>
+          <a:blip r:embed="rId3"/>
+          <a:stretch>
+            <a:fillRect/>
+          </a:stretch>
+        </p:blipFill>
+        <p:spPr>
+          <a:xfrm>
+            <a:off x="838200" y="2537094"/>
+            <a:ext cx="7137440" cy="3628755"/>
+          </a:xfrm>
+          <a:prstGeom prst="rect">
+            <a:avLst/>
+          </a:prstGeom>
+        </p:spPr>
+      </p:pic>
+      <p:sp>
+        <p:nvSpPr>
+          <p:cNvPr id="11" name="Rechteck 10">
+            <a:extLst>
+              <a:ext uri="{FF2B5EF4-FFF2-40B4-BE49-F238E27FC236}">
+                <a16:creationId xmlns:a16="http://schemas.microsoft.com/office/drawing/2014/main" id="{444FB233-7D49-4B52-BC9C-38CD962C568C}"/>
+              </a:ext>
+            </a:extLst>
+          </p:cNvPr>
+          <p:cNvSpPr/>
+          <p:nvPr/>
+        </p:nvSpPr>
+        <p:spPr>
+          <a:xfrm>
+            <a:off x="1816474" y="3315587"/>
+            <a:ext cx="1160902" cy="393404"/>
+          </a:xfrm>
+          <a:prstGeom prst="rect">
+            <a:avLst/>
+          </a:prstGeom>
+          <a:noFill/>
+          <a:ln w="28575">
+            <a:solidFill>
+              <a:schemeClr val="accent1"/>
+            </a:solidFill>
+          </a:ln>
+        </p:spPr>
+        <p:style>
+          <a:lnRef idx="2">
+            <a:schemeClr val="accent1">
+              <a:shade val="50000"/>
+            </a:schemeClr>
+          </a:lnRef>
+          <a:fillRef idx="1">
+            <a:schemeClr val="accent1"/>
+          </a:fillRef>
+          <a:effectRef idx="0">
+            <a:schemeClr val="accent1"/>
+          </a:effectRef>
+          <a:fontRef idx="minor">
+            <a:schemeClr val="lt1"/>
+          </a:fontRef>
+        </p:style>
+        <p:txBody>
+          <a:bodyPr rtlCol="0" anchor="ctr"/>
+          <a:lstStyle/>
+          <a:p>
+            <a:pPr algn="ctr"/>
+            <a:endParaRPr lang="de-DE"/>
+          </a:p>
+        </p:txBody>
+      </p:sp>
+      <p:sp>
+        <p:nvSpPr>
+          <p:cNvPr id="12" name="Textfeld 11">
+            <a:extLst>
+              <a:ext uri="{FF2B5EF4-FFF2-40B4-BE49-F238E27FC236}">
+                <a16:creationId xmlns:a16="http://schemas.microsoft.com/office/drawing/2014/main" id="{B1D28FFE-BF40-4784-892D-591D71C55283}"/>
+              </a:ext>
+            </a:extLst>
+          </p:cNvPr>
+          <p:cNvSpPr txBox="1"/>
+          <p:nvPr/>
+        </p:nvSpPr>
+        <p:spPr>
+          <a:xfrm>
+            <a:off x="3166946" y="3327623"/>
+            <a:ext cx="2009653" cy="369332"/>
+          </a:xfrm>
+          <a:prstGeom prst="rect">
+            <a:avLst/>
+          </a:prstGeom>
+          <a:noFill/>
+        </p:spPr>
+        <p:txBody>
+          <a:bodyPr wrap="none" rtlCol="0">
+            <a:spAutoFit/>
+          </a:bodyPr>
+          <a:lstStyle/>
+          <a:p>
+            <a:r>
+              <a:rPr lang="de-DE" dirty="0"/>
+              <a:t>Kein Fehler erkannt</a:t>
+            </a:r>
+          </a:p>
+        </p:txBody>
+      </p:sp>
+      <p:sp>
+        <p:nvSpPr>
+          <p:cNvPr id="13" name="Rechteck 12">
+            <a:extLst>
+              <a:ext uri="{FF2B5EF4-FFF2-40B4-BE49-F238E27FC236}">
+                <a16:creationId xmlns:a16="http://schemas.microsoft.com/office/drawing/2014/main" id="{BE3B1DA2-DEE2-4D40-A273-7DCD4BB5EF7A}"/>
+              </a:ext>
+            </a:extLst>
+          </p:cNvPr>
+          <p:cNvSpPr/>
+          <p:nvPr/>
+        </p:nvSpPr>
+        <p:spPr>
+          <a:xfrm>
+            <a:off x="2586494" y="4154769"/>
+            <a:ext cx="580451" cy="393404"/>
+          </a:xfrm>
+          <a:prstGeom prst="rect">
+            <a:avLst/>
+          </a:prstGeom>
+          <a:noFill/>
+          <a:ln w="28575">
+            <a:solidFill>
+              <a:schemeClr val="accent1"/>
+            </a:solidFill>
+          </a:ln>
+        </p:spPr>
+        <p:style>
+          <a:lnRef idx="2">
+            <a:schemeClr val="accent1">
+              <a:shade val="50000"/>
+            </a:schemeClr>
+          </a:lnRef>
+          <a:fillRef idx="1">
+            <a:schemeClr val="accent1"/>
+          </a:fillRef>
+          <a:effectRef idx="0">
+            <a:schemeClr val="accent1"/>
+          </a:effectRef>
+          <a:fontRef idx="minor">
+            <a:schemeClr val="lt1"/>
+          </a:fontRef>
+        </p:style>
+        <p:txBody>
+          <a:bodyPr rtlCol="0" anchor="ctr"/>
+          <a:lstStyle/>
+          <a:p>
+            <a:pPr algn="ctr"/>
+            <a:endParaRPr lang="de-DE"/>
+          </a:p>
+        </p:txBody>
+      </p:sp>
+    </p:spTree>
+    <p:extLst>
+      <p:ext uri="{BB962C8B-B14F-4D97-AF65-F5344CB8AC3E}">
+        <p14:creationId xmlns:p14="http://schemas.microsoft.com/office/powerpoint/2010/main" val="9698463"/>
+      </p:ext>
+    </p:extLst>
+  </p:cSld>
+  <p:clrMapOvr>
+    <a:masterClrMapping/>
+  </p:clrMapOvr>
+</p:sld>
+</file>
+
+<file path=ppt/slides/slide37.xml><?xml version="1.0" encoding="utf-8"?>
+<p:sld xmlns:a="http://schemas.openxmlformats.org/drawingml/2006/main" xmlns:r="http://schemas.openxmlformats.org/officeDocument/2006/relationships" xmlns:p="http://schemas.openxmlformats.org/presentationml/2006/main">
+  <p:cSld>
+    <p:spTree>
+      <p:nvGrpSpPr>
+        <p:cNvPr id="1" name=""/>
+        <p:cNvGrpSpPr/>
+        <p:nvPr/>
+      </p:nvGrpSpPr>
+      <p:grpSpPr>
+        <a:xfrm>
+          <a:off x="0" y="0"/>
+          <a:ext cx="0" cy="0"/>
+          <a:chOff x="0" y="0"/>
+          <a:chExt cx="0" cy="0"/>
+        </a:xfrm>
+      </p:grpSpPr>
+      <p:pic>
+        <p:nvPicPr>
+          <p:cNvPr id="8" name="Grafik 7">
+            <a:extLst>
+              <a:ext uri="{FF2B5EF4-FFF2-40B4-BE49-F238E27FC236}">
+                <a16:creationId xmlns:a16="http://schemas.microsoft.com/office/drawing/2014/main" id="{DE3F11EE-B4D5-4BBD-8D1B-776D9898D5AD}"/>
+              </a:ext>
+            </a:extLst>
+          </p:cNvPr>
+          <p:cNvPicPr>
+            <a:picLocks noChangeAspect="1"/>
+          </p:cNvPicPr>
+          <p:nvPr/>
+        </p:nvPicPr>
+        <p:blipFill>
+          <a:blip r:embed="rId3"/>
+          <a:stretch>
+            <a:fillRect/>
+          </a:stretch>
+        </p:blipFill>
+        <p:spPr>
+          <a:xfrm>
+            <a:off x="838199" y="2537093"/>
+            <a:ext cx="7177461" cy="3628754"/>
+          </a:xfrm>
+          <a:prstGeom prst="rect">
+            <a:avLst/>
+          </a:prstGeom>
+        </p:spPr>
+      </p:pic>
+      <p:sp>
+        <p:nvSpPr>
+          <p:cNvPr id="2" name="Titel 1">
+            <a:extLst>
+              <a:ext uri="{FF2B5EF4-FFF2-40B4-BE49-F238E27FC236}">
+                <a16:creationId xmlns:a16="http://schemas.microsoft.com/office/drawing/2014/main" id="{D8AEE356-2190-4A68-B30A-AD40D96A4F3E}"/>
+              </a:ext>
+            </a:extLst>
+          </p:cNvPr>
+          <p:cNvSpPr>
+            <a:spLocks noGrp="1"/>
+          </p:cNvSpPr>
+          <p:nvPr>
+            <p:ph type="title"/>
+          </p:nvPr>
+        </p:nvSpPr>
+        <p:spPr/>
+        <p:txBody>
+          <a:bodyPr/>
+          <a:lstStyle/>
+          <a:p>
+            <a:r>
+              <a:rPr lang="de-DE" dirty="0"/>
+              <a:t>Dart - Methoden</a:t>
+            </a:r>
+          </a:p>
+        </p:txBody>
+      </p:sp>
+      <p:sp>
+        <p:nvSpPr>
+          <p:cNvPr id="3" name="Inhaltsplatzhalter 2">
+            <a:extLst>
+              <a:ext uri="{FF2B5EF4-FFF2-40B4-BE49-F238E27FC236}">
+                <a16:creationId xmlns:a16="http://schemas.microsoft.com/office/drawing/2014/main" id="{CAA2B96E-C69F-4F5B-8511-66F66DA7DC44}"/>
+              </a:ext>
+            </a:extLst>
+          </p:cNvPr>
+          <p:cNvSpPr>
+            <a:spLocks noGrp="1"/>
+          </p:cNvSpPr>
+          <p:nvPr>
+            <p:ph idx="1"/>
+          </p:nvPr>
+        </p:nvSpPr>
+        <p:spPr/>
+        <p:txBody>
+          <a:bodyPr/>
+          <a:lstStyle/>
+          <a:p>
+            <a:r>
+              <a:rPr lang="de-DE" dirty="0"/>
+              <a:t>Mit </a:t>
+            </a:r>
+            <a:r>
+              <a:rPr lang="de-DE" sz="2400" b="1" dirty="0" err="1">
+                <a:solidFill>
+                  <a:schemeClr val="accent1">
+                    <a:lumMod val="75000"/>
+                  </a:schemeClr>
+                </a:solidFill>
+              </a:rPr>
+              <a:t>int</a:t>
+            </a:r>
+            <a:r>
+              <a:rPr lang="de-DE" sz="2400" b="1" dirty="0">
+                <a:solidFill>
+                  <a:schemeClr val="accent1">
+                    <a:lumMod val="75000"/>
+                  </a:schemeClr>
+                </a:solidFill>
+              </a:rPr>
+              <a:t> </a:t>
+            </a:r>
+            <a:r>
+              <a:rPr lang="de-DE" dirty="0"/>
+              <a:t>erkennt die Programmierumgebung den Fehler schon vorher</a:t>
+            </a:r>
+          </a:p>
+        </p:txBody>
+      </p:sp>
+      <p:sp>
+        <p:nvSpPr>
+          <p:cNvPr id="4" name="Datumsplatzhalter 3">
+            <a:extLst>
+              <a:ext uri="{FF2B5EF4-FFF2-40B4-BE49-F238E27FC236}">
+                <a16:creationId xmlns:a16="http://schemas.microsoft.com/office/drawing/2014/main" id="{5DB3E6EA-5CA3-4700-8A7A-A7DF6CBD7260}"/>
+              </a:ext>
+            </a:extLst>
+          </p:cNvPr>
+          <p:cNvSpPr>
+            <a:spLocks noGrp="1"/>
+          </p:cNvSpPr>
+          <p:nvPr>
+            <p:ph type="dt" sz="half" idx="10"/>
+          </p:nvPr>
+        </p:nvSpPr>
+        <p:spPr/>
+        <p:txBody>
+          <a:bodyPr/>
+          <a:lstStyle/>
+          <a:p>
+            <a:fld id="{172E1AE1-643D-418C-ACE4-F2637FAE5286}" type="datetime1">
+              <a:rPr lang="de-DE" smtClean="0"/>
+              <a:t>31.01.2023</a:t>
+            </a:fld>
+            <a:endParaRPr lang="de-DE"/>
+          </a:p>
+        </p:txBody>
+      </p:sp>
+      <p:sp>
+        <p:nvSpPr>
+          <p:cNvPr id="5" name="Fußzeilenplatzhalter 4">
+            <a:extLst>
+              <a:ext uri="{FF2B5EF4-FFF2-40B4-BE49-F238E27FC236}">
+                <a16:creationId xmlns:a16="http://schemas.microsoft.com/office/drawing/2014/main" id="{14E75CA1-7496-4A5F-A5B9-9377BBE8B1B1}"/>
+              </a:ext>
+            </a:extLst>
+          </p:cNvPr>
+          <p:cNvSpPr>
+            <a:spLocks noGrp="1"/>
+          </p:cNvSpPr>
+          <p:nvPr>
+            <p:ph type="ftr" sz="quarter" idx="11"/>
+          </p:nvPr>
+        </p:nvSpPr>
+        <p:spPr/>
+        <p:txBody>
+          <a:bodyPr/>
+          <a:lstStyle/>
+          <a:p>
+            <a:r>
+              <a:rPr lang="de-DE"/>
+              <a:t>Dart - Programmiersprache für Smartphones</a:t>
+            </a:r>
+          </a:p>
+        </p:txBody>
+      </p:sp>
+      <p:sp>
+        <p:nvSpPr>
+          <p:cNvPr id="6" name="Foliennummernplatzhalter 5">
+            <a:extLst>
+              <a:ext uri="{FF2B5EF4-FFF2-40B4-BE49-F238E27FC236}">
+                <a16:creationId xmlns:a16="http://schemas.microsoft.com/office/drawing/2014/main" id="{D692A012-F83C-46E1-89B2-E7D25E69A176}"/>
+              </a:ext>
+            </a:extLst>
+          </p:cNvPr>
+          <p:cNvSpPr>
+            <a:spLocks noGrp="1"/>
+          </p:cNvSpPr>
+          <p:nvPr>
+            <p:ph type="sldNum" sz="quarter" idx="12"/>
+          </p:nvPr>
+        </p:nvSpPr>
+        <p:spPr/>
+        <p:txBody>
+          <a:bodyPr/>
+          <a:lstStyle/>
+          <a:p>
+            <a:fld id="{3A1F27E2-D58A-4028-9FF2-B12D897F257E}" type="slidenum">
+              <a:rPr lang="de-DE" smtClean="0"/>
+              <a:t>37</a:t>
+            </a:fld>
+            <a:endParaRPr lang="de-DE"/>
+          </a:p>
+        </p:txBody>
+      </p:sp>
+      <p:sp>
+        <p:nvSpPr>
+          <p:cNvPr id="11" name="Rechteck 10">
+            <a:extLst>
+              <a:ext uri="{FF2B5EF4-FFF2-40B4-BE49-F238E27FC236}">
+                <a16:creationId xmlns:a16="http://schemas.microsoft.com/office/drawing/2014/main" id="{444FB233-7D49-4B52-BC9C-38CD962C568C}"/>
+              </a:ext>
+            </a:extLst>
+          </p:cNvPr>
+          <p:cNvSpPr/>
+          <p:nvPr/>
+        </p:nvSpPr>
+        <p:spPr>
+          <a:xfrm>
+            <a:off x="1816474" y="3315587"/>
+            <a:ext cx="1160902" cy="393404"/>
+          </a:xfrm>
+          <a:prstGeom prst="rect">
+            <a:avLst/>
+          </a:prstGeom>
+          <a:noFill/>
+          <a:ln w="28575">
+            <a:solidFill>
+              <a:schemeClr val="accent1"/>
+            </a:solidFill>
+          </a:ln>
+        </p:spPr>
+        <p:style>
+          <a:lnRef idx="2">
+            <a:schemeClr val="accent1">
+              <a:shade val="50000"/>
+            </a:schemeClr>
+          </a:lnRef>
+          <a:fillRef idx="1">
+            <a:schemeClr val="accent1"/>
+          </a:fillRef>
+          <a:effectRef idx="0">
+            <a:schemeClr val="accent1"/>
+          </a:effectRef>
+          <a:fontRef idx="minor">
+            <a:schemeClr val="lt1"/>
+          </a:fontRef>
+        </p:style>
+        <p:txBody>
+          <a:bodyPr rtlCol="0" anchor="ctr"/>
+          <a:lstStyle/>
+          <a:p>
+            <a:pPr algn="ctr"/>
+            <a:endParaRPr lang="de-DE"/>
+          </a:p>
+        </p:txBody>
+      </p:sp>
+      <p:sp>
+        <p:nvSpPr>
+          <p:cNvPr id="12" name="Textfeld 11">
+            <a:extLst>
+              <a:ext uri="{FF2B5EF4-FFF2-40B4-BE49-F238E27FC236}">
+                <a16:creationId xmlns:a16="http://schemas.microsoft.com/office/drawing/2014/main" id="{B1D28FFE-BF40-4784-892D-591D71C55283}"/>
+              </a:ext>
+            </a:extLst>
+          </p:cNvPr>
+          <p:cNvSpPr txBox="1"/>
+          <p:nvPr/>
+        </p:nvSpPr>
+        <p:spPr>
+          <a:xfrm>
+            <a:off x="3166946" y="3327623"/>
+            <a:ext cx="1550553" cy="369332"/>
+          </a:xfrm>
+          <a:prstGeom prst="rect">
+            <a:avLst/>
+          </a:prstGeom>
+          <a:noFill/>
+        </p:spPr>
+        <p:txBody>
+          <a:bodyPr wrap="none" rtlCol="0">
+            <a:spAutoFit/>
+          </a:bodyPr>
+          <a:lstStyle/>
+          <a:p>
+            <a:r>
+              <a:rPr lang="de-DE" dirty="0"/>
+              <a:t>Fehler erkannt</a:t>
+            </a:r>
+          </a:p>
+        </p:txBody>
+      </p:sp>
+      <p:sp>
+        <p:nvSpPr>
+          <p:cNvPr id="13" name="Rechteck 12">
+            <a:extLst>
+              <a:ext uri="{FF2B5EF4-FFF2-40B4-BE49-F238E27FC236}">
+                <a16:creationId xmlns:a16="http://schemas.microsoft.com/office/drawing/2014/main" id="{BE3B1DA2-DEE2-4D40-A273-7DCD4BB5EF7A}"/>
+              </a:ext>
+            </a:extLst>
+          </p:cNvPr>
+          <p:cNvSpPr/>
+          <p:nvPr/>
+        </p:nvSpPr>
+        <p:spPr>
+          <a:xfrm>
+            <a:off x="2586494" y="4154769"/>
+            <a:ext cx="580451" cy="393404"/>
+          </a:xfrm>
+          <a:prstGeom prst="rect">
+            <a:avLst/>
+          </a:prstGeom>
+          <a:noFill/>
+          <a:ln w="28575">
+            <a:solidFill>
+              <a:schemeClr val="accent1"/>
+            </a:solidFill>
+          </a:ln>
+        </p:spPr>
+        <p:style>
+          <a:lnRef idx="2">
+            <a:schemeClr val="accent1">
+              <a:shade val="50000"/>
+            </a:schemeClr>
+          </a:lnRef>
+          <a:fillRef idx="1">
+            <a:schemeClr val="accent1"/>
+          </a:fillRef>
+          <a:effectRef idx="0">
+            <a:schemeClr val="accent1"/>
+          </a:effectRef>
+          <a:fontRef idx="minor">
+            <a:schemeClr val="lt1"/>
+          </a:fontRef>
+        </p:style>
+        <p:txBody>
+          <a:bodyPr rtlCol="0" anchor="ctr"/>
+          <a:lstStyle/>
+          <a:p>
+            <a:pPr algn="ctr"/>
+            <a:endParaRPr lang="de-DE"/>
+          </a:p>
+        </p:txBody>
+      </p:sp>
+    </p:spTree>
+    <p:extLst>
+      <p:ext uri="{BB962C8B-B14F-4D97-AF65-F5344CB8AC3E}">
+        <p14:creationId xmlns:p14="http://schemas.microsoft.com/office/powerpoint/2010/main" val="1615878168"/>
+      </p:ext>
+    </p:extLst>
+  </p:cSld>
+  <p:clrMapOvr>
+    <a:masterClrMapping/>
+  </p:clrMapOvr>
+</p:sld>
+</file>
+
+<file path=ppt/slides/slide38.xml><?xml version="1.0" encoding="utf-8"?>
+<p:sld xmlns:a="http://schemas.openxmlformats.org/drawingml/2006/main" xmlns:r="http://schemas.openxmlformats.org/officeDocument/2006/relationships" xmlns:p="http://schemas.openxmlformats.org/presentationml/2006/main">
+  <p:cSld>
+    <p:spTree>
+      <p:nvGrpSpPr>
+        <p:cNvPr id="1" name=""/>
+        <p:cNvGrpSpPr/>
+        <p:nvPr/>
+      </p:nvGrpSpPr>
+      <p:grpSpPr>
+        <a:xfrm>
+          <a:off x="0" y="0"/>
+          <a:ext cx="0" cy="0"/>
+          <a:chOff x="0" y="0"/>
+          <a:chExt cx="0" cy="0"/>
+        </a:xfrm>
+      </p:grpSpPr>
+      <p:pic>
+        <p:nvPicPr>
+          <p:cNvPr id="11" name="Grafik 10">
+            <a:extLst>
+              <a:ext uri="{FF2B5EF4-FFF2-40B4-BE49-F238E27FC236}">
+                <a16:creationId xmlns:a16="http://schemas.microsoft.com/office/drawing/2014/main" id="{8A3CE24C-DE57-4896-AD9F-31B3EC9D1BD5}"/>
+              </a:ext>
+            </a:extLst>
+          </p:cNvPr>
+          <p:cNvPicPr>
+            <a:picLocks noChangeAspect="1"/>
+          </p:cNvPicPr>
+          <p:nvPr/>
+        </p:nvPicPr>
+        <p:blipFill>
+          <a:blip r:embed="rId3"/>
+          <a:stretch>
+            <a:fillRect/>
+          </a:stretch>
+        </p:blipFill>
+        <p:spPr>
+          <a:xfrm>
+            <a:off x="1168325" y="3576484"/>
+            <a:ext cx="5752895" cy="2589366"/>
+          </a:xfrm>
+          <a:prstGeom prst="rect">
+            <a:avLst/>
+          </a:prstGeom>
+        </p:spPr>
+      </p:pic>
+      <p:sp>
+        <p:nvSpPr>
+          <p:cNvPr id="2" name="Titel 1">
+            <a:extLst>
+              <a:ext uri="{FF2B5EF4-FFF2-40B4-BE49-F238E27FC236}">
+                <a16:creationId xmlns:a16="http://schemas.microsoft.com/office/drawing/2014/main" id="{D8AEE356-2190-4A68-B30A-AD40D96A4F3E}"/>
+              </a:ext>
+            </a:extLst>
+          </p:cNvPr>
+          <p:cNvSpPr>
+            <a:spLocks noGrp="1"/>
+          </p:cNvSpPr>
+          <p:nvPr>
+            <p:ph type="title"/>
+          </p:nvPr>
+        </p:nvSpPr>
+        <p:spPr/>
+        <p:txBody>
+          <a:bodyPr/>
+          <a:lstStyle/>
+          <a:p>
+            <a:r>
+              <a:rPr lang="de-DE" dirty="0"/>
+              <a:t>Dart - Funktionen</a:t>
+            </a:r>
+          </a:p>
+        </p:txBody>
+      </p:sp>
+      <p:sp>
+        <p:nvSpPr>
+          <p:cNvPr id="3" name="Inhaltsplatzhalter 2">
+            <a:extLst>
+              <a:ext uri="{FF2B5EF4-FFF2-40B4-BE49-F238E27FC236}">
+                <a16:creationId xmlns:a16="http://schemas.microsoft.com/office/drawing/2014/main" id="{CAA2B96E-C69F-4F5B-8511-66F66DA7DC44}"/>
+              </a:ext>
+            </a:extLst>
+          </p:cNvPr>
+          <p:cNvSpPr>
+            <a:spLocks noGrp="1"/>
+          </p:cNvSpPr>
+          <p:nvPr>
+            <p:ph idx="1"/>
+          </p:nvPr>
+        </p:nvSpPr>
+        <p:spPr/>
+        <p:txBody>
+          <a:bodyPr/>
+          <a:lstStyle/>
+          <a:p>
+            <a:r>
+              <a:rPr lang="de-DE" dirty="0"/>
+              <a:t>Funktionen sind ähnlich wie Methoden, liefern aber ein Ergebnis</a:t>
+            </a:r>
+            <a:br>
+              <a:rPr lang="de-DE" dirty="0"/>
+            </a:br>
+            <a:r>
+              <a:rPr lang="de-DE" sz="2400" b="1" i="1" dirty="0">
+                <a:solidFill>
+                  <a:schemeClr val="tx2"/>
+                </a:solidFill>
+              </a:rPr>
+              <a:t>ergebnistyp</a:t>
+            </a:r>
+            <a:r>
+              <a:rPr lang="de-DE" sz="2400" b="1" dirty="0">
+                <a:solidFill>
+                  <a:schemeClr val="accent1">
+                    <a:lumMod val="75000"/>
+                  </a:schemeClr>
+                </a:solidFill>
+              </a:rPr>
+              <a:t> </a:t>
+            </a:r>
+            <a:r>
+              <a:rPr lang="de-DE" sz="2400" b="1" i="1" dirty="0" err="1">
+                <a:solidFill>
+                  <a:schemeClr val="tx2"/>
+                </a:solidFill>
+              </a:rPr>
+              <a:t>name</a:t>
+            </a:r>
+            <a:r>
+              <a:rPr lang="de-DE" sz="2400" b="1" dirty="0">
+                <a:solidFill>
+                  <a:schemeClr val="accent1">
+                    <a:lumMod val="75000"/>
+                  </a:schemeClr>
+                </a:solidFill>
+              </a:rPr>
+              <a:t>(</a:t>
+            </a:r>
+            <a:r>
+              <a:rPr lang="de-DE" sz="2400" b="1" dirty="0" err="1">
+                <a:solidFill>
+                  <a:schemeClr val="accent1">
+                    <a:lumMod val="75000"/>
+                  </a:schemeClr>
+                </a:solidFill>
+              </a:rPr>
+              <a:t>var</a:t>
+            </a:r>
+            <a:r>
+              <a:rPr lang="de-DE" sz="2400" b="1" dirty="0">
+                <a:solidFill>
+                  <a:schemeClr val="accent1">
+                    <a:lumMod val="75000"/>
+                  </a:schemeClr>
+                </a:solidFill>
+              </a:rPr>
+              <a:t> </a:t>
+            </a:r>
+            <a:r>
+              <a:rPr lang="de-DE" sz="2400" b="1" i="1" dirty="0" err="1">
+                <a:solidFill>
+                  <a:schemeClr val="tx2"/>
+                </a:solidFill>
+              </a:rPr>
+              <a:t>argument</a:t>
+            </a:r>
+            <a:r>
+              <a:rPr lang="de-DE" sz="2400" b="1" dirty="0">
+                <a:solidFill>
+                  <a:schemeClr val="accent1">
+                    <a:lumMod val="75000"/>
+                  </a:schemeClr>
+                </a:solidFill>
+              </a:rPr>
+              <a:t>, </a:t>
+            </a:r>
+            <a:r>
+              <a:rPr lang="de-DE" sz="2400" b="1" dirty="0" err="1">
+                <a:solidFill>
+                  <a:schemeClr val="accent1">
+                    <a:lumMod val="75000"/>
+                  </a:schemeClr>
+                </a:solidFill>
+              </a:rPr>
+              <a:t>var</a:t>
+            </a:r>
+            <a:r>
+              <a:rPr lang="de-DE" sz="2400" b="1" i="1" dirty="0">
+                <a:solidFill>
+                  <a:schemeClr val="tx2"/>
+                </a:solidFill>
+              </a:rPr>
+              <a:t> argument2</a:t>
+            </a:r>
+            <a:r>
+              <a:rPr lang="de-DE" sz="2400" b="1" dirty="0">
+                <a:solidFill>
+                  <a:schemeClr val="accent1">
+                    <a:lumMod val="75000"/>
+                  </a:schemeClr>
+                </a:solidFill>
+              </a:rPr>
+              <a:t>,</a:t>
+            </a:r>
+            <a:r>
+              <a:rPr lang="de-DE" sz="2400" b="1" i="1" dirty="0">
+                <a:solidFill>
+                  <a:schemeClr val="tx2"/>
+                </a:solidFill>
+              </a:rPr>
+              <a:t> </a:t>
+            </a:r>
+            <a:r>
+              <a:rPr lang="de-DE" dirty="0"/>
+              <a:t>…</a:t>
+            </a:r>
+            <a:r>
+              <a:rPr lang="de-DE" sz="2400" b="1" dirty="0">
+                <a:solidFill>
+                  <a:schemeClr val="accent1">
+                    <a:lumMod val="75000"/>
+                  </a:schemeClr>
+                </a:solidFill>
+              </a:rPr>
+              <a:t>) {</a:t>
+            </a:r>
+            <a:r>
+              <a:rPr lang="de-DE" dirty="0"/>
+              <a:t> </a:t>
+            </a:r>
+            <a:br>
+              <a:rPr lang="de-DE" dirty="0"/>
+            </a:br>
+            <a:r>
+              <a:rPr lang="de-DE" dirty="0"/>
+              <a:t>	…</a:t>
+            </a:r>
+            <a:br>
+              <a:rPr lang="de-DE" dirty="0"/>
+            </a:br>
+            <a:r>
+              <a:rPr lang="de-DE" dirty="0"/>
+              <a:t>	</a:t>
+            </a:r>
+            <a:r>
+              <a:rPr lang="de-DE" sz="2400" b="1" dirty="0" err="1">
+                <a:solidFill>
+                  <a:schemeClr val="accent1">
+                    <a:lumMod val="75000"/>
+                  </a:schemeClr>
+                </a:solidFill>
+              </a:rPr>
+              <a:t>return</a:t>
+            </a:r>
+            <a:r>
+              <a:rPr lang="de-DE" sz="2400" b="1" i="1" dirty="0">
+                <a:solidFill>
+                  <a:schemeClr val="tx2"/>
+                </a:solidFill>
+              </a:rPr>
+              <a:t> </a:t>
+            </a:r>
+            <a:r>
+              <a:rPr lang="de-DE" sz="2400" b="1" i="1" dirty="0" err="1">
+                <a:solidFill>
+                  <a:schemeClr val="tx2"/>
+                </a:solidFill>
+              </a:rPr>
+              <a:t>ergebnis</a:t>
+            </a:r>
+            <a:r>
+              <a:rPr lang="de-DE" sz="2400" b="1" dirty="0">
+                <a:solidFill>
+                  <a:schemeClr val="accent1">
+                    <a:lumMod val="75000"/>
+                  </a:schemeClr>
+                </a:solidFill>
+              </a:rPr>
+              <a:t>;</a:t>
+            </a:r>
+            <a:r>
+              <a:rPr lang="de-DE" sz="2400" b="1" i="1" dirty="0">
+                <a:solidFill>
+                  <a:schemeClr val="tx2"/>
+                </a:solidFill>
+              </a:rPr>
+              <a:t> </a:t>
+            </a:r>
+            <a:br>
+              <a:rPr lang="de-DE" sz="2400" b="1" i="1" dirty="0">
+                <a:solidFill>
+                  <a:schemeClr val="tx2"/>
+                </a:solidFill>
+              </a:rPr>
+            </a:br>
+            <a:r>
+              <a:rPr lang="de-DE" sz="2400" b="1" dirty="0">
+                <a:solidFill>
+                  <a:schemeClr val="accent1">
+                    <a:lumMod val="75000"/>
+                  </a:schemeClr>
+                </a:solidFill>
+              </a:rPr>
+              <a:t>}</a:t>
+            </a:r>
+          </a:p>
+        </p:txBody>
+      </p:sp>
+      <p:sp>
+        <p:nvSpPr>
+          <p:cNvPr id="4" name="Datumsplatzhalter 3">
+            <a:extLst>
+              <a:ext uri="{FF2B5EF4-FFF2-40B4-BE49-F238E27FC236}">
+                <a16:creationId xmlns:a16="http://schemas.microsoft.com/office/drawing/2014/main" id="{5DB3E6EA-5CA3-4700-8A7A-A7DF6CBD7260}"/>
+              </a:ext>
+            </a:extLst>
+          </p:cNvPr>
+          <p:cNvSpPr>
+            <a:spLocks noGrp="1"/>
+          </p:cNvSpPr>
+          <p:nvPr>
+            <p:ph type="dt" sz="half" idx="10"/>
+          </p:nvPr>
+        </p:nvSpPr>
+        <p:spPr/>
+        <p:txBody>
+          <a:bodyPr/>
+          <a:lstStyle/>
+          <a:p>
+            <a:fld id="{0C2E1D0D-BBB0-4269-8DC7-C28B8DA8D26F}" type="datetime1">
+              <a:rPr lang="de-DE" smtClean="0"/>
+              <a:t>31.01.2023</a:t>
+            </a:fld>
+            <a:endParaRPr lang="de-DE"/>
+          </a:p>
+        </p:txBody>
+      </p:sp>
+      <p:sp>
+        <p:nvSpPr>
+          <p:cNvPr id="5" name="Fußzeilenplatzhalter 4">
+            <a:extLst>
+              <a:ext uri="{FF2B5EF4-FFF2-40B4-BE49-F238E27FC236}">
+                <a16:creationId xmlns:a16="http://schemas.microsoft.com/office/drawing/2014/main" id="{14E75CA1-7496-4A5F-A5B9-9377BBE8B1B1}"/>
+              </a:ext>
+            </a:extLst>
+          </p:cNvPr>
+          <p:cNvSpPr>
+            <a:spLocks noGrp="1"/>
+          </p:cNvSpPr>
+          <p:nvPr>
+            <p:ph type="ftr" sz="quarter" idx="11"/>
+          </p:nvPr>
+        </p:nvSpPr>
+        <p:spPr/>
+        <p:txBody>
+          <a:bodyPr/>
+          <a:lstStyle/>
+          <a:p>
+            <a:r>
+              <a:rPr lang="de-DE"/>
+              <a:t>Dart - Programmiersprache für Smartphones</a:t>
+            </a:r>
+          </a:p>
+        </p:txBody>
+      </p:sp>
+      <p:sp>
+        <p:nvSpPr>
+          <p:cNvPr id="6" name="Foliennummernplatzhalter 5">
+            <a:extLst>
+              <a:ext uri="{FF2B5EF4-FFF2-40B4-BE49-F238E27FC236}">
+                <a16:creationId xmlns:a16="http://schemas.microsoft.com/office/drawing/2014/main" id="{D692A012-F83C-46E1-89B2-E7D25E69A176}"/>
+              </a:ext>
+            </a:extLst>
+          </p:cNvPr>
+          <p:cNvSpPr>
+            <a:spLocks noGrp="1"/>
+          </p:cNvSpPr>
+          <p:nvPr>
+            <p:ph type="sldNum" sz="quarter" idx="12"/>
+          </p:nvPr>
+        </p:nvSpPr>
+        <p:spPr/>
+        <p:txBody>
+          <a:bodyPr/>
+          <a:lstStyle/>
+          <a:p>
+            <a:fld id="{3A1F27E2-D58A-4028-9FF2-B12D897F257E}" type="slidenum">
+              <a:rPr lang="de-DE" smtClean="0"/>
+              <a:t>38</a:t>
+            </a:fld>
+            <a:endParaRPr lang="de-DE"/>
+          </a:p>
+        </p:txBody>
+      </p:sp>
+    </p:spTree>
+    <p:extLst>
+      <p:ext uri="{BB962C8B-B14F-4D97-AF65-F5344CB8AC3E}">
+        <p14:creationId xmlns:p14="http://schemas.microsoft.com/office/powerpoint/2010/main" val="521988749"/>
+      </p:ext>
+    </p:extLst>
+  </p:cSld>
+  <p:clrMapOvr>
+    <a:masterClrMapping/>
+  </p:clrMapOvr>
+</p:sld>
+</file>
+
+<file path=ppt/slides/slide39.xml><?xml version="1.0" encoding="utf-8"?>
+<p:sld xmlns:a="http://schemas.openxmlformats.org/drawingml/2006/main" xmlns:r="http://schemas.openxmlformats.org/officeDocument/2006/relationships" xmlns:p="http://schemas.openxmlformats.org/presentationml/2006/main">
+  <p:cSld>
+    <p:spTree>
+      <p:nvGrpSpPr>
+        <p:cNvPr id="1" name=""/>
+        <p:cNvGrpSpPr/>
+        <p:nvPr/>
+      </p:nvGrpSpPr>
+      <p:grpSpPr>
+        <a:xfrm>
+          <a:off x="0" y="0"/>
+          <a:ext cx="0" cy="0"/>
+          <a:chOff x="0" y="0"/>
+          <a:chExt cx="0" cy="0"/>
+        </a:xfrm>
+      </p:grpSpPr>
+      <p:sp>
+        <p:nvSpPr>
+          <p:cNvPr id="2" name="Titel 1">
+            <a:extLst>
+              <a:ext uri="{FF2B5EF4-FFF2-40B4-BE49-F238E27FC236}">
+                <a16:creationId xmlns:a16="http://schemas.microsoft.com/office/drawing/2014/main" id="{D8AEE356-2190-4A68-B30A-AD40D96A4F3E}"/>
+              </a:ext>
+            </a:extLst>
+          </p:cNvPr>
+          <p:cNvSpPr>
+            <a:spLocks noGrp="1"/>
+          </p:cNvSpPr>
+          <p:nvPr>
+            <p:ph type="title"/>
+          </p:nvPr>
+        </p:nvSpPr>
+        <p:spPr/>
+        <p:txBody>
+          <a:bodyPr/>
+          <a:lstStyle/>
+          <a:p>
+            <a:r>
+              <a:rPr lang="de-DE" dirty="0"/>
+              <a:t>Dart - Funktionen</a:t>
+            </a:r>
+          </a:p>
+        </p:txBody>
+      </p:sp>
+      <mc:AlternateContent xmlns:mc="http://schemas.openxmlformats.org/markup-compatibility/2006" xmlns:a14="http://schemas.microsoft.com/office/drawing/2010/main">
+        <mc:Choice Requires="a14">
+          <p:sp>
+            <p:nvSpPr>
+              <p:cNvPr id="3" name="Inhaltsplatzhalter 2">
+                <a:extLst>
+                  <a:ext uri="{FF2B5EF4-FFF2-40B4-BE49-F238E27FC236}">
+                    <a16:creationId xmlns:a16="http://schemas.microsoft.com/office/drawing/2014/main" id="{CAA2B96E-C69F-4F5B-8511-66F66DA7DC44}"/>
+                  </a:ext>
+                </a:extLst>
+              </p:cNvPr>
+              <p:cNvSpPr>
+                <a:spLocks noGrp="1"/>
+              </p:cNvSpPr>
+              <p:nvPr>
+                <p:ph idx="1"/>
+              </p:nvPr>
+            </p:nvSpPr>
+            <p:spPr>
+              <a:xfrm>
+                <a:off x="838200" y="1520825"/>
+                <a:ext cx="9869129" cy="4645025"/>
+              </a:xfrm>
+            </p:spPr>
+            <p:txBody>
+              <a:bodyPr anchor="ctr"/>
+              <a:lstStyle/>
+              <a:p>
+                <a:pPr marL="0" indent="0">
+                  <a:buNone/>
+                </a:pPr>
+                <a:r>
+                  <a:rPr lang="de-DE" dirty="0"/>
+                  <a:t>Programmiere eine Funktion, </a:t>
+                </a:r>
+                <a:br>
+                  <a:rPr lang="de-DE" dirty="0"/>
+                </a:br>
+                <a:r>
+                  <a:rPr lang="de-DE" dirty="0"/>
+                  <a:t>die das gleiche Ergebnis liefert wie </a:t>
+                </a:r>
+                <a:r>
+                  <a:rPr lang="de-DE" dirty="0" err="1"/>
+                  <a:t>math.pow</a:t>
+                </a:r>
+                <a:r>
+                  <a:rPr lang="de-DE" dirty="0"/>
+                  <a:t>()</a:t>
+                </a:r>
+              </a:p>
+              <a:p>
+                <a:pPr marL="0" indent="0">
+                  <a:buNone/>
+                </a:pPr>
+                <a:endParaRPr lang="de-DE" dirty="0"/>
+              </a:p>
+              <a:p>
+                <a:pPr marL="0" indent="0">
+                  <a:buNone/>
+                </a:pPr>
+                <a:r>
+                  <a:rPr lang="de-DE" sz="2000" dirty="0"/>
+                  <a:t>Zulässige Annahme:</a:t>
+                </a:r>
+              </a:p>
+              <a:p>
+                <a:r>
+                  <a:rPr lang="de-DE" sz="2000" dirty="0"/>
+                  <a:t>Nur natürliche Zahlen (</a:t>
+                </a:r>
+                <a14:m>
+                  <m:oMath xmlns:m="http://schemas.openxmlformats.org/officeDocument/2006/math">
+                    <m:sSubSup>
+                      <m:sSubSupPr>
+                        <m:ctrlPr>
+                          <a:rPr lang="de-DE" sz="2000" i="1" smtClean="0">
+                            <a:latin typeface="Cambria Math" panose="02040503050406030204" pitchFamily="18" charset="0"/>
+                            <a:ea typeface="Cambria Math" panose="02040503050406030204" pitchFamily="18" charset="0"/>
+                          </a:rPr>
+                        </m:ctrlPr>
+                      </m:sSubSupPr>
+                      <m:e>
+                        <m:r>
+                          <a:rPr lang="de-DE" sz="2000" i="1">
+                            <a:latin typeface="Cambria Math" panose="02040503050406030204" pitchFamily="18" charset="0"/>
+                            <a:ea typeface="Cambria Math" panose="02040503050406030204" pitchFamily="18" charset="0"/>
+                          </a:rPr>
+                          <m:t>ℕ</m:t>
+                        </m:r>
+                      </m:e>
+                      <m:sub>
+                        <m:r>
+                          <a:rPr lang="de-DE" sz="2000" b="0" i="1" smtClean="0">
+                            <a:latin typeface="Cambria Math" panose="02040503050406030204" pitchFamily="18" charset="0"/>
+                            <a:ea typeface="Cambria Math" panose="02040503050406030204" pitchFamily="18" charset="0"/>
+                          </a:rPr>
+                          <m:t>0</m:t>
+                        </m:r>
+                      </m:sub>
+                      <m:sup>
+                        <m:r>
+                          <a:rPr lang="de-DE" sz="2000" b="0" i="1" smtClean="0">
+                            <a:latin typeface="Cambria Math" panose="02040503050406030204" pitchFamily="18" charset="0"/>
+                            <a:ea typeface="Cambria Math" panose="02040503050406030204" pitchFamily="18" charset="0"/>
+                          </a:rPr>
+                          <m:t> </m:t>
+                        </m:r>
+                      </m:sup>
+                    </m:sSubSup>
+                  </m:oMath>
+                </a14:m>
+                <a:r>
+                  <a:rPr lang="de-DE" sz="2000" dirty="0"/>
+                  <a:t>)</a:t>
+                </a:r>
+              </a:p>
+            </p:txBody>
+          </p:sp>
+        </mc:Choice>
+        <mc:Fallback xmlns="">
+          <p:sp>
+            <p:nvSpPr>
+              <p:cNvPr id="3" name="Inhaltsplatzhalter 2">
+                <a:extLst>
+                  <a:ext uri="{FF2B5EF4-FFF2-40B4-BE49-F238E27FC236}">
+                    <a16:creationId xmlns:a16="http://schemas.microsoft.com/office/drawing/2014/main" id="{CAA2B96E-C69F-4F5B-8511-66F66DA7DC44}"/>
+                  </a:ext>
+                </a:extLst>
+              </p:cNvPr>
+              <p:cNvSpPr>
+                <a:spLocks noGrp="1" noRot="1" noChangeAspect="1" noMove="1" noResize="1" noEditPoints="1" noAdjustHandles="1" noChangeArrowheads="1" noChangeShapeType="1" noTextEdit="1"/>
+              </p:cNvSpPr>
+              <p:nvPr>
+                <p:ph idx="1"/>
+              </p:nvPr>
+            </p:nvSpPr>
+            <p:spPr>
+              <a:xfrm>
+                <a:off x="838200" y="1520825"/>
+                <a:ext cx="9869129" cy="4645025"/>
+              </a:xfrm>
+              <a:blipFill>
+                <a:blip r:embed="rId3"/>
+                <a:stretch>
+                  <a:fillRect l="-1298"/>
+                </a:stretch>
+              </a:blipFill>
+            </p:spPr>
+            <p:txBody>
+              <a:bodyPr/>
+              <a:lstStyle/>
+              <a:p>
+                <a:r>
+                  <a:rPr lang="de-DE">
+                    <a:noFill/>
+                  </a:rPr>
+                  <a:t> </a:t>
+                </a:r>
+              </a:p>
+            </p:txBody>
+          </p:sp>
+        </mc:Fallback>
+      </mc:AlternateContent>
+      <p:sp>
+        <p:nvSpPr>
+          <p:cNvPr id="4" name="Datumsplatzhalter 3">
+            <a:extLst>
+              <a:ext uri="{FF2B5EF4-FFF2-40B4-BE49-F238E27FC236}">
+                <a16:creationId xmlns:a16="http://schemas.microsoft.com/office/drawing/2014/main" id="{5DB3E6EA-5CA3-4700-8A7A-A7DF6CBD7260}"/>
+              </a:ext>
+            </a:extLst>
+          </p:cNvPr>
+          <p:cNvSpPr>
+            <a:spLocks noGrp="1"/>
+          </p:cNvSpPr>
+          <p:nvPr>
+            <p:ph type="dt" sz="half" idx="10"/>
+          </p:nvPr>
+        </p:nvSpPr>
+        <p:spPr/>
+        <p:txBody>
+          <a:bodyPr/>
+          <a:lstStyle/>
+          <a:p>
+            <a:fld id="{509B9FD4-6125-48DF-AAFB-8A90591F704C}" type="datetime1">
+              <a:rPr lang="de-DE" smtClean="0"/>
+              <a:t>31.01.2023</a:t>
+            </a:fld>
+            <a:endParaRPr lang="de-DE"/>
+          </a:p>
+        </p:txBody>
+      </p:sp>
+      <p:sp>
+        <p:nvSpPr>
+          <p:cNvPr id="5" name="Fußzeilenplatzhalter 4">
+            <a:extLst>
+              <a:ext uri="{FF2B5EF4-FFF2-40B4-BE49-F238E27FC236}">
+                <a16:creationId xmlns:a16="http://schemas.microsoft.com/office/drawing/2014/main" id="{14E75CA1-7496-4A5F-A5B9-9377BBE8B1B1}"/>
+              </a:ext>
+            </a:extLst>
+          </p:cNvPr>
+          <p:cNvSpPr>
+            <a:spLocks noGrp="1"/>
+          </p:cNvSpPr>
+          <p:nvPr>
+            <p:ph type="ftr" sz="quarter" idx="11"/>
+          </p:nvPr>
+        </p:nvSpPr>
+        <p:spPr/>
+        <p:txBody>
+          <a:bodyPr/>
+          <a:lstStyle/>
+          <a:p>
+            <a:r>
+              <a:rPr lang="de-DE"/>
+              <a:t>Dart - Programmiersprache für Smartphones</a:t>
+            </a:r>
+          </a:p>
+        </p:txBody>
+      </p:sp>
+      <p:sp>
+        <p:nvSpPr>
+          <p:cNvPr id="6" name="Foliennummernplatzhalter 5">
+            <a:extLst>
+              <a:ext uri="{FF2B5EF4-FFF2-40B4-BE49-F238E27FC236}">
+                <a16:creationId xmlns:a16="http://schemas.microsoft.com/office/drawing/2014/main" id="{D692A012-F83C-46E1-89B2-E7D25E69A176}"/>
+              </a:ext>
+            </a:extLst>
+          </p:cNvPr>
+          <p:cNvSpPr>
+            <a:spLocks noGrp="1"/>
+          </p:cNvSpPr>
+          <p:nvPr>
+            <p:ph type="sldNum" sz="quarter" idx="12"/>
+          </p:nvPr>
+        </p:nvSpPr>
+        <p:spPr/>
+        <p:txBody>
+          <a:bodyPr/>
+          <a:lstStyle/>
+          <a:p>
+            <a:fld id="{3A1F27E2-D58A-4028-9FF2-B12D897F257E}" type="slidenum">
+              <a:rPr lang="de-DE" smtClean="0"/>
+              <a:t>39</a:t>
+            </a:fld>
+            <a:endParaRPr lang="de-DE"/>
+          </a:p>
+        </p:txBody>
+      </p:sp>
+    </p:spTree>
+    <p:extLst>
+      <p:ext uri="{BB962C8B-B14F-4D97-AF65-F5344CB8AC3E}">
+        <p14:creationId xmlns:p14="http://schemas.microsoft.com/office/powerpoint/2010/main" val="917328592"/>
+      </p:ext>
+    </p:extLst>
+  </p:cSld>
+  <p:clrMapOvr>
+    <a:masterClrMapping/>
+  </p:clrMapOvr>
+</p:sld>
+</file>
+
 <file path=ppt/slides/slide4.xml><?xml version="1.0" encoding="utf-8"?>
 <p:sld xmlns:a="http://schemas.openxmlformats.org/drawingml/2006/main" xmlns:r="http://schemas.openxmlformats.org/officeDocument/2006/relationships" xmlns:p="http://schemas.openxmlformats.org/presentationml/2006/main">
   <p:cSld>
@@ -15366,6 +18768,282 @@
     <p:extLst>
       <p:ext uri="{BB962C8B-B14F-4D97-AF65-F5344CB8AC3E}">
         <p14:creationId xmlns:p14="http://schemas.microsoft.com/office/powerpoint/2010/main" val="3521883337"/>
+      </p:ext>
+    </p:extLst>
+  </p:cSld>
+  <p:clrMapOvr>
+    <a:masterClrMapping/>
+  </p:clrMapOvr>
+</p:sld>
+</file>
+
+<file path=ppt/slides/slide40.xml><?xml version="1.0" encoding="utf-8"?>
+<p:sld xmlns:a="http://schemas.openxmlformats.org/drawingml/2006/main" xmlns:r="http://schemas.openxmlformats.org/officeDocument/2006/relationships" xmlns:p="http://schemas.openxmlformats.org/presentationml/2006/main">
+  <p:cSld>
+    <p:spTree>
+      <p:nvGrpSpPr>
+        <p:cNvPr id="1" name=""/>
+        <p:cNvGrpSpPr/>
+        <p:nvPr/>
+      </p:nvGrpSpPr>
+      <p:grpSpPr>
+        <a:xfrm>
+          <a:off x="0" y="0"/>
+          <a:ext cx="0" cy="0"/>
+          <a:chOff x="0" y="0"/>
+          <a:chExt cx="0" cy="0"/>
+        </a:xfrm>
+      </p:grpSpPr>
+      <p:sp>
+        <p:nvSpPr>
+          <p:cNvPr id="2" name="Titel 1">
+            <a:extLst>
+              <a:ext uri="{FF2B5EF4-FFF2-40B4-BE49-F238E27FC236}">
+                <a16:creationId xmlns:a16="http://schemas.microsoft.com/office/drawing/2014/main" id="{D8AEE356-2190-4A68-B30A-AD40D96A4F3E}"/>
+              </a:ext>
+            </a:extLst>
+          </p:cNvPr>
+          <p:cNvSpPr>
+            <a:spLocks noGrp="1"/>
+          </p:cNvSpPr>
+          <p:nvPr>
+            <p:ph type="title"/>
+          </p:nvPr>
+        </p:nvSpPr>
+        <p:spPr/>
+        <p:txBody>
+          <a:bodyPr/>
+          <a:lstStyle/>
+          <a:p>
+            <a:r>
+              <a:rPr lang="de-DE" dirty="0"/>
+              <a:t>Dart - Funktionen</a:t>
+            </a:r>
+          </a:p>
+        </p:txBody>
+      </p:sp>
+      <mc:AlternateContent xmlns:mc="http://schemas.openxmlformats.org/markup-compatibility/2006" xmlns:a14="http://schemas.microsoft.com/office/drawing/2010/main">
+        <mc:Choice Requires="a14">
+          <p:sp>
+            <p:nvSpPr>
+              <p:cNvPr id="3" name="Inhaltsplatzhalter 2">
+                <a:extLst>
+                  <a:ext uri="{FF2B5EF4-FFF2-40B4-BE49-F238E27FC236}">
+                    <a16:creationId xmlns:a16="http://schemas.microsoft.com/office/drawing/2014/main" id="{CAA2B96E-C69F-4F5B-8511-66F66DA7DC44}"/>
+                  </a:ext>
+                </a:extLst>
+              </p:cNvPr>
+              <p:cNvSpPr>
+                <a:spLocks noGrp="1"/>
+              </p:cNvSpPr>
+              <p:nvPr>
+                <p:ph idx="1"/>
+              </p:nvPr>
+            </p:nvSpPr>
+            <p:spPr>
+              <a:xfrm>
+                <a:off x="838200" y="1520825"/>
+                <a:ext cx="9869129" cy="4645025"/>
+              </a:xfrm>
+            </p:spPr>
+            <p:txBody>
+              <a:bodyPr anchor="ctr"/>
+              <a:lstStyle/>
+              <a:p>
+                <a:pPr marL="0" indent="0">
+                  <a:buNone/>
+                </a:pPr>
+                <a:r>
+                  <a:rPr lang="de-DE" dirty="0"/>
+                  <a:t>Schreibe eine Funktion, </a:t>
+                </a:r>
+                <a:br>
+                  <a:rPr lang="de-DE" dirty="0"/>
+                </a:br>
+                <a:r>
+                  <a:rPr lang="de-DE" dirty="0"/>
+                  <a:t>die aus einer Liste mit Zahlen die kleinste heraussucht.</a:t>
+                </a:r>
+              </a:p>
+              <a:p>
+                <a:pPr marL="0" indent="0">
+                  <a:buNone/>
+                </a:pPr>
+                <a:endParaRPr lang="de-DE" sz="2000" dirty="0"/>
+              </a:p>
+              <a:p>
+                <a:pPr marL="0" indent="0">
+                  <a:buNone/>
+                </a:pPr>
+                <a:r>
+                  <a:rPr lang="de-DE" sz="2000" dirty="0"/>
+                  <a:t>Zulässige Annahme:</a:t>
+                </a:r>
+              </a:p>
+              <a:p>
+                <a:r>
+                  <a:rPr lang="de-DE" sz="2000" dirty="0"/>
+                  <a:t>Nur ganze Zahlen (</a:t>
+                </a:r>
+                <a14:m>
+                  <m:oMath xmlns:m="http://schemas.openxmlformats.org/officeDocument/2006/math">
+                    <m:r>
+                      <a:rPr lang="de-DE" sz="2000" i="1" smtClean="0">
+                        <a:latin typeface="Cambria Math" panose="02040503050406030204" pitchFamily="18" charset="0"/>
+                        <a:ea typeface="Cambria Math" panose="02040503050406030204" pitchFamily="18" charset="0"/>
+                      </a:rPr>
+                      <m:t>ℤ</m:t>
+                    </m:r>
+                  </m:oMath>
+                </a14:m>
+                <a:r>
+                  <a:rPr lang="de-DE" sz="2000" dirty="0"/>
+                  <a:t>)</a:t>
+                </a:r>
+              </a:p>
+              <a:p>
+                <a:r>
+                  <a:rPr lang="de-DE" sz="2000" dirty="0"/>
+                  <a:t>Mindestens eine Zahl in der Liste</a:t>
+                </a:r>
+              </a:p>
+            </p:txBody>
+          </p:sp>
+        </mc:Choice>
+        <mc:Fallback xmlns="">
+          <p:sp>
+            <p:nvSpPr>
+              <p:cNvPr id="3" name="Inhaltsplatzhalter 2">
+                <a:extLst>
+                  <a:ext uri="{FF2B5EF4-FFF2-40B4-BE49-F238E27FC236}">
+                    <a16:creationId xmlns:a16="http://schemas.microsoft.com/office/drawing/2014/main" id="{CAA2B96E-C69F-4F5B-8511-66F66DA7DC44}"/>
+                  </a:ext>
+                </a:extLst>
+              </p:cNvPr>
+              <p:cNvSpPr>
+                <a:spLocks noGrp="1" noRot="1" noChangeAspect="1" noMove="1" noResize="1" noEditPoints="1" noAdjustHandles="1" noChangeArrowheads="1" noChangeShapeType="1" noTextEdit="1"/>
+              </p:cNvSpPr>
+              <p:nvPr>
+                <p:ph idx="1"/>
+              </p:nvPr>
+            </p:nvSpPr>
+            <p:spPr>
+              <a:xfrm>
+                <a:off x="838200" y="1520825"/>
+                <a:ext cx="9869129" cy="4645025"/>
+              </a:xfrm>
+              <a:blipFill>
+                <a:blip r:embed="rId3"/>
+                <a:stretch>
+                  <a:fillRect l="-1298"/>
+                </a:stretch>
+              </a:blipFill>
+            </p:spPr>
+            <p:txBody>
+              <a:bodyPr/>
+              <a:lstStyle/>
+              <a:p>
+                <a:r>
+                  <a:rPr lang="de-DE">
+                    <a:noFill/>
+                  </a:rPr>
+                  <a:t> </a:t>
+                </a:r>
+              </a:p>
+            </p:txBody>
+          </p:sp>
+        </mc:Fallback>
+      </mc:AlternateContent>
+      <p:sp>
+        <p:nvSpPr>
+          <p:cNvPr id="4" name="Datumsplatzhalter 3">
+            <a:extLst>
+              <a:ext uri="{FF2B5EF4-FFF2-40B4-BE49-F238E27FC236}">
+                <a16:creationId xmlns:a16="http://schemas.microsoft.com/office/drawing/2014/main" id="{5DB3E6EA-5CA3-4700-8A7A-A7DF6CBD7260}"/>
+              </a:ext>
+            </a:extLst>
+          </p:cNvPr>
+          <p:cNvSpPr>
+            <a:spLocks noGrp="1"/>
+          </p:cNvSpPr>
+          <p:nvPr>
+            <p:ph type="dt" sz="half" idx="10"/>
+          </p:nvPr>
+        </p:nvSpPr>
+        <p:spPr/>
+        <p:txBody>
+          <a:bodyPr/>
+          <a:lstStyle/>
+          <a:p>
+            <a:fld id="{5E005D36-C238-4437-9368-75EE1209248D}" type="datetime1">
+              <a:rPr lang="de-DE" smtClean="0"/>
+              <a:t>31.01.2023</a:t>
+            </a:fld>
+            <a:endParaRPr lang="de-DE"/>
+          </a:p>
+        </p:txBody>
+      </p:sp>
+      <p:sp>
+        <p:nvSpPr>
+          <p:cNvPr id="5" name="Fußzeilenplatzhalter 4">
+            <a:extLst>
+              <a:ext uri="{FF2B5EF4-FFF2-40B4-BE49-F238E27FC236}">
+                <a16:creationId xmlns:a16="http://schemas.microsoft.com/office/drawing/2014/main" id="{14E75CA1-7496-4A5F-A5B9-9377BBE8B1B1}"/>
+              </a:ext>
+            </a:extLst>
+          </p:cNvPr>
+          <p:cNvSpPr>
+            <a:spLocks noGrp="1"/>
+          </p:cNvSpPr>
+          <p:nvPr>
+            <p:ph type="ftr" sz="quarter" idx="11"/>
+          </p:nvPr>
+        </p:nvSpPr>
+        <p:spPr/>
+        <p:txBody>
+          <a:bodyPr/>
+          <a:lstStyle/>
+          <a:p>
+            <a:r>
+              <a:rPr lang="de-DE"/>
+              <a:t>Dart - Programmiersprache für Smartphones</a:t>
+            </a:r>
+          </a:p>
+        </p:txBody>
+      </p:sp>
+      <p:sp>
+        <p:nvSpPr>
+          <p:cNvPr id="6" name="Foliennummernplatzhalter 5">
+            <a:extLst>
+              <a:ext uri="{FF2B5EF4-FFF2-40B4-BE49-F238E27FC236}">
+                <a16:creationId xmlns:a16="http://schemas.microsoft.com/office/drawing/2014/main" id="{D692A012-F83C-46E1-89B2-E7D25E69A176}"/>
+              </a:ext>
+            </a:extLst>
+          </p:cNvPr>
+          <p:cNvSpPr>
+            <a:spLocks noGrp="1"/>
+          </p:cNvSpPr>
+          <p:nvPr>
+            <p:ph type="sldNum" sz="quarter" idx="12"/>
+          </p:nvPr>
+        </p:nvSpPr>
+        <p:spPr/>
+        <p:txBody>
+          <a:bodyPr/>
+          <a:lstStyle/>
+          <a:p>
+            <a:fld id="{3A1F27E2-D58A-4028-9FF2-B12D897F257E}" type="slidenum">
+              <a:rPr lang="de-DE" smtClean="0"/>
+              <a:t>40</a:t>
+            </a:fld>
+            <a:endParaRPr lang="de-DE"/>
+          </a:p>
+        </p:txBody>
+      </p:sp>
+    </p:spTree>
+    <p:extLst>
+      <p:ext uri="{BB962C8B-B14F-4D97-AF65-F5344CB8AC3E}">
+        <p14:creationId xmlns:p14="http://schemas.microsoft.com/office/powerpoint/2010/main" val="751209009"/>
       </p:ext>
     </p:extLst>
   </p:cSld>

</xml_diff>

<commit_message>
Add slides for lambdas
</commit_message>
<xml_diff>
--- a/presentations/Dart.pptx
+++ b/presentations/Dart.pptx
@@ -6,10 +6,10 @@
     <p:sldMasterId id="2147483656" r:id="rId2"/>
   </p:sldMasterIdLst>
   <p:notesMasterIdLst>
-    <p:notesMasterId r:id="rId61"/>
+    <p:notesMasterId r:id="rId67"/>
   </p:notesMasterIdLst>
   <p:handoutMasterIdLst>
-    <p:handoutMasterId r:id="rId62"/>
+    <p:handoutMasterId r:id="rId68"/>
   </p:handoutMasterIdLst>
   <p:sldIdLst>
     <p:sldId id="256" r:id="rId3"/>
@@ -70,6 +70,12 @@
     <p:sldId id="322" r:id="rId58"/>
     <p:sldId id="323" r:id="rId59"/>
     <p:sldId id="324" r:id="rId60"/>
+    <p:sldId id="347" r:id="rId61"/>
+    <p:sldId id="352" r:id="rId62"/>
+    <p:sldId id="353" r:id="rId63"/>
+    <p:sldId id="354" r:id="rId64"/>
+    <p:sldId id="355" r:id="rId65"/>
+    <p:sldId id="356" r:id="rId66"/>
   </p:sldIdLst>
   <p:sldSz cx="12192000" cy="6858000"/>
   <p:notesSz cx="6858000" cy="9144000"/>
@@ -293,7 +299,14 @@
           </p14:sldIdLst>
         </p14:section>
         <p14:section name="Lambdas" id="{76D72FA9-169C-4513-9244-C6C9B595BF6E}">
-          <p14:sldIdLst/>
+          <p14:sldIdLst>
+            <p14:sldId id="347"/>
+            <p14:sldId id="352"/>
+            <p14:sldId id="353"/>
+            <p14:sldId id="354"/>
+            <p14:sldId id="355"/>
+            <p14:sldId id="356"/>
+          </p14:sldIdLst>
         </p14:section>
         <p14:section name="Async/Await" id="{F00BADB3-CEE5-4594-895D-E5F0B75FD60F}">
           <p14:sldIdLst/>
@@ -426,7 +439,7 @@
                   <a:schemeClr val="tx2"/>
                 </a:solidFill>
               </a:rPr>
-              <a:t>17.02.2023</a:t>
+              <a:t>24.03.2023</a:t>
             </a:fld>
             <a:endParaRPr lang="de-DE">
               <a:solidFill>
@@ -776,7 +789,7 @@
             <a:fld id="{B4113CCE-1A1A-46DB-884A-AE560F65C3AF}" type="datetimeFigureOut">
               <a:rPr lang="de-DE" smtClean="0"/>
               <a:pPr/>
-              <a:t>17.02.2023</a:t>
+              <a:t>24.03.2023</a:t>
             </a:fld>
             <a:endParaRPr lang="de-DE"/>
           </a:p>
@@ -5565,6 +5578,508 @@
 </p:notes>
 </file>
 
+<file path=ppt/notesSlides/notesSlide44.xml><?xml version="1.0" encoding="utf-8"?>
+<p:notes xmlns:a="http://schemas.openxmlformats.org/drawingml/2006/main" xmlns:r="http://schemas.openxmlformats.org/officeDocument/2006/relationships" xmlns:p="http://schemas.openxmlformats.org/presentationml/2006/main">
+  <p:cSld>
+    <p:spTree>
+      <p:nvGrpSpPr>
+        <p:cNvPr id="1" name=""/>
+        <p:cNvGrpSpPr/>
+        <p:nvPr/>
+      </p:nvGrpSpPr>
+      <p:grpSpPr>
+        <a:xfrm>
+          <a:off x="0" y="0"/>
+          <a:ext cx="0" cy="0"/>
+          <a:chOff x="0" y="0"/>
+          <a:chExt cx="0" cy="0"/>
+        </a:xfrm>
+      </p:grpSpPr>
+      <p:sp>
+        <p:nvSpPr>
+          <p:cNvPr id="2" name="Folienbildplatzhalter 1"/>
+          <p:cNvSpPr>
+            <a:spLocks noGrp="1" noRot="1" noChangeAspect="1"/>
+          </p:cNvSpPr>
+          <p:nvPr>
+            <p:ph type="sldImg"/>
+          </p:nvPr>
+        </p:nvSpPr>
+        <p:spPr>
+          <a:xfrm>
+            <a:off x="685800" y="1143000"/>
+            <a:ext cx="4270375" cy="2401888"/>
+          </a:xfrm>
+        </p:spPr>
+      </p:sp>
+      <p:sp>
+        <p:nvSpPr>
+          <p:cNvPr id="3" name="Notizenplatzhalter 2"/>
+          <p:cNvSpPr>
+            <a:spLocks noGrp="1"/>
+          </p:cNvSpPr>
+          <p:nvPr>
+            <p:ph type="body" idx="1"/>
+          </p:nvPr>
+        </p:nvSpPr>
+        <p:spPr/>
+        <p:txBody>
+          <a:bodyPr/>
+          <a:lstStyle/>
+          <a:p>
+            <a:r>
+              <a:rPr lang="de-DE" dirty="0"/>
+              <a:t>Frage an die Teilnehmer: was wäre eine Lösung?</a:t>
+            </a:r>
+          </a:p>
+        </p:txBody>
+      </p:sp>
+      <p:sp>
+        <p:nvSpPr>
+          <p:cNvPr id="4" name="Foliennummernplatzhalter 3"/>
+          <p:cNvSpPr>
+            <a:spLocks noGrp="1"/>
+          </p:cNvSpPr>
+          <p:nvPr>
+            <p:ph type="sldNum" sz="quarter" idx="5"/>
+          </p:nvPr>
+        </p:nvSpPr>
+        <p:spPr/>
+        <p:txBody>
+          <a:bodyPr/>
+          <a:lstStyle/>
+          <a:p>
+            <a:fld id="{927DBD90-B360-417B-B4B3-F05A4AFC1996}" type="slidenum">
+              <a:rPr lang="de-DE" smtClean="0"/>
+              <a:pPr/>
+              <a:t>59</a:t>
+            </a:fld>
+            <a:endParaRPr lang="de-DE"/>
+          </a:p>
+        </p:txBody>
+      </p:sp>
+    </p:spTree>
+    <p:extLst>
+      <p:ext uri="{BB962C8B-B14F-4D97-AF65-F5344CB8AC3E}">
+        <p14:creationId xmlns:p14="http://schemas.microsoft.com/office/powerpoint/2010/main" val="1775610637"/>
+      </p:ext>
+    </p:extLst>
+  </p:cSld>
+  <p:clrMapOvr>
+    <a:masterClrMapping/>
+  </p:clrMapOvr>
+</p:notes>
+</file>
+
+<file path=ppt/notesSlides/notesSlide45.xml><?xml version="1.0" encoding="utf-8"?>
+<p:notes xmlns:a="http://schemas.openxmlformats.org/drawingml/2006/main" xmlns:r="http://schemas.openxmlformats.org/officeDocument/2006/relationships" xmlns:p="http://schemas.openxmlformats.org/presentationml/2006/main">
+  <p:cSld>
+    <p:spTree>
+      <p:nvGrpSpPr>
+        <p:cNvPr id="1" name=""/>
+        <p:cNvGrpSpPr/>
+        <p:nvPr/>
+      </p:nvGrpSpPr>
+      <p:grpSpPr>
+        <a:xfrm>
+          <a:off x="0" y="0"/>
+          <a:ext cx="0" cy="0"/>
+          <a:chOff x="0" y="0"/>
+          <a:chExt cx="0" cy="0"/>
+        </a:xfrm>
+      </p:grpSpPr>
+      <p:sp>
+        <p:nvSpPr>
+          <p:cNvPr id="2" name="Folienbildplatzhalter 1"/>
+          <p:cNvSpPr>
+            <a:spLocks noGrp="1" noRot="1" noChangeAspect="1"/>
+          </p:cNvSpPr>
+          <p:nvPr>
+            <p:ph type="sldImg"/>
+          </p:nvPr>
+        </p:nvSpPr>
+        <p:spPr>
+          <a:xfrm>
+            <a:off x="685800" y="1143000"/>
+            <a:ext cx="4270375" cy="2401888"/>
+          </a:xfrm>
+        </p:spPr>
+      </p:sp>
+      <p:sp>
+        <p:nvSpPr>
+          <p:cNvPr id="3" name="Notizenplatzhalter 2"/>
+          <p:cNvSpPr>
+            <a:spLocks noGrp="1"/>
+          </p:cNvSpPr>
+          <p:nvPr>
+            <p:ph type="body" idx="1"/>
+          </p:nvPr>
+        </p:nvSpPr>
+        <p:spPr/>
+        <p:txBody>
+          <a:bodyPr/>
+          <a:lstStyle/>
+          <a:p>
+            <a:endParaRPr lang="de-DE" dirty="0"/>
+          </a:p>
+        </p:txBody>
+      </p:sp>
+      <p:sp>
+        <p:nvSpPr>
+          <p:cNvPr id="4" name="Foliennummernplatzhalter 3"/>
+          <p:cNvSpPr>
+            <a:spLocks noGrp="1"/>
+          </p:cNvSpPr>
+          <p:nvPr>
+            <p:ph type="sldNum" sz="quarter" idx="5"/>
+          </p:nvPr>
+        </p:nvSpPr>
+        <p:spPr/>
+        <p:txBody>
+          <a:bodyPr/>
+          <a:lstStyle/>
+          <a:p>
+            <a:fld id="{927DBD90-B360-417B-B4B3-F05A4AFC1996}" type="slidenum">
+              <a:rPr lang="de-DE" smtClean="0"/>
+              <a:pPr/>
+              <a:t>60</a:t>
+            </a:fld>
+            <a:endParaRPr lang="de-DE"/>
+          </a:p>
+        </p:txBody>
+      </p:sp>
+    </p:spTree>
+    <p:extLst>
+      <p:ext uri="{BB962C8B-B14F-4D97-AF65-F5344CB8AC3E}">
+        <p14:creationId xmlns:p14="http://schemas.microsoft.com/office/powerpoint/2010/main" val="748185437"/>
+      </p:ext>
+    </p:extLst>
+  </p:cSld>
+  <p:clrMapOvr>
+    <a:masterClrMapping/>
+  </p:clrMapOvr>
+</p:notes>
+</file>
+
+<file path=ppt/notesSlides/notesSlide46.xml><?xml version="1.0" encoding="utf-8"?>
+<p:notes xmlns:a="http://schemas.openxmlformats.org/drawingml/2006/main" xmlns:r="http://schemas.openxmlformats.org/officeDocument/2006/relationships" xmlns:p="http://schemas.openxmlformats.org/presentationml/2006/main">
+  <p:cSld>
+    <p:spTree>
+      <p:nvGrpSpPr>
+        <p:cNvPr id="1" name=""/>
+        <p:cNvGrpSpPr/>
+        <p:nvPr/>
+      </p:nvGrpSpPr>
+      <p:grpSpPr>
+        <a:xfrm>
+          <a:off x="0" y="0"/>
+          <a:ext cx="0" cy="0"/>
+          <a:chOff x="0" y="0"/>
+          <a:chExt cx="0" cy="0"/>
+        </a:xfrm>
+      </p:grpSpPr>
+      <p:sp>
+        <p:nvSpPr>
+          <p:cNvPr id="2" name="Folienbildplatzhalter 1"/>
+          <p:cNvSpPr>
+            <a:spLocks noGrp="1" noRot="1" noChangeAspect="1"/>
+          </p:cNvSpPr>
+          <p:nvPr>
+            <p:ph type="sldImg"/>
+          </p:nvPr>
+        </p:nvSpPr>
+        <p:spPr>
+          <a:xfrm>
+            <a:off x="685800" y="1143000"/>
+            <a:ext cx="4270375" cy="2401888"/>
+          </a:xfrm>
+        </p:spPr>
+      </p:sp>
+      <p:sp>
+        <p:nvSpPr>
+          <p:cNvPr id="3" name="Notizenplatzhalter 2"/>
+          <p:cNvSpPr>
+            <a:spLocks noGrp="1"/>
+          </p:cNvSpPr>
+          <p:nvPr>
+            <p:ph type="body" idx="1"/>
+          </p:nvPr>
+        </p:nvSpPr>
+        <p:spPr/>
+        <p:txBody>
+          <a:bodyPr/>
+          <a:lstStyle/>
+          <a:p>
+            <a:endParaRPr lang="de-DE" dirty="0"/>
+          </a:p>
+        </p:txBody>
+      </p:sp>
+      <p:sp>
+        <p:nvSpPr>
+          <p:cNvPr id="4" name="Foliennummernplatzhalter 3"/>
+          <p:cNvSpPr>
+            <a:spLocks noGrp="1"/>
+          </p:cNvSpPr>
+          <p:nvPr>
+            <p:ph type="sldNum" sz="quarter" idx="5"/>
+          </p:nvPr>
+        </p:nvSpPr>
+        <p:spPr/>
+        <p:txBody>
+          <a:bodyPr/>
+          <a:lstStyle/>
+          <a:p>
+            <a:fld id="{927DBD90-B360-417B-B4B3-F05A4AFC1996}" type="slidenum">
+              <a:rPr lang="de-DE" smtClean="0"/>
+              <a:pPr/>
+              <a:t>61</a:t>
+            </a:fld>
+            <a:endParaRPr lang="de-DE"/>
+          </a:p>
+        </p:txBody>
+      </p:sp>
+    </p:spTree>
+    <p:extLst>
+      <p:ext uri="{BB962C8B-B14F-4D97-AF65-F5344CB8AC3E}">
+        <p14:creationId xmlns:p14="http://schemas.microsoft.com/office/powerpoint/2010/main" val="1244336510"/>
+      </p:ext>
+    </p:extLst>
+  </p:cSld>
+  <p:clrMapOvr>
+    <a:masterClrMapping/>
+  </p:clrMapOvr>
+</p:notes>
+</file>
+
+<file path=ppt/notesSlides/notesSlide47.xml><?xml version="1.0" encoding="utf-8"?>
+<p:notes xmlns:a="http://schemas.openxmlformats.org/drawingml/2006/main" xmlns:r="http://schemas.openxmlformats.org/officeDocument/2006/relationships" xmlns:p="http://schemas.openxmlformats.org/presentationml/2006/main">
+  <p:cSld>
+    <p:spTree>
+      <p:nvGrpSpPr>
+        <p:cNvPr id="1" name=""/>
+        <p:cNvGrpSpPr/>
+        <p:nvPr/>
+      </p:nvGrpSpPr>
+      <p:grpSpPr>
+        <a:xfrm>
+          <a:off x="0" y="0"/>
+          <a:ext cx="0" cy="0"/>
+          <a:chOff x="0" y="0"/>
+          <a:chExt cx="0" cy="0"/>
+        </a:xfrm>
+      </p:grpSpPr>
+      <p:sp>
+        <p:nvSpPr>
+          <p:cNvPr id="2" name="Folienbildplatzhalter 1"/>
+          <p:cNvSpPr>
+            <a:spLocks noGrp="1" noRot="1" noChangeAspect="1"/>
+          </p:cNvSpPr>
+          <p:nvPr>
+            <p:ph type="sldImg"/>
+          </p:nvPr>
+        </p:nvSpPr>
+        <p:spPr>
+          <a:xfrm>
+            <a:off x="685800" y="1143000"/>
+            <a:ext cx="4270375" cy="2401888"/>
+          </a:xfrm>
+        </p:spPr>
+      </p:sp>
+      <p:sp>
+        <p:nvSpPr>
+          <p:cNvPr id="3" name="Notizenplatzhalter 2"/>
+          <p:cNvSpPr>
+            <a:spLocks noGrp="1"/>
+          </p:cNvSpPr>
+          <p:nvPr>
+            <p:ph type="body" idx="1"/>
+          </p:nvPr>
+        </p:nvSpPr>
+        <p:spPr/>
+        <p:txBody>
+          <a:bodyPr/>
+          <a:lstStyle/>
+          <a:p>
+            <a:r>
+              <a:rPr lang="de-DE" dirty="0"/>
+              <a:t>Bei der Funktion müssen wir den Rückgabewert angeben (hier: </a:t>
+            </a:r>
+            <a:r>
+              <a:rPr lang="de-DE" dirty="0" err="1"/>
+              <a:t>int</a:t>
+            </a:r>
+            <a:r>
+              <a:rPr lang="de-DE" dirty="0"/>
+              <a:t>), beim Lambda nicht (</a:t>
+            </a:r>
+            <a:r>
+              <a:rPr lang="de-DE" dirty="0" err="1"/>
+              <a:t>var</a:t>
+            </a:r>
+            <a:r>
+              <a:rPr lang="de-DE" dirty="0"/>
+              <a:t> ist der Typ der Variable, nicht der Rückgabetyp der Funktion).</a:t>
+            </a:r>
+          </a:p>
+          <a:p>
+            <a:r>
+              <a:rPr lang="de-DE" dirty="0"/>
+              <a:t>Beim Lambda brauchen wir einen Stichpunkt (grün), um die Zuweisung (auch grün) abzuschließen. Bei der Funktion brauchen wir keinen Strichpunkt am Ende. Das Ende der Funktion ist die geschweifte Klammer.</a:t>
+            </a:r>
+          </a:p>
+          <a:p>
+            <a:r>
+              <a:rPr lang="de-DE" dirty="0"/>
+              <a:t>Beim Verwenden des Lambdas setzen wir Klammern wie bei einem Funktionsaufruf (lila).</a:t>
+            </a:r>
+          </a:p>
+          <a:p>
+            <a:endParaRPr lang="de-DE" dirty="0"/>
+          </a:p>
+          <a:p>
+            <a:r>
+              <a:rPr lang="de-DE" dirty="0"/>
+              <a:t>Bis jetzt haben wir noch nichts gewonnen. Das Lambda verhält sich genau wie eine Funktion.</a:t>
+            </a:r>
+          </a:p>
+          <a:p>
+            <a:r>
+              <a:rPr lang="de-DE" dirty="0"/>
+              <a:t>Wir wollten ja ein Problem lösen, nämlich den Zugriff auf lokale Variablen.</a:t>
+            </a:r>
+          </a:p>
+        </p:txBody>
+      </p:sp>
+      <p:sp>
+        <p:nvSpPr>
+          <p:cNvPr id="4" name="Foliennummernplatzhalter 3"/>
+          <p:cNvSpPr>
+            <a:spLocks noGrp="1"/>
+          </p:cNvSpPr>
+          <p:nvPr>
+            <p:ph type="sldNum" sz="quarter" idx="5"/>
+          </p:nvPr>
+        </p:nvSpPr>
+        <p:spPr/>
+        <p:txBody>
+          <a:bodyPr/>
+          <a:lstStyle/>
+          <a:p>
+            <a:fld id="{927DBD90-B360-417B-B4B3-F05A4AFC1996}" type="slidenum">
+              <a:rPr lang="de-DE" smtClean="0"/>
+              <a:pPr/>
+              <a:t>62</a:t>
+            </a:fld>
+            <a:endParaRPr lang="de-DE"/>
+          </a:p>
+        </p:txBody>
+      </p:sp>
+    </p:spTree>
+    <p:extLst>
+      <p:ext uri="{BB962C8B-B14F-4D97-AF65-F5344CB8AC3E}">
+        <p14:creationId xmlns:p14="http://schemas.microsoft.com/office/powerpoint/2010/main" val="487843608"/>
+      </p:ext>
+    </p:extLst>
+  </p:cSld>
+  <p:clrMapOvr>
+    <a:masterClrMapping/>
+  </p:clrMapOvr>
+</p:notes>
+</file>
+
+<file path=ppt/notesSlides/notesSlide48.xml><?xml version="1.0" encoding="utf-8"?>
+<p:notes xmlns:a="http://schemas.openxmlformats.org/drawingml/2006/main" xmlns:r="http://schemas.openxmlformats.org/officeDocument/2006/relationships" xmlns:p="http://schemas.openxmlformats.org/presentationml/2006/main">
+  <p:cSld>
+    <p:spTree>
+      <p:nvGrpSpPr>
+        <p:cNvPr id="1" name=""/>
+        <p:cNvGrpSpPr/>
+        <p:nvPr/>
+      </p:nvGrpSpPr>
+      <p:grpSpPr>
+        <a:xfrm>
+          <a:off x="0" y="0"/>
+          <a:ext cx="0" cy="0"/>
+          <a:chOff x="0" y="0"/>
+          <a:chExt cx="0" cy="0"/>
+        </a:xfrm>
+      </p:grpSpPr>
+      <p:sp>
+        <p:nvSpPr>
+          <p:cNvPr id="2" name="Folienbildplatzhalter 1"/>
+          <p:cNvSpPr>
+            <a:spLocks noGrp="1" noRot="1" noChangeAspect="1"/>
+          </p:cNvSpPr>
+          <p:nvPr>
+            <p:ph type="sldImg"/>
+          </p:nvPr>
+        </p:nvSpPr>
+        <p:spPr>
+          <a:xfrm>
+            <a:off x="685800" y="1143000"/>
+            <a:ext cx="4270375" cy="2401888"/>
+          </a:xfrm>
+        </p:spPr>
+      </p:sp>
+      <p:sp>
+        <p:nvSpPr>
+          <p:cNvPr id="3" name="Notizenplatzhalter 2"/>
+          <p:cNvSpPr>
+            <a:spLocks noGrp="1"/>
+          </p:cNvSpPr>
+          <p:nvPr>
+            <p:ph type="body" idx="1"/>
+          </p:nvPr>
+        </p:nvSpPr>
+        <p:spPr/>
+        <p:txBody>
+          <a:bodyPr/>
+          <a:lstStyle/>
+          <a:p>
+            <a:r>
+              <a:rPr lang="de-DE" dirty="0"/>
+              <a:t>Das schöne ist nun, dass wir innerhalb des Lambdas auf lokale Variablen zugreifen können, die außerhalb der Funktion definiert sind.</a:t>
+            </a:r>
+          </a:p>
+        </p:txBody>
+      </p:sp>
+      <p:sp>
+        <p:nvSpPr>
+          <p:cNvPr id="4" name="Foliennummernplatzhalter 3"/>
+          <p:cNvSpPr>
+            <a:spLocks noGrp="1"/>
+          </p:cNvSpPr>
+          <p:nvPr>
+            <p:ph type="sldNum" sz="quarter" idx="5"/>
+          </p:nvPr>
+        </p:nvSpPr>
+        <p:spPr/>
+        <p:txBody>
+          <a:bodyPr/>
+          <a:lstStyle/>
+          <a:p>
+            <a:fld id="{927DBD90-B360-417B-B4B3-F05A4AFC1996}" type="slidenum">
+              <a:rPr lang="de-DE" smtClean="0"/>
+              <a:pPr/>
+              <a:t>63</a:t>
+            </a:fld>
+            <a:endParaRPr lang="de-DE"/>
+          </a:p>
+        </p:txBody>
+      </p:sp>
+    </p:spTree>
+    <p:extLst>
+      <p:ext uri="{BB962C8B-B14F-4D97-AF65-F5344CB8AC3E}">
+        <p14:creationId xmlns:p14="http://schemas.microsoft.com/office/powerpoint/2010/main" val="4179338695"/>
+      </p:ext>
+    </p:extLst>
+  </p:cSld>
+  <p:clrMapOvr>
+    <a:masterClrMapping/>
+  </p:clrMapOvr>
+</p:notes>
+</file>
+
 <file path=ppt/notesSlides/notesSlide5.xml><?xml version="1.0" encoding="utf-8"?>
 <p:notes xmlns:a="http://schemas.openxmlformats.org/drawingml/2006/main" xmlns:r="http://schemas.openxmlformats.org/officeDocument/2006/relationships" xmlns:p="http://schemas.openxmlformats.org/presentationml/2006/main">
   <p:cSld>
@@ -6180,7 +6695,7 @@
           <a:p>
             <a:fld id="{4E6DF7AA-8899-480A-AE8B-97B651237939}" type="datetime1">
               <a:rPr lang="de-DE" smtClean="0"/>
-              <a:t>17.02.2023</a:t>
+              <a:t>24.03.2023</a:t>
             </a:fld>
             <a:endParaRPr lang="de-DE"/>
           </a:p>
@@ -6385,7 +6900,7 @@
           <a:p>
             <a:fld id="{A1082C62-1968-4D03-BE49-CB116A4D6814}" type="datetime1">
               <a:rPr lang="de-DE" smtClean="0"/>
-              <a:t>17.02.2023</a:t>
+              <a:t>24.03.2023</a:t>
             </a:fld>
             <a:endParaRPr lang="de-DE"/>
           </a:p>
@@ -6539,7 +7054,7 @@
           <a:p>
             <a:fld id="{C0E04462-FF80-4281-98D0-2AB88E65DA84}" type="datetime1">
               <a:rPr lang="de-DE" smtClean="0"/>
-              <a:t>17.02.2023</a:t>
+              <a:t>24.03.2023</a:t>
             </a:fld>
             <a:endParaRPr lang="de-DE"/>
           </a:p>
@@ -6776,7 +7291,7 @@
           <a:p>
             <a:fld id="{1FAA5A7F-2A4E-40D6-9FFE-960B13817A2C}" type="datetime1">
               <a:rPr lang="de-DE" smtClean="0"/>
-              <a:t>17.02.2023</a:t>
+              <a:t>24.03.2023</a:t>
             </a:fld>
             <a:endParaRPr lang="de-DE"/>
           </a:p>
@@ -6952,7 +7467,7 @@
           <a:p>
             <a:fld id="{382DDC3E-10C9-4B92-B2FB-A8167FB6AB1D}" type="datetime1">
               <a:rPr lang="de-DE" smtClean="0"/>
-              <a:t>17.02.2023</a:t>
+              <a:t>24.03.2023</a:t>
             </a:fld>
             <a:endParaRPr lang="de-DE"/>
           </a:p>
@@ -7128,7 +7643,7 @@
           <a:p>
             <a:fld id="{8159FE7A-07D2-4D3F-9855-29B7F3DF1D43}" type="datetime1">
               <a:rPr lang="de-DE" smtClean="0"/>
-              <a:t>17.02.2023</a:t>
+              <a:t>24.03.2023</a:t>
             </a:fld>
             <a:endParaRPr lang="de-DE"/>
           </a:p>
@@ -7278,7 +7793,7 @@
           <a:p>
             <a:fld id="{7CF1A54B-9CB9-49D3-BA48-5A7ECDBA0943}" type="datetime1">
               <a:rPr lang="de-DE" smtClean="0"/>
-              <a:t>17.02.2023</a:t>
+              <a:t>24.03.2023</a:t>
             </a:fld>
             <a:endParaRPr lang="de-DE"/>
           </a:p>
@@ -7376,7 +7891,7 @@
           <a:p>
             <a:fld id="{5621DBFA-780B-465A-97B9-CC4792E01430}" type="datetime1">
               <a:rPr lang="de-DE" smtClean="0"/>
-              <a:t>17.02.2023</a:t>
+              <a:t>24.03.2023</a:t>
             </a:fld>
             <a:endParaRPr lang="de-DE"/>
           </a:p>
@@ -7500,7 +8015,7 @@
           <a:p>
             <a:fld id="{13ADA68E-BD65-4999-8C0B-CC0F110C2BD3}" type="datetime1">
               <a:rPr lang="de-DE" smtClean="0"/>
-              <a:t>17.02.2023</a:t>
+              <a:t>24.03.2023</a:t>
             </a:fld>
             <a:endParaRPr lang="de-DE"/>
           </a:p>
@@ -7684,7 +8199,7 @@
           <a:p>
             <a:fld id="{93B55C80-8AAA-4242-8442-4A53184707C3}" type="datetime1">
               <a:rPr lang="de-DE" smtClean="0"/>
-              <a:t>17.02.2023</a:t>
+              <a:t>24.03.2023</a:t>
             </a:fld>
             <a:endParaRPr lang="de-DE"/>
           </a:p>
@@ -7889,7 +8404,7 @@
           <a:p>
             <a:fld id="{4485BB24-7FA9-422A-BF70-F9FA49C1D9F8}" type="datetime1">
               <a:rPr lang="de-DE" smtClean="0"/>
-              <a:t>17.02.2023</a:t>
+              <a:t>24.03.2023</a:t>
             </a:fld>
             <a:endParaRPr lang="de-DE"/>
           </a:p>
@@ -8247,7 +8762,7 @@
           <a:p>
             <a:fld id="{3CD93E9C-CF59-4162-A977-F7642EDBB23A}" type="datetime1">
               <a:rPr lang="de-DE" smtClean="0"/>
-              <a:t>17.02.2023</a:t>
+              <a:t>24.03.2023</a:t>
             </a:fld>
             <a:endParaRPr lang="de-DE" dirty="0"/>
           </a:p>
@@ -8888,7 +9403,7 @@
           <a:p>
             <a:fld id="{6FE8A2CE-6D32-4716-A090-EDD7EE0B4140}" type="datetime1">
               <a:rPr lang="de-DE" smtClean="0"/>
-              <a:t>17.02.2023</a:t>
+              <a:t>24.03.2023</a:t>
             </a:fld>
             <a:endParaRPr lang="de-DE" dirty="0"/>
           </a:p>
@@ -9560,7 +10075,7 @@
           <a:p>
             <a:fld id="{603113A9-B1ED-4EC0-A094-9858FCF2D0C8}" type="datetime1">
               <a:rPr lang="de-DE" smtClean="0"/>
-              <a:t>17.02.2023</a:t>
+              <a:t>24.03.2023</a:t>
             </a:fld>
             <a:endParaRPr lang="de-DE"/>
           </a:p>
@@ -9770,7 +10285,7 @@
           <a:p>
             <a:fld id="{B70EBCA3-FB0B-48D9-A2E5-56DBD5624AFE}" type="datetime1">
               <a:rPr lang="de-DE" smtClean="0"/>
-              <a:t>17.02.2023</a:t>
+              <a:t>24.03.2023</a:t>
             </a:fld>
             <a:endParaRPr lang="de-DE"/>
           </a:p>
@@ -10079,7 +10594,7 @@
           <a:p>
             <a:fld id="{AAEBEB04-CBF0-4835-872C-2565D4E2EBF1}" type="datetime1">
               <a:rPr lang="de-DE" smtClean="0"/>
-              <a:t>17.02.2023</a:t>
+              <a:t>24.03.2023</a:t>
             </a:fld>
             <a:endParaRPr lang="de-DE"/>
           </a:p>
@@ -10347,7 +10862,7 @@
           <a:p>
             <a:fld id="{8F663D0B-A90A-4472-ADF1-2D4D5E0E002A}" type="datetime1">
               <a:rPr lang="de-DE" smtClean="0"/>
-              <a:t>17.02.2023</a:t>
+              <a:t>24.03.2023</a:t>
             </a:fld>
             <a:endParaRPr lang="de-DE"/>
           </a:p>
@@ -10646,7 +11161,7 @@
           <a:p>
             <a:fld id="{C81998FD-B568-4E47-AA9F-CE36B3FEB5BA}" type="datetime1">
               <a:rPr lang="de-DE" smtClean="0"/>
-              <a:t>17.02.2023</a:t>
+              <a:t>24.03.2023</a:t>
             </a:fld>
             <a:endParaRPr lang="de-DE"/>
           </a:p>
@@ -10997,7 +11512,7 @@
           <a:p>
             <a:fld id="{0A4F56F1-7827-4042-A276-DAF40AC0B000}" type="datetime1">
               <a:rPr lang="de-DE" smtClean="0"/>
-              <a:t>17.02.2023</a:t>
+              <a:t>24.03.2023</a:t>
             </a:fld>
             <a:endParaRPr lang="de-DE"/>
           </a:p>
@@ -11295,7 +11810,7 @@
           <a:p>
             <a:fld id="{DAB02174-66FA-41E9-A997-DF7D3619438B}" type="datetime1">
               <a:rPr lang="de-DE" smtClean="0"/>
-              <a:t>17.02.2023</a:t>
+              <a:t>24.03.2023</a:t>
             </a:fld>
             <a:endParaRPr lang="de-DE"/>
           </a:p>
@@ -11676,7 +12191,7 @@
           <a:p>
             <a:fld id="{BDFFDF87-2C7B-4FBB-B7F3-0EB8FC88FA6F}" type="datetime1">
               <a:rPr lang="de-DE" smtClean="0"/>
-              <a:t>17.02.2023</a:t>
+              <a:t>24.03.2023</a:t>
             </a:fld>
             <a:endParaRPr lang="de-DE"/>
           </a:p>
@@ -12009,7 +12524,7 @@
           <a:p>
             <a:fld id="{4AEAFF43-79D1-488F-88E5-AECF0C52E4F6}" type="datetime1">
               <a:rPr lang="de-DE" smtClean="0"/>
-              <a:t>17.02.2023</a:t>
+              <a:t>24.03.2023</a:t>
             </a:fld>
             <a:endParaRPr lang="de-DE"/>
           </a:p>
@@ -12287,7 +12802,7 @@
           <a:p>
             <a:fld id="{F3624D99-4580-4939-A184-6854C4D65CB3}" type="datetime1">
               <a:rPr lang="de-DE" smtClean="0"/>
-              <a:t>17.02.2023</a:t>
+              <a:t>24.03.2023</a:t>
             </a:fld>
             <a:endParaRPr lang="de-DE"/>
           </a:p>
@@ -12627,7 +13142,7 @@
           <a:p>
             <a:fld id="{F2FEDD9D-5594-473A-899D-C0AD9514F726}" type="datetime1">
               <a:rPr lang="de-DE" smtClean="0"/>
-              <a:t>17.02.2023</a:t>
+              <a:t>24.03.2023</a:t>
             </a:fld>
             <a:endParaRPr lang="de-DE"/>
           </a:p>
@@ -12889,7 +13404,7 @@
           <a:p>
             <a:fld id="{92A047F3-1820-4570-AC17-C8DA167C5F14}" type="datetime1">
               <a:rPr lang="de-DE" smtClean="0"/>
-              <a:t>17.02.2023</a:t>
+              <a:t>24.03.2023</a:t>
             </a:fld>
             <a:endParaRPr lang="de-DE"/>
           </a:p>
@@ -13387,7 +13902,7 @@
           <a:p>
             <a:fld id="{95C3B550-B314-4EBE-B643-25AC9427FA8B}" type="datetime1">
               <a:rPr lang="de-DE" smtClean="0"/>
-              <a:t>17.02.2023</a:t>
+              <a:t>24.03.2023</a:t>
             </a:fld>
             <a:endParaRPr lang="de-DE"/>
           </a:p>
@@ -13733,7 +14248,7 @@
           <a:p>
             <a:fld id="{767B626B-00B4-4CEC-8206-7F4851B03FEF}" type="datetime1">
               <a:rPr lang="de-DE" smtClean="0"/>
-              <a:t>17.02.2023</a:t>
+              <a:t>24.03.2023</a:t>
             </a:fld>
             <a:endParaRPr lang="de-DE"/>
           </a:p>
@@ -14045,7 +14560,7 @@
           <a:p>
             <a:fld id="{102EEC64-5E38-4CDE-986C-4F454B58738A}" type="datetime1">
               <a:rPr lang="de-DE" smtClean="0"/>
-              <a:t>17.02.2023</a:t>
+              <a:t>24.03.2023</a:t>
             </a:fld>
             <a:endParaRPr lang="de-DE"/>
           </a:p>
@@ -14278,7 +14793,7 @@
           <a:p>
             <a:fld id="{8B9E1184-3E8E-4927-B70E-FCD133F545CF}" type="datetime1">
               <a:rPr lang="de-DE" smtClean="0"/>
-              <a:t>17.02.2023</a:t>
+              <a:t>24.03.2023</a:t>
             </a:fld>
             <a:endParaRPr lang="de-DE"/>
           </a:p>
@@ -14706,7 +15221,7 @@
           <a:p>
             <a:fld id="{372285A9-CAD1-4F8C-A320-59D4C92876C5}" type="datetime1">
               <a:rPr lang="de-DE" smtClean="0"/>
-              <a:t>17.02.2023</a:t>
+              <a:t>24.03.2023</a:t>
             </a:fld>
             <a:endParaRPr lang="de-DE"/>
           </a:p>
@@ -14919,7 +15434,7 @@
           <a:p>
             <a:fld id="{2F8DC1E6-2D30-4DE7-9C9D-5217FE18022E}" type="datetime1">
               <a:rPr lang="de-DE" smtClean="0"/>
-              <a:t>17.02.2023</a:t>
+              <a:t>24.03.2023</a:t>
             </a:fld>
             <a:endParaRPr lang="de-DE"/>
           </a:p>
@@ -15096,7 +15611,7 @@
           <a:p>
             <a:fld id="{637BE197-E414-48F3-B656-784E07538695}" type="datetime1">
               <a:rPr lang="de-DE" smtClean="0"/>
-              <a:t>17.02.2023</a:t>
+              <a:t>24.03.2023</a:t>
             </a:fld>
             <a:endParaRPr lang="de-DE"/>
           </a:p>
@@ -15528,7 +16043,7 @@
           <a:p>
             <a:fld id="{BC048919-3C08-48F6-A0CD-915EC777362A}" type="datetime1">
               <a:rPr lang="de-DE" smtClean="0"/>
-              <a:t>17.02.2023</a:t>
+              <a:t>24.03.2023</a:t>
             </a:fld>
             <a:endParaRPr lang="de-DE"/>
           </a:p>
@@ -15781,7 +16296,7 @@
           <a:p>
             <a:fld id="{94C91350-6869-4C72-8675-ECEAAAF05F8D}" type="datetime1">
               <a:rPr lang="de-DE" smtClean="0"/>
-              <a:t>17.02.2023</a:t>
+              <a:t>24.03.2023</a:t>
             </a:fld>
             <a:endParaRPr lang="de-DE"/>
           </a:p>
@@ -16123,7 +16638,7 @@
           <a:p>
             <a:fld id="{ACA1733B-6687-4EEA-9A6B-2EF228C82457}" type="datetime1">
               <a:rPr lang="de-DE" smtClean="0"/>
-              <a:t>17.02.2023</a:t>
+              <a:t>24.03.2023</a:t>
             </a:fld>
             <a:endParaRPr lang="de-DE"/>
           </a:p>
@@ -16423,7 +16938,7 @@
           <a:p>
             <a:fld id="{5C03BAA7-20D5-4E1B-8CB5-A2ED8F9EFD7F}" type="datetime1">
               <a:rPr lang="de-DE" smtClean="0"/>
-              <a:t>17.02.2023</a:t>
+              <a:t>24.03.2023</a:t>
             </a:fld>
             <a:endParaRPr lang="de-DE"/>
           </a:p>
@@ -16715,7 +17230,7 @@
           <a:p>
             <a:fld id="{2BBD85E3-27A5-4125-9DB2-C537C85BBE8A}" type="datetime1">
               <a:rPr lang="de-DE" smtClean="0"/>
-              <a:t>17.02.2023</a:t>
+              <a:t>24.03.2023</a:t>
             </a:fld>
             <a:endParaRPr lang="de-DE"/>
           </a:p>
@@ -16946,7 +17461,7 @@
           <a:p>
             <a:fld id="{2BBD85E3-27A5-4125-9DB2-C537C85BBE8A}" type="datetime1">
               <a:rPr lang="de-DE" smtClean="0"/>
-              <a:t>17.02.2023</a:t>
+              <a:t>24.03.2023</a:t>
             </a:fld>
             <a:endParaRPr lang="de-DE"/>
           </a:p>
@@ -17177,7 +17692,7 @@
           <a:p>
             <a:fld id="{115AC75E-72B2-486D-BEF5-A13F9B218F2F}" type="datetime1">
               <a:rPr lang="de-DE" smtClean="0"/>
-              <a:t>17.02.2023</a:t>
+              <a:t>24.03.2023</a:t>
             </a:fld>
             <a:endParaRPr lang="de-DE"/>
           </a:p>
@@ -17577,7 +18092,7 @@
           <a:p>
             <a:fld id="{B8ECF4B1-F230-4767-9D40-08A350DFB7D7}" type="datetime1">
               <a:rPr lang="de-DE" smtClean="0"/>
-              <a:t>17.02.2023</a:t>
+              <a:t>24.03.2023</a:t>
             </a:fld>
             <a:endParaRPr lang="de-DE"/>
           </a:p>
@@ -17913,7 +18428,7 @@
           <a:p>
             <a:fld id="{DFEB386C-A89C-4E71-8C7A-EB57A1CCB74F}" type="datetime1">
               <a:rPr lang="de-DE" smtClean="0"/>
-              <a:t>17.02.2023</a:t>
+              <a:t>24.03.2023</a:t>
             </a:fld>
             <a:endParaRPr lang="de-DE"/>
           </a:p>
@@ -18258,7 +18773,7 @@
           <a:p>
             <a:fld id="{E3A6C6BD-3868-452A-A2BD-92328FD8B4E8}" type="datetime1">
               <a:rPr lang="de-DE" smtClean="0"/>
-              <a:t>17.02.2023</a:t>
+              <a:t>24.03.2023</a:t>
             </a:fld>
             <a:endParaRPr lang="de-DE"/>
           </a:p>
@@ -18477,7 +18992,7 @@
           <a:p>
             <a:fld id="{B60FD287-29C3-4567-A3C8-1214880B52D5}" type="datetime1">
               <a:rPr lang="de-DE" smtClean="0"/>
-              <a:t>17.02.2023</a:t>
+              <a:t>24.03.2023</a:t>
             </a:fld>
             <a:endParaRPr lang="de-DE"/>
           </a:p>
@@ -18872,7 +19387,7 @@
           <a:p>
             <a:fld id="{172E1AE1-643D-418C-ACE4-F2637FAE5286}" type="datetime1">
               <a:rPr lang="de-DE" smtClean="0"/>
-              <a:t>17.02.2023</a:t>
+              <a:t>24.03.2023</a:t>
             </a:fld>
             <a:endParaRPr lang="de-DE"/>
           </a:p>
@@ -19419,7 +19934,7 @@
           <a:p>
             <a:fld id="{0C2E1D0D-BBB0-4269-8DC7-C28B8DA8D26F}" type="datetime1">
               <a:rPr lang="de-DE" smtClean="0"/>
-              <a:t>17.02.2023</a:t>
+              <a:t>24.03.2023</a:t>
             </a:fld>
             <a:endParaRPr lang="de-DE"/>
           </a:p>
@@ -19727,7 +20242,7 @@
           <a:p>
             <a:fld id="{509B9FD4-6125-48DF-AAFB-8A90591F704C}" type="datetime1">
               <a:rPr lang="de-DE" smtClean="0"/>
-              <a:t>17.02.2023</a:t>
+              <a:t>24.03.2023</a:t>
             </a:fld>
             <a:endParaRPr lang="de-DE"/>
           </a:p>
@@ -20026,7 +20541,7 @@
           <a:p>
             <a:fld id="{DDF7F67B-F411-40A4-BFC4-67CF6BB150A8}" type="datetime1">
               <a:rPr lang="de-DE" smtClean="0"/>
-              <a:t>17.02.2023</a:t>
+              <a:t>24.03.2023</a:t>
             </a:fld>
             <a:endParaRPr lang="de-DE"/>
           </a:p>
@@ -20453,7 +20968,7 @@
           <a:p>
             <a:fld id="{5E005D36-C238-4437-9368-75EE1209248D}" type="datetime1">
               <a:rPr lang="de-DE" smtClean="0"/>
-              <a:t>17.02.2023</a:t>
+              <a:t>24.03.2023</a:t>
             </a:fld>
             <a:endParaRPr lang="de-DE"/>
           </a:p>
@@ -20633,7 +21148,7 @@
           <a:p>
             <a:fld id="{21A4D148-919D-4643-B21F-50F1B7EF8BA2}" type="datetime1">
               <a:rPr lang="de-DE" smtClean="0"/>
-              <a:t>17.02.2023</a:t>
+              <a:t>24.03.2023</a:t>
             </a:fld>
             <a:endParaRPr lang="de-DE"/>
           </a:p>
@@ -20953,7 +21468,7 @@
           <a:p>
             <a:fld id="{A3D84A41-9102-4FAF-BB9B-7AD126A78344}" type="datetime1">
               <a:rPr lang="de-DE" smtClean="0"/>
-              <a:t>17.02.2023</a:t>
+              <a:t>24.03.2023</a:t>
             </a:fld>
             <a:endParaRPr lang="de-DE"/>
           </a:p>
@@ -21563,7 +22078,7 @@
           <a:p>
             <a:fld id="{81CA66B2-419B-4A00-B550-DA1493185108}" type="datetime1">
               <a:rPr lang="de-DE" smtClean="0"/>
-              <a:t>17.02.2023</a:t>
+              <a:t>24.03.2023</a:t>
             </a:fld>
             <a:endParaRPr lang="de-DE"/>
           </a:p>
@@ -22392,7 +22907,7 @@
           <a:p>
             <a:fld id="{374AF400-B2B3-4498-869C-65158B84F62E}" type="datetime1">
               <a:rPr lang="de-DE" smtClean="0"/>
-              <a:t>17.02.2023</a:t>
+              <a:t>24.03.2023</a:t>
             </a:fld>
             <a:endParaRPr lang="de-DE"/>
           </a:p>
@@ -22602,7 +23117,7 @@
           <a:p>
             <a:fld id="{EECFBCB7-6E51-47D1-88C0-70C111ACD504}" type="datetime1">
               <a:rPr lang="de-DE" smtClean="0"/>
-              <a:t>17.02.2023</a:t>
+              <a:t>24.03.2023</a:t>
             </a:fld>
             <a:endParaRPr lang="de-DE"/>
           </a:p>
@@ -23040,7 +23555,7 @@
           <a:p>
             <a:fld id="{284F0D45-833B-4CA2-95DA-AFDB6EDAE49B}" type="datetime1">
               <a:rPr lang="de-DE" smtClean="0"/>
-              <a:t>17.02.2023</a:t>
+              <a:t>24.03.2023</a:t>
             </a:fld>
             <a:endParaRPr lang="de-DE"/>
           </a:p>
@@ -23290,7 +23805,7 @@
           <a:p>
             <a:fld id="{382DDC3E-10C9-4B92-B2FB-A8167FB6AB1D}" type="datetime1">
               <a:rPr lang="de-DE" smtClean="0"/>
-              <a:t>17.02.2023</a:t>
+              <a:t>24.03.2023</a:t>
             </a:fld>
             <a:endParaRPr lang="de-DE"/>
           </a:p>
@@ -23477,7 +23992,7 @@
           <a:p>
             <a:fld id="{8159FE7A-07D2-4D3F-9855-29B7F3DF1D43}" type="datetime1">
               <a:rPr lang="de-DE" smtClean="0"/>
-              <a:t>17.02.2023</a:t>
+              <a:t>24.03.2023</a:t>
             </a:fld>
             <a:endParaRPr lang="de-DE"/>
           </a:p>
@@ -24443,7 +24958,7 @@
           <a:p>
             <a:fld id="{8159FE7A-07D2-4D3F-9855-29B7F3DF1D43}" type="datetime1">
               <a:rPr lang="de-DE" smtClean="0"/>
-              <a:t>17.02.2023</a:t>
+              <a:t>24.03.2023</a:t>
             </a:fld>
             <a:endParaRPr lang="de-DE"/>
           </a:p>
@@ -25242,7 +25757,7 @@
           <a:p>
             <a:fld id="{96C0D114-F0DB-443F-9337-40D84E177FDC}" type="datetime1">
               <a:rPr lang="de-DE" smtClean="0"/>
-              <a:t>17.02.2023</a:t>
+              <a:t>24.03.2023</a:t>
             </a:fld>
             <a:endParaRPr lang="de-DE"/>
           </a:p>
@@ -25473,7 +25988,7 @@
           <a:p>
             <a:fld id="{8159FE7A-07D2-4D3F-9855-29B7F3DF1D43}" type="datetime1">
               <a:rPr lang="de-DE" smtClean="0"/>
-              <a:t>17.02.2023</a:t>
+              <a:t>24.03.2023</a:t>
             </a:fld>
             <a:endParaRPr lang="de-DE"/>
           </a:p>
@@ -26223,7 +26738,7 @@
           <a:p>
             <a:fld id="{8159FE7A-07D2-4D3F-9855-29B7F3DF1D43}" type="datetime1">
               <a:rPr lang="de-DE" smtClean="0"/>
-              <a:t>17.02.2023</a:t>
+              <a:t>24.03.2023</a:t>
             </a:fld>
             <a:endParaRPr lang="de-DE"/>
           </a:p>
@@ -26484,7 +26999,7 @@
           <a:p>
             <a:fld id="{BC1A8AC8-5070-4C02-8E82-DE4FD3F8497A}" type="datetime1">
               <a:rPr lang="de-DE" smtClean="0"/>
-              <a:t>17.02.2023</a:t>
+              <a:t>24.03.2023</a:t>
             </a:fld>
             <a:endParaRPr lang="de-DE"/>
           </a:p>
@@ -26712,7 +27227,7 @@
           <a:p>
             <a:fld id="{AF1CB7BF-E60D-47C9-99CD-43B03711F834}" type="datetime1">
               <a:rPr lang="de-DE" smtClean="0"/>
-              <a:t>17.02.2023</a:t>
+              <a:t>24.03.2023</a:t>
             </a:fld>
             <a:endParaRPr lang="de-DE"/>
           </a:p>
@@ -26921,7 +27436,7 @@
           <a:p>
             <a:fld id="{B9053FEB-F038-4EB7-B9DC-77977117EA33}" type="datetime1">
               <a:rPr lang="de-DE" smtClean="0"/>
-              <a:t>17.02.2023</a:t>
+              <a:t>24.03.2023</a:t>
             </a:fld>
             <a:endParaRPr lang="de-DE"/>
           </a:p>
@@ -27481,7 +27996,7 @@
           <a:p>
             <a:fld id="{0B399FA5-2F01-416C-865E-705C1E0C03C8}" type="datetime1">
               <a:rPr lang="de-DE" smtClean="0"/>
-              <a:t>17.02.2023</a:t>
+              <a:t>24.03.2023</a:t>
             </a:fld>
             <a:endParaRPr lang="de-DE"/>
           </a:p>
@@ -27964,7 +28479,7 @@
           <a:p>
             <a:fld id="{D7CFAA5B-8ED2-4D87-B5CD-876772B506EB}" type="datetime1">
               <a:rPr lang="de-DE" smtClean="0"/>
-              <a:t>17.02.2023</a:t>
+              <a:t>24.03.2023</a:t>
             </a:fld>
             <a:endParaRPr lang="de-DE"/>
           </a:p>
@@ -28438,7 +28953,7 @@
           <a:p>
             <a:fld id="{706CFF74-9D82-4823-AFE2-CBE8D2D808FC}" type="datetime1">
               <a:rPr lang="de-DE" smtClean="0"/>
-              <a:t>17.02.2023</a:t>
+              <a:t>24.03.2023</a:t>
             </a:fld>
             <a:endParaRPr lang="de-DE"/>
           </a:p>
@@ -28649,7 +29164,7 @@
           <a:p>
             <a:fld id="{DF7C2B1F-6E2C-496E-BFF9-7CD4B274FE9C}" type="datetime1">
               <a:rPr lang="de-DE" smtClean="0"/>
-              <a:t>17.02.2023</a:t>
+              <a:t>24.03.2023</a:t>
             </a:fld>
             <a:endParaRPr lang="de-DE"/>
           </a:p>
@@ -28755,6 +29270,398 @@
 </p:sld>
 </file>
 
+<file path=ppt/slides/slide59.xml><?xml version="1.0" encoding="utf-8"?>
+<p:sld xmlns:a="http://schemas.openxmlformats.org/drawingml/2006/main" xmlns:r="http://schemas.openxmlformats.org/officeDocument/2006/relationships" xmlns:p="http://schemas.openxmlformats.org/presentationml/2006/main">
+  <p:cSld>
+    <p:spTree>
+      <p:nvGrpSpPr>
+        <p:cNvPr id="1" name=""/>
+        <p:cNvGrpSpPr/>
+        <p:nvPr/>
+      </p:nvGrpSpPr>
+      <p:grpSpPr>
+        <a:xfrm>
+          <a:off x="0" y="0"/>
+          <a:ext cx="0" cy="0"/>
+          <a:chOff x="0" y="0"/>
+          <a:chExt cx="0" cy="0"/>
+        </a:xfrm>
+      </p:grpSpPr>
+      <p:pic>
+        <p:nvPicPr>
+          <p:cNvPr id="13" name="Grafik 12">
+            <a:extLst>
+              <a:ext uri="{FF2B5EF4-FFF2-40B4-BE49-F238E27FC236}">
+                <a16:creationId xmlns:a16="http://schemas.microsoft.com/office/drawing/2014/main" id="{7FCAFDC7-B029-4A9A-9758-09162716B8E3}"/>
+              </a:ext>
+            </a:extLst>
+          </p:cNvPr>
+          <p:cNvPicPr>
+            <a:picLocks noChangeAspect="1"/>
+          </p:cNvPicPr>
+          <p:nvPr/>
+        </p:nvPicPr>
+        <p:blipFill>
+          <a:blip r:embed="rId3"/>
+          <a:stretch>
+            <a:fillRect/>
+          </a:stretch>
+        </p:blipFill>
+        <p:spPr>
+          <a:xfrm>
+            <a:off x="838201" y="2045014"/>
+            <a:ext cx="7308822" cy="4068191"/>
+          </a:xfrm>
+          <a:prstGeom prst="rect">
+            <a:avLst/>
+          </a:prstGeom>
+        </p:spPr>
+      </p:pic>
+      <p:sp>
+        <p:nvSpPr>
+          <p:cNvPr id="2" name="Titel 1">
+            <a:extLst>
+              <a:ext uri="{FF2B5EF4-FFF2-40B4-BE49-F238E27FC236}">
+                <a16:creationId xmlns:a16="http://schemas.microsoft.com/office/drawing/2014/main" id="{2A32A1F9-7E4E-4044-9E9A-D86B60384C9E}"/>
+              </a:ext>
+            </a:extLst>
+          </p:cNvPr>
+          <p:cNvSpPr>
+            <a:spLocks noGrp="1"/>
+          </p:cNvSpPr>
+          <p:nvPr>
+            <p:ph type="title"/>
+          </p:nvPr>
+        </p:nvSpPr>
+        <p:spPr/>
+        <p:txBody>
+          <a:bodyPr/>
+          <a:lstStyle/>
+          <a:p>
+            <a:r>
+              <a:rPr lang="de-DE" dirty="0"/>
+              <a:t>Dart - Lambdas</a:t>
+            </a:r>
+          </a:p>
+        </p:txBody>
+      </p:sp>
+      <p:sp>
+        <p:nvSpPr>
+          <p:cNvPr id="3" name="Inhaltsplatzhalter 2">
+            <a:extLst>
+              <a:ext uri="{FF2B5EF4-FFF2-40B4-BE49-F238E27FC236}">
+                <a16:creationId xmlns:a16="http://schemas.microsoft.com/office/drawing/2014/main" id="{6A6039B6-1897-4596-83B7-0B42F485643C}"/>
+              </a:ext>
+            </a:extLst>
+          </p:cNvPr>
+          <p:cNvSpPr>
+            <a:spLocks noGrp="1"/>
+          </p:cNvSpPr>
+          <p:nvPr>
+            <p:ph idx="1"/>
+          </p:nvPr>
+        </p:nvSpPr>
+        <p:spPr/>
+        <p:txBody>
+          <a:bodyPr/>
+          <a:lstStyle/>
+          <a:p>
+            <a:r>
+              <a:rPr lang="de-DE" dirty="0"/>
+              <a:t>Ungeschickt bei </a:t>
+            </a:r>
+            <a:r>
+              <a:rPr lang="de-DE" dirty="0" err="1"/>
+              <a:t>Callbacks</a:t>
+            </a:r>
+            <a:r>
+              <a:rPr lang="de-DE" dirty="0"/>
+              <a:t>: kein Zugriff auf lokale Variablen</a:t>
+            </a:r>
+          </a:p>
+        </p:txBody>
+      </p:sp>
+      <p:sp>
+        <p:nvSpPr>
+          <p:cNvPr id="4" name="Datumsplatzhalter 3">
+            <a:extLst>
+              <a:ext uri="{FF2B5EF4-FFF2-40B4-BE49-F238E27FC236}">
+                <a16:creationId xmlns:a16="http://schemas.microsoft.com/office/drawing/2014/main" id="{53A7EC4B-AC09-42FE-961B-472A96A04FF0}"/>
+              </a:ext>
+            </a:extLst>
+          </p:cNvPr>
+          <p:cNvSpPr>
+            <a:spLocks noGrp="1"/>
+          </p:cNvSpPr>
+          <p:nvPr>
+            <p:ph type="dt" sz="half" idx="10"/>
+          </p:nvPr>
+        </p:nvSpPr>
+        <p:spPr/>
+        <p:txBody>
+          <a:bodyPr/>
+          <a:lstStyle/>
+          <a:p>
+            <a:fld id="{8159FE7A-07D2-4D3F-9855-29B7F3DF1D43}" type="datetime1">
+              <a:rPr lang="de-DE" smtClean="0"/>
+              <a:t>24.03.2023</a:t>
+            </a:fld>
+            <a:endParaRPr lang="de-DE"/>
+          </a:p>
+        </p:txBody>
+      </p:sp>
+      <p:sp>
+        <p:nvSpPr>
+          <p:cNvPr id="5" name="Fußzeilenplatzhalter 4">
+            <a:extLst>
+              <a:ext uri="{FF2B5EF4-FFF2-40B4-BE49-F238E27FC236}">
+                <a16:creationId xmlns:a16="http://schemas.microsoft.com/office/drawing/2014/main" id="{9F46E991-A732-426B-A07E-8DAB44654B2E}"/>
+              </a:ext>
+            </a:extLst>
+          </p:cNvPr>
+          <p:cNvSpPr>
+            <a:spLocks noGrp="1"/>
+          </p:cNvSpPr>
+          <p:nvPr>
+            <p:ph type="ftr" sz="quarter" idx="11"/>
+          </p:nvPr>
+        </p:nvSpPr>
+        <p:spPr/>
+        <p:txBody>
+          <a:bodyPr/>
+          <a:lstStyle/>
+          <a:p>
+            <a:r>
+              <a:rPr lang="de-DE"/>
+              <a:t>Dart - Programmiersprache für Smartphones</a:t>
+            </a:r>
+          </a:p>
+        </p:txBody>
+      </p:sp>
+      <p:sp>
+        <p:nvSpPr>
+          <p:cNvPr id="6" name="Foliennummernplatzhalter 5">
+            <a:extLst>
+              <a:ext uri="{FF2B5EF4-FFF2-40B4-BE49-F238E27FC236}">
+                <a16:creationId xmlns:a16="http://schemas.microsoft.com/office/drawing/2014/main" id="{BE238A0B-1E74-4745-A606-FE964B62FF45}"/>
+              </a:ext>
+            </a:extLst>
+          </p:cNvPr>
+          <p:cNvSpPr>
+            <a:spLocks noGrp="1"/>
+          </p:cNvSpPr>
+          <p:nvPr>
+            <p:ph type="sldNum" sz="quarter" idx="12"/>
+          </p:nvPr>
+        </p:nvSpPr>
+        <p:spPr/>
+        <p:txBody>
+          <a:bodyPr/>
+          <a:lstStyle/>
+          <a:p>
+            <a:fld id="{3A1F27E2-D58A-4028-9FF2-B12D897F257E}" type="slidenum">
+              <a:rPr lang="de-DE" smtClean="0"/>
+              <a:t>59</a:t>
+            </a:fld>
+            <a:endParaRPr lang="de-DE"/>
+          </a:p>
+        </p:txBody>
+      </p:sp>
+      <p:sp>
+        <p:nvSpPr>
+          <p:cNvPr id="9" name="Rechteck 8">
+            <a:extLst>
+              <a:ext uri="{FF2B5EF4-FFF2-40B4-BE49-F238E27FC236}">
+                <a16:creationId xmlns:a16="http://schemas.microsoft.com/office/drawing/2014/main" id="{CA513ECB-059A-4712-AA07-5563AA915ED8}"/>
+              </a:ext>
+            </a:extLst>
+          </p:cNvPr>
+          <p:cNvSpPr/>
+          <p:nvPr/>
+        </p:nvSpPr>
+        <p:spPr>
+          <a:xfrm>
+            <a:off x="1677594" y="2293724"/>
+            <a:ext cx="1699787" cy="256825"/>
+          </a:xfrm>
+          <a:prstGeom prst="rect">
+            <a:avLst/>
+          </a:prstGeom>
+          <a:noFill/>
+          <a:ln w="28575">
+            <a:solidFill>
+              <a:schemeClr val="accent1"/>
+            </a:solidFill>
+          </a:ln>
+        </p:spPr>
+        <p:style>
+          <a:lnRef idx="2">
+            <a:schemeClr val="accent1">
+              <a:shade val="50000"/>
+            </a:schemeClr>
+          </a:lnRef>
+          <a:fillRef idx="1">
+            <a:schemeClr val="accent1"/>
+          </a:fillRef>
+          <a:effectRef idx="0">
+            <a:schemeClr val="accent1"/>
+          </a:effectRef>
+          <a:fontRef idx="minor">
+            <a:schemeClr val="lt1"/>
+          </a:fontRef>
+        </p:style>
+        <p:txBody>
+          <a:bodyPr rtlCol="0" anchor="ctr"/>
+          <a:lstStyle/>
+          <a:p>
+            <a:pPr algn="ctr"/>
+            <a:endParaRPr lang="de-DE"/>
+          </a:p>
+        </p:txBody>
+      </p:sp>
+      <p:sp>
+        <p:nvSpPr>
+          <p:cNvPr id="10" name="Textfeld 9">
+            <a:extLst>
+              <a:ext uri="{FF2B5EF4-FFF2-40B4-BE49-F238E27FC236}">
+                <a16:creationId xmlns:a16="http://schemas.microsoft.com/office/drawing/2014/main" id="{6FC99006-2D87-4455-8174-52A75D4A2475}"/>
+              </a:ext>
+            </a:extLst>
+          </p:cNvPr>
+          <p:cNvSpPr txBox="1"/>
+          <p:nvPr/>
+        </p:nvSpPr>
+        <p:spPr>
+          <a:xfrm>
+            <a:off x="3377381" y="2181217"/>
+            <a:ext cx="6312241" cy="369332"/>
+          </a:xfrm>
+          <a:prstGeom prst="rect">
+            <a:avLst/>
+          </a:prstGeom>
+          <a:noFill/>
+        </p:spPr>
+        <p:txBody>
+          <a:bodyPr wrap="none" rtlCol="0">
+            <a:spAutoFit/>
+          </a:bodyPr>
+          <a:lstStyle/>
+          <a:p>
+            <a:r>
+              <a:rPr lang="de-DE" dirty="0">
+                <a:solidFill>
+                  <a:schemeClr val="accent1"/>
+                </a:solidFill>
+              </a:rPr>
+              <a:t>Hier will ich vielleicht festlegen, wie viel Skonto jemand bekommt</a:t>
+            </a:r>
+          </a:p>
+        </p:txBody>
+      </p:sp>
+      <p:sp>
+        <p:nvSpPr>
+          <p:cNvPr id="11" name="Rechteck 10">
+            <a:extLst>
+              <a:ext uri="{FF2B5EF4-FFF2-40B4-BE49-F238E27FC236}">
+                <a16:creationId xmlns:a16="http://schemas.microsoft.com/office/drawing/2014/main" id="{2184E5DB-3550-43CC-B8F7-8AFCC84D47EF}"/>
+              </a:ext>
+            </a:extLst>
+          </p:cNvPr>
+          <p:cNvSpPr/>
+          <p:nvPr/>
+        </p:nvSpPr>
+        <p:spPr>
+          <a:xfrm>
+            <a:off x="3511310" y="3576193"/>
+            <a:ext cx="868961" cy="256825"/>
+          </a:xfrm>
+          <a:prstGeom prst="rect">
+            <a:avLst/>
+          </a:prstGeom>
+          <a:noFill/>
+          <a:ln w="28575">
+            <a:solidFill>
+              <a:schemeClr val="accent1"/>
+            </a:solidFill>
+          </a:ln>
+        </p:spPr>
+        <p:style>
+          <a:lnRef idx="2">
+            <a:schemeClr val="accent1">
+              <a:shade val="50000"/>
+            </a:schemeClr>
+          </a:lnRef>
+          <a:fillRef idx="1">
+            <a:schemeClr val="accent1"/>
+          </a:fillRef>
+          <a:effectRef idx="0">
+            <a:schemeClr val="accent1"/>
+          </a:effectRef>
+          <a:fontRef idx="minor">
+            <a:schemeClr val="lt1"/>
+          </a:fontRef>
+        </p:style>
+        <p:txBody>
+          <a:bodyPr rtlCol="0" anchor="ctr"/>
+          <a:lstStyle/>
+          <a:p>
+            <a:pPr algn="ctr"/>
+            <a:endParaRPr lang="de-DE"/>
+          </a:p>
+        </p:txBody>
+      </p:sp>
+      <p:sp>
+        <p:nvSpPr>
+          <p:cNvPr id="14" name="Textfeld 13">
+            <a:extLst>
+              <a:ext uri="{FF2B5EF4-FFF2-40B4-BE49-F238E27FC236}">
+                <a16:creationId xmlns:a16="http://schemas.microsoft.com/office/drawing/2014/main" id="{C23EC763-131A-42CD-92EA-E5A7718F0519}"/>
+              </a:ext>
+            </a:extLst>
+          </p:cNvPr>
+          <p:cNvSpPr txBox="1"/>
+          <p:nvPr/>
+        </p:nvSpPr>
+        <p:spPr>
+          <a:xfrm>
+            <a:off x="3646344" y="3818619"/>
+            <a:ext cx="3025765" cy="369332"/>
+          </a:xfrm>
+          <a:prstGeom prst="rect">
+            <a:avLst/>
+          </a:prstGeom>
+          <a:noFill/>
+        </p:spPr>
+        <p:txBody>
+          <a:bodyPr wrap="none" rtlCol="0">
+            <a:spAutoFit/>
+          </a:bodyPr>
+          <a:lstStyle/>
+          <a:p>
+            <a:r>
+              <a:rPr lang="de-DE" dirty="0">
+                <a:solidFill>
+                  <a:schemeClr val="accent1"/>
+                </a:solidFill>
+              </a:rPr>
+              <a:t>Hier lebt die Variable gar nicht</a:t>
+            </a:r>
+          </a:p>
+        </p:txBody>
+      </p:sp>
+    </p:spTree>
+    <p:extLst>
+      <p:ext uri="{BB962C8B-B14F-4D97-AF65-F5344CB8AC3E}">
+        <p14:creationId xmlns:p14="http://schemas.microsoft.com/office/powerpoint/2010/main" val="495040579"/>
+      </p:ext>
+    </p:extLst>
+  </p:cSld>
+  <p:clrMapOvr>
+    <a:masterClrMapping/>
+  </p:clrMapOvr>
+</p:sld>
+</file>
+
 <file path=ppt/slides/slide6.xml><?xml version="1.0" encoding="utf-8"?>
 <p:sld xmlns:a="http://schemas.openxmlformats.org/drawingml/2006/main" xmlns:r="http://schemas.openxmlformats.org/officeDocument/2006/relationships" xmlns:p="http://schemas.openxmlformats.org/presentationml/2006/main">
   <p:cSld>
@@ -29048,7 +29955,7 @@
           <a:p>
             <a:fld id="{A952138C-0142-4C6B-A620-863AA96BBBE1}" type="datetime1">
               <a:rPr lang="de-DE" smtClean="0"/>
-              <a:t>17.02.2023</a:t>
+              <a:t>24.03.2023</a:t>
             </a:fld>
             <a:endParaRPr lang="de-DE"/>
           </a:p>
@@ -29115,6 +30022,2458 @@
     <p:extLst>
       <p:ext uri="{BB962C8B-B14F-4D97-AF65-F5344CB8AC3E}">
         <p14:creationId xmlns:p14="http://schemas.microsoft.com/office/powerpoint/2010/main" val="87743950"/>
+      </p:ext>
+    </p:extLst>
+  </p:cSld>
+  <p:clrMapOvr>
+    <a:masterClrMapping/>
+  </p:clrMapOvr>
+</p:sld>
+</file>
+
+<file path=ppt/slides/slide60.xml><?xml version="1.0" encoding="utf-8"?>
+<p:sld xmlns:a="http://schemas.openxmlformats.org/drawingml/2006/main" xmlns:r="http://schemas.openxmlformats.org/officeDocument/2006/relationships" xmlns:p="http://schemas.openxmlformats.org/presentationml/2006/main">
+  <p:cSld>
+    <p:spTree>
+      <p:nvGrpSpPr>
+        <p:cNvPr id="1" name=""/>
+        <p:cNvGrpSpPr/>
+        <p:nvPr/>
+      </p:nvGrpSpPr>
+      <p:grpSpPr>
+        <a:xfrm>
+          <a:off x="0" y="0"/>
+          <a:ext cx="0" cy="0"/>
+          <a:chOff x="0" y="0"/>
+          <a:chExt cx="0" cy="0"/>
+        </a:xfrm>
+      </p:grpSpPr>
+      <p:pic>
+        <p:nvPicPr>
+          <p:cNvPr id="15" name="Grafik 14">
+            <a:extLst>
+              <a:ext uri="{FF2B5EF4-FFF2-40B4-BE49-F238E27FC236}">
+                <a16:creationId xmlns:a16="http://schemas.microsoft.com/office/drawing/2014/main" id="{2387DD2E-D1EA-4568-9FB2-2CC52BFA91D3}"/>
+              </a:ext>
+            </a:extLst>
+          </p:cNvPr>
+          <p:cNvPicPr>
+            <a:picLocks noChangeAspect="1"/>
+          </p:cNvPicPr>
+          <p:nvPr/>
+        </p:nvPicPr>
+        <p:blipFill>
+          <a:blip r:embed="rId3"/>
+          <a:stretch>
+            <a:fillRect/>
+          </a:stretch>
+        </p:blipFill>
+        <p:spPr>
+          <a:xfrm>
+            <a:off x="838198" y="1992369"/>
+            <a:ext cx="7062184" cy="4120836"/>
+          </a:xfrm>
+          <a:prstGeom prst="rect">
+            <a:avLst/>
+          </a:prstGeom>
+        </p:spPr>
+      </p:pic>
+      <p:sp>
+        <p:nvSpPr>
+          <p:cNvPr id="2" name="Titel 1">
+            <a:extLst>
+              <a:ext uri="{FF2B5EF4-FFF2-40B4-BE49-F238E27FC236}">
+                <a16:creationId xmlns:a16="http://schemas.microsoft.com/office/drawing/2014/main" id="{2A32A1F9-7E4E-4044-9E9A-D86B60384C9E}"/>
+              </a:ext>
+            </a:extLst>
+          </p:cNvPr>
+          <p:cNvSpPr>
+            <a:spLocks noGrp="1"/>
+          </p:cNvSpPr>
+          <p:nvPr>
+            <p:ph type="title"/>
+          </p:nvPr>
+        </p:nvSpPr>
+        <p:spPr/>
+        <p:txBody>
+          <a:bodyPr/>
+          <a:lstStyle/>
+          <a:p>
+            <a:r>
+              <a:rPr lang="de-DE" dirty="0"/>
+              <a:t>Dart - Lambdas</a:t>
+            </a:r>
+          </a:p>
+        </p:txBody>
+      </p:sp>
+      <p:sp>
+        <p:nvSpPr>
+          <p:cNvPr id="3" name="Inhaltsplatzhalter 2">
+            <a:extLst>
+              <a:ext uri="{FF2B5EF4-FFF2-40B4-BE49-F238E27FC236}">
+                <a16:creationId xmlns:a16="http://schemas.microsoft.com/office/drawing/2014/main" id="{6A6039B6-1897-4596-83B7-0B42F485643C}"/>
+              </a:ext>
+            </a:extLst>
+          </p:cNvPr>
+          <p:cNvSpPr>
+            <a:spLocks noGrp="1"/>
+          </p:cNvSpPr>
+          <p:nvPr>
+            <p:ph idx="1"/>
+          </p:nvPr>
+        </p:nvSpPr>
+        <p:spPr/>
+        <p:txBody>
+          <a:bodyPr/>
+          <a:lstStyle/>
+          <a:p>
+            <a:r>
+              <a:rPr lang="de-DE" dirty="0"/>
+              <a:t>Lösung über </a:t>
+            </a:r>
+            <a:r>
+              <a:rPr lang="de-DE" dirty="0" err="1"/>
+              <a:t>Scope</a:t>
+            </a:r>
+            <a:endParaRPr lang="de-DE" dirty="0"/>
+          </a:p>
+        </p:txBody>
+      </p:sp>
+      <p:sp>
+        <p:nvSpPr>
+          <p:cNvPr id="4" name="Datumsplatzhalter 3">
+            <a:extLst>
+              <a:ext uri="{FF2B5EF4-FFF2-40B4-BE49-F238E27FC236}">
+                <a16:creationId xmlns:a16="http://schemas.microsoft.com/office/drawing/2014/main" id="{53A7EC4B-AC09-42FE-961B-472A96A04FF0}"/>
+              </a:ext>
+            </a:extLst>
+          </p:cNvPr>
+          <p:cNvSpPr>
+            <a:spLocks noGrp="1"/>
+          </p:cNvSpPr>
+          <p:nvPr>
+            <p:ph type="dt" sz="half" idx="10"/>
+          </p:nvPr>
+        </p:nvSpPr>
+        <p:spPr/>
+        <p:txBody>
+          <a:bodyPr/>
+          <a:lstStyle/>
+          <a:p>
+            <a:fld id="{8159FE7A-07D2-4D3F-9855-29B7F3DF1D43}" type="datetime1">
+              <a:rPr lang="de-DE" smtClean="0"/>
+              <a:t>24.03.2023</a:t>
+            </a:fld>
+            <a:endParaRPr lang="de-DE"/>
+          </a:p>
+        </p:txBody>
+      </p:sp>
+      <p:sp>
+        <p:nvSpPr>
+          <p:cNvPr id="5" name="Fußzeilenplatzhalter 4">
+            <a:extLst>
+              <a:ext uri="{FF2B5EF4-FFF2-40B4-BE49-F238E27FC236}">
+                <a16:creationId xmlns:a16="http://schemas.microsoft.com/office/drawing/2014/main" id="{9F46E991-A732-426B-A07E-8DAB44654B2E}"/>
+              </a:ext>
+            </a:extLst>
+          </p:cNvPr>
+          <p:cNvSpPr>
+            <a:spLocks noGrp="1"/>
+          </p:cNvSpPr>
+          <p:nvPr>
+            <p:ph type="ftr" sz="quarter" idx="11"/>
+          </p:nvPr>
+        </p:nvSpPr>
+        <p:spPr/>
+        <p:txBody>
+          <a:bodyPr/>
+          <a:lstStyle/>
+          <a:p>
+            <a:r>
+              <a:rPr lang="de-DE"/>
+              <a:t>Dart - Programmiersprache für Smartphones</a:t>
+            </a:r>
+          </a:p>
+        </p:txBody>
+      </p:sp>
+      <p:sp>
+        <p:nvSpPr>
+          <p:cNvPr id="6" name="Foliennummernplatzhalter 5">
+            <a:extLst>
+              <a:ext uri="{FF2B5EF4-FFF2-40B4-BE49-F238E27FC236}">
+                <a16:creationId xmlns:a16="http://schemas.microsoft.com/office/drawing/2014/main" id="{BE238A0B-1E74-4745-A606-FE964B62FF45}"/>
+              </a:ext>
+            </a:extLst>
+          </p:cNvPr>
+          <p:cNvSpPr>
+            <a:spLocks noGrp="1"/>
+          </p:cNvSpPr>
+          <p:nvPr>
+            <p:ph type="sldNum" sz="quarter" idx="12"/>
+          </p:nvPr>
+        </p:nvSpPr>
+        <p:spPr/>
+        <p:txBody>
+          <a:bodyPr/>
+          <a:lstStyle/>
+          <a:p>
+            <a:fld id="{3A1F27E2-D58A-4028-9FF2-B12D897F257E}" type="slidenum">
+              <a:rPr lang="de-DE" smtClean="0"/>
+              <a:t>60</a:t>
+            </a:fld>
+            <a:endParaRPr lang="de-DE"/>
+          </a:p>
+        </p:txBody>
+      </p:sp>
+      <p:sp>
+        <p:nvSpPr>
+          <p:cNvPr id="9" name="Rechteck 8">
+            <a:extLst>
+              <a:ext uri="{FF2B5EF4-FFF2-40B4-BE49-F238E27FC236}">
+                <a16:creationId xmlns:a16="http://schemas.microsoft.com/office/drawing/2014/main" id="{CA513ECB-059A-4712-AA07-5563AA915ED8}"/>
+              </a:ext>
+            </a:extLst>
+          </p:cNvPr>
+          <p:cNvSpPr/>
+          <p:nvPr/>
+        </p:nvSpPr>
+        <p:spPr>
+          <a:xfrm>
+            <a:off x="1448993" y="1992369"/>
+            <a:ext cx="1353201" cy="256825"/>
+          </a:xfrm>
+          <a:prstGeom prst="rect">
+            <a:avLst/>
+          </a:prstGeom>
+          <a:noFill/>
+          <a:ln w="28575">
+            <a:solidFill>
+              <a:schemeClr val="accent1"/>
+            </a:solidFill>
+          </a:ln>
+        </p:spPr>
+        <p:style>
+          <a:lnRef idx="2">
+            <a:schemeClr val="accent1">
+              <a:shade val="50000"/>
+            </a:schemeClr>
+          </a:lnRef>
+          <a:fillRef idx="1">
+            <a:schemeClr val="accent1"/>
+          </a:fillRef>
+          <a:effectRef idx="0">
+            <a:schemeClr val="accent1"/>
+          </a:effectRef>
+          <a:fontRef idx="minor">
+            <a:schemeClr val="lt1"/>
+          </a:fontRef>
+        </p:style>
+        <p:txBody>
+          <a:bodyPr rtlCol="0" anchor="ctr"/>
+          <a:lstStyle/>
+          <a:p>
+            <a:pPr algn="ctr"/>
+            <a:endParaRPr lang="de-DE"/>
+          </a:p>
+        </p:txBody>
+      </p:sp>
+      <p:sp>
+        <p:nvSpPr>
+          <p:cNvPr id="10" name="Textfeld 9">
+            <a:extLst>
+              <a:ext uri="{FF2B5EF4-FFF2-40B4-BE49-F238E27FC236}">
+                <a16:creationId xmlns:a16="http://schemas.microsoft.com/office/drawing/2014/main" id="{6FC99006-2D87-4455-8174-52A75D4A2475}"/>
+              </a:ext>
+            </a:extLst>
+          </p:cNvPr>
+          <p:cNvSpPr txBox="1"/>
+          <p:nvPr/>
+        </p:nvSpPr>
+        <p:spPr>
+          <a:xfrm>
+            <a:off x="2802194" y="1936115"/>
+            <a:ext cx="1673407" cy="369332"/>
+          </a:xfrm>
+          <a:prstGeom prst="rect">
+            <a:avLst/>
+          </a:prstGeom>
+          <a:noFill/>
+        </p:spPr>
+        <p:txBody>
+          <a:bodyPr wrap="none" rtlCol="0">
+            <a:spAutoFit/>
+          </a:bodyPr>
+          <a:lstStyle/>
+          <a:p>
+            <a:r>
+              <a:rPr lang="de-DE" dirty="0" err="1">
+                <a:solidFill>
+                  <a:schemeClr val="accent1"/>
+                </a:solidFill>
+              </a:rPr>
+              <a:t>Scope</a:t>
+            </a:r>
+            <a:r>
+              <a:rPr lang="de-DE" dirty="0">
+                <a:solidFill>
+                  <a:schemeClr val="accent1"/>
+                </a:solidFill>
+              </a:rPr>
+              <a:t> erweitert</a:t>
+            </a:r>
+          </a:p>
+        </p:txBody>
+      </p:sp>
+      <p:sp>
+        <p:nvSpPr>
+          <p:cNvPr id="11" name="Rechteck 10">
+            <a:extLst>
+              <a:ext uri="{FF2B5EF4-FFF2-40B4-BE49-F238E27FC236}">
+                <a16:creationId xmlns:a16="http://schemas.microsoft.com/office/drawing/2014/main" id="{2184E5DB-3550-43CC-B8F7-8AFCC84D47EF}"/>
+              </a:ext>
+            </a:extLst>
+          </p:cNvPr>
+          <p:cNvSpPr/>
+          <p:nvPr/>
+        </p:nvSpPr>
+        <p:spPr>
+          <a:xfrm>
+            <a:off x="3400698" y="3690206"/>
+            <a:ext cx="868961" cy="256825"/>
+          </a:xfrm>
+          <a:prstGeom prst="rect">
+            <a:avLst/>
+          </a:prstGeom>
+          <a:noFill/>
+          <a:ln w="28575">
+            <a:solidFill>
+              <a:schemeClr val="accent1"/>
+            </a:solidFill>
+          </a:ln>
+        </p:spPr>
+        <p:style>
+          <a:lnRef idx="2">
+            <a:schemeClr val="accent1">
+              <a:shade val="50000"/>
+            </a:schemeClr>
+          </a:lnRef>
+          <a:fillRef idx="1">
+            <a:schemeClr val="accent1"/>
+          </a:fillRef>
+          <a:effectRef idx="0">
+            <a:schemeClr val="accent1"/>
+          </a:effectRef>
+          <a:fontRef idx="minor">
+            <a:schemeClr val="lt1"/>
+          </a:fontRef>
+        </p:style>
+        <p:txBody>
+          <a:bodyPr rtlCol="0" anchor="ctr"/>
+          <a:lstStyle/>
+          <a:p>
+            <a:pPr algn="ctr"/>
+            <a:endParaRPr lang="de-DE"/>
+          </a:p>
+        </p:txBody>
+      </p:sp>
+      <p:sp>
+        <p:nvSpPr>
+          <p:cNvPr id="14" name="Textfeld 13">
+            <a:extLst>
+              <a:ext uri="{FF2B5EF4-FFF2-40B4-BE49-F238E27FC236}">
+                <a16:creationId xmlns:a16="http://schemas.microsoft.com/office/drawing/2014/main" id="{C23EC763-131A-42CD-92EA-E5A7718F0519}"/>
+              </a:ext>
+            </a:extLst>
+          </p:cNvPr>
+          <p:cNvSpPr txBox="1"/>
+          <p:nvPr/>
+        </p:nvSpPr>
+        <p:spPr>
+          <a:xfrm>
+            <a:off x="3400698" y="3922038"/>
+            <a:ext cx="1833515" cy="369332"/>
+          </a:xfrm>
+          <a:prstGeom prst="rect">
+            <a:avLst/>
+          </a:prstGeom>
+          <a:noFill/>
+        </p:spPr>
+        <p:txBody>
+          <a:bodyPr wrap="none" rtlCol="0">
+            <a:spAutoFit/>
+          </a:bodyPr>
+          <a:lstStyle/>
+          <a:p>
+            <a:r>
+              <a:rPr lang="de-DE" dirty="0">
+                <a:solidFill>
+                  <a:schemeClr val="accent1"/>
+                </a:solidFill>
+              </a:rPr>
+              <a:t>Variable lebt jetzt</a:t>
+            </a:r>
+          </a:p>
+        </p:txBody>
+      </p:sp>
+    </p:spTree>
+    <p:extLst>
+      <p:ext uri="{BB962C8B-B14F-4D97-AF65-F5344CB8AC3E}">
+        <p14:creationId xmlns:p14="http://schemas.microsoft.com/office/powerpoint/2010/main" val="1565534018"/>
+      </p:ext>
+    </p:extLst>
+  </p:cSld>
+  <p:clrMapOvr>
+    <a:masterClrMapping/>
+  </p:clrMapOvr>
+</p:sld>
+</file>
+
+<file path=ppt/slides/slide61.xml><?xml version="1.0" encoding="utf-8"?>
+<p:sld xmlns:a="http://schemas.openxmlformats.org/drawingml/2006/main" xmlns:r="http://schemas.openxmlformats.org/officeDocument/2006/relationships" xmlns:p="http://schemas.openxmlformats.org/presentationml/2006/main">
+  <p:cSld>
+    <p:spTree>
+      <p:nvGrpSpPr>
+        <p:cNvPr id="1" name=""/>
+        <p:cNvGrpSpPr/>
+        <p:nvPr/>
+      </p:nvGrpSpPr>
+      <p:grpSpPr>
+        <a:xfrm>
+          <a:off x="0" y="0"/>
+          <a:ext cx="0" cy="0"/>
+          <a:chOff x="0" y="0"/>
+          <a:chExt cx="0" cy="0"/>
+        </a:xfrm>
+      </p:grpSpPr>
+      <p:pic>
+        <p:nvPicPr>
+          <p:cNvPr id="8" name="Grafik 7">
+            <a:extLst>
+              <a:ext uri="{FF2B5EF4-FFF2-40B4-BE49-F238E27FC236}">
+                <a16:creationId xmlns:a16="http://schemas.microsoft.com/office/drawing/2014/main" id="{50537923-0EF0-4506-8DA0-AC6DB66B679D}"/>
+              </a:ext>
+            </a:extLst>
+          </p:cNvPr>
+          <p:cNvPicPr>
+            <a:picLocks noChangeAspect="1"/>
+          </p:cNvPicPr>
+          <p:nvPr/>
+        </p:nvPicPr>
+        <p:blipFill rotWithShape="1">
+          <a:blip r:embed="rId3"/>
+          <a:srcRect t="-1" b="-1277"/>
+          <a:stretch/>
+        </p:blipFill>
+        <p:spPr>
+          <a:xfrm>
+            <a:off x="841273" y="1992368"/>
+            <a:ext cx="5471650" cy="4173482"/>
+          </a:xfrm>
+          <a:prstGeom prst="rect">
+            <a:avLst/>
+          </a:prstGeom>
+        </p:spPr>
+      </p:pic>
+      <p:sp>
+        <p:nvSpPr>
+          <p:cNvPr id="2" name="Titel 1">
+            <a:extLst>
+              <a:ext uri="{FF2B5EF4-FFF2-40B4-BE49-F238E27FC236}">
+                <a16:creationId xmlns:a16="http://schemas.microsoft.com/office/drawing/2014/main" id="{2A32A1F9-7E4E-4044-9E9A-D86B60384C9E}"/>
+              </a:ext>
+            </a:extLst>
+          </p:cNvPr>
+          <p:cNvSpPr>
+            <a:spLocks noGrp="1"/>
+          </p:cNvSpPr>
+          <p:nvPr>
+            <p:ph type="title"/>
+          </p:nvPr>
+        </p:nvSpPr>
+        <p:spPr/>
+        <p:txBody>
+          <a:bodyPr/>
+          <a:lstStyle/>
+          <a:p>
+            <a:r>
+              <a:rPr lang="de-DE" dirty="0"/>
+              <a:t>Dart - Lambdas</a:t>
+            </a:r>
+          </a:p>
+        </p:txBody>
+      </p:sp>
+      <p:sp>
+        <p:nvSpPr>
+          <p:cNvPr id="3" name="Inhaltsplatzhalter 2">
+            <a:extLst>
+              <a:ext uri="{FF2B5EF4-FFF2-40B4-BE49-F238E27FC236}">
+                <a16:creationId xmlns:a16="http://schemas.microsoft.com/office/drawing/2014/main" id="{6A6039B6-1897-4596-83B7-0B42F485643C}"/>
+              </a:ext>
+            </a:extLst>
+          </p:cNvPr>
+          <p:cNvSpPr>
+            <a:spLocks noGrp="1"/>
+          </p:cNvSpPr>
+          <p:nvPr>
+            <p:ph idx="1"/>
+          </p:nvPr>
+        </p:nvSpPr>
+        <p:spPr/>
+        <p:txBody>
+          <a:bodyPr/>
+          <a:lstStyle/>
+          <a:p>
+            <a:r>
+              <a:rPr lang="de-DE" dirty="0"/>
+              <a:t>Neues Problem: parallele Ausführung</a:t>
+            </a:r>
+          </a:p>
+        </p:txBody>
+      </p:sp>
+      <p:sp>
+        <p:nvSpPr>
+          <p:cNvPr id="4" name="Datumsplatzhalter 3">
+            <a:extLst>
+              <a:ext uri="{FF2B5EF4-FFF2-40B4-BE49-F238E27FC236}">
+                <a16:creationId xmlns:a16="http://schemas.microsoft.com/office/drawing/2014/main" id="{53A7EC4B-AC09-42FE-961B-472A96A04FF0}"/>
+              </a:ext>
+            </a:extLst>
+          </p:cNvPr>
+          <p:cNvSpPr>
+            <a:spLocks noGrp="1"/>
+          </p:cNvSpPr>
+          <p:nvPr>
+            <p:ph type="dt" sz="half" idx="10"/>
+          </p:nvPr>
+        </p:nvSpPr>
+        <p:spPr/>
+        <p:txBody>
+          <a:bodyPr/>
+          <a:lstStyle/>
+          <a:p>
+            <a:fld id="{8159FE7A-07D2-4D3F-9855-29B7F3DF1D43}" type="datetime1">
+              <a:rPr lang="de-DE" smtClean="0"/>
+              <a:t>24.03.2023</a:t>
+            </a:fld>
+            <a:endParaRPr lang="de-DE"/>
+          </a:p>
+        </p:txBody>
+      </p:sp>
+      <p:sp>
+        <p:nvSpPr>
+          <p:cNvPr id="5" name="Fußzeilenplatzhalter 4">
+            <a:extLst>
+              <a:ext uri="{FF2B5EF4-FFF2-40B4-BE49-F238E27FC236}">
+                <a16:creationId xmlns:a16="http://schemas.microsoft.com/office/drawing/2014/main" id="{9F46E991-A732-426B-A07E-8DAB44654B2E}"/>
+              </a:ext>
+            </a:extLst>
+          </p:cNvPr>
+          <p:cNvSpPr>
+            <a:spLocks noGrp="1"/>
+          </p:cNvSpPr>
+          <p:nvPr>
+            <p:ph type="ftr" sz="quarter" idx="11"/>
+          </p:nvPr>
+        </p:nvSpPr>
+        <p:spPr/>
+        <p:txBody>
+          <a:bodyPr/>
+          <a:lstStyle/>
+          <a:p>
+            <a:r>
+              <a:rPr lang="de-DE"/>
+              <a:t>Dart - Programmiersprache für Smartphones</a:t>
+            </a:r>
+          </a:p>
+        </p:txBody>
+      </p:sp>
+      <p:sp>
+        <p:nvSpPr>
+          <p:cNvPr id="6" name="Foliennummernplatzhalter 5">
+            <a:extLst>
+              <a:ext uri="{FF2B5EF4-FFF2-40B4-BE49-F238E27FC236}">
+                <a16:creationId xmlns:a16="http://schemas.microsoft.com/office/drawing/2014/main" id="{BE238A0B-1E74-4745-A606-FE964B62FF45}"/>
+              </a:ext>
+            </a:extLst>
+          </p:cNvPr>
+          <p:cNvSpPr>
+            <a:spLocks noGrp="1"/>
+          </p:cNvSpPr>
+          <p:nvPr>
+            <p:ph type="sldNum" sz="quarter" idx="12"/>
+          </p:nvPr>
+        </p:nvSpPr>
+        <p:spPr/>
+        <p:txBody>
+          <a:bodyPr/>
+          <a:lstStyle/>
+          <a:p>
+            <a:fld id="{3A1F27E2-D58A-4028-9FF2-B12D897F257E}" type="slidenum">
+              <a:rPr lang="de-DE" smtClean="0"/>
+              <a:t>61</a:t>
+            </a:fld>
+            <a:endParaRPr lang="de-DE"/>
+          </a:p>
+        </p:txBody>
+      </p:sp>
+      <p:sp>
+        <p:nvSpPr>
+          <p:cNvPr id="9" name="Rechteck 8">
+            <a:extLst>
+              <a:ext uri="{FF2B5EF4-FFF2-40B4-BE49-F238E27FC236}">
+                <a16:creationId xmlns:a16="http://schemas.microsoft.com/office/drawing/2014/main" id="{CA513ECB-059A-4712-AA07-5563AA915ED8}"/>
+              </a:ext>
+            </a:extLst>
+          </p:cNvPr>
+          <p:cNvSpPr/>
+          <p:nvPr/>
+        </p:nvSpPr>
+        <p:spPr>
+          <a:xfrm>
+            <a:off x="1448994" y="2322696"/>
+            <a:ext cx="1043484" cy="256825"/>
+          </a:xfrm>
+          <a:prstGeom prst="rect">
+            <a:avLst/>
+          </a:prstGeom>
+          <a:noFill/>
+          <a:ln w="28575">
+            <a:solidFill>
+              <a:schemeClr val="accent1"/>
+            </a:solidFill>
+          </a:ln>
+        </p:spPr>
+        <p:style>
+          <a:lnRef idx="2">
+            <a:schemeClr val="accent1">
+              <a:shade val="50000"/>
+            </a:schemeClr>
+          </a:lnRef>
+          <a:fillRef idx="1">
+            <a:schemeClr val="accent1"/>
+          </a:fillRef>
+          <a:effectRef idx="0">
+            <a:schemeClr val="accent1"/>
+          </a:effectRef>
+          <a:fontRef idx="minor">
+            <a:schemeClr val="lt1"/>
+          </a:fontRef>
+        </p:style>
+        <p:txBody>
+          <a:bodyPr rtlCol="0" anchor="ctr"/>
+          <a:lstStyle/>
+          <a:p>
+            <a:pPr algn="ctr"/>
+            <a:endParaRPr lang="de-DE"/>
+          </a:p>
+        </p:txBody>
+      </p:sp>
+      <p:sp>
+        <p:nvSpPr>
+          <p:cNvPr id="11" name="Rechteck 10">
+            <a:extLst>
+              <a:ext uri="{FF2B5EF4-FFF2-40B4-BE49-F238E27FC236}">
+                <a16:creationId xmlns:a16="http://schemas.microsoft.com/office/drawing/2014/main" id="{2184E5DB-3550-43CC-B8F7-8AFCC84D47EF}"/>
+              </a:ext>
+            </a:extLst>
+          </p:cNvPr>
+          <p:cNvSpPr/>
+          <p:nvPr/>
+        </p:nvSpPr>
+        <p:spPr>
+          <a:xfrm>
+            <a:off x="2802195" y="4219209"/>
+            <a:ext cx="648928" cy="256825"/>
+          </a:xfrm>
+          <a:prstGeom prst="rect">
+            <a:avLst/>
+          </a:prstGeom>
+          <a:noFill/>
+          <a:ln w="28575">
+            <a:solidFill>
+              <a:schemeClr val="accent1"/>
+            </a:solidFill>
+          </a:ln>
+        </p:spPr>
+        <p:style>
+          <a:lnRef idx="2">
+            <a:schemeClr val="accent1">
+              <a:shade val="50000"/>
+            </a:schemeClr>
+          </a:lnRef>
+          <a:fillRef idx="1">
+            <a:schemeClr val="accent1"/>
+          </a:fillRef>
+          <a:effectRef idx="0">
+            <a:schemeClr val="accent1"/>
+          </a:effectRef>
+          <a:fontRef idx="minor">
+            <a:schemeClr val="lt1"/>
+          </a:fontRef>
+        </p:style>
+        <p:txBody>
+          <a:bodyPr rtlCol="0" anchor="ctr"/>
+          <a:lstStyle/>
+          <a:p>
+            <a:pPr algn="ctr"/>
+            <a:endParaRPr lang="de-DE"/>
+          </a:p>
+        </p:txBody>
+      </p:sp>
+      <p:sp>
+        <p:nvSpPr>
+          <p:cNvPr id="14" name="Textfeld 13">
+            <a:extLst>
+              <a:ext uri="{FF2B5EF4-FFF2-40B4-BE49-F238E27FC236}">
+                <a16:creationId xmlns:a16="http://schemas.microsoft.com/office/drawing/2014/main" id="{C23EC763-131A-42CD-92EA-E5A7718F0519}"/>
+              </a:ext>
+            </a:extLst>
+          </p:cNvPr>
+          <p:cNvSpPr txBox="1"/>
+          <p:nvPr/>
+        </p:nvSpPr>
+        <p:spPr>
+          <a:xfrm>
+            <a:off x="2736119" y="4424718"/>
+            <a:ext cx="3515129" cy="369332"/>
+          </a:xfrm>
+          <a:prstGeom prst="rect">
+            <a:avLst/>
+          </a:prstGeom>
+          <a:noFill/>
+        </p:spPr>
+        <p:txBody>
+          <a:bodyPr wrap="none" rtlCol="0">
+            <a:spAutoFit/>
+          </a:bodyPr>
+          <a:lstStyle/>
+          <a:p>
+            <a:r>
+              <a:rPr lang="de-DE" dirty="0">
+                <a:solidFill>
+                  <a:schemeClr val="accent1"/>
+                </a:solidFill>
+              </a:rPr>
+              <a:t>Mit welchem Wert wird gerechnet?</a:t>
+            </a:r>
+          </a:p>
+        </p:txBody>
+      </p:sp>
+      <p:sp>
+        <p:nvSpPr>
+          <p:cNvPr id="16" name="Rechteck 15">
+            <a:extLst>
+              <a:ext uri="{FF2B5EF4-FFF2-40B4-BE49-F238E27FC236}">
+                <a16:creationId xmlns:a16="http://schemas.microsoft.com/office/drawing/2014/main" id="{670DB967-24B7-4FC4-9478-346292A4390E}"/>
+              </a:ext>
+            </a:extLst>
+          </p:cNvPr>
+          <p:cNvSpPr/>
+          <p:nvPr/>
+        </p:nvSpPr>
+        <p:spPr>
+          <a:xfrm>
+            <a:off x="1448994" y="3278465"/>
+            <a:ext cx="1043484" cy="256825"/>
+          </a:xfrm>
+          <a:prstGeom prst="rect">
+            <a:avLst/>
+          </a:prstGeom>
+          <a:noFill/>
+          <a:ln w="28575">
+            <a:solidFill>
+              <a:schemeClr val="accent1"/>
+            </a:solidFill>
+          </a:ln>
+        </p:spPr>
+        <p:style>
+          <a:lnRef idx="2">
+            <a:schemeClr val="accent1">
+              <a:shade val="50000"/>
+            </a:schemeClr>
+          </a:lnRef>
+          <a:fillRef idx="1">
+            <a:schemeClr val="accent1"/>
+          </a:fillRef>
+          <a:effectRef idx="0">
+            <a:schemeClr val="accent1"/>
+          </a:effectRef>
+          <a:fontRef idx="minor">
+            <a:schemeClr val="lt1"/>
+          </a:fontRef>
+        </p:style>
+        <p:txBody>
+          <a:bodyPr rtlCol="0" anchor="ctr"/>
+          <a:lstStyle/>
+          <a:p>
+            <a:pPr algn="ctr"/>
+            <a:endParaRPr lang="de-DE"/>
+          </a:p>
+        </p:txBody>
+      </p:sp>
+      <p:sp>
+        <p:nvSpPr>
+          <p:cNvPr id="17" name="Textfeld 16">
+            <a:extLst>
+              <a:ext uri="{FF2B5EF4-FFF2-40B4-BE49-F238E27FC236}">
+                <a16:creationId xmlns:a16="http://schemas.microsoft.com/office/drawing/2014/main" id="{CA17B334-ADE0-45AF-9A64-306AA57E82E9}"/>
+              </a:ext>
+            </a:extLst>
+          </p:cNvPr>
+          <p:cNvSpPr txBox="1"/>
+          <p:nvPr/>
+        </p:nvSpPr>
+        <p:spPr>
+          <a:xfrm>
+            <a:off x="1694151" y="2917006"/>
+            <a:ext cx="2865015" cy="276999"/>
+          </a:xfrm>
+          <a:prstGeom prst="rect">
+            <a:avLst/>
+          </a:prstGeom>
+          <a:noFill/>
+        </p:spPr>
+        <p:txBody>
+          <a:bodyPr wrap="none" rtlCol="0">
+            <a:spAutoFit/>
+          </a:bodyPr>
+          <a:lstStyle/>
+          <a:p>
+            <a:r>
+              <a:rPr lang="de-DE" sz="1200" dirty="0">
+                <a:solidFill>
+                  <a:schemeClr val="accent1"/>
+                </a:solidFill>
+              </a:rPr>
+              <a:t>Annahme: main2() wird parallel ausgeführt</a:t>
+            </a:r>
+          </a:p>
+        </p:txBody>
+      </p:sp>
+    </p:spTree>
+    <p:extLst>
+      <p:ext uri="{BB962C8B-B14F-4D97-AF65-F5344CB8AC3E}">
+        <p14:creationId xmlns:p14="http://schemas.microsoft.com/office/powerpoint/2010/main" val="1927333959"/>
+      </p:ext>
+    </p:extLst>
+  </p:cSld>
+  <p:clrMapOvr>
+    <a:masterClrMapping/>
+  </p:clrMapOvr>
+</p:sld>
+</file>
+
+<file path=ppt/slides/slide62.xml><?xml version="1.0" encoding="utf-8"?>
+<p:sld xmlns:a="http://schemas.openxmlformats.org/drawingml/2006/main" xmlns:r="http://schemas.openxmlformats.org/officeDocument/2006/relationships" xmlns:p="http://schemas.openxmlformats.org/presentationml/2006/main">
+  <p:cSld>
+    <p:spTree>
+      <p:nvGrpSpPr>
+        <p:cNvPr id="1" name=""/>
+        <p:cNvGrpSpPr/>
+        <p:nvPr/>
+      </p:nvGrpSpPr>
+      <p:grpSpPr>
+        <a:xfrm>
+          <a:off x="0" y="0"/>
+          <a:ext cx="0" cy="0"/>
+          <a:chOff x="0" y="0"/>
+          <a:chExt cx="0" cy="0"/>
+        </a:xfrm>
+      </p:grpSpPr>
+      <p:sp>
+        <p:nvSpPr>
+          <p:cNvPr id="2" name="Titel 1">
+            <a:extLst>
+              <a:ext uri="{FF2B5EF4-FFF2-40B4-BE49-F238E27FC236}">
+                <a16:creationId xmlns:a16="http://schemas.microsoft.com/office/drawing/2014/main" id="{2A32A1F9-7E4E-4044-9E9A-D86B60384C9E}"/>
+              </a:ext>
+            </a:extLst>
+          </p:cNvPr>
+          <p:cNvSpPr>
+            <a:spLocks noGrp="1"/>
+          </p:cNvSpPr>
+          <p:nvPr>
+            <p:ph type="title"/>
+          </p:nvPr>
+        </p:nvSpPr>
+        <p:spPr/>
+        <p:txBody>
+          <a:bodyPr/>
+          <a:lstStyle/>
+          <a:p>
+            <a:r>
+              <a:rPr lang="de-DE" dirty="0"/>
+              <a:t>Dart - Lambdas</a:t>
+            </a:r>
+          </a:p>
+        </p:txBody>
+      </p:sp>
+      <p:sp>
+        <p:nvSpPr>
+          <p:cNvPr id="3" name="Inhaltsplatzhalter 2">
+            <a:extLst>
+              <a:ext uri="{FF2B5EF4-FFF2-40B4-BE49-F238E27FC236}">
+                <a16:creationId xmlns:a16="http://schemas.microsoft.com/office/drawing/2014/main" id="{6A6039B6-1897-4596-83B7-0B42F485643C}"/>
+              </a:ext>
+            </a:extLst>
+          </p:cNvPr>
+          <p:cNvSpPr>
+            <a:spLocks noGrp="1"/>
+          </p:cNvSpPr>
+          <p:nvPr>
+            <p:ph idx="1"/>
+          </p:nvPr>
+        </p:nvSpPr>
+        <p:spPr/>
+        <p:txBody>
+          <a:bodyPr/>
+          <a:lstStyle/>
+          <a:p>
+            <a:r>
+              <a:rPr lang="de-DE" dirty="0"/>
+              <a:t>Lösung: Lambda-Ausdrücke (kurz: Lambdas)</a:t>
+            </a:r>
+          </a:p>
+          <a:p>
+            <a:r>
+              <a:rPr lang="de-DE" dirty="0"/>
+              <a:t>Lambda = Funktion als Variable = anonyme Funktion</a:t>
+            </a:r>
+          </a:p>
+          <a:p>
+            <a:pPr marL="0" indent="0">
+              <a:buNone/>
+            </a:pPr>
+            <a:endParaRPr lang="de-DE" dirty="0"/>
+          </a:p>
+        </p:txBody>
+      </p:sp>
+      <p:sp>
+        <p:nvSpPr>
+          <p:cNvPr id="4" name="Datumsplatzhalter 3">
+            <a:extLst>
+              <a:ext uri="{FF2B5EF4-FFF2-40B4-BE49-F238E27FC236}">
+                <a16:creationId xmlns:a16="http://schemas.microsoft.com/office/drawing/2014/main" id="{53A7EC4B-AC09-42FE-961B-472A96A04FF0}"/>
+              </a:ext>
+            </a:extLst>
+          </p:cNvPr>
+          <p:cNvSpPr>
+            <a:spLocks noGrp="1"/>
+          </p:cNvSpPr>
+          <p:nvPr>
+            <p:ph type="dt" sz="half" idx="10"/>
+          </p:nvPr>
+        </p:nvSpPr>
+        <p:spPr/>
+        <p:txBody>
+          <a:bodyPr/>
+          <a:lstStyle/>
+          <a:p>
+            <a:fld id="{8159FE7A-07D2-4D3F-9855-29B7F3DF1D43}" type="datetime1">
+              <a:rPr lang="de-DE" smtClean="0"/>
+              <a:t>24.03.2023</a:t>
+            </a:fld>
+            <a:endParaRPr lang="de-DE"/>
+          </a:p>
+        </p:txBody>
+      </p:sp>
+      <p:sp>
+        <p:nvSpPr>
+          <p:cNvPr id="5" name="Fußzeilenplatzhalter 4">
+            <a:extLst>
+              <a:ext uri="{FF2B5EF4-FFF2-40B4-BE49-F238E27FC236}">
+                <a16:creationId xmlns:a16="http://schemas.microsoft.com/office/drawing/2014/main" id="{9F46E991-A732-426B-A07E-8DAB44654B2E}"/>
+              </a:ext>
+            </a:extLst>
+          </p:cNvPr>
+          <p:cNvSpPr>
+            <a:spLocks noGrp="1"/>
+          </p:cNvSpPr>
+          <p:nvPr>
+            <p:ph type="ftr" sz="quarter" idx="11"/>
+          </p:nvPr>
+        </p:nvSpPr>
+        <p:spPr/>
+        <p:txBody>
+          <a:bodyPr/>
+          <a:lstStyle/>
+          <a:p>
+            <a:r>
+              <a:rPr lang="de-DE"/>
+              <a:t>Dart - Programmiersprache für Smartphones</a:t>
+            </a:r>
+          </a:p>
+        </p:txBody>
+      </p:sp>
+      <p:sp>
+        <p:nvSpPr>
+          <p:cNvPr id="6" name="Foliennummernplatzhalter 5">
+            <a:extLst>
+              <a:ext uri="{FF2B5EF4-FFF2-40B4-BE49-F238E27FC236}">
+                <a16:creationId xmlns:a16="http://schemas.microsoft.com/office/drawing/2014/main" id="{BE238A0B-1E74-4745-A606-FE964B62FF45}"/>
+              </a:ext>
+            </a:extLst>
+          </p:cNvPr>
+          <p:cNvSpPr>
+            <a:spLocks noGrp="1"/>
+          </p:cNvSpPr>
+          <p:nvPr>
+            <p:ph type="sldNum" sz="quarter" idx="12"/>
+          </p:nvPr>
+        </p:nvSpPr>
+        <p:spPr/>
+        <p:txBody>
+          <a:bodyPr/>
+          <a:lstStyle/>
+          <a:p>
+            <a:fld id="{3A1F27E2-D58A-4028-9FF2-B12D897F257E}" type="slidenum">
+              <a:rPr lang="de-DE" smtClean="0"/>
+              <a:t>62</a:t>
+            </a:fld>
+            <a:endParaRPr lang="de-DE"/>
+          </a:p>
+        </p:txBody>
+      </p:sp>
+      <p:pic>
+        <p:nvPicPr>
+          <p:cNvPr id="13" name="Grafik 12">
+            <a:extLst>
+              <a:ext uri="{FF2B5EF4-FFF2-40B4-BE49-F238E27FC236}">
+                <a16:creationId xmlns:a16="http://schemas.microsoft.com/office/drawing/2014/main" id="{D8FBCAF4-0FE8-4B94-A458-87A4989BDC03}"/>
+              </a:ext>
+            </a:extLst>
+          </p:cNvPr>
+          <p:cNvPicPr>
+            <a:picLocks noChangeAspect="1"/>
+          </p:cNvPicPr>
+          <p:nvPr/>
+        </p:nvPicPr>
+        <p:blipFill>
+          <a:blip r:embed="rId3"/>
+          <a:stretch>
+            <a:fillRect/>
+          </a:stretch>
+        </p:blipFill>
+        <p:spPr>
+          <a:xfrm>
+            <a:off x="838200" y="2786348"/>
+            <a:ext cx="3344814" cy="3106749"/>
+          </a:xfrm>
+          <a:prstGeom prst="rect">
+            <a:avLst/>
+          </a:prstGeom>
+        </p:spPr>
+      </p:pic>
+      <p:sp>
+        <p:nvSpPr>
+          <p:cNvPr id="15" name="Textfeld 14">
+            <a:extLst>
+              <a:ext uri="{FF2B5EF4-FFF2-40B4-BE49-F238E27FC236}">
+                <a16:creationId xmlns:a16="http://schemas.microsoft.com/office/drawing/2014/main" id="{5BE01268-44FC-465E-9A78-23325CCAA2CB}"/>
+              </a:ext>
+            </a:extLst>
+          </p:cNvPr>
+          <p:cNvSpPr txBox="1"/>
+          <p:nvPr/>
+        </p:nvSpPr>
+        <p:spPr>
+          <a:xfrm>
+            <a:off x="5167423" y="3634073"/>
+            <a:ext cx="606256" cy="1107996"/>
+          </a:xfrm>
+          <a:prstGeom prst="rect">
+            <a:avLst/>
+          </a:prstGeom>
+          <a:noFill/>
+        </p:spPr>
+        <p:txBody>
+          <a:bodyPr wrap="none" rtlCol="0">
+            <a:spAutoFit/>
+          </a:bodyPr>
+          <a:lstStyle/>
+          <a:p>
+            <a:r>
+              <a:rPr lang="de-DE" sz="6600" dirty="0"/>
+              <a:t>=</a:t>
+            </a:r>
+          </a:p>
+        </p:txBody>
+      </p:sp>
+      <p:pic>
+        <p:nvPicPr>
+          <p:cNvPr id="19" name="Grafik 18">
+            <a:extLst>
+              <a:ext uri="{FF2B5EF4-FFF2-40B4-BE49-F238E27FC236}">
+                <a16:creationId xmlns:a16="http://schemas.microsoft.com/office/drawing/2014/main" id="{1C9FA99D-B033-490F-AB79-63079C57E371}"/>
+              </a:ext>
+            </a:extLst>
+          </p:cNvPr>
+          <p:cNvPicPr>
+            <a:picLocks noChangeAspect="1"/>
+          </p:cNvPicPr>
+          <p:nvPr/>
+        </p:nvPicPr>
+        <p:blipFill>
+          <a:blip r:embed="rId4"/>
+          <a:stretch>
+            <a:fillRect/>
+          </a:stretch>
+        </p:blipFill>
+        <p:spPr>
+          <a:xfrm>
+            <a:off x="6095206" y="2786348"/>
+            <a:ext cx="3697380" cy="2644257"/>
+          </a:xfrm>
+          <a:prstGeom prst="rect">
+            <a:avLst/>
+          </a:prstGeom>
+        </p:spPr>
+      </p:pic>
+      <p:sp>
+        <p:nvSpPr>
+          <p:cNvPr id="29" name="Freihandform: Form 28">
+            <a:extLst>
+              <a:ext uri="{FF2B5EF4-FFF2-40B4-BE49-F238E27FC236}">
+                <a16:creationId xmlns:a16="http://schemas.microsoft.com/office/drawing/2014/main" id="{5549DC0F-E845-4310-8633-F1BB44AAC8EE}"/>
+              </a:ext>
+            </a:extLst>
+          </p:cNvPr>
+          <p:cNvSpPr/>
+          <p:nvPr/>
+        </p:nvSpPr>
+        <p:spPr>
+          <a:xfrm>
+            <a:off x="6528391" y="3166241"/>
+            <a:ext cx="3189767" cy="1049237"/>
+          </a:xfrm>
+          <a:custGeom>
+            <a:avLst/>
+            <a:gdLst>
+              <a:gd name="connsiteX0" fmla="*/ 1860697 w 3189767"/>
+              <a:gd name="connsiteY0" fmla="*/ 0 h 1049237"/>
+              <a:gd name="connsiteX1" fmla="*/ 3189767 w 3189767"/>
+              <a:gd name="connsiteY1" fmla="*/ 0 h 1049237"/>
+              <a:gd name="connsiteX2" fmla="*/ 3189767 w 3189767"/>
+              <a:gd name="connsiteY2" fmla="*/ 345225 h 1049237"/>
+              <a:gd name="connsiteX3" fmla="*/ 3189767 w 3189767"/>
+              <a:gd name="connsiteY3" fmla="*/ 409687 h 1049237"/>
+              <a:gd name="connsiteX4" fmla="*/ 3189767 w 3189767"/>
+              <a:gd name="connsiteY4" fmla="*/ 754912 h 1049237"/>
+              <a:gd name="connsiteX5" fmla="*/ 229697 w 3189767"/>
+              <a:gd name="connsiteY5" fmla="*/ 754912 h 1049237"/>
+              <a:gd name="connsiteX6" fmla="*/ 229697 w 3189767"/>
+              <a:gd name="connsiteY6" fmla="*/ 1049237 h 1049237"/>
+              <a:gd name="connsiteX7" fmla="*/ 0 w 3189767"/>
+              <a:gd name="connsiteY7" fmla="*/ 1049237 h 1049237"/>
+              <a:gd name="connsiteX8" fmla="*/ 0 w 3189767"/>
+              <a:gd name="connsiteY8" fmla="*/ 754912 h 1049237"/>
+              <a:gd name="connsiteX9" fmla="*/ 0 w 3189767"/>
+              <a:gd name="connsiteY9" fmla="*/ 708995 h 1049237"/>
+              <a:gd name="connsiteX10" fmla="*/ 0 w 3189767"/>
+              <a:gd name="connsiteY10" fmla="*/ 345225 h 1049237"/>
+              <a:gd name="connsiteX11" fmla="*/ 1860697 w 3189767"/>
+              <a:gd name="connsiteY11" fmla="*/ 345225 h 1049237"/>
+            </a:gdLst>
+            <a:ahLst/>
+            <a:cxnLst>
+              <a:cxn ang="0">
+                <a:pos x="connsiteX0" y="connsiteY0"/>
+              </a:cxn>
+              <a:cxn ang="0">
+                <a:pos x="connsiteX1" y="connsiteY1"/>
+              </a:cxn>
+              <a:cxn ang="0">
+                <a:pos x="connsiteX2" y="connsiteY2"/>
+              </a:cxn>
+              <a:cxn ang="0">
+                <a:pos x="connsiteX3" y="connsiteY3"/>
+              </a:cxn>
+              <a:cxn ang="0">
+                <a:pos x="connsiteX4" y="connsiteY4"/>
+              </a:cxn>
+              <a:cxn ang="0">
+                <a:pos x="connsiteX5" y="connsiteY5"/>
+              </a:cxn>
+              <a:cxn ang="0">
+                <a:pos x="connsiteX6" y="connsiteY6"/>
+              </a:cxn>
+              <a:cxn ang="0">
+                <a:pos x="connsiteX7" y="connsiteY7"/>
+              </a:cxn>
+              <a:cxn ang="0">
+                <a:pos x="connsiteX8" y="connsiteY8"/>
+              </a:cxn>
+              <a:cxn ang="0">
+                <a:pos x="connsiteX9" y="connsiteY9"/>
+              </a:cxn>
+              <a:cxn ang="0">
+                <a:pos x="connsiteX10" y="connsiteY10"/>
+              </a:cxn>
+              <a:cxn ang="0">
+                <a:pos x="connsiteX11" y="connsiteY11"/>
+              </a:cxn>
+            </a:cxnLst>
+            <a:rect l="l" t="t" r="r" b="b"/>
+            <a:pathLst>
+              <a:path w="3189767" h="1049237">
+                <a:moveTo>
+                  <a:pt x="1860697" y="0"/>
+                </a:moveTo>
+                <a:lnTo>
+                  <a:pt x="3189767" y="0"/>
+                </a:lnTo>
+                <a:lnTo>
+                  <a:pt x="3189767" y="345225"/>
+                </a:lnTo>
+                <a:lnTo>
+                  <a:pt x="3189767" y="409687"/>
+                </a:lnTo>
+                <a:lnTo>
+                  <a:pt x="3189767" y="754912"/>
+                </a:lnTo>
+                <a:lnTo>
+                  <a:pt x="229697" y="754912"/>
+                </a:lnTo>
+                <a:lnTo>
+                  <a:pt x="229697" y="1049237"/>
+                </a:lnTo>
+                <a:lnTo>
+                  <a:pt x="0" y="1049237"/>
+                </a:lnTo>
+                <a:lnTo>
+                  <a:pt x="0" y="754912"/>
+                </a:lnTo>
+                <a:lnTo>
+                  <a:pt x="0" y="708995"/>
+                </a:lnTo>
+                <a:lnTo>
+                  <a:pt x="0" y="345225"/>
+                </a:lnTo>
+                <a:lnTo>
+                  <a:pt x="1860697" y="345225"/>
+                </a:lnTo>
+                <a:close/>
+              </a:path>
+            </a:pathLst>
+          </a:custGeom>
+          <a:solidFill>
+            <a:srgbClr val="F47836">
+              <a:alpha val="30196"/>
+            </a:srgbClr>
+          </a:solidFill>
+          <a:ln>
+            <a:noFill/>
+          </a:ln>
+        </p:spPr>
+        <p:style>
+          <a:lnRef idx="2">
+            <a:schemeClr val="accent1">
+              <a:shade val="50000"/>
+            </a:schemeClr>
+          </a:lnRef>
+          <a:fillRef idx="1">
+            <a:schemeClr val="accent1"/>
+          </a:fillRef>
+          <a:effectRef idx="0">
+            <a:schemeClr val="accent1"/>
+          </a:effectRef>
+          <a:fontRef idx="minor">
+            <a:schemeClr val="lt1"/>
+          </a:fontRef>
+        </p:style>
+        <p:txBody>
+          <a:bodyPr wrap="square" rtlCol="0" anchor="ctr">
+            <a:noAutofit/>
+          </a:bodyPr>
+          <a:lstStyle/>
+          <a:p>
+            <a:pPr algn="ctr"/>
+            <a:endParaRPr lang="de-DE"/>
+          </a:p>
+        </p:txBody>
+      </p:sp>
+      <p:sp>
+        <p:nvSpPr>
+          <p:cNvPr id="30" name="Freihandform: Form 29">
+            <a:extLst>
+              <a:ext uri="{FF2B5EF4-FFF2-40B4-BE49-F238E27FC236}">
+                <a16:creationId xmlns:a16="http://schemas.microsoft.com/office/drawing/2014/main" id="{6E86AAFC-4CCC-48E0-897F-CC2D16928D68}"/>
+              </a:ext>
+            </a:extLst>
+          </p:cNvPr>
+          <p:cNvSpPr/>
+          <p:nvPr/>
+        </p:nvSpPr>
+        <p:spPr>
+          <a:xfrm>
+            <a:off x="918816" y="4770024"/>
+            <a:ext cx="3189767" cy="1049237"/>
+          </a:xfrm>
+          <a:custGeom>
+            <a:avLst/>
+            <a:gdLst>
+              <a:gd name="connsiteX0" fmla="*/ 1860697 w 3189767"/>
+              <a:gd name="connsiteY0" fmla="*/ 0 h 1049237"/>
+              <a:gd name="connsiteX1" fmla="*/ 3189767 w 3189767"/>
+              <a:gd name="connsiteY1" fmla="*/ 0 h 1049237"/>
+              <a:gd name="connsiteX2" fmla="*/ 3189767 w 3189767"/>
+              <a:gd name="connsiteY2" fmla="*/ 345225 h 1049237"/>
+              <a:gd name="connsiteX3" fmla="*/ 3189767 w 3189767"/>
+              <a:gd name="connsiteY3" fmla="*/ 409687 h 1049237"/>
+              <a:gd name="connsiteX4" fmla="*/ 3189767 w 3189767"/>
+              <a:gd name="connsiteY4" fmla="*/ 754912 h 1049237"/>
+              <a:gd name="connsiteX5" fmla="*/ 229697 w 3189767"/>
+              <a:gd name="connsiteY5" fmla="*/ 754912 h 1049237"/>
+              <a:gd name="connsiteX6" fmla="*/ 229697 w 3189767"/>
+              <a:gd name="connsiteY6" fmla="*/ 1049237 h 1049237"/>
+              <a:gd name="connsiteX7" fmla="*/ 0 w 3189767"/>
+              <a:gd name="connsiteY7" fmla="*/ 1049237 h 1049237"/>
+              <a:gd name="connsiteX8" fmla="*/ 0 w 3189767"/>
+              <a:gd name="connsiteY8" fmla="*/ 754912 h 1049237"/>
+              <a:gd name="connsiteX9" fmla="*/ 0 w 3189767"/>
+              <a:gd name="connsiteY9" fmla="*/ 708995 h 1049237"/>
+              <a:gd name="connsiteX10" fmla="*/ 0 w 3189767"/>
+              <a:gd name="connsiteY10" fmla="*/ 345225 h 1049237"/>
+              <a:gd name="connsiteX11" fmla="*/ 1860697 w 3189767"/>
+              <a:gd name="connsiteY11" fmla="*/ 345225 h 1049237"/>
+            </a:gdLst>
+            <a:ahLst/>
+            <a:cxnLst>
+              <a:cxn ang="0">
+                <a:pos x="connsiteX0" y="connsiteY0"/>
+              </a:cxn>
+              <a:cxn ang="0">
+                <a:pos x="connsiteX1" y="connsiteY1"/>
+              </a:cxn>
+              <a:cxn ang="0">
+                <a:pos x="connsiteX2" y="connsiteY2"/>
+              </a:cxn>
+              <a:cxn ang="0">
+                <a:pos x="connsiteX3" y="connsiteY3"/>
+              </a:cxn>
+              <a:cxn ang="0">
+                <a:pos x="connsiteX4" y="connsiteY4"/>
+              </a:cxn>
+              <a:cxn ang="0">
+                <a:pos x="connsiteX5" y="connsiteY5"/>
+              </a:cxn>
+              <a:cxn ang="0">
+                <a:pos x="connsiteX6" y="connsiteY6"/>
+              </a:cxn>
+              <a:cxn ang="0">
+                <a:pos x="connsiteX7" y="connsiteY7"/>
+              </a:cxn>
+              <a:cxn ang="0">
+                <a:pos x="connsiteX8" y="connsiteY8"/>
+              </a:cxn>
+              <a:cxn ang="0">
+                <a:pos x="connsiteX9" y="connsiteY9"/>
+              </a:cxn>
+              <a:cxn ang="0">
+                <a:pos x="connsiteX10" y="connsiteY10"/>
+              </a:cxn>
+              <a:cxn ang="0">
+                <a:pos x="connsiteX11" y="connsiteY11"/>
+              </a:cxn>
+            </a:cxnLst>
+            <a:rect l="l" t="t" r="r" b="b"/>
+            <a:pathLst>
+              <a:path w="3189767" h="1049237">
+                <a:moveTo>
+                  <a:pt x="1860697" y="0"/>
+                </a:moveTo>
+                <a:lnTo>
+                  <a:pt x="3189767" y="0"/>
+                </a:lnTo>
+                <a:lnTo>
+                  <a:pt x="3189767" y="345225"/>
+                </a:lnTo>
+                <a:lnTo>
+                  <a:pt x="3189767" y="409687"/>
+                </a:lnTo>
+                <a:lnTo>
+                  <a:pt x="3189767" y="754912"/>
+                </a:lnTo>
+                <a:lnTo>
+                  <a:pt x="229697" y="754912"/>
+                </a:lnTo>
+                <a:lnTo>
+                  <a:pt x="229697" y="1049237"/>
+                </a:lnTo>
+                <a:lnTo>
+                  <a:pt x="0" y="1049237"/>
+                </a:lnTo>
+                <a:lnTo>
+                  <a:pt x="0" y="754912"/>
+                </a:lnTo>
+                <a:lnTo>
+                  <a:pt x="0" y="708995"/>
+                </a:lnTo>
+                <a:lnTo>
+                  <a:pt x="0" y="345225"/>
+                </a:lnTo>
+                <a:lnTo>
+                  <a:pt x="1860697" y="345225"/>
+                </a:lnTo>
+                <a:close/>
+              </a:path>
+            </a:pathLst>
+          </a:custGeom>
+          <a:solidFill>
+            <a:srgbClr val="F47836">
+              <a:alpha val="30196"/>
+            </a:srgbClr>
+          </a:solidFill>
+          <a:ln>
+            <a:noFill/>
+          </a:ln>
+        </p:spPr>
+        <p:style>
+          <a:lnRef idx="2">
+            <a:schemeClr val="accent1">
+              <a:shade val="50000"/>
+            </a:schemeClr>
+          </a:lnRef>
+          <a:fillRef idx="1">
+            <a:schemeClr val="accent1"/>
+          </a:fillRef>
+          <a:effectRef idx="0">
+            <a:schemeClr val="accent1"/>
+          </a:effectRef>
+          <a:fontRef idx="minor">
+            <a:schemeClr val="lt1"/>
+          </a:fontRef>
+        </p:style>
+        <p:txBody>
+          <a:bodyPr wrap="square" rtlCol="0" anchor="ctr">
+            <a:noAutofit/>
+          </a:bodyPr>
+          <a:lstStyle/>
+          <a:p>
+            <a:pPr algn="ctr"/>
+            <a:endParaRPr lang="de-DE"/>
+          </a:p>
+        </p:txBody>
+      </p:sp>
+      <p:sp>
+        <p:nvSpPr>
+          <p:cNvPr id="31" name="Rechteck 30">
+            <a:extLst>
+              <a:ext uri="{FF2B5EF4-FFF2-40B4-BE49-F238E27FC236}">
+                <a16:creationId xmlns:a16="http://schemas.microsoft.com/office/drawing/2014/main" id="{39D99A01-F515-44BE-AD1A-CD04130933B6}"/>
+              </a:ext>
+            </a:extLst>
+          </p:cNvPr>
+          <p:cNvSpPr/>
+          <p:nvPr/>
+        </p:nvSpPr>
+        <p:spPr>
+          <a:xfrm>
+            <a:off x="1552353" y="4770024"/>
+            <a:ext cx="1201479" cy="333604"/>
+          </a:xfrm>
+          <a:prstGeom prst="rect">
+            <a:avLst/>
+          </a:prstGeom>
+          <a:solidFill>
+            <a:srgbClr val="004990">
+              <a:alpha val="30196"/>
+            </a:srgbClr>
+          </a:solidFill>
+          <a:ln>
+            <a:noFill/>
+          </a:ln>
+        </p:spPr>
+        <p:style>
+          <a:lnRef idx="2">
+            <a:schemeClr val="accent1">
+              <a:shade val="50000"/>
+            </a:schemeClr>
+          </a:lnRef>
+          <a:fillRef idx="1">
+            <a:schemeClr val="accent1"/>
+          </a:fillRef>
+          <a:effectRef idx="0">
+            <a:schemeClr val="accent1"/>
+          </a:effectRef>
+          <a:fontRef idx="minor">
+            <a:schemeClr val="lt1"/>
+          </a:fontRef>
+        </p:style>
+        <p:txBody>
+          <a:bodyPr rtlCol="0" anchor="ctr"/>
+          <a:lstStyle/>
+          <a:p>
+            <a:pPr algn="ctr"/>
+            <a:endParaRPr lang="de-DE"/>
+          </a:p>
+        </p:txBody>
+      </p:sp>
+      <p:sp>
+        <p:nvSpPr>
+          <p:cNvPr id="32" name="Rechteck 31">
+            <a:extLst>
+              <a:ext uri="{FF2B5EF4-FFF2-40B4-BE49-F238E27FC236}">
+                <a16:creationId xmlns:a16="http://schemas.microsoft.com/office/drawing/2014/main" id="{C9DFEEE8-DAC4-48FA-A4B6-EC1B34F73772}"/>
+              </a:ext>
+            </a:extLst>
+          </p:cNvPr>
+          <p:cNvSpPr/>
+          <p:nvPr/>
+        </p:nvSpPr>
+        <p:spPr>
+          <a:xfrm>
+            <a:off x="7137413" y="3166241"/>
+            <a:ext cx="958837" cy="333604"/>
+          </a:xfrm>
+          <a:prstGeom prst="rect">
+            <a:avLst/>
+          </a:prstGeom>
+          <a:solidFill>
+            <a:srgbClr val="004990">
+              <a:alpha val="30196"/>
+            </a:srgbClr>
+          </a:solidFill>
+          <a:ln>
+            <a:noFill/>
+          </a:ln>
+        </p:spPr>
+        <p:style>
+          <a:lnRef idx="2">
+            <a:schemeClr val="accent1">
+              <a:shade val="50000"/>
+            </a:schemeClr>
+          </a:lnRef>
+          <a:fillRef idx="1">
+            <a:schemeClr val="accent1"/>
+          </a:fillRef>
+          <a:effectRef idx="0">
+            <a:schemeClr val="accent1"/>
+          </a:effectRef>
+          <a:fontRef idx="minor">
+            <a:schemeClr val="lt1"/>
+          </a:fontRef>
+        </p:style>
+        <p:txBody>
+          <a:bodyPr rtlCol="0" anchor="ctr"/>
+          <a:lstStyle/>
+          <a:p>
+            <a:pPr algn="ctr"/>
+            <a:endParaRPr lang="de-DE"/>
+          </a:p>
+        </p:txBody>
+      </p:sp>
+      <p:sp>
+        <p:nvSpPr>
+          <p:cNvPr id="33" name="Textfeld 32">
+            <a:extLst>
+              <a:ext uri="{FF2B5EF4-FFF2-40B4-BE49-F238E27FC236}">
+                <a16:creationId xmlns:a16="http://schemas.microsoft.com/office/drawing/2014/main" id="{3D44B594-762D-498A-A65F-CB5255EC47D3}"/>
+              </a:ext>
+            </a:extLst>
+          </p:cNvPr>
+          <p:cNvSpPr txBox="1"/>
+          <p:nvPr/>
+        </p:nvSpPr>
+        <p:spPr>
+          <a:xfrm>
+            <a:off x="2146431" y="5672695"/>
+            <a:ext cx="2036583" cy="369332"/>
+          </a:xfrm>
+          <a:prstGeom prst="rect">
+            <a:avLst/>
+          </a:prstGeom>
+          <a:noFill/>
+        </p:spPr>
+        <p:txBody>
+          <a:bodyPr wrap="none" rtlCol="0">
+            <a:spAutoFit/>
+          </a:bodyPr>
+          <a:lstStyle/>
+          <a:p>
+            <a:r>
+              <a:rPr lang="de-DE" dirty="0"/>
+              <a:t>"normale" Funktion</a:t>
+            </a:r>
+          </a:p>
+        </p:txBody>
+      </p:sp>
+      <p:sp>
+        <p:nvSpPr>
+          <p:cNvPr id="34" name="Textfeld 33">
+            <a:extLst>
+              <a:ext uri="{FF2B5EF4-FFF2-40B4-BE49-F238E27FC236}">
+                <a16:creationId xmlns:a16="http://schemas.microsoft.com/office/drawing/2014/main" id="{84A2F6A4-EBA3-4992-A2EB-DE0AC1DAD0BE}"/>
+              </a:ext>
+            </a:extLst>
+          </p:cNvPr>
+          <p:cNvSpPr txBox="1"/>
+          <p:nvPr/>
+        </p:nvSpPr>
+        <p:spPr>
+          <a:xfrm>
+            <a:off x="6343384" y="5539177"/>
+            <a:ext cx="4164923" cy="369332"/>
+          </a:xfrm>
+          <a:prstGeom prst="rect">
+            <a:avLst/>
+          </a:prstGeom>
+          <a:noFill/>
+        </p:spPr>
+        <p:txBody>
+          <a:bodyPr wrap="none" rtlCol="0">
+            <a:spAutoFit/>
+          </a:bodyPr>
+          <a:lstStyle/>
+          <a:p>
+            <a:r>
+              <a:rPr lang="de-DE" dirty="0"/>
+              <a:t>Zuweisung einer Funktion an eine Variable</a:t>
+            </a:r>
+          </a:p>
+        </p:txBody>
+      </p:sp>
+      <p:sp>
+        <p:nvSpPr>
+          <p:cNvPr id="35" name="Rechteck 34">
+            <a:extLst>
+              <a:ext uri="{FF2B5EF4-FFF2-40B4-BE49-F238E27FC236}">
+                <a16:creationId xmlns:a16="http://schemas.microsoft.com/office/drawing/2014/main" id="{09E4B30E-8D94-4236-8F6F-DBEBDAB4D35A}"/>
+              </a:ext>
+            </a:extLst>
+          </p:cNvPr>
+          <p:cNvSpPr/>
+          <p:nvPr/>
+        </p:nvSpPr>
+        <p:spPr>
+          <a:xfrm>
+            <a:off x="8115300" y="3166241"/>
+            <a:ext cx="257175" cy="333604"/>
+          </a:xfrm>
+          <a:prstGeom prst="rect">
+            <a:avLst/>
+          </a:prstGeom>
+          <a:solidFill>
+            <a:schemeClr val="accent3">
+              <a:alpha val="30196"/>
+            </a:schemeClr>
+          </a:solidFill>
+          <a:ln>
+            <a:noFill/>
+          </a:ln>
+        </p:spPr>
+        <p:style>
+          <a:lnRef idx="2">
+            <a:schemeClr val="accent1">
+              <a:shade val="50000"/>
+            </a:schemeClr>
+          </a:lnRef>
+          <a:fillRef idx="1">
+            <a:schemeClr val="accent1"/>
+          </a:fillRef>
+          <a:effectRef idx="0">
+            <a:schemeClr val="accent1"/>
+          </a:effectRef>
+          <a:fontRef idx="minor">
+            <a:schemeClr val="lt1"/>
+          </a:fontRef>
+        </p:style>
+        <p:txBody>
+          <a:bodyPr rtlCol="0" anchor="ctr"/>
+          <a:lstStyle/>
+          <a:p>
+            <a:pPr algn="ctr"/>
+            <a:endParaRPr lang="de-DE"/>
+          </a:p>
+        </p:txBody>
+      </p:sp>
+      <p:sp>
+        <p:nvSpPr>
+          <p:cNvPr id="36" name="Rechteck 35">
+            <a:extLst>
+              <a:ext uri="{FF2B5EF4-FFF2-40B4-BE49-F238E27FC236}">
+                <a16:creationId xmlns:a16="http://schemas.microsoft.com/office/drawing/2014/main" id="{684146F0-7051-47A7-97C5-DCB4A48A8A99}"/>
+              </a:ext>
+            </a:extLst>
+          </p:cNvPr>
+          <p:cNvSpPr/>
+          <p:nvPr/>
+        </p:nvSpPr>
+        <p:spPr>
+          <a:xfrm>
+            <a:off x="6769088" y="3937766"/>
+            <a:ext cx="174638" cy="277712"/>
+          </a:xfrm>
+          <a:prstGeom prst="rect">
+            <a:avLst/>
+          </a:prstGeom>
+          <a:solidFill>
+            <a:schemeClr val="accent3">
+              <a:alpha val="30196"/>
+            </a:schemeClr>
+          </a:solidFill>
+          <a:ln>
+            <a:noFill/>
+          </a:ln>
+        </p:spPr>
+        <p:style>
+          <a:lnRef idx="2">
+            <a:schemeClr val="accent1">
+              <a:shade val="50000"/>
+            </a:schemeClr>
+          </a:lnRef>
+          <a:fillRef idx="1">
+            <a:schemeClr val="accent1"/>
+          </a:fillRef>
+          <a:effectRef idx="0">
+            <a:schemeClr val="accent1"/>
+          </a:effectRef>
+          <a:fontRef idx="minor">
+            <a:schemeClr val="lt1"/>
+          </a:fontRef>
+        </p:style>
+        <p:txBody>
+          <a:bodyPr rtlCol="0" anchor="ctr"/>
+          <a:lstStyle/>
+          <a:p>
+            <a:pPr algn="ctr"/>
+            <a:endParaRPr lang="de-DE"/>
+          </a:p>
+        </p:txBody>
+      </p:sp>
+      <p:sp>
+        <p:nvSpPr>
+          <p:cNvPr id="37" name="Rechteck 36">
+            <a:extLst>
+              <a:ext uri="{FF2B5EF4-FFF2-40B4-BE49-F238E27FC236}">
+                <a16:creationId xmlns:a16="http://schemas.microsoft.com/office/drawing/2014/main" id="{11F4094A-AFF5-4CDB-9B06-2D0C2FA80997}"/>
+              </a:ext>
+            </a:extLst>
+          </p:cNvPr>
+          <p:cNvSpPr/>
+          <p:nvPr/>
+        </p:nvSpPr>
+        <p:spPr>
+          <a:xfrm>
+            <a:off x="8562976" y="4280666"/>
+            <a:ext cx="133350" cy="333604"/>
+          </a:xfrm>
+          <a:prstGeom prst="rect">
+            <a:avLst/>
+          </a:prstGeom>
+          <a:solidFill>
+            <a:schemeClr val="accent5">
+              <a:alpha val="30196"/>
+            </a:schemeClr>
+          </a:solidFill>
+          <a:ln>
+            <a:noFill/>
+          </a:ln>
+        </p:spPr>
+        <p:style>
+          <a:lnRef idx="2">
+            <a:schemeClr val="accent1">
+              <a:shade val="50000"/>
+            </a:schemeClr>
+          </a:lnRef>
+          <a:fillRef idx="1">
+            <a:schemeClr val="accent1"/>
+          </a:fillRef>
+          <a:effectRef idx="0">
+            <a:schemeClr val="accent1"/>
+          </a:effectRef>
+          <a:fontRef idx="minor">
+            <a:schemeClr val="lt1"/>
+          </a:fontRef>
+        </p:style>
+        <p:txBody>
+          <a:bodyPr rtlCol="0" anchor="ctr"/>
+          <a:lstStyle/>
+          <a:p>
+            <a:pPr algn="ctr"/>
+            <a:endParaRPr lang="de-DE"/>
+          </a:p>
+        </p:txBody>
+      </p:sp>
+      <p:sp>
+        <p:nvSpPr>
+          <p:cNvPr id="38" name="Rechteck 37">
+            <a:extLst>
+              <a:ext uri="{FF2B5EF4-FFF2-40B4-BE49-F238E27FC236}">
+                <a16:creationId xmlns:a16="http://schemas.microsoft.com/office/drawing/2014/main" id="{700DD6FC-BE91-495E-8CAA-9FB34169BAFB}"/>
+              </a:ext>
+            </a:extLst>
+          </p:cNvPr>
+          <p:cNvSpPr/>
+          <p:nvPr/>
+        </p:nvSpPr>
+        <p:spPr>
+          <a:xfrm>
+            <a:off x="8820151" y="4271141"/>
+            <a:ext cx="133350" cy="333604"/>
+          </a:xfrm>
+          <a:prstGeom prst="rect">
+            <a:avLst/>
+          </a:prstGeom>
+          <a:solidFill>
+            <a:schemeClr val="accent5">
+              <a:alpha val="30196"/>
+            </a:schemeClr>
+          </a:solidFill>
+          <a:ln>
+            <a:noFill/>
+          </a:ln>
+        </p:spPr>
+        <p:style>
+          <a:lnRef idx="2">
+            <a:schemeClr val="accent1">
+              <a:shade val="50000"/>
+            </a:schemeClr>
+          </a:lnRef>
+          <a:fillRef idx="1">
+            <a:schemeClr val="accent1"/>
+          </a:fillRef>
+          <a:effectRef idx="0">
+            <a:schemeClr val="accent1"/>
+          </a:effectRef>
+          <a:fontRef idx="minor">
+            <a:schemeClr val="lt1"/>
+          </a:fontRef>
+        </p:style>
+        <p:txBody>
+          <a:bodyPr rtlCol="0" anchor="ctr"/>
+          <a:lstStyle/>
+          <a:p>
+            <a:pPr algn="ctr"/>
+            <a:endParaRPr lang="de-DE"/>
+          </a:p>
+        </p:txBody>
+      </p:sp>
+    </p:spTree>
+    <p:extLst>
+      <p:ext uri="{BB962C8B-B14F-4D97-AF65-F5344CB8AC3E}">
+        <p14:creationId xmlns:p14="http://schemas.microsoft.com/office/powerpoint/2010/main" val="3494289134"/>
+      </p:ext>
+    </p:extLst>
+  </p:cSld>
+  <p:clrMapOvr>
+    <a:masterClrMapping/>
+  </p:clrMapOvr>
+</p:sld>
+</file>
+
+<file path=ppt/slides/slide63.xml><?xml version="1.0" encoding="utf-8"?>
+<p:sld xmlns:a="http://schemas.openxmlformats.org/drawingml/2006/main" xmlns:r="http://schemas.openxmlformats.org/officeDocument/2006/relationships" xmlns:p="http://schemas.openxmlformats.org/presentationml/2006/main">
+  <p:cSld>
+    <p:spTree>
+      <p:nvGrpSpPr>
+        <p:cNvPr id="1" name=""/>
+        <p:cNvGrpSpPr/>
+        <p:nvPr/>
+      </p:nvGrpSpPr>
+      <p:grpSpPr>
+        <a:xfrm>
+          <a:off x="0" y="0"/>
+          <a:ext cx="0" cy="0"/>
+          <a:chOff x="0" y="0"/>
+          <a:chExt cx="0" cy="0"/>
+        </a:xfrm>
+      </p:grpSpPr>
+      <p:sp>
+        <p:nvSpPr>
+          <p:cNvPr id="2" name="Titel 1">
+            <a:extLst>
+              <a:ext uri="{FF2B5EF4-FFF2-40B4-BE49-F238E27FC236}">
+                <a16:creationId xmlns:a16="http://schemas.microsoft.com/office/drawing/2014/main" id="{FACFBA44-F278-4A4B-B66C-29A9C0A45E9F}"/>
+              </a:ext>
+            </a:extLst>
+          </p:cNvPr>
+          <p:cNvSpPr>
+            <a:spLocks noGrp="1"/>
+          </p:cNvSpPr>
+          <p:nvPr>
+            <p:ph type="title"/>
+          </p:nvPr>
+        </p:nvSpPr>
+        <p:spPr/>
+        <p:txBody>
+          <a:bodyPr/>
+          <a:lstStyle/>
+          <a:p>
+            <a:r>
+              <a:rPr lang="de-DE" dirty="0"/>
+              <a:t>Dart - Lambdas</a:t>
+            </a:r>
+          </a:p>
+        </p:txBody>
+      </p:sp>
+      <p:sp>
+        <p:nvSpPr>
+          <p:cNvPr id="3" name="Content Placeholder 2">
+            <a:extLst>
+              <a:ext uri="{FF2B5EF4-FFF2-40B4-BE49-F238E27FC236}">
+                <a16:creationId xmlns:a16="http://schemas.microsoft.com/office/drawing/2014/main" id="{59266691-6F20-41DD-14AA-B34569312EF0}"/>
+              </a:ext>
+            </a:extLst>
+          </p:cNvPr>
+          <p:cNvSpPr>
+            <a:spLocks noGrp="1"/>
+          </p:cNvSpPr>
+          <p:nvPr>
+            <p:ph idx="1"/>
+          </p:nvPr>
+        </p:nvSpPr>
+        <p:spPr/>
+        <p:txBody>
+          <a:bodyPr/>
+          <a:lstStyle/>
+          <a:p>
+            <a:endParaRPr lang="de-DE"/>
+          </a:p>
+        </p:txBody>
+      </p:sp>
+      <p:sp>
+        <p:nvSpPr>
+          <p:cNvPr id="4" name="Datumsplatzhalter 3">
+            <a:extLst>
+              <a:ext uri="{FF2B5EF4-FFF2-40B4-BE49-F238E27FC236}">
+                <a16:creationId xmlns:a16="http://schemas.microsoft.com/office/drawing/2014/main" id="{02CC89AB-3905-4A5B-88C4-4FD333ECD4B8}"/>
+              </a:ext>
+            </a:extLst>
+          </p:cNvPr>
+          <p:cNvSpPr>
+            <a:spLocks noGrp="1"/>
+          </p:cNvSpPr>
+          <p:nvPr>
+            <p:ph type="dt" sz="half" idx="10"/>
+          </p:nvPr>
+        </p:nvSpPr>
+        <p:spPr/>
+        <p:txBody>
+          <a:bodyPr/>
+          <a:lstStyle/>
+          <a:p>
+            <a:fld id="{8159FE7A-07D2-4D3F-9855-29B7F3DF1D43}" type="datetime1">
+              <a:rPr lang="de-DE" smtClean="0"/>
+              <a:t>24.03.2023</a:t>
+            </a:fld>
+            <a:endParaRPr lang="de-DE"/>
+          </a:p>
+        </p:txBody>
+      </p:sp>
+      <p:sp>
+        <p:nvSpPr>
+          <p:cNvPr id="5" name="Fußzeilenplatzhalter 4">
+            <a:extLst>
+              <a:ext uri="{FF2B5EF4-FFF2-40B4-BE49-F238E27FC236}">
+                <a16:creationId xmlns:a16="http://schemas.microsoft.com/office/drawing/2014/main" id="{7173D78B-6B80-4206-8EF9-36054C301E49}"/>
+              </a:ext>
+            </a:extLst>
+          </p:cNvPr>
+          <p:cNvSpPr>
+            <a:spLocks noGrp="1"/>
+          </p:cNvSpPr>
+          <p:nvPr>
+            <p:ph type="ftr" sz="quarter" idx="11"/>
+          </p:nvPr>
+        </p:nvSpPr>
+        <p:spPr/>
+        <p:txBody>
+          <a:bodyPr/>
+          <a:lstStyle/>
+          <a:p>
+            <a:r>
+              <a:rPr lang="de-DE"/>
+              <a:t>Dart - Programmiersprache für Smartphones</a:t>
+            </a:r>
+          </a:p>
+        </p:txBody>
+      </p:sp>
+      <p:sp>
+        <p:nvSpPr>
+          <p:cNvPr id="6" name="Foliennummernplatzhalter 5">
+            <a:extLst>
+              <a:ext uri="{FF2B5EF4-FFF2-40B4-BE49-F238E27FC236}">
+                <a16:creationId xmlns:a16="http://schemas.microsoft.com/office/drawing/2014/main" id="{1AD4BF87-D581-44DD-9F82-CA60B5DA5A5D}"/>
+              </a:ext>
+            </a:extLst>
+          </p:cNvPr>
+          <p:cNvSpPr>
+            <a:spLocks noGrp="1"/>
+          </p:cNvSpPr>
+          <p:nvPr>
+            <p:ph type="sldNum" sz="quarter" idx="12"/>
+          </p:nvPr>
+        </p:nvSpPr>
+        <p:spPr/>
+        <p:txBody>
+          <a:bodyPr/>
+          <a:lstStyle/>
+          <a:p>
+            <a:fld id="{3A1F27E2-D58A-4028-9FF2-B12D897F257E}" type="slidenum">
+              <a:rPr lang="de-DE" smtClean="0"/>
+              <a:t>63</a:t>
+            </a:fld>
+            <a:endParaRPr lang="de-DE"/>
+          </a:p>
+        </p:txBody>
+      </p:sp>
+      <p:pic>
+        <p:nvPicPr>
+          <p:cNvPr id="8" name="Grafik 7">
+            <a:extLst>
+              <a:ext uri="{FF2B5EF4-FFF2-40B4-BE49-F238E27FC236}">
+                <a16:creationId xmlns:a16="http://schemas.microsoft.com/office/drawing/2014/main" id="{B9ABE3A9-F358-4FAF-85C3-37806DCF66CF}"/>
+              </a:ext>
+            </a:extLst>
+          </p:cNvPr>
+          <p:cNvPicPr>
+            <a:picLocks noChangeAspect="1"/>
+          </p:cNvPicPr>
+          <p:nvPr/>
+        </p:nvPicPr>
+        <p:blipFill>
+          <a:blip r:embed="rId3"/>
+          <a:stretch>
+            <a:fillRect/>
+          </a:stretch>
+        </p:blipFill>
+        <p:spPr>
+          <a:xfrm>
+            <a:off x="838200" y="2190249"/>
+            <a:ext cx="5374056" cy="3610476"/>
+          </a:xfrm>
+          <a:prstGeom prst="rect">
+            <a:avLst/>
+          </a:prstGeom>
+        </p:spPr>
+      </p:pic>
+      <p:sp>
+        <p:nvSpPr>
+          <p:cNvPr id="9" name="Rechteck 8">
+            <a:extLst>
+              <a:ext uri="{FF2B5EF4-FFF2-40B4-BE49-F238E27FC236}">
+                <a16:creationId xmlns:a16="http://schemas.microsoft.com/office/drawing/2014/main" id="{70434E77-E12D-4764-9501-009481836046}"/>
+              </a:ext>
+            </a:extLst>
+          </p:cNvPr>
+          <p:cNvSpPr/>
+          <p:nvPr/>
+        </p:nvSpPr>
+        <p:spPr>
+          <a:xfrm>
+            <a:off x="2969609" y="2670941"/>
+            <a:ext cx="958837" cy="333604"/>
+          </a:xfrm>
+          <a:prstGeom prst="rect">
+            <a:avLst/>
+          </a:prstGeom>
+          <a:solidFill>
+            <a:srgbClr val="004990">
+              <a:alpha val="30196"/>
+            </a:srgbClr>
+          </a:solidFill>
+          <a:ln>
+            <a:noFill/>
+          </a:ln>
+        </p:spPr>
+        <p:style>
+          <a:lnRef idx="2">
+            <a:schemeClr val="accent1">
+              <a:shade val="50000"/>
+            </a:schemeClr>
+          </a:lnRef>
+          <a:fillRef idx="1">
+            <a:schemeClr val="accent1"/>
+          </a:fillRef>
+          <a:effectRef idx="0">
+            <a:schemeClr val="accent1"/>
+          </a:effectRef>
+          <a:fontRef idx="minor">
+            <a:schemeClr val="lt1"/>
+          </a:fontRef>
+        </p:style>
+        <p:txBody>
+          <a:bodyPr rtlCol="0" anchor="ctr"/>
+          <a:lstStyle/>
+          <a:p>
+            <a:pPr algn="ctr"/>
+            <a:endParaRPr lang="de-DE"/>
+          </a:p>
+        </p:txBody>
+      </p:sp>
+      <p:sp>
+        <p:nvSpPr>
+          <p:cNvPr id="10" name="Rechteck 9">
+            <a:extLst>
+              <a:ext uri="{FF2B5EF4-FFF2-40B4-BE49-F238E27FC236}">
+                <a16:creationId xmlns:a16="http://schemas.microsoft.com/office/drawing/2014/main" id="{BEBFE1F3-3752-49B9-BA5F-27F2029D2303}"/>
+              </a:ext>
+            </a:extLst>
+          </p:cNvPr>
+          <p:cNvSpPr/>
+          <p:nvPr/>
+        </p:nvSpPr>
+        <p:spPr>
+          <a:xfrm>
+            <a:off x="3760184" y="3585341"/>
+            <a:ext cx="958837" cy="333604"/>
+          </a:xfrm>
+          <a:prstGeom prst="rect">
+            <a:avLst/>
+          </a:prstGeom>
+          <a:solidFill>
+            <a:srgbClr val="004990">
+              <a:alpha val="30196"/>
+            </a:srgbClr>
+          </a:solidFill>
+          <a:ln>
+            <a:noFill/>
+          </a:ln>
+        </p:spPr>
+        <p:style>
+          <a:lnRef idx="2">
+            <a:schemeClr val="accent1">
+              <a:shade val="50000"/>
+            </a:schemeClr>
+          </a:lnRef>
+          <a:fillRef idx="1">
+            <a:schemeClr val="accent1"/>
+          </a:fillRef>
+          <a:effectRef idx="0">
+            <a:schemeClr val="accent1"/>
+          </a:effectRef>
+          <a:fontRef idx="minor">
+            <a:schemeClr val="lt1"/>
+          </a:fontRef>
+        </p:style>
+        <p:txBody>
+          <a:bodyPr rtlCol="0" anchor="ctr"/>
+          <a:lstStyle/>
+          <a:p>
+            <a:pPr algn="ctr"/>
+            <a:endParaRPr lang="de-DE"/>
+          </a:p>
+        </p:txBody>
+      </p:sp>
+    </p:spTree>
+    <p:extLst>
+      <p:ext uri="{BB962C8B-B14F-4D97-AF65-F5344CB8AC3E}">
+        <p14:creationId xmlns:p14="http://schemas.microsoft.com/office/powerpoint/2010/main" val="2062522188"/>
+      </p:ext>
+    </p:extLst>
+  </p:cSld>
+  <p:clrMapOvr>
+    <a:masterClrMapping/>
+  </p:clrMapOvr>
+</p:sld>
+</file>
+
+<file path=ppt/slides/slide64.xml><?xml version="1.0" encoding="utf-8"?>
+<p:sld xmlns:a="http://schemas.openxmlformats.org/drawingml/2006/main" xmlns:r="http://schemas.openxmlformats.org/officeDocument/2006/relationships" xmlns:p="http://schemas.openxmlformats.org/presentationml/2006/main">
+  <p:cSld>
+    <p:spTree>
+      <p:nvGrpSpPr>
+        <p:cNvPr id="1" name=""/>
+        <p:cNvGrpSpPr/>
+        <p:nvPr/>
+      </p:nvGrpSpPr>
+      <p:grpSpPr>
+        <a:xfrm>
+          <a:off x="0" y="0"/>
+          <a:ext cx="0" cy="0"/>
+          <a:chOff x="0" y="0"/>
+          <a:chExt cx="0" cy="0"/>
+        </a:xfrm>
+      </p:grpSpPr>
+      <p:sp>
+        <p:nvSpPr>
+          <p:cNvPr id="2" name="Titel 1">
+            <a:extLst>
+              <a:ext uri="{FF2B5EF4-FFF2-40B4-BE49-F238E27FC236}">
+                <a16:creationId xmlns:a16="http://schemas.microsoft.com/office/drawing/2014/main" id="{819C97C1-91C9-4C6D-98AB-2DDA99ECD871}"/>
+              </a:ext>
+            </a:extLst>
+          </p:cNvPr>
+          <p:cNvSpPr>
+            <a:spLocks noGrp="1"/>
+          </p:cNvSpPr>
+          <p:nvPr>
+            <p:ph type="title"/>
+          </p:nvPr>
+        </p:nvSpPr>
+        <p:spPr/>
+        <p:txBody>
+          <a:bodyPr/>
+          <a:lstStyle/>
+          <a:p>
+            <a:r>
+              <a:rPr lang="de-DE" dirty="0"/>
+              <a:t>Dart - Lambdas</a:t>
+            </a:r>
+          </a:p>
+        </p:txBody>
+      </p:sp>
+      <p:sp>
+        <p:nvSpPr>
+          <p:cNvPr id="11" name="Inhaltsplatzhalter 10">
+            <a:extLst>
+              <a:ext uri="{FF2B5EF4-FFF2-40B4-BE49-F238E27FC236}">
+                <a16:creationId xmlns:a16="http://schemas.microsoft.com/office/drawing/2014/main" id="{991E0FBB-A601-4147-AE59-FD4F72726DD7}"/>
+              </a:ext>
+            </a:extLst>
+          </p:cNvPr>
+          <p:cNvSpPr>
+            <a:spLocks noGrp="1"/>
+          </p:cNvSpPr>
+          <p:nvPr>
+            <p:ph idx="1"/>
+          </p:nvPr>
+        </p:nvSpPr>
+        <p:spPr/>
+        <p:txBody>
+          <a:bodyPr/>
+          <a:lstStyle/>
+          <a:p>
+            <a:r>
+              <a:rPr lang="de-DE" dirty="0" err="1"/>
+              <a:t>Finally</a:t>
+            </a:r>
+            <a:r>
+              <a:rPr lang="de-DE" dirty="0"/>
+              <a:t>…</a:t>
+            </a:r>
+          </a:p>
+        </p:txBody>
+      </p:sp>
+      <p:sp>
+        <p:nvSpPr>
+          <p:cNvPr id="4" name="Datumsplatzhalter 3">
+            <a:extLst>
+              <a:ext uri="{FF2B5EF4-FFF2-40B4-BE49-F238E27FC236}">
+                <a16:creationId xmlns:a16="http://schemas.microsoft.com/office/drawing/2014/main" id="{9CA3E089-985D-482B-91AE-5E838935A374}"/>
+              </a:ext>
+            </a:extLst>
+          </p:cNvPr>
+          <p:cNvSpPr>
+            <a:spLocks noGrp="1"/>
+          </p:cNvSpPr>
+          <p:nvPr>
+            <p:ph type="dt" sz="half" idx="10"/>
+          </p:nvPr>
+        </p:nvSpPr>
+        <p:spPr/>
+        <p:txBody>
+          <a:bodyPr/>
+          <a:lstStyle/>
+          <a:p>
+            <a:fld id="{8159FE7A-07D2-4D3F-9855-29B7F3DF1D43}" type="datetime1">
+              <a:rPr lang="de-DE" smtClean="0"/>
+              <a:t>24.03.2023</a:t>
+            </a:fld>
+            <a:endParaRPr lang="de-DE"/>
+          </a:p>
+        </p:txBody>
+      </p:sp>
+      <p:sp>
+        <p:nvSpPr>
+          <p:cNvPr id="5" name="Fußzeilenplatzhalter 4">
+            <a:extLst>
+              <a:ext uri="{FF2B5EF4-FFF2-40B4-BE49-F238E27FC236}">
+                <a16:creationId xmlns:a16="http://schemas.microsoft.com/office/drawing/2014/main" id="{6C699D81-2E59-437E-B020-F725F5447A64}"/>
+              </a:ext>
+            </a:extLst>
+          </p:cNvPr>
+          <p:cNvSpPr>
+            <a:spLocks noGrp="1"/>
+          </p:cNvSpPr>
+          <p:nvPr>
+            <p:ph type="ftr" sz="quarter" idx="11"/>
+          </p:nvPr>
+        </p:nvSpPr>
+        <p:spPr/>
+        <p:txBody>
+          <a:bodyPr/>
+          <a:lstStyle/>
+          <a:p>
+            <a:r>
+              <a:rPr lang="de-DE"/>
+              <a:t>Dart - Programmiersprache für Smartphones</a:t>
+            </a:r>
+          </a:p>
+        </p:txBody>
+      </p:sp>
+      <p:sp>
+        <p:nvSpPr>
+          <p:cNvPr id="6" name="Foliennummernplatzhalter 5">
+            <a:extLst>
+              <a:ext uri="{FF2B5EF4-FFF2-40B4-BE49-F238E27FC236}">
+                <a16:creationId xmlns:a16="http://schemas.microsoft.com/office/drawing/2014/main" id="{613A4E99-866C-4160-9AA5-F42C4E2DBFDC}"/>
+              </a:ext>
+            </a:extLst>
+          </p:cNvPr>
+          <p:cNvSpPr>
+            <a:spLocks noGrp="1"/>
+          </p:cNvSpPr>
+          <p:nvPr>
+            <p:ph type="sldNum" sz="quarter" idx="12"/>
+          </p:nvPr>
+        </p:nvSpPr>
+        <p:spPr/>
+        <p:txBody>
+          <a:bodyPr/>
+          <a:lstStyle/>
+          <a:p>
+            <a:fld id="{3A1F27E2-D58A-4028-9FF2-B12D897F257E}" type="slidenum">
+              <a:rPr lang="de-DE" smtClean="0"/>
+              <a:t>64</a:t>
+            </a:fld>
+            <a:endParaRPr lang="de-DE"/>
+          </a:p>
+        </p:txBody>
+      </p:sp>
+      <p:pic>
+        <p:nvPicPr>
+          <p:cNvPr id="8" name="Grafik 7">
+            <a:extLst>
+              <a:ext uri="{FF2B5EF4-FFF2-40B4-BE49-F238E27FC236}">
+                <a16:creationId xmlns:a16="http://schemas.microsoft.com/office/drawing/2014/main" id="{EE17C094-0EE6-4ED0-BC9E-6C452073F63A}"/>
+              </a:ext>
+            </a:extLst>
+          </p:cNvPr>
+          <p:cNvPicPr>
+            <a:picLocks noChangeAspect="1"/>
+          </p:cNvPicPr>
+          <p:nvPr/>
+        </p:nvPicPr>
+        <p:blipFill>
+          <a:blip r:embed="rId2"/>
+          <a:stretch>
+            <a:fillRect/>
+          </a:stretch>
+        </p:blipFill>
+        <p:spPr>
+          <a:xfrm>
+            <a:off x="838200" y="2138354"/>
+            <a:ext cx="7562850" cy="3913196"/>
+          </a:xfrm>
+          <a:prstGeom prst="rect">
+            <a:avLst/>
+          </a:prstGeom>
+        </p:spPr>
+      </p:pic>
+      <p:sp>
+        <p:nvSpPr>
+          <p:cNvPr id="9" name="Rechteck 8">
+            <a:extLst>
+              <a:ext uri="{FF2B5EF4-FFF2-40B4-BE49-F238E27FC236}">
+                <a16:creationId xmlns:a16="http://schemas.microsoft.com/office/drawing/2014/main" id="{552FDEA9-7C50-41BD-9DDE-CA92ABEAD73E}"/>
+              </a:ext>
+            </a:extLst>
+          </p:cNvPr>
+          <p:cNvSpPr/>
+          <p:nvPr/>
+        </p:nvSpPr>
+        <p:spPr>
+          <a:xfrm>
+            <a:off x="2083784" y="2362199"/>
+            <a:ext cx="859441" cy="280395"/>
+          </a:xfrm>
+          <a:prstGeom prst="rect">
+            <a:avLst/>
+          </a:prstGeom>
+          <a:solidFill>
+            <a:srgbClr val="004990">
+              <a:alpha val="30196"/>
+            </a:srgbClr>
+          </a:solidFill>
+          <a:ln>
+            <a:noFill/>
+          </a:ln>
+        </p:spPr>
+        <p:style>
+          <a:lnRef idx="2">
+            <a:schemeClr val="accent1">
+              <a:shade val="50000"/>
+            </a:schemeClr>
+          </a:lnRef>
+          <a:fillRef idx="1">
+            <a:schemeClr val="accent1"/>
+          </a:fillRef>
+          <a:effectRef idx="0">
+            <a:schemeClr val="accent1"/>
+          </a:effectRef>
+          <a:fontRef idx="minor">
+            <a:schemeClr val="lt1"/>
+          </a:fontRef>
+        </p:style>
+        <p:txBody>
+          <a:bodyPr rtlCol="0" anchor="ctr"/>
+          <a:lstStyle/>
+          <a:p>
+            <a:pPr algn="ctr"/>
+            <a:endParaRPr lang="de-DE"/>
+          </a:p>
+        </p:txBody>
+      </p:sp>
+      <p:sp>
+        <p:nvSpPr>
+          <p:cNvPr id="10" name="Rechteck 9">
+            <a:extLst>
+              <a:ext uri="{FF2B5EF4-FFF2-40B4-BE49-F238E27FC236}">
+                <a16:creationId xmlns:a16="http://schemas.microsoft.com/office/drawing/2014/main" id="{34DF6FF1-9F9F-4C5C-BB2F-1D8350BCDE0A}"/>
+              </a:ext>
+            </a:extLst>
+          </p:cNvPr>
+          <p:cNvSpPr/>
+          <p:nvPr/>
+        </p:nvSpPr>
+        <p:spPr>
+          <a:xfrm>
+            <a:off x="3807809" y="2876549"/>
+            <a:ext cx="859441" cy="280395"/>
+          </a:xfrm>
+          <a:prstGeom prst="rect">
+            <a:avLst/>
+          </a:prstGeom>
+          <a:solidFill>
+            <a:srgbClr val="004990">
+              <a:alpha val="30196"/>
+            </a:srgbClr>
+          </a:solidFill>
+          <a:ln>
+            <a:noFill/>
+          </a:ln>
+        </p:spPr>
+        <p:style>
+          <a:lnRef idx="2">
+            <a:schemeClr val="accent1">
+              <a:shade val="50000"/>
+            </a:schemeClr>
+          </a:lnRef>
+          <a:fillRef idx="1">
+            <a:schemeClr val="accent1"/>
+          </a:fillRef>
+          <a:effectRef idx="0">
+            <a:schemeClr val="accent1"/>
+          </a:effectRef>
+          <a:fontRef idx="minor">
+            <a:schemeClr val="lt1"/>
+          </a:fontRef>
+        </p:style>
+        <p:txBody>
+          <a:bodyPr rtlCol="0" anchor="ctr"/>
+          <a:lstStyle/>
+          <a:p>
+            <a:pPr algn="ctr"/>
+            <a:endParaRPr lang="de-DE"/>
+          </a:p>
+        </p:txBody>
+      </p:sp>
+    </p:spTree>
+    <p:extLst>
+      <p:ext uri="{BB962C8B-B14F-4D97-AF65-F5344CB8AC3E}">
+        <p14:creationId xmlns:p14="http://schemas.microsoft.com/office/powerpoint/2010/main" val="1170326698"/>
       </p:ext>
     </p:extLst>
   </p:cSld>
@@ -29284,7 +32643,7 @@
           <a:p>
             <a:fld id="{7127E464-1A99-4532-A297-E1D7378D9E61}" type="datetime1">
               <a:rPr lang="de-DE" smtClean="0"/>
-              <a:t>17.02.2023</a:t>
+              <a:t>24.03.2023</a:t>
             </a:fld>
             <a:endParaRPr lang="de-DE"/>
           </a:p>
@@ -29665,7 +33024,7 @@
           <a:p>
             <a:fld id="{77B5C711-A7A8-40A0-AEA6-3F77D4628817}" type="datetime1">
               <a:rPr lang="de-DE" smtClean="0"/>
-              <a:t>17.02.2023</a:t>
+              <a:t>24.03.2023</a:t>
             </a:fld>
             <a:endParaRPr lang="de-DE"/>
           </a:p>
@@ -30044,7 +33403,7 @@
           <a:p>
             <a:fld id="{27A2010A-1149-4F23-80A2-1B4570F18F3A}" type="datetime1">
               <a:rPr lang="de-DE" smtClean="0"/>
-              <a:t>17.02.2023</a:t>
+              <a:t>24.03.2023</a:t>
             </a:fld>
             <a:endParaRPr lang="de-DE"/>
           </a:p>

</xml_diff>